<commit_message>
add pic of quaternion
</commit_message>
<xml_diff>
--- a/images/images_for_readme.pptx
+++ b/images/images_for_readme.pptx
@@ -5,13 +5,14 @@
     <p:sldMasterId id="2147483660" r:id="rId1"/>
   </p:sldMasterIdLst>
   <p:notesMasterIdLst>
-    <p:notesMasterId r:id="rId6"/>
+    <p:notesMasterId r:id="rId7"/>
   </p:notesMasterIdLst>
   <p:sldIdLst>
     <p:sldId id="518" r:id="rId2"/>
     <p:sldId id="519" r:id="rId3"/>
     <p:sldId id="520" r:id="rId4"/>
     <p:sldId id="521" r:id="rId5"/>
+    <p:sldId id="522" r:id="rId6"/>
   </p:sldIdLst>
   <p:sldSz cx="9144000" cy="6858000" type="screen4x3"/>
   <p:notesSz cx="6797675" cy="9926638"/>
@@ -4451,8 +4452,8 @@
           </a:p>
         </p:txBody>
       </p:sp>
-      <mc:AlternateContent xmlns:mc="http://schemas.openxmlformats.org/markup-compatibility/2006">
-        <mc:Choice xmlns:a14="http://schemas.microsoft.com/office/drawing/2010/main" Requires="a14">
+      <mc:AlternateContent xmlns:mc="http://schemas.openxmlformats.org/markup-compatibility/2006" xmlns:a14="http://schemas.microsoft.com/office/drawing/2010/main">
+        <mc:Choice Requires="a14">
           <p:sp>
             <p:nvSpPr>
               <p:cNvPr id="30" name="テキスト ボックス 29"/>
@@ -5106,7 +5107,7 @@
             </p:txBody>
           </p:sp>
         </mc:Choice>
-        <mc:Fallback>
+        <mc:Fallback xmlns="">
           <p:sp>
             <p:nvSpPr>
               <p:cNvPr id="30" name="テキスト ボックス 29"/>
@@ -5533,11 +5534,7 @@
             </a:r>
             <a:r>
               <a:rPr lang="en-US" altLang="ja-JP" dirty="0" smtClean="0"/>
-              <a:t> </a:t>
-            </a:r>
-            <a:r>
-              <a:rPr lang="en-US" altLang="ja-JP" dirty="0" smtClean="0"/>
-              <a:t>DCM</a:t>
+              <a:t> DCM</a:t>
             </a:r>
             <a:endParaRPr kumimoji="1" lang="ja-JP" altLang="en-US" dirty="0"/>
           </a:p>
@@ -5647,8 +5644,8 @@
           </a:p>
         </p:txBody>
       </p:sp>
-      <mc:AlternateContent xmlns:mc="http://schemas.openxmlformats.org/markup-compatibility/2006">
-        <mc:Choice xmlns:a14="http://schemas.microsoft.com/office/drawing/2010/main" Requires="a14">
+      <mc:AlternateContent xmlns:mc="http://schemas.openxmlformats.org/markup-compatibility/2006" xmlns:a14="http://schemas.microsoft.com/office/drawing/2010/main">
+        <mc:Choice Requires="a14">
           <p:sp>
             <p:nvSpPr>
               <p:cNvPr id="30" name="テキスト ボックス 29"/>
@@ -5881,7 +5878,7 @@
             </p:txBody>
           </p:sp>
         </mc:Choice>
-        <mc:Fallback>
+        <mc:Fallback xmlns="">
           <p:sp>
             <p:nvSpPr>
               <p:cNvPr id="30" name="テキスト ボックス 29"/>
@@ -5957,12 +5954,6 @@
               </a:rPr>
               <a:t>3-2-1 system</a:t>
             </a:r>
-            <a:endParaRPr kumimoji="1" lang="en-US" altLang="ja-JP" dirty="0" smtClean="0">
-              <a:solidFill>
-                <a:schemeClr val="accent1"/>
-              </a:solidFill>
-              <a:latin typeface="+mn-ea"/>
-            </a:endParaRPr>
           </a:p>
         </p:txBody>
       </p:sp>
@@ -6032,8 +6023,8 @@
           </a:p>
         </p:txBody>
       </p:sp>
-      <mc:AlternateContent xmlns:mc="http://schemas.openxmlformats.org/markup-compatibility/2006">
-        <mc:Choice xmlns:a14="http://schemas.microsoft.com/office/drawing/2010/main" Requires="a14">
+      <mc:AlternateContent xmlns:mc="http://schemas.openxmlformats.org/markup-compatibility/2006" xmlns:a14="http://schemas.microsoft.com/office/drawing/2010/main">
+        <mc:Choice Requires="a14">
           <p:sp>
             <p:nvSpPr>
               <p:cNvPr id="11" name="テキスト ボックス 10"/>
@@ -6155,13 +6146,7 @@
                                 <a:rPr lang="en-US" altLang="ja-JP" b="0" i="1" smtClean="0">
                                   <a:latin typeface="Cambria Math" panose="02040503050406030204" pitchFamily="18" charset="0"/>
                                 </a:rPr>
-                                <m:t>                             </m:t>
-                              </m:r>
-                              <m:r>
-                                <a:rPr lang="en-US" altLang="ja-JP" b="0" i="1" smtClean="0">
-                                  <a:latin typeface="Cambria Math" panose="02040503050406030204" pitchFamily="18" charset="0"/>
-                                </a:rPr>
-                                <m:t>&amp;</m:t>
+                                <m:t>                             &amp;</m:t>
                               </m:r>
                               <m:sSub>
                                 <m:sSubPr>
@@ -6441,13 +6426,7 @@
                                 <a:rPr lang="en-US" altLang="ja-JP" b="0" i="1" smtClean="0">
                                   <a:latin typeface="Cambria Math" panose="02040503050406030204" pitchFamily="18" charset="0"/>
                                 </a:rPr>
-                                <m:t>    </m:t>
-                              </m:r>
-                              <m:r>
-                                <a:rPr lang="en-US" altLang="ja-JP" b="0" i="1" smtClean="0">
-                                  <a:latin typeface="Cambria Math" panose="02040503050406030204" pitchFamily="18" charset="0"/>
-                                </a:rPr>
-                                <m:t>&amp;</m:t>
+                                <m:t>    &amp;</m:t>
                               </m:r>
                               <m:sSub>
                                 <m:sSubPr>
@@ -6620,13 +6599,7 @@
                                 <a:rPr lang="en-US" altLang="ja-JP" b="0" i="1" smtClean="0">
                                   <a:latin typeface="Cambria Math" panose="02040503050406030204" pitchFamily="18" charset="0"/>
                                 </a:rPr>
-                                <m:t>   </m:t>
-                              </m:r>
-                              <m:r>
-                                <a:rPr lang="en-US" altLang="ja-JP" b="0" i="1" smtClean="0">
-                                  <a:latin typeface="Cambria Math" panose="02040503050406030204" pitchFamily="18" charset="0"/>
-                                </a:rPr>
-                                <m:t>&amp;</m:t>
+                                <m:t>   &amp;</m:t>
                               </m:r>
                               <m:sSub>
                                 <m:sSubPr>
@@ -7124,7 +7097,7 @@
             </p:txBody>
           </p:sp>
         </mc:Choice>
-        <mc:Fallback>
+        <mc:Fallback xmlns="">
           <p:sp>
             <p:nvSpPr>
               <p:cNvPr id="11" name="テキスト ボックス 10"/>
@@ -7163,8 +7136,8 @@
           </p:sp>
         </mc:Fallback>
       </mc:AlternateContent>
-      <mc:AlternateContent xmlns:mc="http://schemas.openxmlformats.org/markup-compatibility/2006">
-        <mc:Choice xmlns:a14="http://schemas.microsoft.com/office/drawing/2010/main" Requires="a14">
+      <mc:AlternateContent xmlns:mc="http://schemas.openxmlformats.org/markup-compatibility/2006" xmlns:a14="http://schemas.microsoft.com/office/drawing/2010/main">
+        <mc:Choice Requires="a14">
           <p:sp>
             <p:nvSpPr>
               <p:cNvPr id="5" name="正方形/長方形 4"/>
@@ -7186,6 +7159,7 @@
               </a:bodyPr>
               <a:lstStyle/>
               <a:p>
+                <a:pPr/>
                 <a14:m>
                   <m:oMathPara xmlns:m="http://schemas.openxmlformats.org/officeDocument/2006/math">
                     <m:oMathParaPr>
@@ -7237,7 +7211,7 @@
             </p:txBody>
           </p:sp>
         </mc:Choice>
-        <mc:Fallback>
+        <mc:Fallback xmlns="">
           <p:sp>
             <p:nvSpPr>
               <p:cNvPr id="5" name="正方形/長方形 4"/>
@@ -7404,8 +7378,8 @@
           </a:p>
         </p:txBody>
       </p:sp>
-      <mc:AlternateContent xmlns:mc="http://schemas.openxmlformats.org/markup-compatibility/2006">
-        <mc:Choice xmlns:a14="http://schemas.microsoft.com/office/drawing/2010/main" Requires="a14">
+      <mc:AlternateContent xmlns:mc="http://schemas.openxmlformats.org/markup-compatibility/2006" xmlns:a14="http://schemas.microsoft.com/office/drawing/2010/main">
+        <mc:Choice Requires="a14">
           <p:sp>
             <p:nvSpPr>
               <p:cNvPr id="9" name="正方形/長方形 8"/>
@@ -7427,6 +7401,7 @@
               </a:bodyPr>
               <a:lstStyle/>
               <a:p>
+                <a:pPr/>
                 <a14:m>
                   <m:oMathPara xmlns:m="http://schemas.openxmlformats.org/officeDocument/2006/math">
                     <m:oMathParaPr>
@@ -7503,7 +7478,7 @@
             </p:txBody>
           </p:sp>
         </mc:Choice>
-        <mc:Fallback>
+        <mc:Fallback xmlns="">
           <p:sp>
             <p:nvSpPr>
               <p:cNvPr id="9" name="正方形/長方形 8"/>
@@ -7606,8 +7581,8 @@
           </a:p>
         </p:txBody>
       </p:sp>
-      <mc:AlternateContent xmlns:mc="http://schemas.openxmlformats.org/markup-compatibility/2006">
-        <mc:Choice xmlns:a14="http://schemas.microsoft.com/office/drawing/2010/main" Requires="a14">
+      <mc:AlternateContent xmlns:mc="http://schemas.openxmlformats.org/markup-compatibility/2006" xmlns:a14="http://schemas.microsoft.com/office/drawing/2010/main">
+        <mc:Choice Requires="a14">
           <p:sp>
             <p:nvSpPr>
               <p:cNvPr id="12" name="正方形/長方形 11"/>
@@ -7629,6 +7604,7 @@
               </a:bodyPr>
               <a:lstStyle/>
               <a:p>
+                <a:pPr/>
                 <a14:m>
                   <m:oMathPara xmlns:m="http://schemas.openxmlformats.org/officeDocument/2006/math">
                     <m:oMathParaPr>
@@ -7705,7 +7681,7 @@
             </p:txBody>
           </p:sp>
         </mc:Choice>
-        <mc:Fallback>
+        <mc:Fallback xmlns="">
           <p:sp>
             <p:nvSpPr>
               <p:cNvPr id="12" name="正方形/長方形 11"/>
@@ -7744,8 +7720,8 @@
           </p:sp>
         </mc:Fallback>
       </mc:AlternateContent>
-      <mc:AlternateContent xmlns:mc="http://schemas.openxmlformats.org/markup-compatibility/2006">
-        <mc:Choice xmlns:a14="http://schemas.microsoft.com/office/drawing/2010/main" Requires="a14">
+      <mc:AlternateContent xmlns:mc="http://schemas.openxmlformats.org/markup-compatibility/2006" xmlns:a14="http://schemas.microsoft.com/office/drawing/2010/main">
+        <mc:Choice Requires="a14">
           <p:sp>
             <p:nvSpPr>
               <p:cNvPr id="13" name="正方形/長方形 12"/>
@@ -7767,6 +7743,7 @@
               </a:bodyPr>
               <a:lstStyle/>
               <a:p>
+                <a:pPr/>
                 <a14:m>
                   <m:oMathPara xmlns:m="http://schemas.openxmlformats.org/officeDocument/2006/math">
                     <m:oMathParaPr>
@@ -7852,7 +7829,7 @@
             </p:txBody>
           </p:sp>
         </mc:Choice>
-        <mc:Fallback>
+        <mc:Fallback xmlns="">
           <p:sp>
             <p:nvSpPr>
               <p:cNvPr id="13" name="正方形/長方形 12"/>
@@ -7891,8 +7868,8 @@
           </p:sp>
         </mc:Fallback>
       </mc:AlternateContent>
-      <mc:AlternateContent xmlns:mc="http://schemas.openxmlformats.org/markup-compatibility/2006">
-        <mc:Choice xmlns:a14="http://schemas.microsoft.com/office/drawing/2010/main" Requires="a14">
+      <mc:AlternateContent xmlns:mc="http://schemas.openxmlformats.org/markup-compatibility/2006" xmlns:a14="http://schemas.microsoft.com/office/drawing/2010/main">
+        <mc:Choice Requires="a14">
           <p:sp>
             <p:nvSpPr>
               <p:cNvPr id="19" name="正方形/長方形 18"/>
@@ -7914,6 +7891,7 @@
               </a:bodyPr>
               <a:lstStyle/>
               <a:p>
+                <a:pPr/>
                 <a14:m>
                   <m:oMathPara xmlns:m="http://schemas.openxmlformats.org/officeDocument/2006/math">
                     <m:oMathParaPr>
@@ -7999,7 +7977,7 @@
             </p:txBody>
           </p:sp>
         </mc:Choice>
-        <mc:Fallback>
+        <mc:Fallback xmlns="">
           <p:sp>
             <p:nvSpPr>
               <p:cNvPr id="19" name="正方形/長方形 18"/>
@@ -8102,8 +8080,8 @@
           </a:p>
         </p:txBody>
       </p:sp>
-      <mc:AlternateContent xmlns:mc="http://schemas.openxmlformats.org/markup-compatibility/2006">
-        <mc:Choice xmlns:a14="http://schemas.microsoft.com/office/drawing/2010/main" Requires="a14">
+      <mc:AlternateContent xmlns:mc="http://schemas.openxmlformats.org/markup-compatibility/2006" xmlns:a14="http://schemas.microsoft.com/office/drawing/2010/main">
+        <mc:Choice Requires="a14">
           <p:sp>
             <p:nvSpPr>
               <p:cNvPr id="16" name="正方形/長方形 15"/>
@@ -8125,6 +8103,7 @@
               </a:bodyPr>
               <a:lstStyle/>
               <a:p>
+                <a:pPr/>
                 <a14:m>
                   <m:oMathPara xmlns:m="http://schemas.openxmlformats.org/officeDocument/2006/math">
                     <m:oMathParaPr>
@@ -8240,7 +8219,7 @@
             </p:txBody>
           </p:sp>
         </mc:Choice>
-        <mc:Fallback>
+        <mc:Fallback xmlns="">
           <p:sp>
             <p:nvSpPr>
               <p:cNvPr id="16" name="正方形/長方形 15"/>
@@ -8279,8 +8258,8 @@
           </p:sp>
         </mc:Fallback>
       </mc:AlternateContent>
-      <mc:AlternateContent xmlns:mc="http://schemas.openxmlformats.org/markup-compatibility/2006">
-        <mc:Choice xmlns:a14="http://schemas.microsoft.com/office/drawing/2010/main" Requires="a14">
+      <mc:AlternateContent xmlns:mc="http://schemas.openxmlformats.org/markup-compatibility/2006" xmlns:a14="http://schemas.microsoft.com/office/drawing/2010/main">
+        <mc:Choice Requires="a14">
           <p:sp>
             <p:nvSpPr>
               <p:cNvPr id="24" name="正方形/長方形 23"/>
@@ -8302,6 +8281,7 @@
               </a:bodyPr>
               <a:lstStyle/>
               <a:p>
+                <a:pPr/>
                 <a14:m>
                   <m:oMathPara xmlns:m="http://schemas.openxmlformats.org/officeDocument/2006/math">
                     <m:oMathParaPr>
@@ -8525,7 +8505,7 @@
             </p:txBody>
           </p:sp>
         </mc:Choice>
-        <mc:Fallback>
+        <mc:Fallback xmlns="">
           <p:sp>
             <p:nvSpPr>
               <p:cNvPr id="24" name="正方形/長方形 23"/>
@@ -8564,8 +8544,8 @@
           </p:sp>
         </mc:Fallback>
       </mc:AlternateContent>
-      <mc:AlternateContent xmlns:mc="http://schemas.openxmlformats.org/markup-compatibility/2006">
-        <mc:Choice xmlns:a14="http://schemas.microsoft.com/office/drawing/2010/main" Requires="a14">
+      <mc:AlternateContent xmlns:mc="http://schemas.openxmlformats.org/markup-compatibility/2006" xmlns:a14="http://schemas.microsoft.com/office/drawing/2010/main">
+        <mc:Choice Requires="a14">
           <p:sp>
             <p:nvSpPr>
               <p:cNvPr id="26" name="正方形/長方形 25"/>
@@ -8587,6 +8567,7 @@
               </a:bodyPr>
               <a:lstStyle/>
               <a:p>
+                <a:pPr/>
                 <a14:m>
                   <m:oMathPara xmlns:m="http://schemas.openxmlformats.org/officeDocument/2006/math">
                     <m:oMathParaPr>
@@ -8804,7 +8785,7 @@
             </p:txBody>
           </p:sp>
         </mc:Choice>
-        <mc:Fallback>
+        <mc:Fallback xmlns="">
           <p:sp>
             <p:nvSpPr>
               <p:cNvPr id="26" name="正方形/長方形 25"/>
@@ -8990,6 +8971,3513 @@
     <p:extLst>
       <p:ext uri="{BB962C8B-B14F-4D97-AF65-F5344CB8AC3E}">
         <p14:creationId xmlns:p14="http://schemas.microsoft.com/office/powerpoint/2010/main" val="1009388672"/>
+      </p:ext>
+    </p:extLst>
+  </p:cSld>
+  <p:clrMapOvr>
+    <a:masterClrMapping/>
+  </p:clrMapOvr>
+</p:sld>
+</file>
+
+<file path=ppt/slides/slide5.xml><?xml version="1.0" encoding="utf-8"?>
+<p:sld xmlns:a="http://schemas.openxmlformats.org/drawingml/2006/main" xmlns:r="http://schemas.openxmlformats.org/officeDocument/2006/relationships" xmlns:p="http://schemas.openxmlformats.org/presentationml/2006/main">
+  <p:cSld>
+    <p:spTree>
+      <p:nvGrpSpPr>
+        <p:cNvPr id="1" name=""/>
+        <p:cNvGrpSpPr/>
+        <p:nvPr/>
+      </p:nvGrpSpPr>
+      <p:grpSpPr>
+        <a:xfrm>
+          <a:off x="0" y="0"/>
+          <a:ext cx="0" cy="0"/>
+          <a:chOff x="0" y="0"/>
+          <a:chExt cx="0" cy="0"/>
+        </a:xfrm>
+      </p:grpSpPr>
+      <p:sp>
+        <p:nvSpPr>
+          <p:cNvPr id="2" name="タイトル 1"/>
+          <p:cNvSpPr>
+            <a:spLocks noGrp="1"/>
+          </p:cNvSpPr>
+          <p:nvPr>
+            <p:ph type="title"/>
+          </p:nvPr>
+        </p:nvSpPr>
+        <p:spPr/>
+        <p:txBody>
+          <a:bodyPr/>
+          <a:lstStyle/>
+          <a:p>
+            <a:r>
+              <a:rPr lang="en-US" altLang="ja-JP" dirty="0" smtClean="0"/>
+              <a:t>Quaternion </a:t>
+            </a:r>
+            <a:r>
+              <a:rPr lang="ja-JP" altLang="en-US" dirty="0" smtClean="0"/>
+              <a:t>⇔</a:t>
+            </a:r>
+            <a:r>
+              <a:rPr lang="en-US" altLang="ja-JP" dirty="0" smtClean="0"/>
+              <a:t> DCM</a:t>
+            </a:r>
+            <a:endParaRPr kumimoji="1" lang="ja-JP" altLang="en-US" dirty="0"/>
+          </a:p>
+        </p:txBody>
+      </p:sp>
+      <p:sp>
+        <p:nvSpPr>
+          <p:cNvPr id="23" name="角丸四角形 22"/>
+          <p:cNvSpPr/>
+          <p:nvPr/>
+        </p:nvSpPr>
+        <p:spPr bwMode="auto">
+          <a:xfrm>
+            <a:off x="539552" y="1340768"/>
+            <a:ext cx="7344816" cy="3744416"/>
+          </a:xfrm>
+          <a:prstGeom prst="roundRect">
+            <a:avLst>
+              <a:gd name="adj" fmla="val 7825"/>
+            </a:avLst>
+          </a:prstGeom>
+          <a:noFill/>
+          <a:ln w="63500" cap="flat" cmpd="sng" algn="ctr">
+            <a:solidFill>
+              <a:schemeClr val="tx1"/>
+            </a:solidFill>
+            <a:prstDash val="solid"/>
+            <a:round/>
+            <a:headEnd type="none" w="med" len="med"/>
+            <a:tailEnd type="none" w="med" len="med"/>
+          </a:ln>
+          <a:effectLst/>
+        </p:spPr>
+        <p:txBody>
+          <a:bodyPr vert="horz" wrap="none" lIns="91440" tIns="45720" rIns="91440" bIns="45720" numCol="1" rtlCol="0" anchor="ctr" anchorCtr="0" compatLnSpc="1">
+            <a:prstTxWarp prst="textNoShape">
+              <a:avLst/>
+            </a:prstTxWarp>
+          </a:bodyPr>
+          <a:lstStyle/>
+          <a:p>
+            <a:pPr marL="0" marR="0" indent="0" algn="l" defTabSz="914400" rtl="0" eaLnBrk="1" fontAlgn="base" latinLnBrk="0" hangingPunct="1">
+              <a:lnSpc>
+                <a:spcPct val="100000"/>
+              </a:lnSpc>
+              <a:spcBef>
+                <a:spcPct val="0"/>
+              </a:spcBef>
+              <a:spcAft>
+                <a:spcPct val="0"/>
+              </a:spcAft>
+              <a:buClrTx/>
+              <a:buSzTx/>
+              <a:buFontTx/>
+              <a:buNone/>
+              <a:tabLst/>
+            </a:pPr>
+            <a:endParaRPr kumimoji="1" lang="ja-JP" altLang="en-US" sz="2400" b="0" i="0" u="none" strike="noStrike" cap="none" normalizeH="0" baseline="0" smtClean="0">
+              <a:ln>
+                <a:noFill/>
+              </a:ln>
+              <a:solidFill>
+                <a:schemeClr val="tx1"/>
+              </a:solidFill>
+              <a:effectLst/>
+              <a:latin typeface="Times New Roman" pitchFamily="18" charset="0"/>
+              <a:ea typeface="ＭＳ Ｐゴシック" pitchFamily="50" charset="-128"/>
+            </a:endParaRPr>
+          </a:p>
+        </p:txBody>
+      </p:sp>
+      <p:sp>
+        <p:nvSpPr>
+          <p:cNvPr id="22" name="テキスト ボックス 21"/>
+          <p:cNvSpPr txBox="1"/>
+          <p:nvPr/>
+        </p:nvSpPr>
+        <p:spPr>
+          <a:xfrm>
+            <a:off x="2388264" y="1114456"/>
+            <a:ext cx="3300455" cy="461665"/>
+          </a:xfrm>
+          <a:prstGeom prst="rect">
+            <a:avLst/>
+          </a:prstGeom>
+          <a:solidFill>
+            <a:srgbClr val="FFFFFF"/>
+          </a:solidFill>
+        </p:spPr>
+        <p:txBody>
+          <a:bodyPr wrap="none" rtlCol="0">
+            <a:spAutoFit/>
+          </a:bodyPr>
+          <a:lstStyle/>
+          <a:p>
+            <a:r>
+              <a:rPr lang="en-US" altLang="ja-JP" sz="2400" dirty="0" smtClean="0">
+                <a:latin typeface="+mj-ea"/>
+                <a:ea typeface="+mj-ea"/>
+              </a:rPr>
+              <a:t>Quaternion</a:t>
+            </a:r>
+            <a:r>
+              <a:rPr lang="en-US" altLang="ja-JP" sz="2400" dirty="0" smtClean="0">
+                <a:latin typeface="+mj-ea"/>
+                <a:ea typeface="+mj-ea"/>
+              </a:rPr>
+              <a:t>          </a:t>
+            </a:r>
+            <a:r>
+              <a:rPr lang="en-US" altLang="ja-JP" sz="2400" dirty="0" smtClean="0">
+                <a:latin typeface="+mj-ea"/>
+                <a:ea typeface="+mj-ea"/>
+              </a:rPr>
+              <a:t>DCM</a:t>
+            </a:r>
+            <a:endParaRPr kumimoji="1" lang="ja-JP" altLang="en-US" sz="2400" dirty="0">
+              <a:latin typeface="+mj-ea"/>
+              <a:ea typeface="+mj-ea"/>
+            </a:endParaRPr>
+          </a:p>
+        </p:txBody>
+      </p:sp>
+      <mc:AlternateContent xmlns:mc="http://schemas.openxmlformats.org/markup-compatibility/2006">
+        <mc:Choice xmlns:a14="http://schemas.microsoft.com/office/drawing/2010/main" Requires="a14">
+          <p:sp>
+            <p:nvSpPr>
+              <p:cNvPr id="30" name="テキスト ボックス 29"/>
+              <p:cNvSpPr txBox="1"/>
+              <p:nvPr/>
+            </p:nvSpPr>
+            <p:spPr>
+              <a:xfrm>
+                <a:off x="741292" y="1948670"/>
+                <a:ext cx="1672189" cy="671146"/>
+              </a:xfrm>
+              <a:prstGeom prst="rect">
+                <a:avLst/>
+              </a:prstGeom>
+              <a:noFill/>
+            </p:spPr>
+            <p:txBody>
+              <a:bodyPr wrap="none" rtlCol="0">
+                <a:spAutoFit/>
+              </a:bodyPr>
+              <a:lstStyle/>
+              <a:p>
+                <a:pPr/>
+                <a14:m>
+                  <m:oMathPara xmlns:m="http://schemas.openxmlformats.org/officeDocument/2006/math">
+                    <m:oMathParaPr>
+                      <m:jc m:val="centerGroup"/>
+                    </m:oMathParaPr>
+                    <m:oMath xmlns:m="http://schemas.openxmlformats.org/officeDocument/2006/math">
+                      <m:sSub>
+                        <m:sSubPr>
+                          <m:ctrlPr>
+                            <a:rPr kumimoji="1" lang="en-US" altLang="ja-JP" sz="2000" b="0" i="1" smtClean="0">
+                              <a:latin typeface="Cambria Math" panose="02040503050406030204" pitchFamily="18" charset="0"/>
+                            </a:rPr>
+                          </m:ctrlPr>
+                        </m:sSubPr>
+                        <m:e>
+                          <m:r>
+                            <a:rPr kumimoji="1" lang="en-US" altLang="ja-JP" sz="2000" b="0" i="1" smtClean="0">
+                              <a:latin typeface="Cambria Math" panose="02040503050406030204" pitchFamily="18" charset="0"/>
+                            </a:rPr>
+                            <m:t>𝑞</m:t>
+                          </m:r>
+                        </m:e>
+                        <m:sub>
+                          <m:r>
+                            <a:rPr kumimoji="1" lang="en-US" altLang="ja-JP" sz="2000" b="0" i="1" smtClean="0">
+                              <a:latin typeface="Cambria Math" panose="02040503050406030204" pitchFamily="18" charset="0"/>
+                            </a:rPr>
+                            <m:t>1</m:t>
+                          </m:r>
+                        </m:sub>
+                      </m:sSub>
+                      <m:r>
+                        <a:rPr lang="en-US" altLang="ja-JP" sz="2000" b="0" i="1" smtClean="0">
+                          <a:latin typeface="Cambria Math" panose="02040503050406030204" pitchFamily="18" charset="0"/>
+                        </a:rPr>
+                        <m:t>=</m:t>
+                      </m:r>
+                      <m:sSub>
+                        <m:sSubPr>
+                          <m:ctrlPr>
+                            <a:rPr lang="en-US" altLang="ja-JP" sz="2000" b="0" i="1" smtClean="0">
+                              <a:latin typeface="Cambria Math" panose="02040503050406030204" pitchFamily="18" charset="0"/>
+                            </a:rPr>
+                          </m:ctrlPr>
+                        </m:sSubPr>
+                        <m:e>
+                          <m:r>
+                            <a:rPr lang="ja-JP" altLang="en-US" sz="2000" b="0" i="1" smtClean="0">
+                              <a:latin typeface="Cambria Math" panose="02040503050406030204" pitchFamily="18" charset="0"/>
+                            </a:rPr>
+                            <m:t>𝜆</m:t>
+                          </m:r>
+                        </m:e>
+                        <m:sub>
+                          <m:r>
+                            <a:rPr lang="en-US" altLang="ja-JP" sz="2000" b="0" i="1" smtClean="0">
+                              <a:latin typeface="Cambria Math" panose="02040503050406030204" pitchFamily="18" charset="0"/>
+                            </a:rPr>
+                            <m:t>1</m:t>
+                          </m:r>
+                        </m:sub>
+                      </m:sSub>
+                      <m:r>
+                        <m:rPr>
+                          <m:sty m:val="p"/>
+                        </m:rPr>
+                        <a:rPr lang="en-US" altLang="ja-JP" sz="2000" b="0" i="0" smtClean="0">
+                          <a:latin typeface="Cambria Math" panose="02040503050406030204" pitchFamily="18" charset="0"/>
+                        </a:rPr>
+                        <m:t>sin</m:t>
+                      </m:r>
+                      <m:f>
+                        <m:fPr>
+                          <m:ctrlPr>
+                            <a:rPr lang="en-US" altLang="ja-JP" sz="2000" b="0" i="1" smtClean="0">
+                              <a:latin typeface="Cambria Math" panose="02040503050406030204" pitchFamily="18" charset="0"/>
+                            </a:rPr>
+                          </m:ctrlPr>
+                        </m:fPr>
+                        <m:num>
+                          <m:r>
+                            <a:rPr lang="ja-JP" altLang="en-US" sz="2000" b="0" i="1" smtClean="0">
+                              <a:latin typeface="Cambria Math" panose="02040503050406030204" pitchFamily="18" charset="0"/>
+                            </a:rPr>
+                            <m:t>𝜃</m:t>
+                          </m:r>
+                        </m:num>
+                        <m:den>
+                          <m:r>
+                            <a:rPr lang="en-US" altLang="ja-JP" sz="2000" b="0" i="1" smtClean="0">
+                              <a:latin typeface="Cambria Math" panose="02040503050406030204" pitchFamily="18" charset="0"/>
+                            </a:rPr>
+                            <m:t>2</m:t>
+                          </m:r>
+                        </m:den>
+                      </m:f>
+                    </m:oMath>
+                  </m:oMathPara>
+                </a14:m>
+                <a:endParaRPr kumimoji="1" lang="ja-JP" altLang="en-US" sz="2000" dirty="0"/>
+              </a:p>
+            </p:txBody>
+          </p:sp>
+        </mc:Choice>
+        <mc:Fallback>
+          <p:sp>
+            <p:nvSpPr>
+              <p:cNvPr id="30" name="テキスト ボックス 29"/>
+              <p:cNvSpPr txBox="1">
+                <a:spLocks noRot="1" noChangeAspect="1" noMove="1" noResize="1" noEditPoints="1" noAdjustHandles="1" noChangeArrowheads="1" noChangeShapeType="1" noTextEdit="1"/>
+              </p:cNvSpPr>
+              <p:nvPr/>
+            </p:nvSpPr>
+            <p:spPr>
+              <a:xfrm>
+                <a:off x="741292" y="1948670"/>
+                <a:ext cx="1672189" cy="671146"/>
+              </a:xfrm>
+              <a:prstGeom prst="rect">
+                <a:avLst/>
+              </a:prstGeom>
+              <a:blipFill rotWithShape="0">
+                <a:blip r:embed="rId2"/>
+                <a:stretch>
+                  <a:fillRect/>
+                </a:stretch>
+              </a:blipFill>
+            </p:spPr>
+            <p:txBody>
+              <a:bodyPr/>
+              <a:lstStyle/>
+              <a:p>
+                <a:r>
+                  <a:rPr lang="ja-JP" altLang="en-US">
+                    <a:noFill/>
+                  </a:rPr>
+                  <a:t> </a:t>
+                </a:r>
+              </a:p>
+            </p:txBody>
+          </p:sp>
+        </mc:Fallback>
+      </mc:AlternateContent>
+      <mc:AlternateContent xmlns:mc="http://schemas.openxmlformats.org/markup-compatibility/2006">
+        <mc:Choice xmlns:a14="http://schemas.microsoft.com/office/drawing/2010/main" Requires="a14">
+          <p:sp>
+            <p:nvSpPr>
+              <p:cNvPr id="3" name="テキスト ボックス 2"/>
+              <p:cNvSpPr txBox="1"/>
+              <p:nvPr/>
+            </p:nvSpPr>
+            <p:spPr>
+              <a:xfrm>
+                <a:off x="684336" y="1576121"/>
+                <a:ext cx="4139146" cy="369332"/>
+              </a:xfrm>
+              <a:prstGeom prst="rect">
+                <a:avLst/>
+              </a:prstGeom>
+              <a:noFill/>
+            </p:spPr>
+            <p:txBody>
+              <a:bodyPr wrap="none" rtlCol="0">
+                <a:spAutoFit/>
+              </a:bodyPr>
+              <a:lstStyle/>
+              <a:p>
+                <a:r>
+                  <a:rPr kumimoji="1" lang="en-US" altLang="ja-JP" dirty="0" smtClean="0">
+                    <a:latin typeface="+mn-ea"/>
+                  </a:rPr>
+                  <a:t>I </a:t>
+                </a:r>
+                <a:r>
+                  <a:rPr lang="en-US" altLang="ja-JP" dirty="0" smtClean="0">
+                    <a:latin typeface="+mn-ea"/>
+                  </a:rPr>
+                  <a:t>define Quaternion </a:t>
+                </a:r>
+                <a14:m>
+                  <m:oMath xmlns:m="http://schemas.openxmlformats.org/officeDocument/2006/math">
+                    <m:sSub>
+                      <m:sSubPr>
+                        <m:ctrlPr>
+                          <a:rPr lang="en-US" altLang="ja-JP" i="1" smtClean="0">
+                            <a:latin typeface="Cambria Math" panose="02040503050406030204" pitchFamily="18" charset="0"/>
+                          </a:rPr>
+                        </m:ctrlPr>
+                      </m:sSubPr>
+                      <m:e>
+                        <m:r>
+                          <a:rPr lang="en-US" altLang="ja-JP" b="0" i="1" smtClean="0">
+                            <a:latin typeface="Cambria Math" panose="02040503050406030204" pitchFamily="18" charset="0"/>
+                          </a:rPr>
+                          <m:t>𝑞</m:t>
+                        </m:r>
+                      </m:e>
+                      <m:sub>
+                        <m:r>
+                          <a:rPr lang="en-US" altLang="ja-JP" b="0" i="1" smtClean="0">
+                            <a:latin typeface="Cambria Math" panose="02040503050406030204" pitchFamily="18" charset="0"/>
+                          </a:rPr>
+                          <m:t>1</m:t>
+                        </m:r>
+                      </m:sub>
+                    </m:sSub>
+                    <m:r>
+                      <a:rPr lang="en-US" altLang="ja-JP" b="0" i="1" smtClean="0">
+                        <a:latin typeface="Cambria Math" panose="02040503050406030204" pitchFamily="18" charset="0"/>
+                      </a:rPr>
+                      <m:t>~</m:t>
+                    </m:r>
+                    <m:sSub>
+                      <m:sSubPr>
+                        <m:ctrlPr>
+                          <a:rPr lang="en-US" altLang="ja-JP" b="0" i="1" smtClean="0">
+                            <a:latin typeface="Cambria Math" panose="02040503050406030204" pitchFamily="18" charset="0"/>
+                          </a:rPr>
+                        </m:ctrlPr>
+                      </m:sSubPr>
+                      <m:e>
+                        <m:r>
+                          <a:rPr lang="en-US" altLang="ja-JP" b="0" i="1" smtClean="0">
+                            <a:latin typeface="Cambria Math" panose="02040503050406030204" pitchFamily="18" charset="0"/>
+                          </a:rPr>
+                          <m:t>𝑞</m:t>
+                        </m:r>
+                      </m:e>
+                      <m:sub>
+                        <m:r>
+                          <a:rPr lang="en-US" altLang="ja-JP" b="0" i="1" smtClean="0">
+                            <a:latin typeface="Cambria Math" panose="02040503050406030204" pitchFamily="18" charset="0"/>
+                          </a:rPr>
+                          <m:t>4</m:t>
+                        </m:r>
+                      </m:sub>
+                    </m:sSub>
+                  </m:oMath>
+                </a14:m>
+                <a:r>
+                  <a:rPr lang="en-US" altLang="ja-JP" dirty="0" smtClean="0">
+                    <a:latin typeface="+mn-ea"/>
+                  </a:rPr>
+                  <a:t> as bellow</a:t>
+                </a:r>
+                <a:endParaRPr kumimoji="1" lang="en-US" altLang="ja-JP" dirty="0" smtClean="0">
+                  <a:solidFill>
+                    <a:schemeClr val="accent1"/>
+                  </a:solidFill>
+                  <a:latin typeface="+mn-ea"/>
+                </a:endParaRPr>
+              </a:p>
+            </p:txBody>
+          </p:sp>
+        </mc:Choice>
+        <mc:Fallback>
+          <p:sp>
+            <p:nvSpPr>
+              <p:cNvPr id="3" name="テキスト ボックス 2"/>
+              <p:cNvSpPr txBox="1">
+                <a:spLocks noRot="1" noChangeAspect="1" noMove="1" noResize="1" noEditPoints="1" noAdjustHandles="1" noChangeArrowheads="1" noChangeShapeType="1" noTextEdit="1"/>
+              </p:cNvSpPr>
+              <p:nvPr/>
+            </p:nvSpPr>
+            <p:spPr>
+              <a:xfrm>
+                <a:off x="684336" y="1576121"/>
+                <a:ext cx="4139146" cy="369332"/>
+              </a:xfrm>
+              <a:prstGeom prst="rect">
+                <a:avLst/>
+              </a:prstGeom>
+              <a:blipFill rotWithShape="0">
+                <a:blip r:embed="rId3"/>
+                <a:stretch>
+                  <a:fillRect l="-1178" t="-10000" b="-26667"/>
+                </a:stretch>
+              </a:blipFill>
+            </p:spPr>
+            <p:txBody>
+              <a:bodyPr/>
+              <a:lstStyle/>
+              <a:p>
+                <a:r>
+                  <a:rPr lang="ja-JP" altLang="en-US">
+                    <a:noFill/>
+                  </a:rPr>
+                  <a:t> </a:t>
+                </a:r>
+              </a:p>
+            </p:txBody>
+          </p:sp>
+        </mc:Fallback>
+      </mc:AlternateContent>
+      <p:sp>
+        <p:nvSpPr>
+          <p:cNvPr id="4" name="左右矢印 3"/>
+          <p:cNvSpPr/>
+          <p:nvPr/>
+        </p:nvSpPr>
+        <p:spPr bwMode="auto">
+          <a:xfrm>
+            <a:off x="4313376" y="1192805"/>
+            <a:ext cx="432048" cy="288032"/>
+          </a:xfrm>
+          <a:prstGeom prst="leftRightArrow">
+            <a:avLst/>
+          </a:prstGeom>
+          <a:solidFill>
+            <a:schemeClr val="tx1"/>
+          </a:solidFill>
+          <a:ln w="9525" cap="flat" cmpd="sng" algn="ctr">
+            <a:solidFill>
+              <a:schemeClr val="tx1"/>
+            </a:solidFill>
+            <a:prstDash val="solid"/>
+            <a:round/>
+            <a:headEnd type="none" w="med" len="med"/>
+            <a:tailEnd type="none" w="med" len="med"/>
+          </a:ln>
+          <a:effectLst/>
+        </p:spPr>
+        <p:txBody>
+          <a:bodyPr vert="horz" wrap="none" lIns="91440" tIns="45720" rIns="91440" bIns="45720" numCol="1" rtlCol="0" anchor="ctr" anchorCtr="0" compatLnSpc="1">
+            <a:prstTxWarp prst="textNoShape">
+              <a:avLst/>
+            </a:prstTxWarp>
+          </a:bodyPr>
+          <a:lstStyle/>
+          <a:p>
+            <a:pPr marL="0" marR="0" indent="0" algn="l" defTabSz="914400" rtl="0" eaLnBrk="1" fontAlgn="base" latinLnBrk="0" hangingPunct="1">
+              <a:lnSpc>
+                <a:spcPct val="100000"/>
+              </a:lnSpc>
+              <a:spcBef>
+                <a:spcPct val="0"/>
+              </a:spcBef>
+              <a:spcAft>
+                <a:spcPct val="0"/>
+              </a:spcAft>
+              <a:buClrTx/>
+              <a:buSzTx/>
+              <a:buFontTx/>
+              <a:buNone/>
+              <a:tabLst/>
+            </a:pPr>
+            <a:endParaRPr kumimoji="1" lang="ja-JP" altLang="en-US" sz="2400" b="0" i="0" u="none" strike="noStrike" cap="none" normalizeH="0" baseline="0" smtClean="0">
+              <a:ln>
+                <a:noFill/>
+              </a:ln>
+              <a:solidFill>
+                <a:schemeClr val="tx1"/>
+              </a:solidFill>
+              <a:effectLst/>
+              <a:latin typeface="Times New Roman" pitchFamily="18" charset="0"/>
+              <a:ea typeface="ＭＳ Ｐゴシック" pitchFamily="50" charset="-128"/>
+            </a:endParaRPr>
+          </a:p>
+        </p:txBody>
+      </p:sp>
+      <mc:AlternateContent xmlns:mc="http://schemas.openxmlformats.org/markup-compatibility/2006">
+        <mc:Choice xmlns:a14="http://schemas.microsoft.com/office/drawing/2010/main" Requires="a14">
+          <p:sp>
+            <p:nvSpPr>
+              <p:cNvPr id="25" name="テキスト ボックス 24"/>
+              <p:cNvSpPr txBox="1"/>
+              <p:nvPr/>
+            </p:nvSpPr>
+            <p:spPr>
+              <a:xfrm>
+                <a:off x="2388264" y="1948670"/>
+                <a:ext cx="1746632" cy="671146"/>
+              </a:xfrm>
+              <a:prstGeom prst="rect">
+                <a:avLst/>
+              </a:prstGeom>
+              <a:noFill/>
+            </p:spPr>
+            <p:txBody>
+              <a:bodyPr wrap="none" rtlCol="0">
+                <a:spAutoFit/>
+              </a:bodyPr>
+              <a:lstStyle/>
+              <a:p>
+                <a:pPr/>
+                <a14:m>
+                  <m:oMathPara xmlns:m="http://schemas.openxmlformats.org/officeDocument/2006/math">
+                    <m:oMathParaPr>
+                      <m:jc m:val="centerGroup"/>
+                    </m:oMathParaPr>
+                    <m:oMath xmlns:m="http://schemas.openxmlformats.org/officeDocument/2006/math">
+                      <m:sSub>
+                        <m:sSubPr>
+                          <m:ctrlPr>
+                            <a:rPr kumimoji="1" lang="en-US" altLang="ja-JP" sz="2000" b="0" i="1" smtClean="0">
+                              <a:latin typeface="Cambria Math" panose="02040503050406030204" pitchFamily="18" charset="0"/>
+                            </a:rPr>
+                          </m:ctrlPr>
+                        </m:sSubPr>
+                        <m:e>
+                          <m:r>
+                            <a:rPr kumimoji="1" lang="en-US" altLang="ja-JP" sz="2000" b="0" i="1" smtClean="0">
+                              <a:latin typeface="Cambria Math" panose="02040503050406030204" pitchFamily="18" charset="0"/>
+                            </a:rPr>
+                            <m:t>𝑞</m:t>
+                          </m:r>
+                        </m:e>
+                        <m:sub>
+                          <m:r>
+                            <a:rPr kumimoji="1" lang="en-US" altLang="ja-JP" sz="2000" b="0" i="1" smtClean="0">
+                              <a:latin typeface="Cambria Math" panose="02040503050406030204" pitchFamily="18" charset="0"/>
+                            </a:rPr>
+                            <m:t>2</m:t>
+                          </m:r>
+                        </m:sub>
+                      </m:sSub>
+                      <m:r>
+                        <a:rPr lang="en-US" altLang="ja-JP" sz="2000" b="0" i="1" smtClean="0">
+                          <a:latin typeface="Cambria Math" panose="02040503050406030204" pitchFamily="18" charset="0"/>
+                        </a:rPr>
+                        <m:t>=</m:t>
+                      </m:r>
+                      <m:sSub>
+                        <m:sSubPr>
+                          <m:ctrlPr>
+                            <a:rPr lang="en-US" altLang="ja-JP" sz="2000" b="0" i="1" smtClean="0">
+                              <a:latin typeface="Cambria Math" panose="02040503050406030204" pitchFamily="18" charset="0"/>
+                            </a:rPr>
+                          </m:ctrlPr>
+                        </m:sSubPr>
+                        <m:e>
+                          <m:r>
+                            <a:rPr lang="ja-JP" altLang="en-US" sz="2000" b="0" i="1" smtClean="0">
+                              <a:latin typeface="Cambria Math" panose="02040503050406030204" pitchFamily="18" charset="0"/>
+                            </a:rPr>
+                            <m:t>𝜆</m:t>
+                          </m:r>
+                        </m:e>
+                        <m:sub>
+                          <m:r>
+                            <a:rPr lang="en-US" altLang="ja-JP" sz="2000" b="0" i="1" smtClean="0">
+                              <a:latin typeface="Cambria Math" panose="02040503050406030204" pitchFamily="18" charset="0"/>
+                            </a:rPr>
+                            <m:t>2</m:t>
+                          </m:r>
+                        </m:sub>
+                      </m:sSub>
+                      <m:r>
+                        <m:rPr>
+                          <m:sty m:val="p"/>
+                        </m:rPr>
+                        <a:rPr lang="en-US" altLang="ja-JP" sz="2000" b="0" i="0" smtClean="0">
+                          <a:latin typeface="Cambria Math" panose="02040503050406030204" pitchFamily="18" charset="0"/>
+                        </a:rPr>
+                        <m:t>sin</m:t>
+                      </m:r>
+                      <m:f>
+                        <m:fPr>
+                          <m:ctrlPr>
+                            <a:rPr lang="en-US" altLang="ja-JP" sz="2000" b="0" i="1" smtClean="0">
+                              <a:latin typeface="Cambria Math" panose="02040503050406030204" pitchFamily="18" charset="0"/>
+                            </a:rPr>
+                          </m:ctrlPr>
+                        </m:fPr>
+                        <m:num>
+                          <m:r>
+                            <a:rPr lang="ja-JP" altLang="en-US" sz="2000" b="0" i="1" smtClean="0">
+                              <a:latin typeface="Cambria Math" panose="02040503050406030204" pitchFamily="18" charset="0"/>
+                            </a:rPr>
+                            <m:t>𝜃</m:t>
+                          </m:r>
+                        </m:num>
+                        <m:den>
+                          <m:r>
+                            <a:rPr lang="en-US" altLang="ja-JP" sz="2000" b="0" i="1" smtClean="0">
+                              <a:latin typeface="Cambria Math" panose="02040503050406030204" pitchFamily="18" charset="0"/>
+                            </a:rPr>
+                            <m:t>2</m:t>
+                          </m:r>
+                        </m:den>
+                      </m:f>
+                    </m:oMath>
+                  </m:oMathPara>
+                </a14:m>
+                <a:endParaRPr kumimoji="1" lang="ja-JP" altLang="en-US" sz="2000" dirty="0"/>
+              </a:p>
+            </p:txBody>
+          </p:sp>
+        </mc:Choice>
+        <mc:Fallback>
+          <p:sp>
+            <p:nvSpPr>
+              <p:cNvPr id="25" name="テキスト ボックス 24"/>
+              <p:cNvSpPr txBox="1">
+                <a:spLocks noRot="1" noChangeAspect="1" noMove="1" noResize="1" noEditPoints="1" noAdjustHandles="1" noChangeArrowheads="1" noChangeShapeType="1" noTextEdit="1"/>
+              </p:cNvSpPr>
+              <p:nvPr/>
+            </p:nvSpPr>
+            <p:spPr>
+              <a:xfrm>
+                <a:off x="2388264" y="1948670"/>
+                <a:ext cx="1746632" cy="671146"/>
+              </a:xfrm>
+              <a:prstGeom prst="rect">
+                <a:avLst/>
+              </a:prstGeom>
+              <a:blipFill rotWithShape="0">
+                <a:blip r:embed="rId4"/>
+                <a:stretch>
+                  <a:fillRect/>
+                </a:stretch>
+              </a:blipFill>
+            </p:spPr>
+            <p:txBody>
+              <a:bodyPr/>
+              <a:lstStyle/>
+              <a:p>
+                <a:r>
+                  <a:rPr lang="ja-JP" altLang="en-US">
+                    <a:noFill/>
+                  </a:rPr>
+                  <a:t> </a:t>
+                </a:r>
+              </a:p>
+            </p:txBody>
+          </p:sp>
+        </mc:Fallback>
+      </mc:AlternateContent>
+      <mc:AlternateContent xmlns:mc="http://schemas.openxmlformats.org/markup-compatibility/2006">
+        <mc:Choice xmlns:a14="http://schemas.microsoft.com/office/drawing/2010/main" Requires="a14">
+          <p:sp>
+            <p:nvSpPr>
+              <p:cNvPr id="29" name="テキスト ボックス 28"/>
+              <p:cNvSpPr txBox="1"/>
+              <p:nvPr/>
+            </p:nvSpPr>
+            <p:spPr>
+              <a:xfrm>
+                <a:off x="4032101" y="1964414"/>
+                <a:ext cx="1746632" cy="671146"/>
+              </a:xfrm>
+              <a:prstGeom prst="rect">
+                <a:avLst/>
+              </a:prstGeom>
+              <a:noFill/>
+            </p:spPr>
+            <p:txBody>
+              <a:bodyPr wrap="none" rtlCol="0">
+                <a:spAutoFit/>
+              </a:bodyPr>
+              <a:lstStyle/>
+              <a:p>
+                <a:pPr/>
+                <a14:m>
+                  <m:oMathPara xmlns:m="http://schemas.openxmlformats.org/officeDocument/2006/math">
+                    <m:oMathParaPr>
+                      <m:jc m:val="centerGroup"/>
+                    </m:oMathParaPr>
+                    <m:oMath xmlns:m="http://schemas.openxmlformats.org/officeDocument/2006/math">
+                      <m:sSub>
+                        <m:sSubPr>
+                          <m:ctrlPr>
+                            <a:rPr kumimoji="1" lang="en-US" altLang="ja-JP" sz="2000" b="0" i="1" smtClean="0">
+                              <a:latin typeface="Cambria Math" panose="02040503050406030204" pitchFamily="18" charset="0"/>
+                            </a:rPr>
+                          </m:ctrlPr>
+                        </m:sSubPr>
+                        <m:e>
+                          <m:r>
+                            <a:rPr kumimoji="1" lang="en-US" altLang="ja-JP" sz="2000" b="0" i="1" smtClean="0">
+                              <a:latin typeface="Cambria Math" panose="02040503050406030204" pitchFamily="18" charset="0"/>
+                            </a:rPr>
+                            <m:t>𝑞</m:t>
+                          </m:r>
+                        </m:e>
+                        <m:sub>
+                          <m:r>
+                            <a:rPr kumimoji="1" lang="en-US" altLang="ja-JP" sz="2000" b="0" i="1" smtClean="0">
+                              <a:latin typeface="Cambria Math" panose="02040503050406030204" pitchFamily="18" charset="0"/>
+                            </a:rPr>
+                            <m:t>3</m:t>
+                          </m:r>
+                        </m:sub>
+                      </m:sSub>
+                      <m:r>
+                        <a:rPr lang="en-US" altLang="ja-JP" sz="2000" b="0" i="1" smtClean="0">
+                          <a:latin typeface="Cambria Math" panose="02040503050406030204" pitchFamily="18" charset="0"/>
+                        </a:rPr>
+                        <m:t>=</m:t>
+                      </m:r>
+                      <m:sSub>
+                        <m:sSubPr>
+                          <m:ctrlPr>
+                            <a:rPr lang="en-US" altLang="ja-JP" sz="2000" b="0" i="1" smtClean="0">
+                              <a:latin typeface="Cambria Math" panose="02040503050406030204" pitchFamily="18" charset="0"/>
+                            </a:rPr>
+                          </m:ctrlPr>
+                        </m:sSubPr>
+                        <m:e>
+                          <m:r>
+                            <a:rPr lang="ja-JP" altLang="en-US" sz="2000" b="0" i="1" smtClean="0">
+                              <a:latin typeface="Cambria Math" panose="02040503050406030204" pitchFamily="18" charset="0"/>
+                            </a:rPr>
+                            <m:t>𝜆</m:t>
+                          </m:r>
+                        </m:e>
+                        <m:sub>
+                          <m:r>
+                            <a:rPr lang="en-US" altLang="ja-JP" sz="2000" b="0" i="1" smtClean="0">
+                              <a:latin typeface="Cambria Math" panose="02040503050406030204" pitchFamily="18" charset="0"/>
+                            </a:rPr>
+                            <m:t>3</m:t>
+                          </m:r>
+                        </m:sub>
+                      </m:sSub>
+                      <m:r>
+                        <m:rPr>
+                          <m:sty m:val="p"/>
+                        </m:rPr>
+                        <a:rPr lang="en-US" altLang="ja-JP" sz="2000" b="0" i="0" smtClean="0">
+                          <a:latin typeface="Cambria Math" panose="02040503050406030204" pitchFamily="18" charset="0"/>
+                        </a:rPr>
+                        <m:t>sin</m:t>
+                      </m:r>
+                      <m:f>
+                        <m:fPr>
+                          <m:ctrlPr>
+                            <a:rPr lang="en-US" altLang="ja-JP" sz="2000" b="0" i="1" smtClean="0">
+                              <a:latin typeface="Cambria Math" panose="02040503050406030204" pitchFamily="18" charset="0"/>
+                            </a:rPr>
+                          </m:ctrlPr>
+                        </m:fPr>
+                        <m:num>
+                          <m:r>
+                            <a:rPr lang="ja-JP" altLang="en-US" sz="2000" b="0" i="1" smtClean="0">
+                              <a:latin typeface="Cambria Math" panose="02040503050406030204" pitchFamily="18" charset="0"/>
+                            </a:rPr>
+                            <m:t>𝜃</m:t>
+                          </m:r>
+                        </m:num>
+                        <m:den>
+                          <m:r>
+                            <a:rPr lang="en-US" altLang="ja-JP" sz="2000" b="0" i="1" smtClean="0">
+                              <a:latin typeface="Cambria Math" panose="02040503050406030204" pitchFamily="18" charset="0"/>
+                            </a:rPr>
+                            <m:t>2</m:t>
+                          </m:r>
+                        </m:den>
+                      </m:f>
+                    </m:oMath>
+                  </m:oMathPara>
+                </a14:m>
+                <a:endParaRPr kumimoji="1" lang="ja-JP" altLang="en-US" sz="2000" dirty="0"/>
+              </a:p>
+            </p:txBody>
+          </p:sp>
+        </mc:Choice>
+        <mc:Fallback>
+          <p:sp>
+            <p:nvSpPr>
+              <p:cNvPr id="29" name="テキスト ボックス 28"/>
+              <p:cNvSpPr txBox="1">
+                <a:spLocks noRot="1" noChangeAspect="1" noMove="1" noResize="1" noEditPoints="1" noAdjustHandles="1" noChangeArrowheads="1" noChangeShapeType="1" noTextEdit="1"/>
+              </p:cNvSpPr>
+              <p:nvPr/>
+            </p:nvSpPr>
+            <p:spPr>
+              <a:xfrm>
+                <a:off x="4032101" y="1964414"/>
+                <a:ext cx="1746632" cy="671146"/>
+              </a:xfrm>
+              <a:prstGeom prst="rect">
+                <a:avLst/>
+              </a:prstGeom>
+              <a:blipFill rotWithShape="0">
+                <a:blip r:embed="rId5"/>
+                <a:stretch>
+                  <a:fillRect/>
+                </a:stretch>
+              </a:blipFill>
+            </p:spPr>
+            <p:txBody>
+              <a:bodyPr/>
+              <a:lstStyle/>
+              <a:p>
+                <a:r>
+                  <a:rPr lang="ja-JP" altLang="en-US">
+                    <a:noFill/>
+                  </a:rPr>
+                  <a:t> </a:t>
+                </a:r>
+              </a:p>
+            </p:txBody>
+          </p:sp>
+        </mc:Fallback>
+      </mc:AlternateContent>
+      <mc:AlternateContent xmlns:mc="http://schemas.openxmlformats.org/markup-compatibility/2006">
+        <mc:Choice xmlns:a14="http://schemas.microsoft.com/office/drawing/2010/main" Requires="a14">
+          <p:sp>
+            <p:nvSpPr>
+              <p:cNvPr id="31" name="テキスト ボックス 30"/>
+              <p:cNvSpPr txBox="1"/>
+              <p:nvPr/>
+            </p:nvSpPr>
+            <p:spPr>
+              <a:xfrm>
+                <a:off x="5778733" y="1964414"/>
+                <a:ext cx="1468287" cy="671146"/>
+              </a:xfrm>
+              <a:prstGeom prst="rect">
+                <a:avLst/>
+              </a:prstGeom>
+              <a:noFill/>
+            </p:spPr>
+            <p:txBody>
+              <a:bodyPr wrap="none" rtlCol="0">
+                <a:spAutoFit/>
+              </a:bodyPr>
+              <a:lstStyle/>
+              <a:p>
+                <a:pPr/>
+                <a14:m>
+                  <m:oMathPara xmlns:m="http://schemas.openxmlformats.org/officeDocument/2006/math">
+                    <m:oMathParaPr>
+                      <m:jc m:val="centerGroup"/>
+                    </m:oMathParaPr>
+                    <m:oMath xmlns:m="http://schemas.openxmlformats.org/officeDocument/2006/math">
+                      <m:sSub>
+                        <m:sSubPr>
+                          <m:ctrlPr>
+                            <a:rPr kumimoji="1" lang="en-US" altLang="ja-JP" sz="2000" b="0" i="1" smtClean="0">
+                              <a:latin typeface="Cambria Math" panose="02040503050406030204" pitchFamily="18" charset="0"/>
+                            </a:rPr>
+                          </m:ctrlPr>
+                        </m:sSubPr>
+                        <m:e>
+                          <m:r>
+                            <a:rPr kumimoji="1" lang="en-US" altLang="ja-JP" sz="2000" b="0" i="1" smtClean="0">
+                              <a:latin typeface="Cambria Math" panose="02040503050406030204" pitchFamily="18" charset="0"/>
+                            </a:rPr>
+                            <m:t>𝑞</m:t>
+                          </m:r>
+                        </m:e>
+                        <m:sub>
+                          <m:r>
+                            <a:rPr kumimoji="1" lang="en-US" altLang="ja-JP" sz="2000" b="0" i="1" smtClean="0">
+                              <a:latin typeface="Cambria Math" panose="02040503050406030204" pitchFamily="18" charset="0"/>
+                            </a:rPr>
+                            <m:t>4</m:t>
+                          </m:r>
+                        </m:sub>
+                      </m:sSub>
+                      <m:r>
+                        <a:rPr lang="en-US" altLang="ja-JP" sz="2000" b="0" i="1" smtClean="0">
+                          <a:latin typeface="Cambria Math" panose="02040503050406030204" pitchFamily="18" charset="0"/>
+                        </a:rPr>
+                        <m:t>=</m:t>
+                      </m:r>
+                      <m:r>
+                        <m:rPr>
+                          <m:sty m:val="p"/>
+                        </m:rPr>
+                        <a:rPr lang="en-US" altLang="ja-JP" sz="2000" b="0" i="0" smtClean="0">
+                          <a:latin typeface="Cambria Math" panose="02040503050406030204" pitchFamily="18" charset="0"/>
+                        </a:rPr>
+                        <m:t>cos</m:t>
+                      </m:r>
+                      <m:f>
+                        <m:fPr>
+                          <m:ctrlPr>
+                            <a:rPr lang="en-US" altLang="ja-JP" sz="2000" b="0" i="1" smtClean="0">
+                              <a:latin typeface="Cambria Math" panose="02040503050406030204" pitchFamily="18" charset="0"/>
+                            </a:rPr>
+                          </m:ctrlPr>
+                        </m:fPr>
+                        <m:num>
+                          <m:r>
+                            <a:rPr lang="ja-JP" altLang="en-US" sz="2000" b="0" i="1" smtClean="0">
+                              <a:latin typeface="Cambria Math" panose="02040503050406030204" pitchFamily="18" charset="0"/>
+                            </a:rPr>
+                            <m:t>𝜃</m:t>
+                          </m:r>
+                        </m:num>
+                        <m:den>
+                          <m:r>
+                            <a:rPr lang="en-US" altLang="ja-JP" sz="2000" b="0" i="1" smtClean="0">
+                              <a:latin typeface="Cambria Math" panose="02040503050406030204" pitchFamily="18" charset="0"/>
+                            </a:rPr>
+                            <m:t>2</m:t>
+                          </m:r>
+                        </m:den>
+                      </m:f>
+                    </m:oMath>
+                  </m:oMathPara>
+                </a14:m>
+                <a:endParaRPr kumimoji="1" lang="ja-JP" altLang="en-US" sz="2000" dirty="0"/>
+              </a:p>
+            </p:txBody>
+          </p:sp>
+        </mc:Choice>
+        <mc:Fallback>
+          <p:sp>
+            <p:nvSpPr>
+              <p:cNvPr id="31" name="テキスト ボックス 30"/>
+              <p:cNvSpPr txBox="1">
+                <a:spLocks noRot="1" noChangeAspect="1" noMove="1" noResize="1" noEditPoints="1" noAdjustHandles="1" noChangeArrowheads="1" noChangeShapeType="1" noTextEdit="1"/>
+              </p:cNvSpPr>
+              <p:nvPr/>
+            </p:nvSpPr>
+            <p:spPr>
+              <a:xfrm>
+                <a:off x="5778733" y="1964414"/>
+                <a:ext cx="1468287" cy="671146"/>
+              </a:xfrm>
+              <a:prstGeom prst="rect">
+                <a:avLst/>
+              </a:prstGeom>
+              <a:blipFill rotWithShape="0">
+                <a:blip r:embed="rId6"/>
+                <a:stretch>
+                  <a:fillRect/>
+                </a:stretch>
+              </a:blipFill>
+            </p:spPr>
+            <p:txBody>
+              <a:bodyPr/>
+              <a:lstStyle/>
+              <a:p>
+                <a:r>
+                  <a:rPr lang="ja-JP" altLang="en-US">
+                    <a:noFill/>
+                  </a:rPr>
+                  <a:t> </a:t>
+                </a:r>
+              </a:p>
+            </p:txBody>
+          </p:sp>
+        </mc:Fallback>
+      </mc:AlternateContent>
+      <mc:AlternateContent xmlns:mc="http://schemas.openxmlformats.org/markup-compatibility/2006">
+        <mc:Choice xmlns:a14="http://schemas.microsoft.com/office/drawing/2010/main" Requires="a14">
+          <p:sp>
+            <p:nvSpPr>
+              <p:cNvPr id="6" name="正方形/長方形 5"/>
+              <p:cNvSpPr/>
+              <p:nvPr/>
+            </p:nvSpPr>
+            <p:spPr>
+              <a:xfrm>
+                <a:off x="1066267" y="2660584"/>
+                <a:ext cx="3259354" cy="307777"/>
+              </a:xfrm>
+              <a:prstGeom prst="rect">
+                <a:avLst/>
+              </a:prstGeom>
+            </p:spPr>
+            <p:txBody>
+              <a:bodyPr wrap="none">
+                <a:spAutoFit/>
+              </a:bodyPr>
+              <a:lstStyle/>
+              <a:p>
+                <a14:m>
+                  <m:oMath xmlns:m="http://schemas.openxmlformats.org/officeDocument/2006/math">
+                    <m:sSub>
+                      <m:sSubPr>
+                        <m:ctrlPr>
+                          <a:rPr lang="en-US" altLang="ja-JP" sz="1400" i="1">
+                            <a:latin typeface="+mn-ea"/>
+                          </a:rPr>
+                        </m:ctrlPr>
+                      </m:sSubPr>
+                      <m:e>
+                        <m:r>
+                          <a:rPr lang="ja-JP" altLang="en-US" sz="1400" i="1">
+                            <a:latin typeface="+mn-ea"/>
+                          </a:rPr>
+                          <m:t>𝜆</m:t>
+                        </m:r>
+                      </m:e>
+                      <m:sub>
+                        <m:r>
+                          <a:rPr lang="en-US" altLang="ja-JP" sz="1400" i="1">
+                            <a:latin typeface="+mn-ea"/>
+                          </a:rPr>
+                          <m:t>1</m:t>
+                        </m:r>
+                      </m:sub>
+                    </m:sSub>
+                  </m:oMath>
+                </a14:m>
+                <a:r>
+                  <a:rPr lang="en-US" altLang="ja-JP" sz="1400" dirty="0" smtClean="0">
+                    <a:latin typeface="+mn-ea"/>
+                  </a:rPr>
+                  <a:t>: unit vector of direction of rotation</a:t>
+                </a:r>
+                <a:endParaRPr lang="ja-JP" altLang="en-US" sz="1400" dirty="0">
+                  <a:latin typeface="+mn-ea"/>
+                </a:endParaRPr>
+              </a:p>
+            </p:txBody>
+          </p:sp>
+        </mc:Choice>
+        <mc:Fallback>
+          <p:sp>
+            <p:nvSpPr>
+              <p:cNvPr id="6" name="正方形/長方形 5"/>
+              <p:cNvSpPr>
+                <a:spLocks noRot="1" noChangeAspect="1" noMove="1" noResize="1" noEditPoints="1" noAdjustHandles="1" noChangeArrowheads="1" noChangeShapeType="1" noTextEdit="1"/>
+              </p:cNvSpPr>
+              <p:nvPr/>
+            </p:nvSpPr>
+            <p:spPr>
+              <a:xfrm>
+                <a:off x="1066267" y="2660584"/>
+                <a:ext cx="3259354" cy="307777"/>
+              </a:xfrm>
+              <a:prstGeom prst="rect">
+                <a:avLst/>
+              </a:prstGeom>
+              <a:blipFill rotWithShape="0">
+                <a:blip r:embed="rId7"/>
+                <a:stretch>
+                  <a:fillRect t="-1961" b="-19608"/>
+                </a:stretch>
+              </a:blipFill>
+            </p:spPr>
+            <p:txBody>
+              <a:bodyPr/>
+              <a:lstStyle/>
+              <a:p>
+                <a:r>
+                  <a:rPr lang="ja-JP" altLang="en-US">
+                    <a:noFill/>
+                  </a:rPr>
+                  <a:t> </a:t>
+                </a:r>
+              </a:p>
+            </p:txBody>
+          </p:sp>
+        </mc:Fallback>
+      </mc:AlternateContent>
+      <mc:AlternateContent xmlns:mc="http://schemas.openxmlformats.org/markup-compatibility/2006">
+        <mc:Choice xmlns:a14="http://schemas.microsoft.com/office/drawing/2010/main" Requires="a14">
+          <p:sp>
+            <p:nvSpPr>
+              <p:cNvPr id="32" name="正方形/長方形 31"/>
+              <p:cNvSpPr/>
+              <p:nvPr/>
+            </p:nvSpPr>
+            <p:spPr>
+              <a:xfrm>
+                <a:off x="4399176" y="2669826"/>
+                <a:ext cx="1551322" cy="307777"/>
+              </a:xfrm>
+              <a:prstGeom prst="rect">
+                <a:avLst/>
+              </a:prstGeom>
+            </p:spPr>
+            <p:txBody>
+              <a:bodyPr wrap="none">
+                <a:spAutoFit/>
+              </a:bodyPr>
+              <a:lstStyle/>
+              <a:p>
+                <a14:m>
+                  <m:oMath xmlns:m="http://schemas.openxmlformats.org/officeDocument/2006/math">
+                    <m:r>
+                      <a:rPr lang="ja-JP" altLang="en-US" sz="1400" i="1" smtClean="0">
+                        <a:latin typeface="Cambria Math" panose="02040503050406030204" pitchFamily="18" charset="0"/>
+                      </a:rPr>
+                      <m:t>𝜃</m:t>
+                    </m:r>
+                  </m:oMath>
+                </a14:m>
+                <a:r>
+                  <a:rPr lang="en-US" altLang="ja-JP" sz="1400" dirty="0" smtClean="0">
+                    <a:latin typeface="+mn-ea"/>
+                  </a:rPr>
+                  <a:t>: rotation angle</a:t>
+                </a:r>
+                <a:endParaRPr lang="ja-JP" altLang="en-US" sz="1400" dirty="0">
+                  <a:latin typeface="+mn-ea"/>
+                </a:endParaRPr>
+              </a:p>
+            </p:txBody>
+          </p:sp>
+        </mc:Choice>
+        <mc:Fallback>
+          <p:sp>
+            <p:nvSpPr>
+              <p:cNvPr id="32" name="正方形/長方形 31"/>
+              <p:cNvSpPr>
+                <a:spLocks noRot="1" noChangeAspect="1" noMove="1" noResize="1" noEditPoints="1" noAdjustHandles="1" noChangeArrowheads="1" noChangeShapeType="1" noTextEdit="1"/>
+              </p:cNvSpPr>
+              <p:nvPr/>
+            </p:nvSpPr>
+            <p:spPr>
+              <a:xfrm>
+                <a:off x="4399176" y="2669826"/>
+                <a:ext cx="1551322" cy="307777"/>
+              </a:xfrm>
+              <a:prstGeom prst="rect">
+                <a:avLst/>
+              </a:prstGeom>
+              <a:blipFill rotWithShape="0">
+                <a:blip r:embed="rId8"/>
+                <a:stretch>
+                  <a:fillRect t="-4000" b="-20000"/>
+                </a:stretch>
+              </a:blipFill>
+            </p:spPr>
+            <p:txBody>
+              <a:bodyPr/>
+              <a:lstStyle/>
+              <a:p>
+                <a:r>
+                  <a:rPr lang="ja-JP" altLang="en-US">
+                    <a:noFill/>
+                  </a:rPr>
+                  <a:t> </a:t>
+                </a:r>
+              </a:p>
+            </p:txBody>
+          </p:sp>
+        </mc:Fallback>
+      </mc:AlternateContent>
+      <mc:AlternateContent xmlns:mc="http://schemas.openxmlformats.org/markup-compatibility/2006">
+        <mc:Choice xmlns:a14="http://schemas.microsoft.com/office/drawing/2010/main" Requires="a14">
+          <p:sp>
+            <p:nvSpPr>
+              <p:cNvPr id="33" name="テキスト ボックス 32"/>
+              <p:cNvSpPr txBox="1"/>
+              <p:nvPr/>
+            </p:nvSpPr>
+            <p:spPr>
+              <a:xfrm>
+                <a:off x="600504" y="3117629"/>
+                <a:ext cx="7303088" cy="1112805"/>
+              </a:xfrm>
+              <a:prstGeom prst="rect">
+                <a:avLst/>
+              </a:prstGeom>
+              <a:noFill/>
+            </p:spPr>
+            <p:txBody>
+              <a:bodyPr wrap="none" rtlCol="0">
+                <a:spAutoFit/>
+              </a:bodyPr>
+              <a:lstStyle/>
+              <a:p>
+                <a:pPr/>
+                <a14:m>
+                  <m:oMathPara xmlns:m="http://schemas.openxmlformats.org/officeDocument/2006/math">
+                    <m:oMathParaPr>
+                      <m:jc m:val="centerGroup"/>
+                    </m:oMathParaPr>
+                    <m:oMath xmlns:m="http://schemas.openxmlformats.org/officeDocument/2006/math">
+                      <m:r>
+                        <a:rPr lang="en-US" altLang="ja-JP" b="0" i="1" smtClean="0">
+                          <a:latin typeface="Cambria Math" panose="02040503050406030204" pitchFamily="18" charset="0"/>
+                        </a:rPr>
+                        <m:t>𝐶</m:t>
+                      </m:r>
+                      <m:r>
+                        <a:rPr lang="en-US" altLang="ja-JP" b="0" i="1" smtClean="0">
+                          <a:latin typeface="Cambria Math" panose="02040503050406030204" pitchFamily="18" charset="0"/>
+                        </a:rPr>
+                        <m:t>=</m:t>
+                      </m:r>
+                      <m:d>
+                        <m:dPr>
+                          <m:begChr m:val="["/>
+                          <m:endChr m:val="]"/>
+                          <m:ctrlPr>
+                            <a:rPr lang="en-US" altLang="ja-JP" b="0" i="1" smtClean="0">
+                              <a:latin typeface="Cambria Math" panose="02040503050406030204" pitchFamily="18" charset="0"/>
+                            </a:rPr>
+                          </m:ctrlPr>
+                        </m:dPr>
+                        <m:e>
+                          <m:eqArr>
+                            <m:eqArrPr>
+                              <m:ctrlPr>
+                                <a:rPr lang="en-US" altLang="ja-JP" b="0" i="1" smtClean="0">
+                                  <a:latin typeface="Cambria Math" panose="02040503050406030204" pitchFamily="18" charset="0"/>
+                                </a:rPr>
+                              </m:ctrlPr>
+                            </m:eqArrPr>
+                            <m:e>
+                              <m:r>
+                                <a:rPr lang="en-US" altLang="ja-JP" b="0" i="1" smtClean="0">
+                                  <a:latin typeface="Cambria Math" panose="02040503050406030204" pitchFamily="18" charset="0"/>
+                                </a:rPr>
+                                <m:t>                                      1</m:t>
+                              </m:r>
+                              <m:f>
+                                <m:fPr>
+                                  <m:ctrlPr>
+                                    <a:rPr lang="en-US" altLang="ja-JP" b="0" i="1" smtClean="0">
+                                      <a:latin typeface="Cambria Math" panose="02040503050406030204" pitchFamily="18" charset="0"/>
+                                    </a:rPr>
+                                  </m:ctrlPr>
+                                </m:fPr>
+                                <m:num>
+                                  <m:r>
+                                    <a:rPr lang="en-US" altLang="ja-JP" b="0" i="1" smtClean="0">
+                                      <a:latin typeface="Cambria Math" panose="02040503050406030204" pitchFamily="18" charset="0"/>
+                                    </a:rPr>
+                                    <m:t>1</m:t>
+                                  </m:r>
+                                </m:num>
+                                <m:den>
+                                  <m:r>
+                                    <a:rPr lang="en-US" altLang="ja-JP" b="0" i="1" smtClean="0">
+                                      <a:latin typeface="Cambria Math" panose="02040503050406030204" pitchFamily="18" charset="0"/>
+                                    </a:rPr>
+                                    <m:t>1</m:t>
+                                  </m:r>
+                                </m:den>
+                              </m:f>
+                              <m:r>
+                                <a:rPr lang="en-US" altLang="ja-JP" b="0" i="1" smtClean="0">
+                                  <a:latin typeface="Cambria Math" panose="02040503050406030204" pitchFamily="18" charset="0"/>
+                                </a:rPr>
+                                <m:t>                   </m:t>
+                              </m:r>
+                              <m:r>
+                                <a:rPr lang="en-US" altLang="ja-JP" b="0" i="1" smtClean="0">
+                                  <a:latin typeface="Cambria Math" panose="02040503050406030204" pitchFamily="18" charset="0"/>
+                                </a:rPr>
+                                <m:t>                                                           </m:t>
+                              </m:r>
+                            </m:e>
+                            <m:e>
+                              <m:r>
+                                <a:rPr lang="en-US" altLang="ja-JP" b="0" i="1" smtClean="0">
+                                  <a:latin typeface="Cambria Math" panose="02040503050406030204" pitchFamily="18" charset="0"/>
+                                </a:rPr>
+                                <m:t>1</m:t>
+                              </m:r>
+                            </m:e>
+                            <m:e>
+                              <m:r>
+                                <a:rPr lang="en-US" altLang="ja-JP" b="0" i="1" smtClean="0">
+                                  <a:latin typeface="Cambria Math" panose="02040503050406030204" pitchFamily="18" charset="0"/>
+                                </a:rPr>
+                                <m:t>1</m:t>
+                              </m:r>
+                            </m:e>
+                          </m:eqArr>
+                        </m:e>
+                      </m:d>
+                    </m:oMath>
+                  </m:oMathPara>
+                </a14:m>
+                <a:endParaRPr kumimoji="1" lang="ja-JP" altLang="en-US" dirty="0"/>
+              </a:p>
+            </p:txBody>
+          </p:sp>
+        </mc:Choice>
+        <mc:Fallback>
+          <p:sp>
+            <p:nvSpPr>
+              <p:cNvPr id="33" name="テキスト ボックス 32"/>
+              <p:cNvSpPr txBox="1">
+                <a:spLocks noRot="1" noChangeAspect="1" noMove="1" noResize="1" noEditPoints="1" noAdjustHandles="1" noChangeArrowheads="1" noChangeShapeType="1" noTextEdit="1"/>
+              </p:cNvSpPr>
+              <p:nvPr/>
+            </p:nvSpPr>
+            <p:spPr>
+              <a:xfrm>
+                <a:off x="600504" y="3117629"/>
+                <a:ext cx="7303088" cy="1112805"/>
+              </a:xfrm>
+              <a:prstGeom prst="rect">
+                <a:avLst/>
+              </a:prstGeom>
+              <a:blipFill rotWithShape="0">
+                <a:blip r:embed="rId9"/>
+                <a:stretch>
+                  <a:fillRect/>
+                </a:stretch>
+              </a:blipFill>
+            </p:spPr>
+            <p:txBody>
+              <a:bodyPr/>
+              <a:lstStyle/>
+              <a:p>
+                <a:r>
+                  <a:rPr lang="ja-JP" altLang="en-US">
+                    <a:noFill/>
+                  </a:rPr>
+                  <a:t> </a:t>
+                </a:r>
+              </a:p>
+            </p:txBody>
+          </p:sp>
+        </mc:Fallback>
+      </mc:AlternateContent>
+      <mc:AlternateContent xmlns:mc="http://schemas.openxmlformats.org/markup-compatibility/2006">
+        <mc:Choice xmlns:a14="http://schemas.microsoft.com/office/drawing/2010/main" Requires="a14">
+          <p:sp>
+            <p:nvSpPr>
+              <p:cNvPr id="7" name="正方形/長方形 6"/>
+              <p:cNvSpPr/>
+              <p:nvPr/>
+            </p:nvSpPr>
+            <p:spPr>
+              <a:xfrm>
+                <a:off x="1568716" y="3480657"/>
+                <a:ext cx="1628202" cy="338554"/>
+              </a:xfrm>
+              <a:prstGeom prst="rect">
+                <a:avLst/>
+              </a:prstGeom>
+            </p:spPr>
+            <p:txBody>
+              <a:bodyPr wrap="none">
+                <a:spAutoFit/>
+              </a:bodyPr>
+              <a:lstStyle/>
+              <a:p>
+                <a14:m>
+                  <m:oMathPara xmlns:m="http://schemas.openxmlformats.org/officeDocument/2006/math">
+                    <m:oMathParaPr>
+                      <m:jc m:val="centerGroup"/>
+                    </m:oMathParaPr>
+                    <m:oMath xmlns:m="http://schemas.openxmlformats.org/officeDocument/2006/math">
+                      <m:r>
+                        <a:rPr lang="en-US" altLang="ja-JP" sz="1600" b="0" i="1" smtClean="0">
+                          <a:latin typeface="Cambria Math" panose="02040503050406030204" pitchFamily="18" charset="0"/>
+                        </a:rPr>
+                        <m:t>2</m:t>
+                      </m:r>
+                      <m:d>
+                        <m:dPr>
+                          <m:ctrlPr>
+                            <a:rPr lang="en-US" altLang="ja-JP" sz="1600" i="1" smtClean="0">
+                              <a:latin typeface="Cambria Math" panose="02040503050406030204" pitchFamily="18" charset="0"/>
+                            </a:rPr>
+                          </m:ctrlPr>
+                        </m:dPr>
+                        <m:e>
+                          <m:sSub>
+                            <m:sSubPr>
+                              <m:ctrlPr>
+                                <a:rPr lang="en-US" altLang="ja-JP" sz="1600" i="1">
+                                  <a:latin typeface="Cambria Math" panose="02040503050406030204" pitchFamily="18" charset="0"/>
+                                </a:rPr>
+                              </m:ctrlPr>
+                            </m:sSubPr>
+                            <m:e>
+                              <m:r>
+                                <a:rPr lang="en-US" altLang="ja-JP" sz="1600" i="1">
+                                  <a:latin typeface="Cambria Math" panose="02040503050406030204" pitchFamily="18" charset="0"/>
+                                </a:rPr>
+                                <m:t>𝑞</m:t>
+                              </m:r>
+                            </m:e>
+                            <m:sub>
+                              <m:r>
+                                <a:rPr lang="en-US" altLang="ja-JP" sz="1600" i="1">
+                                  <a:latin typeface="Cambria Math" panose="02040503050406030204" pitchFamily="18" charset="0"/>
+                                </a:rPr>
+                                <m:t>1</m:t>
+                              </m:r>
+                            </m:sub>
+                          </m:sSub>
+                          <m:sSub>
+                            <m:sSubPr>
+                              <m:ctrlPr>
+                                <a:rPr lang="en-US" altLang="ja-JP" sz="1600" i="1">
+                                  <a:latin typeface="Cambria Math" panose="02040503050406030204" pitchFamily="18" charset="0"/>
+                                </a:rPr>
+                              </m:ctrlPr>
+                            </m:sSubPr>
+                            <m:e>
+                              <m:r>
+                                <a:rPr lang="en-US" altLang="ja-JP" sz="1600" i="1">
+                                  <a:latin typeface="Cambria Math" panose="02040503050406030204" pitchFamily="18" charset="0"/>
+                                </a:rPr>
+                                <m:t>𝑞</m:t>
+                              </m:r>
+                            </m:e>
+                            <m:sub>
+                              <m:r>
+                                <a:rPr lang="en-US" altLang="ja-JP" sz="1600" i="1">
+                                  <a:latin typeface="Cambria Math" panose="02040503050406030204" pitchFamily="18" charset="0"/>
+                                </a:rPr>
+                                <m:t>2</m:t>
+                              </m:r>
+                            </m:sub>
+                          </m:sSub>
+                          <m:r>
+                            <a:rPr lang="en-US" altLang="ja-JP" sz="1600" i="1">
+                              <a:latin typeface="Cambria Math" panose="02040503050406030204" pitchFamily="18" charset="0"/>
+                            </a:rPr>
+                            <m:t>−</m:t>
+                          </m:r>
+                          <m:sSub>
+                            <m:sSubPr>
+                              <m:ctrlPr>
+                                <a:rPr lang="en-US" altLang="ja-JP" sz="1600" i="1">
+                                  <a:latin typeface="Cambria Math" panose="02040503050406030204" pitchFamily="18" charset="0"/>
+                                </a:rPr>
+                              </m:ctrlPr>
+                            </m:sSubPr>
+                            <m:e>
+                              <m:r>
+                                <a:rPr lang="en-US" altLang="ja-JP" sz="1600" i="1">
+                                  <a:latin typeface="Cambria Math" panose="02040503050406030204" pitchFamily="18" charset="0"/>
+                                </a:rPr>
+                                <m:t>𝑞</m:t>
+                              </m:r>
+                            </m:e>
+                            <m:sub>
+                              <m:r>
+                                <a:rPr lang="en-US" altLang="ja-JP" sz="1600" i="1">
+                                  <a:latin typeface="Cambria Math" panose="02040503050406030204" pitchFamily="18" charset="0"/>
+                                </a:rPr>
+                                <m:t>3</m:t>
+                              </m:r>
+                            </m:sub>
+                          </m:sSub>
+                          <m:sSub>
+                            <m:sSubPr>
+                              <m:ctrlPr>
+                                <a:rPr lang="en-US" altLang="ja-JP" sz="1600" i="1">
+                                  <a:latin typeface="Cambria Math" panose="02040503050406030204" pitchFamily="18" charset="0"/>
+                                </a:rPr>
+                              </m:ctrlPr>
+                            </m:sSubPr>
+                            <m:e>
+                              <m:r>
+                                <a:rPr lang="en-US" altLang="ja-JP" sz="1600" i="1">
+                                  <a:latin typeface="Cambria Math" panose="02040503050406030204" pitchFamily="18" charset="0"/>
+                                </a:rPr>
+                                <m:t>𝑞</m:t>
+                              </m:r>
+                            </m:e>
+                            <m:sub>
+                              <m:r>
+                                <a:rPr lang="en-US" altLang="ja-JP" sz="1600" i="1">
+                                  <a:latin typeface="Cambria Math" panose="02040503050406030204" pitchFamily="18" charset="0"/>
+                                </a:rPr>
+                                <m:t>4</m:t>
+                              </m:r>
+                            </m:sub>
+                          </m:sSub>
+                        </m:e>
+                      </m:d>
+                    </m:oMath>
+                  </m:oMathPara>
+                </a14:m>
+                <a:endParaRPr lang="ja-JP" altLang="en-US" sz="1600" dirty="0"/>
+              </a:p>
+            </p:txBody>
+          </p:sp>
+        </mc:Choice>
+        <mc:Fallback>
+          <p:sp>
+            <p:nvSpPr>
+              <p:cNvPr id="7" name="正方形/長方形 6"/>
+              <p:cNvSpPr>
+                <a:spLocks noRot="1" noChangeAspect="1" noMove="1" noResize="1" noEditPoints="1" noAdjustHandles="1" noChangeArrowheads="1" noChangeShapeType="1" noTextEdit="1"/>
+              </p:cNvSpPr>
+              <p:nvPr/>
+            </p:nvSpPr>
+            <p:spPr>
+              <a:xfrm>
+                <a:off x="1568716" y="3480657"/>
+                <a:ext cx="1628202" cy="338554"/>
+              </a:xfrm>
+              <a:prstGeom prst="rect">
+                <a:avLst/>
+              </a:prstGeom>
+              <a:blipFill rotWithShape="0">
+                <a:blip r:embed="rId10"/>
+                <a:stretch>
+                  <a:fillRect b="-1786"/>
+                </a:stretch>
+              </a:blipFill>
+            </p:spPr>
+            <p:txBody>
+              <a:bodyPr/>
+              <a:lstStyle/>
+              <a:p>
+                <a:r>
+                  <a:rPr lang="ja-JP" altLang="en-US">
+                    <a:noFill/>
+                  </a:rPr>
+                  <a:t> </a:t>
+                </a:r>
+              </a:p>
+            </p:txBody>
+          </p:sp>
+        </mc:Fallback>
+      </mc:AlternateContent>
+      <p:sp>
+        <p:nvSpPr>
+          <p:cNvPr id="20" name="正方形/長方形 19"/>
+          <p:cNvSpPr/>
+          <p:nvPr/>
+        </p:nvSpPr>
+        <p:spPr bwMode="auto">
+          <a:xfrm>
+            <a:off x="3251565" y="3090709"/>
+            <a:ext cx="1499399" cy="1114110"/>
+          </a:xfrm>
+          <a:prstGeom prst="rect">
+            <a:avLst/>
+          </a:prstGeom>
+          <a:solidFill>
+            <a:srgbClr val="FFFFFF"/>
+          </a:solidFill>
+          <a:ln w="9525" cap="flat" cmpd="sng" algn="ctr">
+            <a:noFill/>
+            <a:prstDash val="solid"/>
+            <a:round/>
+            <a:headEnd type="none" w="med" len="med"/>
+            <a:tailEnd type="none" w="med" len="med"/>
+          </a:ln>
+          <a:effectLst/>
+        </p:spPr>
+        <p:txBody>
+          <a:bodyPr vert="horz" wrap="none" lIns="91440" tIns="45720" rIns="91440" bIns="45720" numCol="1" rtlCol="0" anchor="ctr" anchorCtr="0" compatLnSpc="1">
+            <a:prstTxWarp prst="textNoShape">
+              <a:avLst/>
+            </a:prstTxWarp>
+          </a:bodyPr>
+          <a:lstStyle/>
+          <a:p>
+            <a:pPr marL="0" marR="0" indent="0" algn="l" defTabSz="914400" rtl="0" eaLnBrk="1" fontAlgn="base" latinLnBrk="0" hangingPunct="1">
+              <a:lnSpc>
+                <a:spcPct val="100000"/>
+              </a:lnSpc>
+              <a:spcBef>
+                <a:spcPct val="0"/>
+              </a:spcBef>
+              <a:spcAft>
+                <a:spcPct val="0"/>
+              </a:spcAft>
+              <a:buClrTx/>
+              <a:buSzTx/>
+              <a:buFontTx/>
+              <a:buNone/>
+              <a:tabLst/>
+            </a:pPr>
+            <a:endParaRPr kumimoji="1" lang="ja-JP" altLang="en-US" sz="2000" b="0" i="0" u="none" strike="noStrike" cap="none" normalizeH="0" baseline="0" smtClean="0">
+              <a:ln>
+                <a:noFill/>
+              </a:ln>
+              <a:solidFill>
+                <a:schemeClr val="tx1"/>
+              </a:solidFill>
+              <a:effectLst/>
+              <a:latin typeface="Times New Roman" pitchFamily="18" charset="0"/>
+              <a:ea typeface="ＭＳ Ｐゴシック" pitchFamily="50" charset="-128"/>
+            </a:endParaRPr>
+          </a:p>
+        </p:txBody>
+      </p:sp>
+      <mc:AlternateContent xmlns:mc="http://schemas.openxmlformats.org/markup-compatibility/2006">
+        <mc:Choice xmlns:a14="http://schemas.microsoft.com/office/drawing/2010/main" Requires="a14">
+          <p:sp>
+            <p:nvSpPr>
+              <p:cNvPr id="40" name="正方形/長方形 39"/>
+              <p:cNvSpPr/>
+              <p:nvPr/>
+            </p:nvSpPr>
+            <p:spPr>
+              <a:xfrm>
+                <a:off x="1543315" y="3780556"/>
+                <a:ext cx="1688218" cy="338554"/>
+              </a:xfrm>
+              <a:prstGeom prst="rect">
+                <a:avLst/>
+              </a:prstGeom>
+            </p:spPr>
+            <p:txBody>
+              <a:bodyPr wrap="none">
+                <a:spAutoFit/>
+              </a:bodyPr>
+              <a:lstStyle/>
+              <a:p>
+                <a14:m>
+                  <m:oMathPara xmlns:m="http://schemas.openxmlformats.org/officeDocument/2006/math">
+                    <m:oMathParaPr>
+                      <m:jc m:val="centerGroup"/>
+                    </m:oMathParaPr>
+                    <m:oMath xmlns:m="http://schemas.openxmlformats.org/officeDocument/2006/math">
+                      <m:r>
+                        <a:rPr lang="en-US" altLang="ja-JP" sz="1600" b="0" i="1" smtClean="0">
+                          <a:latin typeface="Cambria Math" panose="02040503050406030204" pitchFamily="18" charset="0"/>
+                        </a:rPr>
+                        <m:t>2</m:t>
+                      </m:r>
+                      <m:d>
+                        <m:dPr>
+                          <m:ctrlPr>
+                            <a:rPr lang="en-US" altLang="ja-JP" sz="1600" i="1" smtClean="0">
+                              <a:latin typeface="Cambria Math" panose="02040503050406030204" pitchFamily="18" charset="0"/>
+                            </a:rPr>
+                          </m:ctrlPr>
+                        </m:dPr>
+                        <m:e>
+                          <m:sSub>
+                            <m:sSubPr>
+                              <m:ctrlPr>
+                                <a:rPr lang="en-US" altLang="ja-JP" sz="1600" i="1">
+                                  <a:latin typeface="Cambria Math" panose="02040503050406030204" pitchFamily="18" charset="0"/>
+                                </a:rPr>
+                              </m:ctrlPr>
+                            </m:sSubPr>
+                            <m:e>
+                              <m:r>
+                                <a:rPr lang="en-US" altLang="ja-JP" sz="1600" i="1">
+                                  <a:latin typeface="Cambria Math" panose="02040503050406030204" pitchFamily="18" charset="0"/>
+                                </a:rPr>
+                                <m:t>𝑞</m:t>
+                              </m:r>
+                            </m:e>
+                            <m:sub>
+                              <m:r>
+                                <a:rPr lang="en-US" altLang="ja-JP" sz="1600" b="0" i="1" smtClean="0">
+                                  <a:latin typeface="Cambria Math" panose="02040503050406030204" pitchFamily="18" charset="0"/>
+                                </a:rPr>
+                                <m:t>3</m:t>
+                              </m:r>
+                            </m:sub>
+                          </m:sSub>
+                          <m:sSub>
+                            <m:sSubPr>
+                              <m:ctrlPr>
+                                <a:rPr lang="en-US" altLang="ja-JP" sz="1600" i="1">
+                                  <a:latin typeface="Cambria Math" panose="02040503050406030204" pitchFamily="18" charset="0"/>
+                                </a:rPr>
+                              </m:ctrlPr>
+                            </m:sSubPr>
+                            <m:e>
+                              <m:r>
+                                <a:rPr lang="en-US" altLang="ja-JP" sz="1600" i="1">
+                                  <a:latin typeface="Cambria Math" panose="02040503050406030204" pitchFamily="18" charset="0"/>
+                                </a:rPr>
+                                <m:t>𝑞</m:t>
+                              </m:r>
+                            </m:e>
+                            <m:sub>
+                              <m:r>
+                                <a:rPr lang="en-US" altLang="ja-JP" sz="1600" b="0" i="1" smtClean="0">
+                                  <a:latin typeface="Cambria Math" panose="02040503050406030204" pitchFamily="18" charset="0"/>
+                                </a:rPr>
+                                <m:t>1</m:t>
+                              </m:r>
+                            </m:sub>
+                          </m:sSub>
+                          <m:r>
+                            <a:rPr lang="en-US" altLang="ja-JP" sz="1600" b="0" i="1" smtClean="0">
+                              <a:latin typeface="Cambria Math" panose="02040503050406030204" pitchFamily="18" charset="0"/>
+                            </a:rPr>
+                            <m:t>+</m:t>
+                          </m:r>
+                          <m:sSub>
+                            <m:sSubPr>
+                              <m:ctrlPr>
+                                <a:rPr lang="en-US" altLang="ja-JP" sz="1600" i="1">
+                                  <a:latin typeface="Cambria Math" panose="02040503050406030204" pitchFamily="18" charset="0"/>
+                                </a:rPr>
+                              </m:ctrlPr>
+                            </m:sSubPr>
+                            <m:e>
+                              <m:r>
+                                <a:rPr lang="en-US" altLang="ja-JP" sz="1600" i="1">
+                                  <a:latin typeface="Cambria Math" panose="02040503050406030204" pitchFamily="18" charset="0"/>
+                                </a:rPr>
+                                <m:t>𝑞</m:t>
+                              </m:r>
+                            </m:e>
+                            <m:sub>
+                              <m:r>
+                                <a:rPr lang="en-US" altLang="ja-JP" sz="1600" b="0" i="1" smtClean="0">
+                                  <a:latin typeface="Cambria Math" panose="02040503050406030204" pitchFamily="18" charset="0"/>
+                                </a:rPr>
+                                <m:t>2</m:t>
+                              </m:r>
+                            </m:sub>
+                          </m:sSub>
+                          <m:sSub>
+                            <m:sSubPr>
+                              <m:ctrlPr>
+                                <a:rPr lang="en-US" altLang="ja-JP" sz="1600" i="1">
+                                  <a:latin typeface="Cambria Math" panose="02040503050406030204" pitchFamily="18" charset="0"/>
+                                </a:rPr>
+                              </m:ctrlPr>
+                            </m:sSubPr>
+                            <m:e>
+                              <m:r>
+                                <a:rPr lang="en-US" altLang="ja-JP" sz="1600" i="1">
+                                  <a:latin typeface="Cambria Math" panose="02040503050406030204" pitchFamily="18" charset="0"/>
+                                </a:rPr>
+                                <m:t>𝑞</m:t>
+                              </m:r>
+                            </m:e>
+                            <m:sub>
+                              <m:r>
+                                <a:rPr lang="en-US" altLang="ja-JP" sz="1600" i="1">
+                                  <a:latin typeface="Cambria Math" panose="02040503050406030204" pitchFamily="18" charset="0"/>
+                                </a:rPr>
+                                <m:t>4</m:t>
+                              </m:r>
+                            </m:sub>
+                          </m:sSub>
+                        </m:e>
+                      </m:d>
+                    </m:oMath>
+                  </m:oMathPara>
+                </a14:m>
+                <a:endParaRPr lang="ja-JP" altLang="en-US" sz="1600" dirty="0"/>
+              </a:p>
+            </p:txBody>
+          </p:sp>
+        </mc:Choice>
+        <mc:Fallback>
+          <p:sp>
+            <p:nvSpPr>
+              <p:cNvPr id="40" name="正方形/長方形 39"/>
+              <p:cNvSpPr>
+                <a:spLocks noRot="1" noChangeAspect="1" noMove="1" noResize="1" noEditPoints="1" noAdjustHandles="1" noChangeArrowheads="1" noChangeShapeType="1" noTextEdit="1"/>
+              </p:cNvSpPr>
+              <p:nvPr/>
+            </p:nvSpPr>
+            <p:spPr>
+              <a:xfrm>
+                <a:off x="1543315" y="3780556"/>
+                <a:ext cx="1688218" cy="338554"/>
+              </a:xfrm>
+              <a:prstGeom prst="rect">
+                <a:avLst/>
+              </a:prstGeom>
+              <a:blipFill rotWithShape="0">
+                <a:blip r:embed="rId11"/>
+                <a:stretch>
+                  <a:fillRect b="-3571"/>
+                </a:stretch>
+              </a:blipFill>
+            </p:spPr>
+            <p:txBody>
+              <a:bodyPr/>
+              <a:lstStyle/>
+              <a:p>
+                <a:r>
+                  <a:rPr lang="ja-JP" altLang="en-US">
+                    <a:noFill/>
+                  </a:rPr>
+                  <a:t> </a:t>
+                </a:r>
+              </a:p>
+            </p:txBody>
+          </p:sp>
+        </mc:Fallback>
+      </mc:AlternateContent>
+      <mc:AlternateContent xmlns:mc="http://schemas.openxmlformats.org/markup-compatibility/2006">
+        <mc:Choice xmlns:a14="http://schemas.microsoft.com/office/drawing/2010/main" Requires="a14">
+          <p:sp>
+            <p:nvSpPr>
+              <p:cNvPr id="41" name="正方形/長方形 40"/>
+              <p:cNvSpPr/>
+              <p:nvPr/>
+            </p:nvSpPr>
+            <p:spPr>
+              <a:xfrm>
+                <a:off x="3572451" y="3780556"/>
+                <a:ext cx="1688218" cy="338554"/>
+              </a:xfrm>
+              <a:prstGeom prst="rect">
+                <a:avLst/>
+              </a:prstGeom>
+            </p:spPr>
+            <p:txBody>
+              <a:bodyPr wrap="none">
+                <a:spAutoFit/>
+              </a:bodyPr>
+              <a:lstStyle/>
+              <a:p>
+                <a14:m>
+                  <m:oMathPara xmlns:m="http://schemas.openxmlformats.org/officeDocument/2006/math">
+                    <m:oMathParaPr>
+                      <m:jc m:val="centerGroup"/>
+                    </m:oMathParaPr>
+                    <m:oMath xmlns:m="http://schemas.openxmlformats.org/officeDocument/2006/math">
+                      <m:r>
+                        <a:rPr lang="en-US" altLang="ja-JP" sz="1600" b="0" i="1" smtClean="0">
+                          <a:latin typeface="Cambria Math" panose="02040503050406030204" pitchFamily="18" charset="0"/>
+                        </a:rPr>
+                        <m:t>2</m:t>
+                      </m:r>
+                      <m:d>
+                        <m:dPr>
+                          <m:ctrlPr>
+                            <a:rPr lang="en-US" altLang="ja-JP" sz="1600" i="1" smtClean="0">
+                              <a:latin typeface="Cambria Math" panose="02040503050406030204" pitchFamily="18" charset="0"/>
+                            </a:rPr>
+                          </m:ctrlPr>
+                        </m:dPr>
+                        <m:e>
+                          <m:sSub>
+                            <m:sSubPr>
+                              <m:ctrlPr>
+                                <a:rPr lang="en-US" altLang="ja-JP" sz="1600" i="1">
+                                  <a:latin typeface="Cambria Math" panose="02040503050406030204" pitchFamily="18" charset="0"/>
+                                </a:rPr>
+                              </m:ctrlPr>
+                            </m:sSubPr>
+                            <m:e>
+                              <m:r>
+                                <a:rPr lang="en-US" altLang="ja-JP" sz="1600" i="1">
+                                  <a:latin typeface="Cambria Math" panose="02040503050406030204" pitchFamily="18" charset="0"/>
+                                </a:rPr>
+                                <m:t>𝑞</m:t>
+                              </m:r>
+                            </m:e>
+                            <m:sub>
+                              <m:r>
+                                <a:rPr lang="en-US" altLang="ja-JP" sz="1600" b="0" i="1" smtClean="0">
+                                  <a:latin typeface="Cambria Math" panose="02040503050406030204" pitchFamily="18" charset="0"/>
+                                </a:rPr>
+                                <m:t>2</m:t>
+                              </m:r>
+                            </m:sub>
+                          </m:sSub>
+                          <m:sSub>
+                            <m:sSubPr>
+                              <m:ctrlPr>
+                                <a:rPr lang="en-US" altLang="ja-JP" sz="1600" i="1">
+                                  <a:latin typeface="Cambria Math" panose="02040503050406030204" pitchFamily="18" charset="0"/>
+                                </a:rPr>
+                              </m:ctrlPr>
+                            </m:sSubPr>
+                            <m:e>
+                              <m:r>
+                                <a:rPr lang="en-US" altLang="ja-JP" sz="1600" i="1">
+                                  <a:latin typeface="Cambria Math" panose="02040503050406030204" pitchFamily="18" charset="0"/>
+                                </a:rPr>
+                                <m:t>𝑞</m:t>
+                              </m:r>
+                            </m:e>
+                            <m:sub>
+                              <m:r>
+                                <a:rPr lang="en-US" altLang="ja-JP" sz="1600" b="0" i="1" smtClean="0">
+                                  <a:latin typeface="Cambria Math" panose="02040503050406030204" pitchFamily="18" charset="0"/>
+                                </a:rPr>
+                                <m:t>3</m:t>
+                              </m:r>
+                            </m:sub>
+                          </m:sSub>
+                          <m:r>
+                            <a:rPr lang="en-US" altLang="ja-JP" sz="1600" i="1">
+                              <a:latin typeface="Cambria Math" panose="02040503050406030204" pitchFamily="18" charset="0"/>
+                            </a:rPr>
+                            <m:t>−</m:t>
+                          </m:r>
+                          <m:sSub>
+                            <m:sSubPr>
+                              <m:ctrlPr>
+                                <a:rPr lang="en-US" altLang="ja-JP" sz="1600" i="1">
+                                  <a:latin typeface="Cambria Math" panose="02040503050406030204" pitchFamily="18" charset="0"/>
+                                </a:rPr>
+                              </m:ctrlPr>
+                            </m:sSubPr>
+                            <m:e>
+                              <m:r>
+                                <a:rPr lang="en-US" altLang="ja-JP" sz="1600" i="1">
+                                  <a:latin typeface="Cambria Math" panose="02040503050406030204" pitchFamily="18" charset="0"/>
+                                </a:rPr>
+                                <m:t>𝑞</m:t>
+                              </m:r>
+                            </m:e>
+                            <m:sub>
+                              <m:r>
+                                <a:rPr lang="en-US" altLang="ja-JP" sz="1600" b="0" i="1" smtClean="0">
+                                  <a:latin typeface="Cambria Math" panose="02040503050406030204" pitchFamily="18" charset="0"/>
+                                </a:rPr>
+                                <m:t>1</m:t>
+                              </m:r>
+                            </m:sub>
+                          </m:sSub>
+                          <m:sSub>
+                            <m:sSubPr>
+                              <m:ctrlPr>
+                                <a:rPr lang="en-US" altLang="ja-JP" sz="1600" i="1">
+                                  <a:latin typeface="Cambria Math" panose="02040503050406030204" pitchFamily="18" charset="0"/>
+                                </a:rPr>
+                              </m:ctrlPr>
+                            </m:sSubPr>
+                            <m:e>
+                              <m:r>
+                                <a:rPr lang="en-US" altLang="ja-JP" sz="1600" i="1">
+                                  <a:latin typeface="Cambria Math" panose="02040503050406030204" pitchFamily="18" charset="0"/>
+                                </a:rPr>
+                                <m:t>𝑞</m:t>
+                              </m:r>
+                            </m:e>
+                            <m:sub>
+                              <m:r>
+                                <a:rPr lang="en-US" altLang="ja-JP" sz="1600" i="1">
+                                  <a:latin typeface="Cambria Math" panose="02040503050406030204" pitchFamily="18" charset="0"/>
+                                </a:rPr>
+                                <m:t>4</m:t>
+                              </m:r>
+                            </m:sub>
+                          </m:sSub>
+                        </m:e>
+                      </m:d>
+                    </m:oMath>
+                  </m:oMathPara>
+                </a14:m>
+                <a:endParaRPr lang="ja-JP" altLang="en-US" sz="1600" dirty="0"/>
+              </a:p>
+            </p:txBody>
+          </p:sp>
+        </mc:Choice>
+        <mc:Fallback>
+          <p:sp>
+            <p:nvSpPr>
+              <p:cNvPr id="41" name="正方形/長方形 40"/>
+              <p:cNvSpPr>
+                <a:spLocks noRot="1" noChangeAspect="1" noMove="1" noResize="1" noEditPoints="1" noAdjustHandles="1" noChangeArrowheads="1" noChangeShapeType="1" noTextEdit="1"/>
+              </p:cNvSpPr>
+              <p:nvPr/>
+            </p:nvSpPr>
+            <p:spPr>
+              <a:xfrm>
+                <a:off x="3572451" y="3780556"/>
+                <a:ext cx="1688218" cy="338554"/>
+              </a:xfrm>
+              <a:prstGeom prst="rect">
+                <a:avLst/>
+              </a:prstGeom>
+              <a:blipFill rotWithShape="0">
+                <a:blip r:embed="rId12"/>
+                <a:stretch>
+                  <a:fillRect b="-3571"/>
+                </a:stretch>
+              </a:blipFill>
+            </p:spPr>
+            <p:txBody>
+              <a:bodyPr/>
+              <a:lstStyle/>
+              <a:p>
+                <a:r>
+                  <a:rPr lang="ja-JP" altLang="en-US">
+                    <a:noFill/>
+                  </a:rPr>
+                  <a:t> </a:t>
+                </a:r>
+              </a:p>
+            </p:txBody>
+          </p:sp>
+        </mc:Fallback>
+      </mc:AlternateContent>
+      <mc:AlternateContent xmlns:mc="http://schemas.openxmlformats.org/markup-compatibility/2006">
+        <mc:Choice xmlns:a14="http://schemas.microsoft.com/office/drawing/2010/main" Requires="a14">
+          <p:sp>
+            <p:nvSpPr>
+              <p:cNvPr id="42" name="正方形/長方形 41"/>
+              <p:cNvSpPr/>
+              <p:nvPr/>
+            </p:nvSpPr>
+            <p:spPr>
+              <a:xfrm>
+                <a:off x="3590793" y="3167053"/>
+                <a:ext cx="1628203" cy="338554"/>
+              </a:xfrm>
+              <a:prstGeom prst="rect">
+                <a:avLst/>
+              </a:prstGeom>
+            </p:spPr>
+            <p:txBody>
+              <a:bodyPr wrap="none">
+                <a:spAutoFit/>
+              </a:bodyPr>
+              <a:lstStyle/>
+              <a:p>
+                <a14:m>
+                  <m:oMathPara xmlns:m="http://schemas.openxmlformats.org/officeDocument/2006/math">
+                    <m:oMathParaPr>
+                      <m:jc m:val="centerGroup"/>
+                    </m:oMathParaPr>
+                    <m:oMath xmlns:m="http://schemas.openxmlformats.org/officeDocument/2006/math">
+                      <m:r>
+                        <a:rPr lang="en-US" altLang="ja-JP" sz="1600" b="0" i="1" smtClean="0">
+                          <a:latin typeface="Cambria Math" panose="02040503050406030204" pitchFamily="18" charset="0"/>
+                        </a:rPr>
+                        <m:t>2</m:t>
+                      </m:r>
+                      <m:d>
+                        <m:dPr>
+                          <m:ctrlPr>
+                            <a:rPr lang="en-US" altLang="ja-JP" sz="1600" i="1" smtClean="0">
+                              <a:latin typeface="Cambria Math" panose="02040503050406030204" pitchFamily="18" charset="0"/>
+                            </a:rPr>
+                          </m:ctrlPr>
+                        </m:dPr>
+                        <m:e>
+                          <m:sSub>
+                            <m:sSubPr>
+                              <m:ctrlPr>
+                                <a:rPr lang="en-US" altLang="ja-JP" sz="1600" i="1">
+                                  <a:latin typeface="Cambria Math" panose="02040503050406030204" pitchFamily="18" charset="0"/>
+                                </a:rPr>
+                              </m:ctrlPr>
+                            </m:sSubPr>
+                            <m:e>
+                              <m:r>
+                                <a:rPr lang="en-US" altLang="ja-JP" sz="1600" i="1">
+                                  <a:latin typeface="Cambria Math" panose="02040503050406030204" pitchFamily="18" charset="0"/>
+                                </a:rPr>
+                                <m:t>𝑞</m:t>
+                              </m:r>
+                            </m:e>
+                            <m:sub>
+                              <m:r>
+                                <a:rPr lang="en-US" altLang="ja-JP" sz="1600" i="1">
+                                  <a:latin typeface="Cambria Math" panose="02040503050406030204" pitchFamily="18" charset="0"/>
+                                </a:rPr>
+                                <m:t>1</m:t>
+                              </m:r>
+                            </m:sub>
+                          </m:sSub>
+                          <m:sSub>
+                            <m:sSubPr>
+                              <m:ctrlPr>
+                                <a:rPr lang="en-US" altLang="ja-JP" sz="1600" i="1">
+                                  <a:latin typeface="Cambria Math" panose="02040503050406030204" pitchFamily="18" charset="0"/>
+                                </a:rPr>
+                              </m:ctrlPr>
+                            </m:sSubPr>
+                            <m:e>
+                              <m:r>
+                                <a:rPr lang="en-US" altLang="ja-JP" sz="1600" i="1">
+                                  <a:latin typeface="Cambria Math" panose="02040503050406030204" pitchFamily="18" charset="0"/>
+                                </a:rPr>
+                                <m:t>𝑞</m:t>
+                              </m:r>
+                            </m:e>
+                            <m:sub>
+                              <m:r>
+                                <a:rPr lang="en-US" altLang="ja-JP" sz="1600" i="1">
+                                  <a:latin typeface="Cambria Math" panose="02040503050406030204" pitchFamily="18" charset="0"/>
+                                </a:rPr>
+                                <m:t>2</m:t>
+                              </m:r>
+                            </m:sub>
+                          </m:sSub>
+                          <m:r>
+                            <a:rPr lang="en-US" altLang="ja-JP" sz="1600" b="0" i="1" smtClean="0">
+                              <a:latin typeface="Cambria Math" panose="02040503050406030204" pitchFamily="18" charset="0"/>
+                            </a:rPr>
+                            <m:t>+</m:t>
+                          </m:r>
+                          <m:sSub>
+                            <m:sSubPr>
+                              <m:ctrlPr>
+                                <a:rPr lang="en-US" altLang="ja-JP" sz="1600" i="1">
+                                  <a:latin typeface="Cambria Math" panose="02040503050406030204" pitchFamily="18" charset="0"/>
+                                </a:rPr>
+                              </m:ctrlPr>
+                            </m:sSubPr>
+                            <m:e>
+                              <m:r>
+                                <a:rPr lang="en-US" altLang="ja-JP" sz="1600" i="1">
+                                  <a:latin typeface="Cambria Math" panose="02040503050406030204" pitchFamily="18" charset="0"/>
+                                </a:rPr>
+                                <m:t>𝑞</m:t>
+                              </m:r>
+                            </m:e>
+                            <m:sub>
+                              <m:r>
+                                <a:rPr lang="en-US" altLang="ja-JP" sz="1600" i="1">
+                                  <a:latin typeface="Cambria Math" panose="02040503050406030204" pitchFamily="18" charset="0"/>
+                                </a:rPr>
+                                <m:t>3</m:t>
+                              </m:r>
+                            </m:sub>
+                          </m:sSub>
+                          <m:sSub>
+                            <m:sSubPr>
+                              <m:ctrlPr>
+                                <a:rPr lang="en-US" altLang="ja-JP" sz="1600" i="1">
+                                  <a:latin typeface="Cambria Math" panose="02040503050406030204" pitchFamily="18" charset="0"/>
+                                </a:rPr>
+                              </m:ctrlPr>
+                            </m:sSubPr>
+                            <m:e>
+                              <m:r>
+                                <a:rPr lang="en-US" altLang="ja-JP" sz="1600" i="1">
+                                  <a:latin typeface="Cambria Math" panose="02040503050406030204" pitchFamily="18" charset="0"/>
+                                </a:rPr>
+                                <m:t>𝑞</m:t>
+                              </m:r>
+                            </m:e>
+                            <m:sub>
+                              <m:r>
+                                <a:rPr lang="en-US" altLang="ja-JP" sz="1600" i="1">
+                                  <a:latin typeface="Cambria Math" panose="02040503050406030204" pitchFamily="18" charset="0"/>
+                                </a:rPr>
+                                <m:t>4</m:t>
+                              </m:r>
+                            </m:sub>
+                          </m:sSub>
+                        </m:e>
+                      </m:d>
+                    </m:oMath>
+                  </m:oMathPara>
+                </a14:m>
+                <a:endParaRPr lang="ja-JP" altLang="en-US" sz="1600" dirty="0"/>
+              </a:p>
+            </p:txBody>
+          </p:sp>
+        </mc:Choice>
+        <mc:Fallback>
+          <p:sp>
+            <p:nvSpPr>
+              <p:cNvPr id="42" name="正方形/長方形 41"/>
+              <p:cNvSpPr>
+                <a:spLocks noRot="1" noChangeAspect="1" noMove="1" noResize="1" noEditPoints="1" noAdjustHandles="1" noChangeArrowheads="1" noChangeShapeType="1" noTextEdit="1"/>
+              </p:cNvSpPr>
+              <p:nvPr/>
+            </p:nvSpPr>
+            <p:spPr>
+              <a:xfrm>
+                <a:off x="3590793" y="3167053"/>
+                <a:ext cx="1628203" cy="338554"/>
+              </a:xfrm>
+              <a:prstGeom prst="rect">
+                <a:avLst/>
+              </a:prstGeom>
+              <a:blipFill rotWithShape="0">
+                <a:blip r:embed="rId13"/>
+                <a:stretch>
+                  <a:fillRect b="-3636"/>
+                </a:stretch>
+              </a:blipFill>
+            </p:spPr>
+            <p:txBody>
+              <a:bodyPr/>
+              <a:lstStyle/>
+              <a:p>
+                <a:r>
+                  <a:rPr lang="ja-JP" altLang="en-US">
+                    <a:noFill/>
+                  </a:rPr>
+                  <a:t> </a:t>
+                </a:r>
+              </a:p>
+            </p:txBody>
+          </p:sp>
+        </mc:Fallback>
+      </mc:AlternateContent>
+      <mc:AlternateContent xmlns:mc="http://schemas.openxmlformats.org/markup-compatibility/2006">
+        <mc:Choice xmlns:a14="http://schemas.microsoft.com/office/drawing/2010/main" Requires="a14">
+          <p:sp>
+            <p:nvSpPr>
+              <p:cNvPr id="43" name="正方形/長方形 42"/>
+              <p:cNvSpPr/>
+              <p:nvPr/>
+            </p:nvSpPr>
+            <p:spPr>
+              <a:xfrm>
+                <a:off x="5666315" y="3167053"/>
+                <a:ext cx="1688218" cy="338554"/>
+              </a:xfrm>
+              <a:prstGeom prst="rect">
+                <a:avLst/>
+              </a:prstGeom>
+            </p:spPr>
+            <p:txBody>
+              <a:bodyPr wrap="none">
+                <a:spAutoFit/>
+              </a:bodyPr>
+              <a:lstStyle/>
+              <a:p>
+                <a14:m>
+                  <m:oMathPara xmlns:m="http://schemas.openxmlformats.org/officeDocument/2006/math">
+                    <m:oMathParaPr>
+                      <m:jc m:val="centerGroup"/>
+                    </m:oMathParaPr>
+                    <m:oMath xmlns:m="http://schemas.openxmlformats.org/officeDocument/2006/math">
+                      <m:r>
+                        <a:rPr lang="en-US" altLang="ja-JP" sz="1600" b="0" i="1" smtClean="0">
+                          <a:latin typeface="Cambria Math" panose="02040503050406030204" pitchFamily="18" charset="0"/>
+                        </a:rPr>
+                        <m:t>2</m:t>
+                      </m:r>
+                      <m:d>
+                        <m:dPr>
+                          <m:ctrlPr>
+                            <a:rPr lang="en-US" altLang="ja-JP" sz="1600" i="1" smtClean="0">
+                              <a:latin typeface="Cambria Math" panose="02040503050406030204" pitchFamily="18" charset="0"/>
+                            </a:rPr>
+                          </m:ctrlPr>
+                        </m:dPr>
+                        <m:e>
+                          <m:sSub>
+                            <m:sSubPr>
+                              <m:ctrlPr>
+                                <a:rPr lang="en-US" altLang="ja-JP" sz="1600" i="1">
+                                  <a:latin typeface="Cambria Math" panose="02040503050406030204" pitchFamily="18" charset="0"/>
+                                </a:rPr>
+                              </m:ctrlPr>
+                            </m:sSubPr>
+                            <m:e>
+                              <m:r>
+                                <a:rPr lang="en-US" altLang="ja-JP" sz="1600" i="1">
+                                  <a:latin typeface="Cambria Math" panose="02040503050406030204" pitchFamily="18" charset="0"/>
+                                </a:rPr>
+                                <m:t>𝑞</m:t>
+                              </m:r>
+                            </m:e>
+                            <m:sub>
+                              <m:r>
+                                <a:rPr lang="en-US" altLang="ja-JP" sz="1600" b="0" i="1" smtClean="0">
+                                  <a:latin typeface="Cambria Math" panose="02040503050406030204" pitchFamily="18" charset="0"/>
+                                </a:rPr>
+                                <m:t>3</m:t>
+                              </m:r>
+                            </m:sub>
+                          </m:sSub>
+                          <m:sSub>
+                            <m:sSubPr>
+                              <m:ctrlPr>
+                                <a:rPr lang="en-US" altLang="ja-JP" sz="1600" i="1">
+                                  <a:latin typeface="Cambria Math" panose="02040503050406030204" pitchFamily="18" charset="0"/>
+                                </a:rPr>
+                              </m:ctrlPr>
+                            </m:sSubPr>
+                            <m:e>
+                              <m:r>
+                                <a:rPr lang="en-US" altLang="ja-JP" sz="1600" i="1">
+                                  <a:latin typeface="Cambria Math" panose="02040503050406030204" pitchFamily="18" charset="0"/>
+                                </a:rPr>
+                                <m:t>𝑞</m:t>
+                              </m:r>
+                            </m:e>
+                            <m:sub>
+                              <m:r>
+                                <a:rPr lang="en-US" altLang="ja-JP" sz="1600" b="0" i="1" smtClean="0">
+                                  <a:latin typeface="Cambria Math" panose="02040503050406030204" pitchFamily="18" charset="0"/>
+                                </a:rPr>
+                                <m:t>1</m:t>
+                              </m:r>
+                            </m:sub>
+                          </m:sSub>
+                          <m:r>
+                            <a:rPr lang="en-US" altLang="ja-JP" sz="1600" i="1">
+                              <a:latin typeface="Cambria Math" panose="02040503050406030204" pitchFamily="18" charset="0"/>
+                            </a:rPr>
+                            <m:t>−</m:t>
+                          </m:r>
+                          <m:sSub>
+                            <m:sSubPr>
+                              <m:ctrlPr>
+                                <a:rPr lang="en-US" altLang="ja-JP" sz="1600" i="1">
+                                  <a:latin typeface="Cambria Math" panose="02040503050406030204" pitchFamily="18" charset="0"/>
+                                </a:rPr>
+                              </m:ctrlPr>
+                            </m:sSubPr>
+                            <m:e>
+                              <m:r>
+                                <a:rPr lang="en-US" altLang="ja-JP" sz="1600" i="1">
+                                  <a:latin typeface="Cambria Math" panose="02040503050406030204" pitchFamily="18" charset="0"/>
+                                </a:rPr>
+                                <m:t>𝑞</m:t>
+                              </m:r>
+                            </m:e>
+                            <m:sub>
+                              <m:r>
+                                <a:rPr lang="en-US" altLang="ja-JP" sz="1600" b="0" i="1" smtClean="0">
+                                  <a:latin typeface="Cambria Math" panose="02040503050406030204" pitchFamily="18" charset="0"/>
+                                </a:rPr>
+                                <m:t>2</m:t>
+                              </m:r>
+                            </m:sub>
+                          </m:sSub>
+                          <m:sSub>
+                            <m:sSubPr>
+                              <m:ctrlPr>
+                                <a:rPr lang="en-US" altLang="ja-JP" sz="1600" i="1">
+                                  <a:latin typeface="Cambria Math" panose="02040503050406030204" pitchFamily="18" charset="0"/>
+                                </a:rPr>
+                              </m:ctrlPr>
+                            </m:sSubPr>
+                            <m:e>
+                              <m:r>
+                                <a:rPr lang="en-US" altLang="ja-JP" sz="1600" i="1">
+                                  <a:latin typeface="Cambria Math" panose="02040503050406030204" pitchFamily="18" charset="0"/>
+                                </a:rPr>
+                                <m:t>𝑞</m:t>
+                              </m:r>
+                            </m:e>
+                            <m:sub>
+                              <m:r>
+                                <a:rPr lang="en-US" altLang="ja-JP" sz="1600" i="1">
+                                  <a:latin typeface="Cambria Math" panose="02040503050406030204" pitchFamily="18" charset="0"/>
+                                </a:rPr>
+                                <m:t>4</m:t>
+                              </m:r>
+                            </m:sub>
+                          </m:sSub>
+                        </m:e>
+                      </m:d>
+                    </m:oMath>
+                  </m:oMathPara>
+                </a14:m>
+                <a:endParaRPr lang="ja-JP" altLang="en-US" sz="1600" dirty="0"/>
+              </a:p>
+            </p:txBody>
+          </p:sp>
+        </mc:Choice>
+        <mc:Fallback>
+          <p:sp>
+            <p:nvSpPr>
+              <p:cNvPr id="43" name="正方形/長方形 42"/>
+              <p:cNvSpPr>
+                <a:spLocks noRot="1" noChangeAspect="1" noMove="1" noResize="1" noEditPoints="1" noAdjustHandles="1" noChangeArrowheads="1" noChangeShapeType="1" noTextEdit="1"/>
+              </p:cNvSpPr>
+              <p:nvPr/>
+            </p:nvSpPr>
+            <p:spPr>
+              <a:xfrm>
+                <a:off x="5666315" y="3167053"/>
+                <a:ext cx="1688218" cy="338554"/>
+              </a:xfrm>
+              <a:prstGeom prst="rect">
+                <a:avLst/>
+              </a:prstGeom>
+              <a:blipFill rotWithShape="0">
+                <a:blip r:embed="rId14"/>
+                <a:stretch>
+                  <a:fillRect b="-3636"/>
+                </a:stretch>
+              </a:blipFill>
+            </p:spPr>
+            <p:txBody>
+              <a:bodyPr/>
+              <a:lstStyle/>
+              <a:p>
+                <a:r>
+                  <a:rPr lang="ja-JP" altLang="en-US">
+                    <a:noFill/>
+                  </a:rPr>
+                  <a:t> </a:t>
+                </a:r>
+              </a:p>
+            </p:txBody>
+          </p:sp>
+        </mc:Fallback>
+      </mc:AlternateContent>
+      <mc:AlternateContent xmlns:mc="http://schemas.openxmlformats.org/markup-compatibility/2006">
+        <mc:Choice xmlns:a14="http://schemas.microsoft.com/office/drawing/2010/main" Requires="a14">
+          <p:sp>
+            <p:nvSpPr>
+              <p:cNvPr id="44" name="正方形/長方形 43"/>
+              <p:cNvSpPr/>
+              <p:nvPr/>
+            </p:nvSpPr>
+            <p:spPr>
+              <a:xfrm>
+                <a:off x="5673374" y="3480657"/>
+                <a:ext cx="1688218" cy="338554"/>
+              </a:xfrm>
+              <a:prstGeom prst="rect">
+                <a:avLst/>
+              </a:prstGeom>
+            </p:spPr>
+            <p:txBody>
+              <a:bodyPr wrap="none">
+                <a:spAutoFit/>
+              </a:bodyPr>
+              <a:lstStyle/>
+              <a:p>
+                <a14:m>
+                  <m:oMathPara xmlns:m="http://schemas.openxmlformats.org/officeDocument/2006/math">
+                    <m:oMathParaPr>
+                      <m:jc m:val="centerGroup"/>
+                    </m:oMathParaPr>
+                    <m:oMath xmlns:m="http://schemas.openxmlformats.org/officeDocument/2006/math">
+                      <m:r>
+                        <a:rPr lang="en-US" altLang="ja-JP" sz="1600" b="0" i="1" smtClean="0">
+                          <a:latin typeface="Cambria Math" panose="02040503050406030204" pitchFamily="18" charset="0"/>
+                        </a:rPr>
+                        <m:t>2</m:t>
+                      </m:r>
+                      <m:d>
+                        <m:dPr>
+                          <m:ctrlPr>
+                            <a:rPr lang="en-US" altLang="ja-JP" sz="1600" i="1" smtClean="0">
+                              <a:latin typeface="Cambria Math" panose="02040503050406030204" pitchFamily="18" charset="0"/>
+                            </a:rPr>
+                          </m:ctrlPr>
+                        </m:dPr>
+                        <m:e>
+                          <m:sSub>
+                            <m:sSubPr>
+                              <m:ctrlPr>
+                                <a:rPr lang="en-US" altLang="ja-JP" sz="1600" i="1">
+                                  <a:latin typeface="Cambria Math" panose="02040503050406030204" pitchFamily="18" charset="0"/>
+                                </a:rPr>
+                              </m:ctrlPr>
+                            </m:sSubPr>
+                            <m:e>
+                              <m:r>
+                                <a:rPr lang="en-US" altLang="ja-JP" sz="1600" i="1">
+                                  <a:latin typeface="Cambria Math" panose="02040503050406030204" pitchFamily="18" charset="0"/>
+                                </a:rPr>
+                                <m:t>𝑞</m:t>
+                              </m:r>
+                            </m:e>
+                            <m:sub>
+                              <m:r>
+                                <a:rPr lang="en-US" altLang="ja-JP" sz="1600" b="0" i="1" smtClean="0">
+                                  <a:latin typeface="Cambria Math" panose="02040503050406030204" pitchFamily="18" charset="0"/>
+                                </a:rPr>
+                                <m:t>2</m:t>
+                              </m:r>
+                            </m:sub>
+                          </m:sSub>
+                          <m:sSub>
+                            <m:sSubPr>
+                              <m:ctrlPr>
+                                <a:rPr lang="en-US" altLang="ja-JP" sz="1600" i="1">
+                                  <a:latin typeface="Cambria Math" panose="02040503050406030204" pitchFamily="18" charset="0"/>
+                                </a:rPr>
+                              </m:ctrlPr>
+                            </m:sSubPr>
+                            <m:e>
+                              <m:r>
+                                <a:rPr lang="en-US" altLang="ja-JP" sz="1600" i="1">
+                                  <a:latin typeface="Cambria Math" panose="02040503050406030204" pitchFamily="18" charset="0"/>
+                                </a:rPr>
+                                <m:t>𝑞</m:t>
+                              </m:r>
+                            </m:e>
+                            <m:sub>
+                              <m:r>
+                                <a:rPr lang="en-US" altLang="ja-JP" sz="1600" b="0" i="1" smtClean="0">
+                                  <a:latin typeface="Cambria Math" panose="02040503050406030204" pitchFamily="18" charset="0"/>
+                                </a:rPr>
+                                <m:t>3</m:t>
+                              </m:r>
+                            </m:sub>
+                          </m:sSub>
+                          <m:r>
+                            <a:rPr lang="en-US" altLang="ja-JP" sz="1600" b="0" i="1" smtClean="0">
+                              <a:latin typeface="Cambria Math" panose="02040503050406030204" pitchFamily="18" charset="0"/>
+                            </a:rPr>
+                            <m:t>+</m:t>
+                          </m:r>
+                          <m:sSub>
+                            <m:sSubPr>
+                              <m:ctrlPr>
+                                <a:rPr lang="en-US" altLang="ja-JP" sz="1600" i="1">
+                                  <a:latin typeface="Cambria Math" panose="02040503050406030204" pitchFamily="18" charset="0"/>
+                                </a:rPr>
+                              </m:ctrlPr>
+                            </m:sSubPr>
+                            <m:e>
+                              <m:r>
+                                <a:rPr lang="en-US" altLang="ja-JP" sz="1600" i="1">
+                                  <a:latin typeface="Cambria Math" panose="02040503050406030204" pitchFamily="18" charset="0"/>
+                                </a:rPr>
+                                <m:t>𝑞</m:t>
+                              </m:r>
+                            </m:e>
+                            <m:sub>
+                              <m:r>
+                                <a:rPr lang="en-US" altLang="ja-JP" sz="1600" b="0" i="1" smtClean="0">
+                                  <a:latin typeface="Cambria Math" panose="02040503050406030204" pitchFamily="18" charset="0"/>
+                                </a:rPr>
+                                <m:t>1</m:t>
+                              </m:r>
+                            </m:sub>
+                          </m:sSub>
+                          <m:sSub>
+                            <m:sSubPr>
+                              <m:ctrlPr>
+                                <a:rPr lang="en-US" altLang="ja-JP" sz="1600" i="1">
+                                  <a:latin typeface="Cambria Math" panose="02040503050406030204" pitchFamily="18" charset="0"/>
+                                </a:rPr>
+                              </m:ctrlPr>
+                            </m:sSubPr>
+                            <m:e>
+                              <m:r>
+                                <a:rPr lang="en-US" altLang="ja-JP" sz="1600" i="1">
+                                  <a:latin typeface="Cambria Math" panose="02040503050406030204" pitchFamily="18" charset="0"/>
+                                </a:rPr>
+                                <m:t>𝑞</m:t>
+                              </m:r>
+                            </m:e>
+                            <m:sub>
+                              <m:r>
+                                <a:rPr lang="en-US" altLang="ja-JP" sz="1600" i="1">
+                                  <a:latin typeface="Cambria Math" panose="02040503050406030204" pitchFamily="18" charset="0"/>
+                                </a:rPr>
+                                <m:t>4</m:t>
+                              </m:r>
+                            </m:sub>
+                          </m:sSub>
+                        </m:e>
+                      </m:d>
+                    </m:oMath>
+                  </m:oMathPara>
+                </a14:m>
+                <a:endParaRPr lang="ja-JP" altLang="en-US" sz="1600" dirty="0"/>
+              </a:p>
+            </p:txBody>
+          </p:sp>
+        </mc:Choice>
+        <mc:Fallback>
+          <p:sp>
+            <p:nvSpPr>
+              <p:cNvPr id="44" name="正方形/長方形 43"/>
+              <p:cNvSpPr>
+                <a:spLocks noRot="1" noChangeAspect="1" noMove="1" noResize="1" noEditPoints="1" noAdjustHandles="1" noChangeArrowheads="1" noChangeShapeType="1" noTextEdit="1"/>
+              </p:cNvSpPr>
+              <p:nvPr/>
+            </p:nvSpPr>
+            <p:spPr>
+              <a:xfrm>
+                <a:off x="5673374" y="3480657"/>
+                <a:ext cx="1688218" cy="338554"/>
+              </a:xfrm>
+              <a:prstGeom prst="rect">
+                <a:avLst/>
+              </a:prstGeom>
+              <a:blipFill rotWithShape="0">
+                <a:blip r:embed="rId15"/>
+                <a:stretch>
+                  <a:fillRect b="-1786"/>
+                </a:stretch>
+              </a:blipFill>
+            </p:spPr>
+            <p:txBody>
+              <a:bodyPr/>
+              <a:lstStyle/>
+              <a:p>
+                <a:r>
+                  <a:rPr lang="ja-JP" altLang="en-US">
+                    <a:noFill/>
+                  </a:rPr>
+                  <a:t> </a:t>
+                </a:r>
+              </a:p>
+            </p:txBody>
+          </p:sp>
+        </mc:Fallback>
+      </mc:AlternateContent>
+      <mc:AlternateContent xmlns:mc="http://schemas.openxmlformats.org/markup-compatibility/2006">
+        <mc:Choice xmlns:a14="http://schemas.microsoft.com/office/drawing/2010/main" Requires="a14">
+          <p:sp>
+            <p:nvSpPr>
+              <p:cNvPr id="45" name="正方形/長方形 44"/>
+              <p:cNvSpPr/>
+              <p:nvPr/>
+            </p:nvSpPr>
+            <p:spPr>
+              <a:xfrm>
+                <a:off x="1280761" y="3167053"/>
+                <a:ext cx="2214581" cy="338554"/>
+              </a:xfrm>
+              <a:prstGeom prst="rect">
+                <a:avLst/>
+              </a:prstGeom>
+            </p:spPr>
+            <p:txBody>
+              <a:bodyPr wrap="none">
+                <a:spAutoFit/>
+              </a:bodyPr>
+              <a:lstStyle/>
+              <a:p>
+                <a14:m>
+                  <m:oMathPara xmlns:m="http://schemas.openxmlformats.org/officeDocument/2006/math">
+                    <m:oMathParaPr>
+                      <m:jc m:val="centerGroup"/>
+                    </m:oMathParaPr>
+                    <m:oMath xmlns:m="http://schemas.openxmlformats.org/officeDocument/2006/math">
+                      <m:sSup>
+                        <m:sSupPr>
+                          <m:ctrlPr>
+                            <a:rPr lang="en-US" altLang="ja-JP" sz="1600" b="0" i="1" smtClean="0">
+                              <a:latin typeface="Cambria Math" panose="02040503050406030204" pitchFamily="18" charset="0"/>
+                            </a:rPr>
+                          </m:ctrlPr>
+                        </m:sSupPr>
+                        <m:e>
+                          <m:sSub>
+                            <m:sSubPr>
+                              <m:ctrlPr>
+                                <a:rPr lang="en-US" altLang="ja-JP" sz="1600" b="0" i="1" smtClean="0">
+                                  <a:latin typeface="Cambria Math" panose="02040503050406030204" pitchFamily="18" charset="0"/>
+                                </a:rPr>
+                              </m:ctrlPr>
+                            </m:sSubPr>
+                            <m:e>
+                              <m:r>
+                                <a:rPr lang="en-US" altLang="ja-JP" sz="1600" b="0" i="1" smtClean="0">
+                                  <a:latin typeface="Cambria Math" panose="02040503050406030204" pitchFamily="18" charset="0"/>
+                                </a:rPr>
+                                <m:t>𝑞</m:t>
+                              </m:r>
+                            </m:e>
+                            <m:sub>
+                              <m:r>
+                                <a:rPr lang="en-US" altLang="ja-JP" sz="1600" b="0" i="1" smtClean="0">
+                                  <a:latin typeface="Cambria Math" panose="02040503050406030204" pitchFamily="18" charset="0"/>
+                                </a:rPr>
+                                <m:t>1</m:t>
+                              </m:r>
+                            </m:sub>
+                          </m:sSub>
+                        </m:e>
+                        <m:sup>
+                          <m:r>
+                            <a:rPr lang="en-US" altLang="ja-JP" sz="1600" b="0" i="1" smtClean="0">
+                              <a:latin typeface="Cambria Math" panose="02040503050406030204" pitchFamily="18" charset="0"/>
+                            </a:rPr>
+                            <m:t>2</m:t>
+                          </m:r>
+                        </m:sup>
+                      </m:sSup>
+                      <m:r>
+                        <a:rPr lang="en-US" altLang="ja-JP" sz="1600" b="0" i="1" smtClean="0">
+                          <a:latin typeface="Cambria Math" panose="02040503050406030204" pitchFamily="18" charset="0"/>
+                        </a:rPr>
+                        <m:t>−</m:t>
+                      </m:r>
+                      <m:sSup>
+                        <m:sSupPr>
+                          <m:ctrlPr>
+                            <a:rPr lang="en-US" altLang="ja-JP" sz="1600" i="1">
+                              <a:latin typeface="Cambria Math" panose="02040503050406030204" pitchFamily="18" charset="0"/>
+                            </a:rPr>
+                          </m:ctrlPr>
+                        </m:sSupPr>
+                        <m:e>
+                          <m:sSub>
+                            <m:sSubPr>
+                              <m:ctrlPr>
+                                <a:rPr lang="en-US" altLang="ja-JP" sz="1600" i="1">
+                                  <a:latin typeface="Cambria Math" panose="02040503050406030204" pitchFamily="18" charset="0"/>
+                                </a:rPr>
+                              </m:ctrlPr>
+                            </m:sSubPr>
+                            <m:e>
+                              <m:r>
+                                <a:rPr lang="en-US" altLang="ja-JP" sz="1600" i="1">
+                                  <a:latin typeface="Cambria Math" panose="02040503050406030204" pitchFamily="18" charset="0"/>
+                                </a:rPr>
+                                <m:t>𝑞</m:t>
+                              </m:r>
+                            </m:e>
+                            <m:sub>
+                              <m:r>
+                                <a:rPr lang="en-US" altLang="ja-JP" sz="1600" b="0" i="1" smtClean="0">
+                                  <a:latin typeface="Cambria Math" panose="02040503050406030204" pitchFamily="18" charset="0"/>
+                                </a:rPr>
+                                <m:t>2</m:t>
+                              </m:r>
+                            </m:sub>
+                          </m:sSub>
+                        </m:e>
+                        <m:sup>
+                          <m:r>
+                            <a:rPr lang="en-US" altLang="ja-JP" sz="1600" i="1">
+                              <a:latin typeface="Cambria Math" panose="02040503050406030204" pitchFamily="18" charset="0"/>
+                            </a:rPr>
+                            <m:t>2</m:t>
+                          </m:r>
+                        </m:sup>
+                      </m:sSup>
+                      <m:r>
+                        <a:rPr lang="en-US" altLang="ja-JP" sz="1600" i="1">
+                          <a:latin typeface="Cambria Math" panose="02040503050406030204" pitchFamily="18" charset="0"/>
+                        </a:rPr>
+                        <m:t>−</m:t>
+                      </m:r>
+                      <m:sSup>
+                        <m:sSupPr>
+                          <m:ctrlPr>
+                            <a:rPr lang="en-US" altLang="ja-JP" sz="1600" i="1">
+                              <a:latin typeface="Cambria Math" panose="02040503050406030204" pitchFamily="18" charset="0"/>
+                            </a:rPr>
+                          </m:ctrlPr>
+                        </m:sSupPr>
+                        <m:e>
+                          <m:sSub>
+                            <m:sSubPr>
+                              <m:ctrlPr>
+                                <a:rPr lang="en-US" altLang="ja-JP" sz="1600" i="1">
+                                  <a:latin typeface="Cambria Math" panose="02040503050406030204" pitchFamily="18" charset="0"/>
+                                </a:rPr>
+                              </m:ctrlPr>
+                            </m:sSubPr>
+                            <m:e>
+                              <m:r>
+                                <a:rPr lang="en-US" altLang="ja-JP" sz="1600" i="1">
+                                  <a:latin typeface="Cambria Math" panose="02040503050406030204" pitchFamily="18" charset="0"/>
+                                </a:rPr>
+                                <m:t>𝑞</m:t>
+                              </m:r>
+                            </m:e>
+                            <m:sub>
+                              <m:r>
+                                <a:rPr lang="en-US" altLang="ja-JP" sz="1600" b="0" i="1" smtClean="0">
+                                  <a:latin typeface="Cambria Math" panose="02040503050406030204" pitchFamily="18" charset="0"/>
+                                </a:rPr>
+                                <m:t>3</m:t>
+                              </m:r>
+                            </m:sub>
+                          </m:sSub>
+                        </m:e>
+                        <m:sup>
+                          <m:r>
+                            <a:rPr lang="en-US" altLang="ja-JP" sz="1600" i="1">
+                              <a:latin typeface="Cambria Math" panose="02040503050406030204" pitchFamily="18" charset="0"/>
+                            </a:rPr>
+                            <m:t>2</m:t>
+                          </m:r>
+                        </m:sup>
+                      </m:sSup>
+                      <m:r>
+                        <a:rPr lang="en-US" altLang="ja-JP" sz="1600" b="0" i="1" smtClean="0">
+                          <a:latin typeface="Cambria Math" panose="02040503050406030204" pitchFamily="18" charset="0"/>
+                        </a:rPr>
+                        <m:t>+</m:t>
+                      </m:r>
+                      <m:sSup>
+                        <m:sSupPr>
+                          <m:ctrlPr>
+                            <a:rPr lang="en-US" altLang="ja-JP" sz="1600" i="1">
+                              <a:latin typeface="Cambria Math" panose="02040503050406030204" pitchFamily="18" charset="0"/>
+                            </a:rPr>
+                          </m:ctrlPr>
+                        </m:sSupPr>
+                        <m:e>
+                          <m:sSub>
+                            <m:sSubPr>
+                              <m:ctrlPr>
+                                <a:rPr lang="en-US" altLang="ja-JP" sz="1600" i="1" smtClean="0">
+                                  <a:latin typeface="Cambria Math" panose="02040503050406030204" pitchFamily="18" charset="0"/>
+                                </a:rPr>
+                              </m:ctrlPr>
+                            </m:sSubPr>
+                            <m:e>
+                              <m:r>
+                                <a:rPr lang="en-US" altLang="ja-JP" sz="1600" i="1">
+                                  <a:latin typeface="Cambria Math" panose="02040503050406030204" pitchFamily="18" charset="0"/>
+                                </a:rPr>
+                                <m:t>𝑞</m:t>
+                              </m:r>
+                            </m:e>
+                            <m:sub>
+                              <m:r>
+                                <a:rPr lang="en-US" altLang="ja-JP" sz="1600" b="0" i="1" smtClean="0">
+                                  <a:latin typeface="Cambria Math" panose="02040503050406030204" pitchFamily="18" charset="0"/>
+                                </a:rPr>
+                                <m:t>4</m:t>
+                              </m:r>
+                            </m:sub>
+                          </m:sSub>
+                        </m:e>
+                        <m:sup>
+                          <m:r>
+                            <a:rPr lang="en-US" altLang="ja-JP" sz="1600" i="1">
+                              <a:latin typeface="Cambria Math" panose="02040503050406030204" pitchFamily="18" charset="0"/>
+                            </a:rPr>
+                            <m:t>2</m:t>
+                          </m:r>
+                        </m:sup>
+                      </m:sSup>
+                    </m:oMath>
+                  </m:oMathPara>
+                </a14:m>
+                <a:endParaRPr lang="en-US" altLang="ja-JP" sz="1600" b="0" dirty="0" smtClean="0"/>
+              </a:p>
+            </p:txBody>
+          </p:sp>
+        </mc:Choice>
+        <mc:Fallback>
+          <p:sp>
+            <p:nvSpPr>
+              <p:cNvPr id="45" name="正方形/長方形 44"/>
+              <p:cNvSpPr>
+                <a:spLocks noRot="1" noChangeAspect="1" noMove="1" noResize="1" noEditPoints="1" noAdjustHandles="1" noChangeArrowheads="1" noChangeShapeType="1" noTextEdit="1"/>
+              </p:cNvSpPr>
+              <p:nvPr/>
+            </p:nvSpPr>
+            <p:spPr>
+              <a:xfrm>
+                <a:off x="1280761" y="3167053"/>
+                <a:ext cx="2214581" cy="338554"/>
+              </a:xfrm>
+              <a:prstGeom prst="rect">
+                <a:avLst/>
+              </a:prstGeom>
+              <a:blipFill rotWithShape="0">
+                <a:blip r:embed="rId16"/>
+                <a:stretch>
+                  <a:fillRect b="-5455"/>
+                </a:stretch>
+              </a:blipFill>
+            </p:spPr>
+            <p:txBody>
+              <a:bodyPr/>
+              <a:lstStyle/>
+              <a:p>
+                <a:r>
+                  <a:rPr lang="ja-JP" altLang="en-US">
+                    <a:noFill/>
+                  </a:rPr>
+                  <a:t> </a:t>
+                </a:r>
+              </a:p>
+            </p:txBody>
+          </p:sp>
+        </mc:Fallback>
+      </mc:AlternateContent>
+      <mc:AlternateContent xmlns:mc="http://schemas.openxmlformats.org/markup-compatibility/2006">
+        <mc:Choice xmlns:a14="http://schemas.microsoft.com/office/drawing/2010/main" Requires="a14">
+          <p:sp>
+            <p:nvSpPr>
+              <p:cNvPr id="46" name="正方形/長方形 45"/>
+              <p:cNvSpPr/>
+              <p:nvPr/>
+            </p:nvSpPr>
+            <p:spPr>
+              <a:xfrm>
+                <a:off x="5450760" y="3780556"/>
+                <a:ext cx="2274597" cy="338554"/>
+              </a:xfrm>
+              <a:prstGeom prst="rect">
+                <a:avLst/>
+              </a:prstGeom>
+            </p:spPr>
+            <p:txBody>
+              <a:bodyPr wrap="none">
+                <a:spAutoFit/>
+              </a:bodyPr>
+              <a:lstStyle/>
+              <a:p>
+                <a14:m>
+                  <m:oMathPara xmlns:m="http://schemas.openxmlformats.org/officeDocument/2006/math">
+                    <m:oMathParaPr>
+                      <m:jc m:val="centerGroup"/>
+                    </m:oMathParaPr>
+                    <m:oMath xmlns:m="http://schemas.openxmlformats.org/officeDocument/2006/math">
+                      <m:sSup>
+                        <m:sSupPr>
+                          <m:ctrlPr>
+                            <a:rPr lang="en-US" altLang="ja-JP" sz="1600" b="0" i="1" smtClean="0">
+                              <a:latin typeface="Cambria Math" panose="02040503050406030204" pitchFamily="18" charset="0"/>
+                            </a:rPr>
+                          </m:ctrlPr>
+                        </m:sSupPr>
+                        <m:e>
+                          <m:sSub>
+                            <m:sSubPr>
+                              <m:ctrlPr>
+                                <a:rPr lang="en-US" altLang="ja-JP" sz="1600" b="0" i="1" smtClean="0">
+                                  <a:latin typeface="Cambria Math" panose="02040503050406030204" pitchFamily="18" charset="0"/>
+                                </a:rPr>
+                              </m:ctrlPr>
+                            </m:sSubPr>
+                            <m:e>
+                              <m:r>
+                                <a:rPr lang="en-US" altLang="ja-JP" sz="1600" b="0" i="1" smtClean="0">
+                                  <a:latin typeface="Cambria Math" panose="02040503050406030204" pitchFamily="18" charset="0"/>
+                                </a:rPr>
+                                <m:t>𝑞</m:t>
+                              </m:r>
+                            </m:e>
+                            <m:sub>
+                              <m:r>
+                                <a:rPr lang="en-US" altLang="ja-JP" sz="1600" b="0" i="1" smtClean="0">
+                                  <a:latin typeface="Cambria Math" panose="02040503050406030204" pitchFamily="18" charset="0"/>
+                                </a:rPr>
+                                <m:t>3</m:t>
+                              </m:r>
+                            </m:sub>
+                          </m:sSub>
+                        </m:e>
+                        <m:sup>
+                          <m:r>
+                            <a:rPr lang="en-US" altLang="ja-JP" sz="1600" b="0" i="1" smtClean="0">
+                              <a:latin typeface="Cambria Math" panose="02040503050406030204" pitchFamily="18" charset="0"/>
+                            </a:rPr>
+                            <m:t>2</m:t>
+                          </m:r>
+                        </m:sup>
+                      </m:sSup>
+                      <m:r>
+                        <a:rPr lang="en-US" altLang="ja-JP" sz="1600" b="0" i="1" smtClean="0">
+                          <a:latin typeface="Cambria Math" panose="02040503050406030204" pitchFamily="18" charset="0"/>
+                        </a:rPr>
+                        <m:t>−</m:t>
+                      </m:r>
+                      <m:sSup>
+                        <m:sSupPr>
+                          <m:ctrlPr>
+                            <a:rPr lang="en-US" altLang="ja-JP" sz="1600" i="1">
+                              <a:latin typeface="Cambria Math" panose="02040503050406030204" pitchFamily="18" charset="0"/>
+                            </a:rPr>
+                          </m:ctrlPr>
+                        </m:sSupPr>
+                        <m:e>
+                          <m:sSub>
+                            <m:sSubPr>
+                              <m:ctrlPr>
+                                <a:rPr lang="en-US" altLang="ja-JP" sz="1600" i="1">
+                                  <a:latin typeface="Cambria Math" panose="02040503050406030204" pitchFamily="18" charset="0"/>
+                                </a:rPr>
+                              </m:ctrlPr>
+                            </m:sSubPr>
+                            <m:e>
+                              <m:r>
+                                <a:rPr lang="en-US" altLang="ja-JP" sz="1600" i="1">
+                                  <a:latin typeface="Cambria Math" panose="02040503050406030204" pitchFamily="18" charset="0"/>
+                                </a:rPr>
+                                <m:t>𝑞</m:t>
+                              </m:r>
+                            </m:e>
+                            <m:sub>
+                              <m:r>
+                                <a:rPr lang="en-US" altLang="ja-JP" sz="1600" b="0" i="1" smtClean="0">
+                                  <a:latin typeface="Cambria Math" panose="02040503050406030204" pitchFamily="18" charset="0"/>
+                                </a:rPr>
+                                <m:t>1</m:t>
+                              </m:r>
+                            </m:sub>
+                          </m:sSub>
+                        </m:e>
+                        <m:sup>
+                          <m:r>
+                            <a:rPr lang="en-US" altLang="ja-JP" sz="1600" i="1">
+                              <a:latin typeface="Cambria Math" panose="02040503050406030204" pitchFamily="18" charset="0"/>
+                            </a:rPr>
+                            <m:t>2</m:t>
+                          </m:r>
+                        </m:sup>
+                      </m:sSup>
+                      <m:r>
+                        <a:rPr lang="en-US" altLang="ja-JP" sz="1600" i="1">
+                          <a:latin typeface="Cambria Math" panose="02040503050406030204" pitchFamily="18" charset="0"/>
+                        </a:rPr>
+                        <m:t>−</m:t>
+                      </m:r>
+                      <m:sSup>
+                        <m:sSupPr>
+                          <m:ctrlPr>
+                            <a:rPr lang="en-US" altLang="ja-JP" sz="1600" i="1">
+                              <a:latin typeface="Cambria Math" panose="02040503050406030204" pitchFamily="18" charset="0"/>
+                            </a:rPr>
+                          </m:ctrlPr>
+                        </m:sSupPr>
+                        <m:e>
+                          <m:sSub>
+                            <m:sSubPr>
+                              <m:ctrlPr>
+                                <a:rPr lang="en-US" altLang="ja-JP" sz="1600" i="1">
+                                  <a:latin typeface="Cambria Math" panose="02040503050406030204" pitchFamily="18" charset="0"/>
+                                </a:rPr>
+                              </m:ctrlPr>
+                            </m:sSubPr>
+                            <m:e>
+                              <m:r>
+                                <a:rPr lang="en-US" altLang="ja-JP" sz="1600" i="1">
+                                  <a:latin typeface="Cambria Math" panose="02040503050406030204" pitchFamily="18" charset="0"/>
+                                </a:rPr>
+                                <m:t>𝑞</m:t>
+                              </m:r>
+                            </m:e>
+                            <m:sub>
+                              <m:r>
+                                <a:rPr lang="en-US" altLang="ja-JP" sz="1600" b="0" i="1" smtClean="0">
+                                  <a:latin typeface="Cambria Math" panose="02040503050406030204" pitchFamily="18" charset="0"/>
+                                </a:rPr>
+                                <m:t>2</m:t>
+                              </m:r>
+                            </m:sub>
+                          </m:sSub>
+                        </m:e>
+                        <m:sup>
+                          <m:r>
+                            <a:rPr lang="en-US" altLang="ja-JP" sz="1600" i="1">
+                              <a:latin typeface="Cambria Math" panose="02040503050406030204" pitchFamily="18" charset="0"/>
+                            </a:rPr>
+                            <m:t>2</m:t>
+                          </m:r>
+                        </m:sup>
+                      </m:sSup>
+                      <m:r>
+                        <a:rPr lang="en-US" altLang="ja-JP" sz="1600" b="0" i="1" smtClean="0">
+                          <a:latin typeface="Cambria Math" panose="02040503050406030204" pitchFamily="18" charset="0"/>
+                        </a:rPr>
+                        <m:t>+</m:t>
+                      </m:r>
+                      <m:sSup>
+                        <m:sSupPr>
+                          <m:ctrlPr>
+                            <a:rPr lang="en-US" altLang="ja-JP" sz="1600" i="1">
+                              <a:latin typeface="Cambria Math" panose="02040503050406030204" pitchFamily="18" charset="0"/>
+                            </a:rPr>
+                          </m:ctrlPr>
+                        </m:sSupPr>
+                        <m:e>
+                          <m:sSub>
+                            <m:sSubPr>
+                              <m:ctrlPr>
+                                <a:rPr lang="en-US" altLang="ja-JP" sz="1600" i="1" smtClean="0">
+                                  <a:latin typeface="Cambria Math" panose="02040503050406030204" pitchFamily="18" charset="0"/>
+                                </a:rPr>
+                              </m:ctrlPr>
+                            </m:sSubPr>
+                            <m:e>
+                              <m:r>
+                                <a:rPr lang="en-US" altLang="ja-JP" sz="1600" i="1">
+                                  <a:latin typeface="Cambria Math" panose="02040503050406030204" pitchFamily="18" charset="0"/>
+                                </a:rPr>
+                                <m:t>𝑞</m:t>
+                              </m:r>
+                            </m:e>
+                            <m:sub>
+                              <m:r>
+                                <a:rPr lang="en-US" altLang="ja-JP" sz="1600" b="0" i="1" smtClean="0">
+                                  <a:latin typeface="Cambria Math" panose="02040503050406030204" pitchFamily="18" charset="0"/>
+                                </a:rPr>
+                                <m:t>4</m:t>
+                              </m:r>
+                            </m:sub>
+                          </m:sSub>
+                        </m:e>
+                        <m:sup>
+                          <m:r>
+                            <a:rPr lang="en-US" altLang="ja-JP" sz="1600" i="1">
+                              <a:latin typeface="Cambria Math" panose="02040503050406030204" pitchFamily="18" charset="0"/>
+                            </a:rPr>
+                            <m:t>2</m:t>
+                          </m:r>
+                        </m:sup>
+                      </m:sSup>
+                    </m:oMath>
+                  </m:oMathPara>
+                </a14:m>
+                <a:endParaRPr lang="en-US" altLang="ja-JP" sz="1600" b="0" dirty="0" smtClean="0"/>
+              </a:p>
+            </p:txBody>
+          </p:sp>
+        </mc:Choice>
+        <mc:Fallback>
+          <p:sp>
+            <p:nvSpPr>
+              <p:cNvPr id="46" name="正方形/長方形 45"/>
+              <p:cNvSpPr>
+                <a:spLocks noRot="1" noChangeAspect="1" noMove="1" noResize="1" noEditPoints="1" noAdjustHandles="1" noChangeArrowheads="1" noChangeShapeType="1" noTextEdit="1"/>
+              </p:cNvSpPr>
+              <p:nvPr/>
+            </p:nvSpPr>
+            <p:spPr>
+              <a:xfrm>
+                <a:off x="5450760" y="3780556"/>
+                <a:ext cx="2274597" cy="338554"/>
+              </a:xfrm>
+              <a:prstGeom prst="rect">
+                <a:avLst/>
+              </a:prstGeom>
+              <a:blipFill rotWithShape="0">
+                <a:blip r:embed="rId17"/>
+                <a:stretch>
+                  <a:fillRect b="-5357"/>
+                </a:stretch>
+              </a:blipFill>
+            </p:spPr>
+            <p:txBody>
+              <a:bodyPr/>
+              <a:lstStyle/>
+              <a:p>
+                <a:r>
+                  <a:rPr lang="ja-JP" altLang="en-US">
+                    <a:noFill/>
+                  </a:rPr>
+                  <a:t> </a:t>
+                </a:r>
+              </a:p>
+            </p:txBody>
+          </p:sp>
+        </mc:Fallback>
+      </mc:AlternateContent>
+      <mc:AlternateContent xmlns:mc="http://schemas.openxmlformats.org/markup-compatibility/2006">
+        <mc:Choice xmlns:a14="http://schemas.microsoft.com/office/drawing/2010/main" Requires="a14">
+          <p:sp>
+            <p:nvSpPr>
+              <p:cNvPr id="47" name="正方形/長方形 46"/>
+              <p:cNvSpPr/>
+              <p:nvPr/>
+            </p:nvSpPr>
+            <p:spPr>
+              <a:xfrm>
+                <a:off x="3312382" y="3480657"/>
+                <a:ext cx="2274597" cy="338554"/>
+              </a:xfrm>
+              <a:prstGeom prst="rect">
+                <a:avLst/>
+              </a:prstGeom>
+            </p:spPr>
+            <p:txBody>
+              <a:bodyPr wrap="none">
+                <a:spAutoFit/>
+              </a:bodyPr>
+              <a:lstStyle/>
+              <a:p>
+                <a14:m>
+                  <m:oMathPara xmlns:m="http://schemas.openxmlformats.org/officeDocument/2006/math">
+                    <m:oMathParaPr>
+                      <m:jc m:val="centerGroup"/>
+                    </m:oMathParaPr>
+                    <m:oMath xmlns:m="http://schemas.openxmlformats.org/officeDocument/2006/math">
+                      <m:sSup>
+                        <m:sSupPr>
+                          <m:ctrlPr>
+                            <a:rPr lang="en-US" altLang="ja-JP" sz="1600" b="0" i="1" smtClean="0">
+                              <a:latin typeface="Cambria Math" panose="02040503050406030204" pitchFamily="18" charset="0"/>
+                            </a:rPr>
+                          </m:ctrlPr>
+                        </m:sSupPr>
+                        <m:e>
+                          <m:sSub>
+                            <m:sSubPr>
+                              <m:ctrlPr>
+                                <a:rPr lang="en-US" altLang="ja-JP" sz="1600" b="0" i="1" smtClean="0">
+                                  <a:latin typeface="Cambria Math" panose="02040503050406030204" pitchFamily="18" charset="0"/>
+                                </a:rPr>
+                              </m:ctrlPr>
+                            </m:sSubPr>
+                            <m:e>
+                              <m:r>
+                                <a:rPr lang="en-US" altLang="ja-JP" sz="1600" b="0" i="1" smtClean="0">
+                                  <a:latin typeface="Cambria Math" panose="02040503050406030204" pitchFamily="18" charset="0"/>
+                                </a:rPr>
+                                <m:t>𝑞</m:t>
+                              </m:r>
+                            </m:e>
+                            <m:sub>
+                              <m:r>
+                                <a:rPr lang="en-US" altLang="ja-JP" sz="1600" b="0" i="1" smtClean="0">
+                                  <a:latin typeface="Cambria Math" panose="02040503050406030204" pitchFamily="18" charset="0"/>
+                                </a:rPr>
+                                <m:t>2</m:t>
+                              </m:r>
+                            </m:sub>
+                          </m:sSub>
+                        </m:e>
+                        <m:sup>
+                          <m:r>
+                            <a:rPr lang="en-US" altLang="ja-JP" sz="1600" b="0" i="1" smtClean="0">
+                              <a:latin typeface="Cambria Math" panose="02040503050406030204" pitchFamily="18" charset="0"/>
+                            </a:rPr>
+                            <m:t>2</m:t>
+                          </m:r>
+                        </m:sup>
+                      </m:sSup>
+                      <m:r>
+                        <a:rPr lang="en-US" altLang="ja-JP" sz="1600" b="0" i="1" smtClean="0">
+                          <a:latin typeface="Cambria Math" panose="02040503050406030204" pitchFamily="18" charset="0"/>
+                        </a:rPr>
+                        <m:t>−</m:t>
+                      </m:r>
+                      <m:sSup>
+                        <m:sSupPr>
+                          <m:ctrlPr>
+                            <a:rPr lang="en-US" altLang="ja-JP" sz="1600" i="1">
+                              <a:latin typeface="Cambria Math" panose="02040503050406030204" pitchFamily="18" charset="0"/>
+                            </a:rPr>
+                          </m:ctrlPr>
+                        </m:sSupPr>
+                        <m:e>
+                          <m:sSub>
+                            <m:sSubPr>
+                              <m:ctrlPr>
+                                <a:rPr lang="en-US" altLang="ja-JP" sz="1600" i="1">
+                                  <a:latin typeface="Cambria Math" panose="02040503050406030204" pitchFamily="18" charset="0"/>
+                                </a:rPr>
+                              </m:ctrlPr>
+                            </m:sSubPr>
+                            <m:e>
+                              <m:r>
+                                <a:rPr lang="en-US" altLang="ja-JP" sz="1600" i="1">
+                                  <a:latin typeface="Cambria Math" panose="02040503050406030204" pitchFamily="18" charset="0"/>
+                                </a:rPr>
+                                <m:t>𝑞</m:t>
+                              </m:r>
+                            </m:e>
+                            <m:sub>
+                              <m:r>
+                                <a:rPr lang="en-US" altLang="ja-JP" sz="1600" b="0" i="1" smtClean="0">
+                                  <a:latin typeface="Cambria Math" panose="02040503050406030204" pitchFamily="18" charset="0"/>
+                                </a:rPr>
+                                <m:t>3</m:t>
+                              </m:r>
+                            </m:sub>
+                          </m:sSub>
+                        </m:e>
+                        <m:sup>
+                          <m:r>
+                            <a:rPr lang="en-US" altLang="ja-JP" sz="1600" i="1">
+                              <a:latin typeface="Cambria Math" panose="02040503050406030204" pitchFamily="18" charset="0"/>
+                            </a:rPr>
+                            <m:t>2</m:t>
+                          </m:r>
+                        </m:sup>
+                      </m:sSup>
+                      <m:r>
+                        <a:rPr lang="en-US" altLang="ja-JP" sz="1600" i="1">
+                          <a:latin typeface="Cambria Math" panose="02040503050406030204" pitchFamily="18" charset="0"/>
+                        </a:rPr>
+                        <m:t>−</m:t>
+                      </m:r>
+                      <m:sSup>
+                        <m:sSupPr>
+                          <m:ctrlPr>
+                            <a:rPr lang="en-US" altLang="ja-JP" sz="1600" i="1">
+                              <a:latin typeface="Cambria Math" panose="02040503050406030204" pitchFamily="18" charset="0"/>
+                            </a:rPr>
+                          </m:ctrlPr>
+                        </m:sSupPr>
+                        <m:e>
+                          <m:sSub>
+                            <m:sSubPr>
+                              <m:ctrlPr>
+                                <a:rPr lang="en-US" altLang="ja-JP" sz="1600" i="1">
+                                  <a:latin typeface="Cambria Math" panose="02040503050406030204" pitchFamily="18" charset="0"/>
+                                </a:rPr>
+                              </m:ctrlPr>
+                            </m:sSubPr>
+                            <m:e>
+                              <m:r>
+                                <a:rPr lang="en-US" altLang="ja-JP" sz="1600" i="1">
+                                  <a:latin typeface="Cambria Math" panose="02040503050406030204" pitchFamily="18" charset="0"/>
+                                </a:rPr>
+                                <m:t>𝑞</m:t>
+                              </m:r>
+                            </m:e>
+                            <m:sub>
+                              <m:r>
+                                <a:rPr lang="en-US" altLang="ja-JP" sz="1600" b="0" i="1" smtClean="0">
+                                  <a:latin typeface="Cambria Math" panose="02040503050406030204" pitchFamily="18" charset="0"/>
+                                </a:rPr>
+                                <m:t>1</m:t>
+                              </m:r>
+                            </m:sub>
+                          </m:sSub>
+                        </m:e>
+                        <m:sup>
+                          <m:r>
+                            <a:rPr lang="en-US" altLang="ja-JP" sz="1600" i="1">
+                              <a:latin typeface="Cambria Math" panose="02040503050406030204" pitchFamily="18" charset="0"/>
+                            </a:rPr>
+                            <m:t>2</m:t>
+                          </m:r>
+                        </m:sup>
+                      </m:sSup>
+                      <m:r>
+                        <a:rPr lang="en-US" altLang="ja-JP" sz="1600" b="0" i="1" smtClean="0">
+                          <a:latin typeface="Cambria Math" panose="02040503050406030204" pitchFamily="18" charset="0"/>
+                        </a:rPr>
+                        <m:t>+</m:t>
+                      </m:r>
+                      <m:sSup>
+                        <m:sSupPr>
+                          <m:ctrlPr>
+                            <a:rPr lang="en-US" altLang="ja-JP" sz="1600" i="1">
+                              <a:latin typeface="Cambria Math" panose="02040503050406030204" pitchFamily="18" charset="0"/>
+                            </a:rPr>
+                          </m:ctrlPr>
+                        </m:sSupPr>
+                        <m:e>
+                          <m:sSub>
+                            <m:sSubPr>
+                              <m:ctrlPr>
+                                <a:rPr lang="en-US" altLang="ja-JP" sz="1600" i="1" smtClean="0">
+                                  <a:latin typeface="Cambria Math" panose="02040503050406030204" pitchFamily="18" charset="0"/>
+                                </a:rPr>
+                              </m:ctrlPr>
+                            </m:sSubPr>
+                            <m:e>
+                              <m:r>
+                                <a:rPr lang="en-US" altLang="ja-JP" sz="1600" i="1">
+                                  <a:latin typeface="Cambria Math" panose="02040503050406030204" pitchFamily="18" charset="0"/>
+                                </a:rPr>
+                                <m:t>𝑞</m:t>
+                              </m:r>
+                            </m:e>
+                            <m:sub>
+                              <m:r>
+                                <a:rPr lang="en-US" altLang="ja-JP" sz="1600" b="0" i="1" smtClean="0">
+                                  <a:latin typeface="Cambria Math" panose="02040503050406030204" pitchFamily="18" charset="0"/>
+                                </a:rPr>
+                                <m:t>4</m:t>
+                              </m:r>
+                            </m:sub>
+                          </m:sSub>
+                        </m:e>
+                        <m:sup>
+                          <m:r>
+                            <a:rPr lang="en-US" altLang="ja-JP" sz="1600" i="1">
+                              <a:latin typeface="Cambria Math" panose="02040503050406030204" pitchFamily="18" charset="0"/>
+                            </a:rPr>
+                            <m:t>2</m:t>
+                          </m:r>
+                        </m:sup>
+                      </m:sSup>
+                    </m:oMath>
+                  </m:oMathPara>
+                </a14:m>
+                <a:endParaRPr lang="en-US" altLang="ja-JP" sz="1600" b="0" dirty="0" smtClean="0"/>
+              </a:p>
+            </p:txBody>
+          </p:sp>
+        </mc:Choice>
+        <mc:Fallback>
+          <p:sp>
+            <p:nvSpPr>
+              <p:cNvPr id="47" name="正方形/長方形 46"/>
+              <p:cNvSpPr>
+                <a:spLocks noRot="1" noChangeAspect="1" noMove="1" noResize="1" noEditPoints="1" noAdjustHandles="1" noChangeArrowheads="1" noChangeShapeType="1" noTextEdit="1"/>
+              </p:cNvSpPr>
+              <p:nvPr/>
+            </p:nvSpPr>
+            <p:spPr>
+              <a:xfrm>
+                <a:off x="3312382" y="3480657"/>
+                <a:ext cx="2274597" cy="338554"/>
+              </a:xfrm>
+              <a:prstGeom prst="rect">
+                <a:avLst/>
+              </a:prstGeom>
+              <a:blipFill rotWithShape="0">
+                <a:blip r:embed="rId18"/>
+                <a:stretch>
+                  <a:fillRect b="-3571"/>
+                </a:stretch>
+              </a:blipFill>
+            </p:spPr>
+            <p:txBody>
+              <a:bodyPr/>
+              <a:lstStyle/>
+              <a:p>
+                <a:r>
+                  <a:rPr lang="ja-JP" altLang="en-US">
+                    <a:noFill/>
+                  </a:rPr>
+                  <a:t> </a:t>
+                </a:r>
+              </a:p>
+            </p:txBody>
+          </p:sp>
+        </mc:Fallback>
+      </mc:AlternateContent>
+      <p:sp>
+        <p:nvSpPr>
+          <p:cNvPr id="21" name="テキスト ボックス 20"/>
+          <p:cNvSpPr txBox="1"/>
+          <p:nvPr/>
+        </p:nvSpPr>
+        <p:spPr>
+          <a:xfrm>
+            <a:off x="852269" y="4479768"/>
+            <a:ext cx="3986989" cy="369332"/>
+          </a:xfrm>
+          <a:prstGeom prst="rect">
+            <a:avLst/>
+          </a:prstGeom>
+          <a:noFill/>
+        </p:spPr>
+        <p:txBody>
+          <a:bodyPr wrap="none" rtlCol="0">
+            <a:spAutoFit/>
+          </a:bodyPr>
+          <a:lstStyle/>
+          <a:p>
+            <a:r>
+              <a:rPr lang="en-US" altLang="ja-JP" dirty="0" smtClean="0">
+                <a:latin typeface="+mn-ea"/>
+              </a:rPr>
+              <a:t>DCM to Quaternion : please refer [1]</a:t>
+            </a:r>
+            <a:endParaRPr kumimoji="1" lang="ja-JP" altLang="en-US" dirty="0">
+              <a:latin typeface="+mn-ea"/>
+            </a:endParaRPr>
+          </a:p>
+        </p:txBody>
+      </p:sp>
+    </p:spTree>
+    <p:extLst>
+      <p:ext uri="{BB962C8B-B14F-4D97-AF65-F5344CB8AC3E}">
+        <p14:creationId xmlns:p14="http://schemas.microsoft.com/office/powerpoint/2010/main" val="3709337560"/>
       </p:ext>
     </p:extLst>
   </p:cSld>

</xml_diff>

<commit_message>
add pic of gravity vector
</commit_message>
<xml_diff>
--- a/images/images_for_readme.pptx
+++ b/images/images_for_readme.pptx
@@ -5,7 +5,7 @@
     <p:sldMasterId id="2147483660" r:id="rId1"/>
   </p:sldMasterIdLst>
   <p:notesMasterIdLst>
-    <p:notesMasterId r:id="rId9"/>
+    <p:notesMasterId r:id="rId10"/>
   </p:notesMasterIdLst>
   <p:sldIdLst>
     <p:sldId id="523" r:id="rId2"/>
@@ -15,6 +15,7 @@
     <p:sldId id="521" r:id="rId6"/>
     <p:sldId id="522" r:id="rId7"/>
     <p:sldId id="524" r:id="rId8"/>
+    <p:sldId id="525" r:id="rId9"/>
   </p:sldIdLst>
   <p:sldSz cx="9144000" cy="6858000" type="screen4x3"/>
   <p:notesSz cx="6797675" cy="9926638"/>
@@ -13076,14 +13077,7 @@
                 <a:latin typeface="+mj-ea"/>
                 <a:ea typeface="+mj-ea"/>
               </a:rPr>
-              <a:t>Angular velocity</a:t>
-            </a:r>
-            <a:r>
-              <a:rPr lang="en-US" altLang="ja-JP" sz="2400" dirty="0" smtClean="0">
-                <a:latin typeface="+mj-ea"/>
-                <a:ea typeface="+mj-ea"/>
-              </a:rPr>
-              <a:t>          DCM and Quaternion</a:t>
+              <a:t>Angular velocity          DCM and Quaternion</a:t>
             </a:r>
             <a:endParaRPr kumimoji="1" lang="ja-JP" altLang="en-US" sz="2400" dirty="0">
               <a:latin typeface="+mj-ea"/>
@@ -13092,8 +13086,8 @@
           </a:p>
         </p:txBody>
       </p:sp>
-      <mc:AlternateContent xmlns:mc="http://schemas.openxmlformats.org/markup-compatibility/2006">
-        <mc:Choice xmlns:a14="http://schemas.microsoft.com/office/drawing/2010/main" Requires="a14">
+      <mc:AlternateContent xmlns:mc="http://schemas.openxmlformats.org/markup-compatibility/2006" xmlns:a14="http://schemas.microsoft.com/office/drawing/2010/main">
+        <mc:Choice Requires="a14">
           <p:sp>
             <p:nvSpPr>
               <p:cNvPr id="7" name="テキスト ボックス 6"/>
@@ -13126,19 +13120,7 @@
                   <a:rPr lang="en-US" altLang="ja-JP" sz="1600" dirty="0" smtClean="0">
                     <a:latin typeface="+mn-ea"/>
                   </a:rPr>
-                  <a:t>define </a:t>
-                </a:r>
-                <a:r>
-                  <a:rPr lang="en-US" altLang="ja-JP" sz="1600" dirty="0" smtClean="0">
-                    <a:latin typeface="+mn-ea"/>
-                  </a:rPr>
-                  <a:t>Angular velocity</a:t>
-                </a:r>
-                <a:r>
-                  <a:rPr lang="en-US" altLang="ja-JP" sz="1600" dirty="0" smtClean="0">
-                    <a:latin typeface="+mn-ea"/>
-                  </a:rPr>
-                  <a:t> </a:t>
+                  <a:t>define Angular velocity </a:t>
                 </a:r>
                 <a14:m>
                   <m:oMath xmlns:m="http://schemas.openxmlformats.org/officeDocument/2006/math">
@@ -13204,13 +13186,7 @@
                   <a:rPr lang="en-US" altLang="ja-JP" sz="1600" dirty="0" smtClean="0">
                     <a:latin typeface="+mn-ea"/>
                   </a:rPr>
-                  <a:t> </a:t>
-                </a:r>
-                <a:r>
-                  <a:rPr lang="en-US" altLang="ja-JP" sz="1600" dirty="0" smtClean="0">
-                    <a:latin typeface="+mn-ea"/>
-                  </a:rPr>
-                  <a:t>and Temporal differentiation </a:t>
+                  <a:t> and Temporal differentiation </a:t>
                 </a:r>
                 <a14:m>
                   <m:oMath xmlns:m="http://schemas.openxmlformats.org/officeDocument/2006/math">
@@ -13238,13 +13214,7 @@
                   <a:rPr lang="en-US" altLang="ja-JP" sz="1600" dirty="0" smtClean="0">
                     <a:latin typeface="+mn-ea"/>
                   </a:rPr>
-                  <a:t> as </a:t>
-                </a:r>
-                <a:r>
-                  <a:rPr lang="en-US" altLang="ja-JP" sz="1600" dirty="0" smtClean="0">
-                    <a:latin typeface="+mn-ea"/>
-                  </a:rPr>
-                  <a:t>bellow</a:t>
+                  <a:t> as bellow</a:t>
                 </a:r>
                 <a:endParaRPr kumimoji="1" lang="en-US" altLang="ja-JP" sz="1600" dirty="0" smtClean="0">
                   <a:solidFill>
@@ -13256,7 +13226,7 @@
             </p:txBody>
           </p:sp>
         </mc:Choice>
-        <mc:Fallback>
+        <mc:Fallback xmlns="">
           <p:sp>
             <p:nvSpPr>
               <p:cNvPr id="7" name="テキスト ボックス 6"/>
@@ -13361,8 +13331,8 @@
           </a:p>
         </p:txBody>
       </p:sp>
-      <mc:AlternateContent xmlns:mc="http://schemas.openxmlformats.org/markup-compatibility/2006">
-        <mc:Choice xmlns:a14="http://schemas.microsoft.com/office/drawing/2010/main" Requires="a14">
+      <mc:AlternateContent xmlns:mc="http://schemas.openxmlformats.org/markup-compatibility/2006" xmlns:a14="http://schemas.microsoft.com/office/drawing/2010/main">
+        <mc:Choice Requires="a14">
           <p:sp>
             <p:nvSpPr>
               <p:cNvPr id="27" name="テキスト ボックス 26"/>
@@ -13553,7 +13523,7 @@
             </p:txBody>
           </p:sp>
         </mc:Choice>
-        <mc:Fallback>
+        <mc:Fallback xmlns="">
           <p:sp>
             <p:nvSpPr>
               <p:cNvPr id="27" name="テキスト ボックス 26"/>
@@ -13634,10 +13604,10 @@
                         </m:accPr>
                         <m:e>
                           <m:r>
-                            <a:rPr lang="en-US" altLang="ja-JP" sz="2400" b="1" i="1">
-                              <a:latin typeface="Cambria Math" panose="02040503050406030204" pitchFamily="18" charset="0"/>
-                            </a:rPr>
-                            <m:t>𝑪</m:t>
+                            <a:rPr lang="en-US" altLang="ja-JP" sz="2400" b="0" i="1">
+                              <a:latin typeface="Cambria Math" panose="02040503050406030204" pitchFamily="18" charset="0"/>
+                            </a:rPr>
+                            <m:t>𝐶</m:t>
                           </m:r>
                         </m:e>
                       </m:acc>
@@ -13756,13 +13726,7 @@
                                     <a:rPr lang="en-US" altLang="ja-JP" sz="2400" b="0" i="1" smtClean="0">
                                       <a:latin typeface="Cambria Math" panose="02040503050406030204" pitchFamily="18" charset="0"/>
                                     </a:rPr>
-                                    <m:t>13</m:t>
-                                  </m:r>
-                                  <m:r>
-                                    <a:rPr lang="en-US" altLang="ja-JP" sz="2400" b="0" i="1" smtClean="0">
-                                      <a:latin typeface="Cambria Math" panose="02040503050406030204" pitchFamily="18" charset="0"/>
-                                    </a:rPr>
-                                    <m:t>                           </m:t>
+                                    <m:t>13                           </m:t>
                                   </m:r>
                                 </m:sub>
                               </m:sSub>
@@ -14036,17 +14000,17 @@
                         <m:accPr>
                           <m:chr m:val="̇"/>
                           <m:ctrlPr>
-                            <a:rPr lang="ja-JP" altLang="en-US" sz="2400" b="1" i="1" smtClean="0">
+                            <a:rPr lang="ja-JP" altLang="en-US" sz="2400" i="1" smtClean="0">
                               <a:latin typeface="Cambria Math" panose="02040503050406030204" pitchFamily="18" charset="0"/>
                             </a:rPr>
                           </m:ctrlPr>
                         </m:accPr>
                         <m:e>
                           <m:r>
-                            <a:rPr lang="en-US" altLang="ja-JP" sz="2400" b="1" i="1" smtClean="0">
-                              <a:latin typeface="Cambria Math" panose="02040503050406030204" pitchFamily="18" charset="0"/>
-                            </a:rPr>
-                            <m:t>𝑪</m:t>
+                            <a:rPr lang="en-US" altLang="ja-JP" sz="2400" b="0" i="1" smtClean="0">
+                              <a:latin typeface="Cambria Math" panose="02040503050406030204" pitchFamily="18" charset="0"/>
+                            </a:rPr>
+                            <m:t>𝐶</m:t>
                           </m:r>
                         </m:e>
                       </m:acc>
@@ -14576,8 +14540,8 @@
           </a:p>
         </p:txBody>
       </p:sp>
-      <mc:AlternateContent xmlns:mc="http://schemas.openxmlformats.org/markup-compatibility/2006">
-        <mc:Choice xmlns:a14="http://schemas.microsoft.com/office/drawing/2010/main" Requires="a14">
+      <mc:AlternateContent xmlns:mc="http://schemas.openxmlformats.org/markup-compatibility/2006" xmlns:a14="http://schemas.microsoft.com/office/drawing/2010/main">
+        <mc:Choice Requires="a14">
           <p:sp>
             <p:nvSpPr>
               <p:cNvPr id="32" name="正方形/長方形 31"/>
@@ -14599,6 +14563,7 @@
               </a:bodyPr>
               <a:lstStyle/>
               <a:p>
+                <a:pPr/>
                 <a14:m>
                   <m:oMathPara xmlns:m="http://schemas.openxmlformats.org/officeDocument/2006/math">
                     <m:oMathParaPr>
@@ -14731,7 +14696,7 @@
             </p:txBody>
           </p:sp>
         </mc:Choice>
-        <mc:Fallback>
+        <mc:Fallback xmlns="">
           <p:sp>
             <p:nvSpPr>
               <p:cNvPr id="32" name="正方形/長方形 31"/>
@@ -14770,8 +14735,8 @@
           </p:sp>
         </mc:Fallback>
       </mc:AlternateContent>
-      <mc:AlternateContent xmlns:mc="http://schemas.openxmlformats.org/markup-compatibility/2006">
-        <mc:Choice xmlns:a14="http://schemas.microsoft.com/office/drawing/2010/main" Requires="a14">
+      <mc:AlternateContent xmlns:mc="http://schemas.openxmlformats.org/markup-compatibility/2006" xmlns:a14="http://schemas.microsoft.com/office/drawing/2010/main">
+        <mc:Choice Requires="a14">
           <p:sp>
             <p:nvSpPr>
               <p:cNvPr id="33" name="正方形/長方形 32"/>
@@ -14793,6 +14758,7 @@
               </a:bodyPr>
               <a:lstStyle/>
               <a:p>
+                <a:pPr/>
                 <a14:m>
                   <m:oMathPara xmlns:m="http://schemas.openxmlformats.org/officeDocument/2006/math">
                     <m:oMathParaPr>
@@ -14913,7 +14879,7 @@
             </p:txBody>
           </p:sp>
         </mc:Choice>
-        <mc:Fallback>
+        <mc:Fallback xmlns="">
           <p:sp>
             <p:nvSpPr>
               <p:cNvPr id="33" name="正方形/長方形 32"/>
@@ -14952,8 +14918,8 @@
           </p:sp>
         </mc:Fallback>
       </mc:AlternateContent>
-      <mc:AlternateContent xmlns:mc="http://schemas.openxmlformats.org/markup-compatibility/2006">
-        <mc:Choice xmlns:a14="http://schemas.microsoft.com/office/drawing/2010/main" Requires="a14">
+      <mc:AlternateContent xmlns:mc="http://schemas.openxmlformats.org/markup-compatibility/2006" xmlns:a14="http://schemas.microsoft.com/office/drawing/2010/main">
+        <mc:Choice Requires="a14">
           <p:sp>
             <p:nvSpPr>
               <p:cNvPr id="34" name="正方形/長方形 33"/>
@@ -14975,6 +14941,7 @@
               </a:bodyPr>
               <a:lstStyle/>
               <a:p>
+                <a:pPr/>
                 <a14:m>
                   <m:oMathPara xmlns:m="http://schemas.openxmlformats.org/officeDocument/2006/math">
                     <m:oMathParaPr>
@@ -15095,7 +15062,7 @@
             </p:txBody>
           </p:sp>
         </mc:Choice>
-        <mc:Fallback>
+        <mc:Fallback xmlns="">
           <p:sp>
             <p:nvSpPr>
               <p:cNvPr id="34" name="正方形/長方形 33"/>
@@ -15134,8 +15101,8 @@
           </p:sp>
         </mc:Fallback>
       </mc:AlternateContent>
-      <mc:AlternateContent xmlns:mc="http://schemas.openxmlformats.org/markup-compatibility/2006">
-        <mc:Choice xmlns:a14="http://schemas.microsoft.com/office/drawing/2010/main" Requires="a14">
+      <mc:AlternateContent xmlns:mc="http://schemas.openxmlformats.org/markup-compatibility/2006" xmlns:a14="http://schemas.microsoft.com/office/drawing/2010/main">
+        <mc:Choice Requires="a14">
           <p:sp>
             <p:nvSpPr>
               <p:cNvPr id="35" name="正方形/長方形 34"/>
@@ -15157,6 +15124,7 @@
               </a:bodyPr>
               <a:lstStyle/>
               <a:p>
+                <a:pPr/>
                 <a14:m>
                   <m:oMathPara xmlns:m="http://schemas.openxmlformats.org/officeDocument/2006/math">
                     <m:oMathParaPr>
@@ -15289,7 +15257,7 @@
             </p:txBody>
           </p:sp>
         </mc:Choice>
-        <mc:Fallback>
+        <mc:Fallback xmlns="">
           <p:sp>
             <p:nvSpPr>
               <p:cNvPr id="35" name="正方形/長方形 34"/>
@@ -15328,8 +15296,8 @@
           </p:sp>
         </mc:Fallback>
       </mc:AlternateContent>
-      <mc:AlternateContent xmlns:mc="http://schemas.openxmlformats.org/markup-compatibility/2006">
-        <mc:Choice xmlns:a14="http://schemas.microsoft.com/office/drawing/2010/main" Requires="a14">
+      <mc:AlternateContent xmlns:mc="http://schemas.openxmlformats.org/markup-compatibility/2006" xmlns:a14="http://schemas.microsoft.com/office/drawing/2010/main">
+        <mc:Choice Requires="a14">
           <p:sp>
             <p:nvSpPr>
               <p:cNvPr id="36" name="正方形/長方形 35"/>
@@ -15351,6 +15319,7 @@
               </a:bodyPr>
               <a:lstStyle/>
               <a:p>
+                <a:pPr/>
                 <a14:m>
                   <m:oMathPara xmlns:m="http://schemas.openxmlformats.org/officeDocument/2006/math">
                     <m:oMathParaPr>
@@ -15477,7 +15446,7 @@
             </p:txBody>
           </p:sp>
         </mc:Choice>
-        <mc:Fallback>
+        <mc:Fallback xmlns="">
           <p:sp>
             <p:nvSpPr>
               <p:cNvPr id="36" name="正方形/長方形 35"/>
@@ -15516,8 +15485,8 @@
           </p:sp>
         </mc:Fallback>
       </mc:AlternateContent>
-      <mc:AlternateContent xmlns:mc="http://schemas.openxmlformats.org/markup-compatibility/2006">
-        <mc:Choice xmlns:a14="http://schemas.microsoft.com/office/drawing/2010/main" Requires="a14">
+      <mc:AlternateContent xmlns:mc="http://schemas.openxmlformats.org/markup-compatibility/2006" xmlns:a14="http://schemas.microsoft.com/office/drawing/2010/main">
+        <mc:Choice Requires="a14">
           <p:sp>
             <p:nvSpPr>
               <p:cNvPr id="37" name="正方形/長方形 36"/>
@@ -15539,6 +15508,7 @@
               </a:bodyPr>
               <a:lstStyle/>
               <a:p>
+                <a:pPr/>
                 <a14:m>
                   <m:oMathPara xmlns:m="http://schemas.openxmlformats.org/officeDocument/2006/math">
                     <m:oMathParaPr>
@@ -15659,7 +15629,7 @@
             </p:txBody>
           </p:sp>
         </mc:Choice>
-        <mc:Fallback>
+        <mc:Fallback xmlns="">
           <p:sp>
             <p:nvSpPr>
               <p:cNvPr id="37" name="正方形/長方形 36"/>
@@ -15698,8 +15668,8 @@
           </p:sp>
         </mc:Fallback>
       </mc:AlternateContent>
-      <mc:AlternateContent xmlns:mc="http://schemas.openxmlformats.org/markup-compatibility/2006">
-        <mc:Choice xmlns:a14="http://schemas.microsoft.com/office/drawing/2010/main" Requires="a14">
+      <mc:AlternateContent xmlns:mc="http://schemas.openxmlformats.org/markup-compatibility/2006" xmlns:a14="http://schemas.microsoft.com/office/drawing/2010/main">
+        <mc:Choice Requires="a14">
           <p:sp>
             <p:nvSpPr>
               <p:cNvPr id="38" name="正方形/長方形 37"/>
@@ -15721,6 +15691,7 @@
               </a:bodyPr>
               <a:lstStyle/>
               <a:p>
+                <a:pPr/>
                 <a14:m>
                   <m:oMathPara xmlns:m="http://schemas.openxmlformats.org/officeDocument/2006/math">
                     <m:oMathParaPr>
@@ -15841,7 +15812,7 @@
             </p:txBody>
           </p:sp>
         </mc:Choice>
-        <mc:Fallback>
+        <mc:Fallback xmlns="">
           <p:sp>
             <p:nvSpPr>
               <p:cNvPr id="38" name="正方形/長方形 37"/>
@@ -15880,8 +15851,8 @@
           </p:sp>
         </mc:Fallback>
       </mc:AlternateContent>
-      <mc:AlternateContent xmlns:mc="http://schemas.openxmlformats.org/markup-compatibility/2006">
-        <mc:Choice xmlns:a14="http://schemas.microsoft.com/office/drawing/2010/main" Requires="a14">
+      <mc:AlternateContent xmlns:mc="http://schemas.openxmlformats.org/markup-compatibility/2006" xmlns:a14="http://schemas.microsoft.com/office/drawing/2010/main">
+        <mc:Choice Requires="a14">
           <p:sp>
             <p:nvSpPr>
               <p:cNvPr id="39" name="正方形/長方形 38"/>
@@ -15903,6 +15874,7 @@
               </a:bodyPr>
               <a:lstStyle/>
               <a:p>
+                <a:pPr/>
                 <a14:m>
                   <m:oMathPara xmlns:m="http://schemas.openxmlformats.org/officeDocument/2006/math">
                     <m:oMathParaPr>
@@ -16023,7 +15995,7 @@
             </p:txBody>
           </p:sp>
         </mc:Choice>
-        <mc:Fallback>
+        <mc:Fallback xmlns="">
           <p:sp>
             <p:nvSpPr>
               <p:cNvPr id="39" name="正方形/長方形 38"/>
@@ -16062,8 +16034,8 @@
           </p:sp>
         </mc:Fallback>
       </mc:AlternateContent>
-      <mc:AlternateContent xmlns:mc="http://schemas.openxmlformats.org/markup-compatibility/2006">
-        <mc:Choice xmlns:a14="http://schemas.microsoft.com/office/drawing/2010/main" Requires="a14">
+      <mc:AlternateContent xmlns:mc="http://schemas.openxmlformats.org/markup-compatibility/2006" xmlns:a14="http://schemas.microsoft.com/office/drawing/2010/main">
+        <mc:Choice Requires="a14">
           <p:sp>
             <p:nvSpPr>
               <p:cNvPr id="40" name="正方形/長方形 39"/>
@@ -16085,6 +16057,7 @@
               </a:bodyPr>
               <a:lstStyle/>
               <a:p>
+                <a:pPr/>
                 <a14:m>
                   <m:oMathPara xmlns:m="http://schemas.openxmlformats.org/officeDocument/2006/math">
                     <m:oMathParaPr>
@@ -16205,7 +16178,7 @@
             </p:txBody>
           </p:sp>
         </mc:Choice>
-        <mc:Fallback>
+        <mc:Fallback xmlns="">
           <p:sp>
             <p:nvSpPr>
               <p:cNvPr id="40" name="正方形/長方形 39"/>
@@ -16278,25 +16251,25 @@
                       <m:f>
                         <m:fPr>
                           <m:ctrlPr>
-                            <a:rPr lang="en-US" altLang="ja-JP" sz="2400" b="1" i="1" smtClean="0">
+                            <a:rPr lang="en-US" altLang="ja-JP" sz="2400" i="1" smtClean="0">
                               <a:latin typeface="Cambria Math" panose="02040503050406030204" pitchFamily="18" charset="0"/>
                             </a:rPr>
                           </m:ctrlPr>
                         </m:fPr>
                         <m:num>
                           <m:r>
-                            <a:rPr lang="en-US" altLang="ja-JP" sz="2400" b="1" i="1" smtClean="0">
-                              <a:latin typeface="Cambria Math" panose="02040503050406030204" pitchFamily="18" charset="0"/>
-                            </a:rPr>
-                            <m:t>𝒅</m:t>
+                            <a:rPr lang="en-US" altLang="ja-JP" sz="2400" b="0" i="1" smtClean="0">
+                              <a:latin typeface="Cambria Math" panose="02040503050406030204" pitchFamily="18" charset="0"/>
+                            </a:rPr>
+                            <m:t>𝑑</m:t>
                           </m:r>
                         </m:num>
                         <m:den>
                           <m:r>
-                            <a:rPr lang="en-US" altLang="ja-JP" sz="2400" b="1" i="1" smtClean="0">
-                              <a:latin typeface="Cambria Math" panose="02040503050406030204" pitchFamily="18" charset="0"/>
-                            </a:rPr>
-                            <m:t>𝒅𝒙</m:t>
+                            <a:rPr lang="en-US" altLang="ja-JP" sz="2400" b="0" i="1" smtClean="0">
+                              <a:latin typeface="Cambria Math" panose="02040503050406030204" pitchFamily="18" charset="0"/>
+                            </a:rPr>
+                            <m:t>𝑑𝑥</m:t>
                           </m:r>
                         </m:den>
                       </m:f>
@@ -17011,8 +16984,8 @@
           </a:p>
         </p:txBody>
       </p:sp>
-      <mc:AlternateContent xmlns:mc="http://schemas.openxmlformats.org/markup-compatibility/2006">
-        <mc:Choice xmlns:a14="http://schemas.microsoft.com/office/drawing/2010/main" Requires="a14">
+      <mc:AlternateContent xmlns:mc="http://schemas.openxmlformats.org/markup-compatibility/2006" xmlns:a14="http://schemas.microsoft.com/office/drawing/2010/main">
+        <mc:Choice Requires="a14">
           <p:sp>
             <p:nvSpPr>
               <p:cNvPr id="43" name="正方形/長方形 42"/>
@@ -17034,6 +17007,7 @@
               </a:bodyPr>
               <a:lstStyle/>
               <a:p>
+                <a:pPr/>
                 <a14:m>
                   <m:oMathPara xmlns:m="http://schemas.openxmlformats.org/officeDocument/2006/math">
                     <m:oMathParaPr>
@@ -17073,7 +17047,7 @@
             </p:txBody>
           </p:sp>
         </mc:Choice>
-        <mc:Fallback>
+        <mc:Fallback xmlns="">
           <p:sp>
             <p:nvSpPr>
               <p:cNvPr id="43" name="正方形/長方形 42"/>
@@ -17112,8 +17086,8 @@
           </p:sp>
         </mc:Fallback>
       </mc:AlternateContent>
-      <mc:AlternateContent xmlns:mc="http://schemas.openxmlformats.org/markup-compatibility/2006">
-        <mc:Choice xmlns:a14="http://schemas.microsoft.com/office/drawing/2010/main" Requires="a14">
+      <mc:AlternateContent xmlns:mc="http://schemas.openxmlformats.org/markup-compatibility/2006" xmlns:a14="http://schemas.microsoft.com/office/drawing/2010/main">
+        <mc:Choice Requires="a14">
           <p:sp>
             <p:nvSpPr>
               <p:cNvPr id="44" name="正方形/長方形 43"/>
@@ -17135,6 +17109,7 @@
               </a:bodyPr>
               <a:lstStyle/>
               <a:p>
+                <a:pPr/>
                 <a14:m>
                   <m:oMathPara xmlns:m="http://schemas.openxmlformats.org/officeDocument/2006/math">
                     <m:oMathParaPr>
@@ -17180,7 +17155,7 @@
             </p:txBody>
           </p:sp>
         </mc:Choice>
-        <mc:Fallback>
+        <mc:Fallback xmlns="">
           <p:sp>
             <p:nvSpPr>
               <p:cNvPr id="44" name="正方形/長方形 43"/>
@@ -17219,8 +17194,8 @@
           </p:sp>
         </mc:Fallback>
       </mc:AlternateContent>
-      <mc:AlternateContent xmlns:mc="http://schemas.openxmlformats.org/markup-compatibility/2006">
-        <mc:Choice xmlns:a14="http://schemas.microsoft.com/office/drawing/2010/main" Requires="a14">
+      <mc:AlternateContent xmlns:mc="http://schemas.openxmlformats.org/markup-compatibility/2006" xmlns:a14="http://schemas.microsoft.com/office/drawing/2010/main">
+        <mc:Choice Requires="a14">
           <p:sp>
             <p:nvSpPr>
               <p:cNvPr id="45" name="正方形/長方形 44"/>
@@ -17242,6 +17217,7 @@
               </a:bodyPr>
               <a:lstStyle/>
               <a:p>
+                <a:pPr/>
                 <a14:m>
                   <m:oMathPara xmlns:m="http://schemas.openxmlformats.org/officeDocument/2006/math">
                     <m:oMathParaPr>
@@ -17262,7 +17238,7 @@
             </p:txBody>
           </p:sp>
         </mc:Choice>
-        <mc:Fallback>
+        <mc:Fallback xmlns="">
           <p:sp>
             <p:nvSpPr>
               <p:cNvPr id="45" name="正方形/長方形 44"/>
@@ -17301,8 +17277,8 @@
           </p:sp>
         </mc:Fallback>
       </mc:AlternateContent>
-      <mc:AlternateContent xmlns:mc="http://schemas.openxmlformats.org/markup-compatibility/2006">
-        <mc:Choice xmlns:a14="http://schemas.microsoft.com/office/drawing/2010/main" Requires="a14">
+      <mc:AlternateContent xmlns:mc="http://schemas.openxmlformats.org/markup-compatibility/2006" xmlns:a14="http://schemas.microsoft.com/office/drawing/2010/main">
+        <mc:Choice Requires="a14">
           <p:sp>
             <p:nvSpPr>
               <p:cNvPr id="46" name="正方形/長方形 45"/>
@@ -17324,6 +17300,7 @@
               </a:bodyPr>
               <a:lstStyle/>
               <a:p>
+                <a:pPr/>
                 <a14:m>
                   <m:oMathPara xmlns:m="http://schemas.openxmlformats.org/officeDocument/2006/math">
                     <m:oMathParaPr>
@@ -17344,7 +17321,7 @@
             </p:txBody>
           </p:sp>
         </mc:Choice>
-        <mc:Fallback>
+        <mc:Fallback xmlns="">
           <p:sp>
             <p:nvSpPr>
               <p:cNvPr id="46" name="正方形/長方形 45"/>
@@ -17383,8 +17360,8 @@
           </p:sp>
         </mc:Fallback>
       </mc:AlternateContent>
-      <mc:AlternateContent xmlns:mc="http://schemas.openxmlformats.org/markup-compatibility/2006">
-        <mc:Choice xmlns:a14="http://schemas.microsoft.com/office/drawing/2010/main" Requires="a14">
+      <mc:AlternateContent xmlns:mc="http://schemas.openxmlformats.org/markup-compatibility/2006" xmlns:a14="http://schemas.microsoft.com/office/drawing/2010/main">
+        <mc:Choice Requires="a14">
           <p:sp>
             <p:nvSpPr>
               <p:cNvPr id="47" name="正方形/長方形 46"/>
@@ -17406,6 +17383,7 @@
               </a:bodyPr>
               <a:lstStyle/>
               <a:p>
+                <a:pPr/>
                 <a14:m>
                   <m:oMathPara xmlns:m="http://schemas.openxmlformats.org/officeDocument/2006/math">
                     <m:oMathParaPr>
@@ -17426,7 +17404,7 @@
             </p:txBody>
           </p:sp>
         </mc:Choice>
-        <mc:Fallback>
+        <mc:Fallback xmlns="">
           <p:sp>
             <p:nvSpPr>
               <p:cNvPr id="47" name="正方形/長方形 46"/>
@@ -17465,8 +17443,8 @@
           </p:sp>
         </mc:Fallback>
       </mc:AlternateContent>
-      <mc:AlternateContent xmlns:mc="http://schemas.openxmlformats.org/markup-compatibility/2006">
-        <mc:Choice xmlns:a14="http://schemas.microsoft.com/office/drawing/2010/main" Requires="a14">
+      <mc:AlternateContent xmlns:mc="http://schemas.openxmlformats.org/markup-compatibility/2006" xmlns:a14="http://schemas.microsoft.com/office/drawing/2010/main">
+        <mc:Choice Requires="a14">
           <p:sp>
             <p:nvSpPr>
               <p:cNvPr id="48" name="正方形/長方形 47"/>
@@ -17488,6 +17466,7 @@
               </a:bodyPr>
               <a:lstStyle/>
               <a:p>
+                <a:pPr/>
                 <a14:m>
                   <m:oMathPara xmlns:m="http://schemas.openxmlformats.org/officeDocument/2006/math">
                     <m:oMathParaPr>
@@ -17508,7 +17487,7 @@
             </p:txBody>
           </p:sp>
         </mc:Choice>
-        <mc:Fallback>
+        <mc:Fallback xmlns="">
           <p:sp>
             <p:nvSpPr>
               <p:cNvPr id="48" name="正方形/長方形 47"/>
@@ -17547,8 +17526,8 @@
           </p:sp>
         </mc:Fallback>
       </mc:AlternateContent>
-      <mc:AlternateContent xmlns:mc="http://schemas.openxmlformats.org/markup-compatibility/2006">
-        <mc:Choice xmlns:a14="http://schemas.microsoft.com/office/drawing/2010/main" Requires="a14">
+      <mc:AlternateContent xmlns:mc="http://schemas.openxmlformats.org/markup-compatibility/2006" xmlns:a14="http://schemas.microsoft.com/office/drawing/2010/main">
+        <mc:Choice Requires="a14">
           <p:sp>
             <p:nvSpPr>
               <p:cNvPr id="49" name="正方形/長方形 48"/>
@@ -17570,6 +17549,7 @@
               </a:bodyPr>
               <a:lstStyle/>
               <a:p>
+                <a:pPr/>
                 <a14:m>
                   <m:oMathPara xmlns:m="http://schemas.openxmlformats.org/officeDocument/2006/math">
                     <m:oMathParaPr>
@@ -17609,7 +17589,7 @@
             </p:txBody>
           </p:sp>
         </mc:Choice>
-        <mc:Fallback>
+        <mc:Fallback xmlns="">
           <p:sp>
             <p:nvSpPr>
               <p:cNvPr id="49" name="正方形/長方形 48"/>
@@ -17648,8 +17628,8 @@
           </p:sp>
         </mc:Fallback>
       </mc:AlternateContent>
-      <mc:AlternateContent xmlns:mc="http://schemas.openxmlformats.org/markup-compatibility/2006">
-        <mc:Choice xmlns:a14="http://schemas.microsoft.com/office/drawing/2010/main" Requires="a14">
+      <mc:AlternateContent xmlns:mc="http://schemas.openxmlformats.org/markup-compatibility/2006" xmlns:a14="http://schemas.microsoft.com/office/drawing/2010/main">
+        <mc:Choice Requires="a14">
           <p:sp>
             <p:nvSpPr>
               <p:cNvPr id="50" name="正方形/長方形 49"/>
@@ -17671,6 +17651,7 @@
               </a:bodyPr>
               <a:lstStyle/>
               <a:p>
+                <a:pPr/>
                 <a14:m>
                   <m:oMathPara xmlns:m="http://schemas.openxmlformats.org/officeDocument/2006/math">
                     <m:oMathParaPr>
@@ -17710,7 +17691,7 @@
             </p:txBody>
           </p:sp>
         </mc:Choice>
-        <mc:Fallback>
+        <mc:Fallback xmlns="">
           <p:sp>
             <p:nvSpPr>
               <p:cNvPr id="50" name="正方形/長方形 49"/>
@@ -17749,8 +17730,8 @@
           </p:sp>
         </mc:Fallback>
       </mc:AlternateContent>
-      <mc:AlternateContent xmlns:mc="http://schemas.openxmlformats.org/markup-compatibility/2006">
-        <mc:Choice xmlns:a14="http://schemas.microsoft.com/office/drawing/2010/main" Requires="a14">
+      <mc:AlternateContent xmlns:mc="http://schemas.openxmlformats.org/markup-compatibility/2006" xmlns:a14="http://schemas.microsoft.com/office/drawing/2010/main">
+        <mc:Choice Requires="a14">
           <p:sp>
             <p:nvSpPr>
               <p:cNvPr id="51" name="正方形/長方形 50"/>
@@ -17772,6 +17753,7 @@
               </a:bodyPr>
               <a:lstStyle/>
               <a:p>
+                <a:pPr/>
                 <a14:m>
                   <m:oMathPara xmlns:m="http://schemas.openxmlformats.org/officeDocument/2006/math">
                     <m:oMathParaPr>
@@ -17811,7 +17793,7 @@
             </p:txBody>
           </p:sp>
         </mc:Choice>
-        <mc:Fallback>
+        <mc:Fallback xmlns="">
           <p:sp>
             <p:nvSpPr>
               <p:cNvPr id="51" name="正方形/長方形 50"/>
@@ -17850,8 +17832,8 @@
           </p:sp>
         </mc:Fallback>
       </mc:AlternateContent>
-      <mc:AlternateContent xmlns:mc="http://schemas.openxmlformats.org/markup-compatibility/2006">
-        <mc:Choice xmlns:a14="http://schemas.microsoft.com/office/drawing/2010/main" Requires="a14">
+      <mc:AlternateContent xmlns:mc="http://schemas.openxmlformats.org/markup-compatibility/2006" xmlns:a14="http://schemas.microsoft.com/office/drawing/2010/main">
+        <mc:Choice Requires="a14">
           <p:sp>
             <p:nvSpPr>
               <p:cNvPr id="52" name="正方形/長方形 51"/>
@@ -17873,6 +17855,7 @@
               </a:bodyPr>
               <a:lstStyle/>
               <a:p>
+                <a:pPr/>
                 <a14:m>
                   <m:oMathPara xmlns:m="http://schemas.openxmlformats.org/officeDocument/2006/math">
                     <m:oMathParaPr>
@@ -17912,7 +17895,7 @@
             </p:txBody>
           </p:sp>
         </mc:Choice>
-        <mc:Fallback>
+        <mc:Fallback xmlns="">
           <p:sp>
             <p:nvSpPr>
               <p:cNvPr id="52" name="正方形/長方形 51"/>
@@ -17951,8 +17934,8 @@
           </p:sp>
         </mc:Fallback>
       </mc:AlternateContent>
-      <mc:AlternateContent xmlns:mc="http://schemas.openxmlformats.org/markup-compatibility/2006">
-        <mc:Choice xmlns:a14="http://schemas.microsoft.com/office/drawing/2010/main" Requires="a14">
+      <mc:AlternateContent xmlns:mc="http://schemas.openxmlformats.org/markup-compatibility/2006" xmlns:a14="http://schemas.microsoft.com/office/drawing/2010/main">
+        <mc:Choice Requires="a14">
           <p:sp>
             <p:nvSpPr>
               <p:cNvPr id="53" name="正方形/長方形 52"/>
@@ -17974,6 +17957,7 @@
               </a:bodyPr>
               <a:lstStyle/>
               <a:p>
+                <a:pPr/>
                 <a14:m>
                   <m:oMathPara xmlns:m="http://schemas.openxmlformats.org/officeDocument/2006/math">
                     <m:oMathParaPr>
@@ -18013,7 +17997,7 @@
             </p:txBody>
           </p:sp>
         </mc:Choice>
-        <mc:Fallback>
+        <mc:Fallback xmlns="">
           <p:sp>
             <p:nvSpPr>
               <p:cNvPr id="53" name="正方形/長方形 52"/>
@@ -18052,8 +18036,8 @@
           </p:sp>
         </mc:Fallback>
       </mc:AlternateContent>
-      <mc:AlternateContent xmlns:mc="http://schemas.openxmlformats.org/markup-compatibility/2006">
-        <mc:Choice xmlns:a14="http://schemas.microsoft.com/office/drawing/2010/main" Requires="a14">
+      <mc:AlternateContent xmlns:mc="http://schemas.openxmlformats.org/markup-compatibility/2006" xmlns:a14="http://schemas.microsoft.com/office/drawing/2010/main">
+        <mc:Choice Requires="a14">
           <p:sp>
             <p:nvSpPr>
               <p:cNvPr id="54" name="正方形/長方形 53"/>
@@ -18075,6 +18059,7 @@
               </a:bodyPr>
               <a:lstStyle/>
               <a:p>
+                <a:pPr/>
                 <a14:m>
                   <m:oMathPara xmlns:m="http://schemas.openxmlformats.org/officeDocument/2006/math">
                     <m:oMathParaPr>
@@ -18120,7 +18105,7 @@
             </p:txBody>
           </p:sp>
         </mc:Choice>
-        <mc:Fallback>
+        <mc:Fallback xmlns="">
           <p:sp>
             <p:nvSpPr>
               <p:cNvPr id="54" name="正方形/長方形 53"/>
@@ -18159,8 +18144,8 @@
           </p:sp>
         </mc:Fallback>
       </mc:AlternateContent>
-      <mc:AlternateContent xmlns:mc="http://schemas.openxmlformats.org/markup-compatibility/2006">
-        <mc:Choice xmlns:a14="http://schemas.microsoft.com/office/drawing/2010/main" Requires="a14">
+      <mc:AlternateContent xmlns:mc="http://schemas.openxmlformats.org/markup-compatibility/2006" xmlns:a14="http://schemas.microsoft.com/office/drawing/2010/main">
+        <mc:Choice Requires="a14">
           <p:sp>
             <p:nvSpPr>
               <p:cNvPr id="55" name="正方形/長方形 54"/>
@@ -18182,6 +18167,7 @@
               </a:bodyPr>
               <a:lstStyle/>
               <a:p>
+                <a:pPr/>
                 <a14:m>
                   <m:oMathPara xmlns:m="http://schemas.openxmlformats.org/officeDocument/2006/math">
                     <m:oMathParaPr>
@@ -18227,7 +18213,7 @@
             </p:txBody>
           </p:sp>
         </mc:Choice>
-        <mc:Fallback>
+        <mc:Fallback xmlns="">
           <p:sp>
             <p:nvSpPr>
               <p:cNvPr id="55" name="正方形/長方形 54"/>
@@ -18266,8 +18252,8 @@
           </p:sp>
         </mc:Fallback>
       </mc:AlternateContent>
-      <mc:AlternateContent xmlns:mc="http://schemas.openxmlformats.org/markup-compatibility/2006">
-        <mc:Choice xmlns:a14="http://schemas.microsoft.com/office/drawing/2010/main" Requires="a14">
+      <mc:AlternateContent xmlns:mc="http://schemas.openxmlformats.org/markup-compatibility/2006" xmlns:a14="http://schemas.microsoft.com/office/drawing/2010/main">
+        <mc:Choice Requires="a14">
           <p:sp>
             <p:nvSpPr>
               <p:cNvPr id="56" name="正方形/長方形 55"/>
@@ -18289,6 +18275,7 @@
               </a:bodyPr>
               <a:lstStyle/>
               <a:p>
+                <a:pPr/>
                 <a14:m>
                   <m:oMathPara xmlns:m="http://schemas.openxmlformats.org/officeDocument/2006/math">
                     <m:oMathParaPr>
@@ -18334,7 +18321,7 @@
             </p:txBody>
           </p:sp>
         </mc:Choice>
-        <mc:Fallback>
+        <mc:Fallback xmlns="">
           <p:sp>
             <p:nvSpPr>
               <p:cNvPr id="56" name="正方形/長方形 55"/>
@@ -18373,8 +18360,8 @@
           </p:sp>
         </mc:Fallback>
       </mc:AlternateContent>
-      <mc:AlternateContent xmlns:mc="http://schemas.openxmlformats.org/markup-compatibility/2006">
-        <mc:Choice xmlns:a14="http://schemas.microsoft.com/office/drawing/2010/main" Requires="a14">
+      <mc:AlternateContent xmlns:mc="http://schemas.openxmlformats.org/markup-compatibility/2006" xmlns:a14="http://schemas.microsoft.com/office/drawing/2010/main">
+        <mc:Choice Requires="a14">
           <p:sp>
             <p:nvSpPr>
               <p:cNvPr id="57" name="正方形/長方形 56"/>
@@ -18396,6 +18383,7 @@
               </a:bodyPr>
               <a:lstStyle/>
               <a:p>
+                <a:pPr/>
                 <a14:m>
                   <m:oMathPara xmlns:m="http://schemas.openxmlformats.org/officeDocument/2006/math">
                     <m:oMathParaPr>
@@ -18441,7 +18429,7 @@
             </p:txBody>
           </p:sp>
         </mc:Choice>
-        <mc:Fallback>
+        <mc:Fallback xmlns="">
           <p:sp>
             <p:nvSpPr>
               <p:cNvPr id="57" name="正方形/長方形 56"/>
@@ -18480,8 +18468,8 @@
           </p:sp>
         </mc:Fallback>
       </mc:AlternateContent>
-      <mc:AlternateContent xmlns:mc="http://schemas.openxmlformats.org/markup-compatibility/2006">
-        <mc:Choice xmlns:a14="http://schemas.microsoft.com/office/drawing/2010/main" Requires="a14">
+      <mc:AlternateContent xmlns:mc="http://schemas.openxmlformats.org/markup-compatibility/2006" xmlns:a14="http://schemas.microsoft.com/office/drawing/2010/main">
+        <mc:Choice Requires="a14">
           <p:sp>
             <p:nvSpPr>
               <p:cNvPr id="58" name="正方形/長方形 57"/>
@@ -18503,6 +18491,7 @@
               </a:bodyPr>
               <a:lstStyle/>
               <a:p>
+                <a:pPr/>
                 <a14:m>
                   <m:oMathPara xmlns:m="http://schemas.openxmlformats.org/officeDocument/2006/math">
                     <m:oMathParaPr>
@@ -18548,7 +18537,7 @@
             </p:txBody>
           </p:sp>
         </mc:Choice>
-        <mc:Fallback>
+        <mc:Fallback xmlns="">
           <p:sp>
             <p:nvSpPr>
               <p:cNvPr id="58" name="正方形/長方形 57"/>
@@ -18591,6 +18580,1851 @@
     <p:extLst>
       <p:ext uri="{BB962C8B-B14F-4D97-AF65-F5344CB8AC3E}">
         <p14:creationId xmlns:p14="http://schemas.microsoft.com/office/powerpoint/2010/main" val="437339035"/>
+      </p:ext>
+    </p:extLst>
+  </p:cSld>
+  <p:clrMapOvr>
+    <a:masterClrMapping/>
+  </p:clrMapOvr>
+</p:sld>
+</file>
+
+<file path=ppt/slides/slide8.xml><?xml version="1.0" encoding="utf-8"?>
+<p:sld xmlns:a="http://schemas.openxmlformats.org/drawingml/2006/main" xmlns:r="http://schemas.openxmlformats.org/officeDocument/2006/relationships" xmlns:p="http://schemas.openxmlformats.org/presentationml/2006/main">
+  <p:cSld>
+    <p:spTree>
+      <p:nvGrpSpPr>
+        <p:cNvPr id="1" name=""/>
+        <p:cNvGrpSpPr/>
+        <p:nvPr/>
+      </p:nvGrpSpPr>
+      <p:grpSpPr>
+        <a:xfrm>
+          <a:off x="0" y="0"/>
+          <a:ext cx="0" cy="0"/>
+          <a:chOff x="0" y="0"/>
+          <a:chExt cx="0" cy="0"/>
+        </a:xfrm>
+      </p:grpSpPr>
+      <p:sp>
+        <p:nvSpPr>
+          <p:cNvPr id="2" name="タイトル 1"/>
+          <p:cNvSpPr>
+            <a:spLocks noGrp="1"/>
+          </p:cNvSpPr>
+          <p:nvPr>
+            <p:ph type="title"/>
+          </p:nvPr>
+        </p:nvSpPr>
+        <p:spPr/>
+        <p:txBody>
+          <a:bodyPr/>
+          <a:lstStyle/>
+          <a:p>
+            <a:r>
+              <a:rPr kumimoji="1" lang="en-US" altLang="ja-JP" dirty="0" smtClean="0"/>
+              <a:t>Gravity Vector in { b }</a:t>
+            </a:r>
+            <a:endParaRPr kumimoji="1" lang="ja-JP" altLang="en-US" dirty="0"/>
+          </a:p>
+        </p:txBody>
+      </p:sp>
+      <p:sp>
+        <p:nvSpPr>
+          <p:cNvPr id="4" name="角丸四角形 3"/>
+          <p:cNvSpPr/>
+          <p:nvPr/>
+        </p:nvSpPr>
+        <p:spPr bwMode="auto">
+          <a:xfrm>
+            <a:off x="539552" y="1340768"/>
+            <a:ext cx="7344816" cy="4320480"/>
+          </a:xfrm>
+          <a:prstGeom prst="roundRect">
+            <a:avLst>
+              <a:gd name="adj" fmla="val 7825"/>
+            </a:avLst>
+          </a:prstGeom>
+          <a:noFill/>
+          <a:ln w="63500" cap="flat" cmpd="sng" algn="ctr">
+            <a:solidFill>
+              <a:schemeClr val="tx1"/>
+            </a:solidFill>
+            <a:prstDash val="solid"/>
+            <a:round/>
+            <a:headEnd type="none" w="med" len="med"/>
+            <a:tailEnd type="none" w="med" len="med"/>
+          </a:ln>
+          <a:effectLst/>
+        </p:spPr>
+        <p:txBody>
+          <a:bodyPr vert="horz" wrap="none" lIns="91440" tIns="45720" rIns="91440" bIns="45720" numCol="1" rtlCol="0" anchor="ctr" anchorCtr="0" compatLnSpc="1">
+            <a:prstTxWarp prst="textNoShape">
+              <a:avLst/>
+            </a:prstTxWarp>
+          </a:bodyPr>
+          <a:lstStyle/>
+          <a:p>
+            <a:pPr marL="0" marR="0" indent="0" algn="l" defTabSz="914400" rtl="0" eaLnBrk="1" fontAlgn="base" latinLnBrk="0" hangingPunct="1">
+              <a:lnSpc>
+                <a:spcPct val="100000"/>
+              </a:lnSpc>
+              <a:spcBef>
+                <a:spcPct val="0"/>
+              </a:spcBef>
+              <a:spcAft>
+                <a:spcPct val="0"/>
+              </a:spcAft>
+              <a:buClrTx/>
+              <a:buSzTx/>
+              <a:buFontTx/>
+              <a:buNone/>
+              <a:tabLst/>
+            </a:pPr>
+            <a:endParaRPr kumimoji="1" lang="ja-JP" altLang="en-US" sz="2400" b="0" i="0" u="none" strike="noStrike" cap="none" normalizeH="0" baseline="0" smtClean="0">
+              <a:ln>
+                <a:noFill/>
+              </a:ln>
+              <a:solidFill>
+                <a:schemeClr val="tx1"/>
+              </a:solidFill>
+              <a:effectLst/>
+              <a:latin typeface="Times New Roman" pitchFamily="18" charset="0"/>
+              <a:ea typeface="ＭＳ Ｐゴシック" pitchFamily="50" charset="-128"/>
+            </a:endParaRPr>
+          </a:p>
+        </p:txBody>
+      </p:sp>
+      <p:sp>
+        <p:nvSpPr>
+          <p:cNvPr id="5" name="テキスト ボックス 4"/>
+          <p:cNvSpPr txBox="1"/>
+          <p:nvPr/>
+        </p:nvSpPr>
+        <p:spPr>
+          <a:xfrm>
+            <a:off x="2278297" y="1087554"/>
+            <a:ext cx="3338158" cy="461665"/>
+          </a:xfrm>
+          <a:prstGeom prst="rect">
+            <a:avLst/>
+          </a:prstGeom>
+          <a:solidFill>
+            <a:srgbClr val="FFFFFF"/>
+          </a:solidFill>
+        </p:spPr>
+        <p:txBody>
+          <a:bodyPr wrap="none" rtlCol="0">
+            <a:spAutoFit/>
+          </a:bodyPr>
+          <a:lstStyle/>
+          <a:p>
+            <a:r>
+              <a:rPr lang="en-US" altLang="ja-JP" sz="2400" dirty="0" smtClean="0">
+                <a:latin typeface="+mj-ea"/>
+                <a:ea typeface="+mj-ea"/>
+              </a:rPr>
+              <a:t>Gravity Vector in { b }</a:t>
+            </a:r>
+            <a:endParaRPr kumimoji="1" lang="ja-JP" altLang="en-US" sz="2400" dirty="0">
+              <a:latin typeface="+mj-ea"/>
+              <a:ea typeface="+mj-ea"/>
+            </a:endParaRPr>
+          </a:p>
+        </p:txBody>
+      </p:sp>
+      <mc:AlternateContent xmlns:mc="http://schemas.openxmlformats.org/markup-compatibility/2006">
+        <mc:Choice xmlns:a14="http://schemas.microsoft.com/office/drawing/2010/main" Requires="a14">
+          <p:sp>
+            <p:nvSpPr>
+              <p:cNvPr id="27" name="テキスト ボックス 26"/>
+              <p:cNvSpPr txBox="1"/>
+              <p:nvPr/>
+            </p:nvSpPr>
+            <p:spPr>
+              <a:xfrm>
+                <a:off x="611560" y="1599229"/>
+                <a:ext cx="6594049" cy="1271438"/>
+              </a:xfrm>
+              <a:prstGeom prst="rect">
+                <a:avLst/>
+              </a:prstGeom>
+              <a:noFill/>
+            </p:spPr>
+            <p:txBody>
+              <a:bodyPr wrap="none" rtlCol="0">
+                <a:spAutoFit/>
+              </a:bodyPr>
+              <a:lstStyle/>
+              <a:p>
+                <a:pPr/>
+                <a14:m>
+                  <m:oMathPara xmlns:m="http://schemas.openxmlformats.org/officeDocument/2006/math">
+                    <m:oMathParaPr>
+                      <m:jc m:val="centerGroup"/>
+                    </m:oMathParaPr>
+                    <m:oMath xmlns:m="http://schemas.openxmlformats.org/officeDocument/2006/math">
+                      <m:r>
+                        <a:rPr lang="en-US" altLang="ja-JP" sz="2400" b="1" i="1" smtClean="0">
+                          <a:latin typeface="Cambria Math" panose="02040503050406030204" pitchFamily="18" charset="0"/>
+                        </a:rPr>
+                        <m:t>𝒈</m:t>
+                      </m:r>
+                      <m:r>
+                        <a:rPr lang="en-US" altLang="ja-JP" sz="2400" b="0" i="1" smtClean="0">
+                          <a:latin typeface="Cambria Math" panose="02040503050406030204" pitchFamily="18" charset="0"/>
+                        </a:rPr>
+                        <m:t>=</m:t>
+                      </m:r>
+                      <m:sSup>
+                        <m:sSupPr>
+                          <m:ctrlPr>
+                            <a:rPr lang="en-US" altLang="ja-JP" sz="2400" b="0" i="1" smtClean="0">
+                              <a:latin typeface="Cambria Math" panose="02040503050406030204" pitchFamily="18" charset="0"/>
+                            </a:rPr>
+                          </m:ctrlPr>
+                        </m:sSupPr>
+                        <m:e>
+                          <m:d>
+                            <m:dPr>
+                              <m:begChr m:val="{"/>
+                              <m:endChr m:val="}"/>
+                              <m:ctrlPr>
+                                <a:rPr lang="en-US" altLang="ja-JP" sz="2400" b="1" i="1" smtClean="0">
+                                  <a:latin typeface="Cambria Math" panose="02040503050406030204" pitchFamily="18" charset="0"/>
+                                </a:rPr>
+                              </m:ctrlPr>
+                            </m:dPr>
+                            <m:e>
+                              <m:r>
+                                <a:rPr lang="en-US" altLang="ja-JP" sz="2400" b="1" i="1" smtClean="0">
+                                  <a:latin typeface="Cambria Math" panose="02040503050406030204" pitchFamily="18" charset="0"/>
+                                </a:rPr>
+                                <m:t>𝒊</m:t>
+                              </m:r>
+                            </m:e>
+                          </m:d>
+                        </m:e>
+                        <m:sup>
+                          <m:r>
+                            <a:rPr lang="en-US" altLang="ja-JP" sz="2400" b="0" i="1" smtClean="0">
+                              <a:latin typeface="Cambria Math" panose="02040503050406030204" pitchFamily="18" charset="0"/>
+                            </a:rPr>
+                            <m:t>𝑇</m:t>
+                          </m:r>
+                        </m:sup>
+                      </m:sSup>
+                      <m:d>
+                        <m:dPr>
+                          <m:begChr m:val="["/>
+                          <m:endChr m:val="]"/>
+                          <m:ctrlPr>
+                            <a:rPr lang="en-US" altLang="ja-JP" sz="2400" b="0" i="1" smtClean="0">
+                              <a:latin typeface="Cambria Math" panose="02040503050406030204" pitchFamily="18" charset="0"/>
+                            </a:rPr>
+                          </m:ctrlPr>
+                        </m:dPr>
+                        <m:e>
+                          <m:eqArr>
+                            <m:eqArrPr>
+                              <m:ctrlPr>
+                                <a:rPr lang="en-US" altLang="ja-JP" sz="2400" b="0" i="1" smtClean="0">
+                                  <a:latin typeface="Cambria Math" panose="02040503050406030204" pitchFamily="18" charset="0"/>
+                                </a:rPr>
+                              </m:ctrlPr>
+                            </m:eqArrPr>
+                            <m:e>
+                              <m:r>
+                                <a:rPr lang="en-US" altLang="ja-JP" sz="2400" b="0" i="1" smtClean="0">
+                                  <a:latin typeface="Cambria Math" panose="02040503050406030204" pitchFamily="18" charset="0"/>
+                                </a:rPr>
+                                <m:t>0</m:t>
+                              </m:r>
+                            </m:e>
+                            <m:e>
+                              <m:r>
+                                <a:rPr lang="en-US" altLang="ja-JP" sz="2400" b="0" i="1" smtClean="0">
+                                  <a:latin typeface="Cambria Math" panose="02040503050406030204" pitchFamily="18" charset="0"/>
+                                </a:rPr>
+                                <m:t>0</m:t>
+                              </m:r>
+                            </m:e>
+                            <m:e>
+                              <m:r>
+                                <a:rPr lang="en-US" altLang="ja-JP" sz="2400" b="0" i="1" smtClean="0">
+                                  <a:latin typeface="Cambria Math" panose="02040503050406030204" pitchFamily="18" charset="0"/>
+                                </a:rPr>
+                                <m:t>𝑔</m:t>
+                              </m:r>
+                            </m:e>
+                          </m:eqArr>
+                        </m:e>
+                      </m:d>
+                      <m:r>
+                        <a:rPr lang="en-US" altLang="ja-JP" sz="2400" b="0" i="1" smtClean="0">
+                          <a:latin typeface="Cambria Math" panose="02040503050406030204" pitchFamily="18" charset="0"/>
+                        </a:rPr>
+                        <m:t>=</m:t>
+                      </m:r>
+                      <m:d>
+                        <m:dPr>
+                          <m:begChr m:val="["/>
+                          <m:endChr m:val="]"/>
+                          <m:ctrlPr>
+                            <a:rPr lang="en-US" altLang="ja-JP" sz="2400" i="1">
+                              <a:latin typeface="Cambria Math" panose="02040503050406030204" pitchFamily="18" charset="0"/>
+                            </a:rPr>
+                          </m:ctrlPr>
+                        </m:dPr>
+                        <m:e>
+                          <m:r>
+                            <a:rPr lang="en-US" altLang="ja-JP" sz="2400" b="0" i="1" smtClean="0">
+                              <a:latin typeface="Cambria Math" panose="02040503050406030204" pitchFamily="18" charset="0"/>
+                            </a:rPr>
+                            <m:t>0  0  </m:t>
+                          </m:r>
+                          <m:r>
+                            <a:rPr lang="en-US" altLang="ja-JP" sz="2400" b="0" i="1" smtClean="0">
+                              <a:latin typeface="Cambria Math" panose="02040503050406030204" pitchFamily="18" charset="0"/>
+                            </a:rPr>
+                            <m:t>𝑔</m:t>
+                          </m:r>
+                        </m:e>
+                      </m:d>
+                      <m:d>
+                        <m:dPr>
+                          <m:begChr m:val="{"/>
+                          <m:endChr m:val="}"/>
+                          <m:ctrlPr>
+                            <a:rPr lang="en-US" altLang="ja-JP" sz="2400" i="1">
+                              <a:latin typeface="Cambria Math" panose="02040503050406030204" pitchFamily="18" charset="0"/>
+                            </a:rPr>
+                          </m:ctrlPr>
+                        </m:dPr>
+                        <m:e>
+                          <m:eqArr>
+                            <m:eqArrPr>
+                              <m:ctrlPr>
+                                <a:rPr lang="en-US" altLang="ja-JP" sz="2400" b="1" i="1">
+                                  <a:latin typeface="Cambria Math" panose="02040503050406030204" pitchFamily="18" charset="0"/>
+                                </a:rPr>
+                              </m:ctrlPr>
+                            </m:eqArrPr>
+                            <m:e>
+                              <m:sSub>
+                                <m:sSubPr>
+                                  <m:ctrlPr>
+                                    <a:rPr lang="en-US" altLang="ja-JP" sz="2400" b="1" i="1">
+                                      <a:latin typeface="Cambria Math" panose="02040503050406030204" pitchFamily="18" charset="0"/>
+                                    </a:rPr>
+                                  </m:ctrlPr>
+                                </m:sSubPr>
+                                <m:e>
+                                  <m:r>
+                                    <a:rPr lang="en-US" altLang="ja-JP" sz="2400" b="1" i="1">
+                                      <a:latin typeface="Cambria Math" panose="02040503050406030204" pitchFamily="18" charset="0"/>
+                                    </a:rPr>
+                                    <m:t>𝒊</m:t>
+                                  </m:r>
+                                </m:e>
+                                <m:sub>
+                                  <m:r>
+                                    <a:rPr lang="en-US" altLang="ja-JP" sz="2400" b="1" i="1">
+                                      <a:latin typeface="Cambria Math" panose="02040503050406030204" pitchFamily="18" charset="0"/>
+                                    </a:rPr>
+                                    <m:t>𝟏</m:t>
+                                  </m:r>
+                                </m:sub>
+                              </m:sSub>
+                            </m:e>
+                            <m:e>
+                              <m:sSub>
+                                <m:sSubPr>
+                                  <m:ctrlPr>
+                                    <a:rPr lang="en-US" altLang="ja-JP" sz="2400" b="1" i="1">
+                                      <a:latin typeface="Cambria Math" panose="02040503050406030204" pitchFamily="18" charset="0"/>
+                                    </a:rPr>
+                                  </m:ctrlPr>
+                                </m:sSubPr>
+                                <m:e>
+                                  <m:r>
+                                    <a:rPr lang="en-US" altLang="ja-JP" sz="2400" b="1" i="1">
+                                      <a:latin typeface="Cambria Math" panose="02040503050406030204" pitchFamily="18" charset="0"/>
+                                    </a:rPr>
+                                    <m:t>𝒊</m:t>
+                                  </m:r>
+                                </m:e>
+                                <m:sub>
+                                  <m:r>
+                                    <a:rPr lang="en-US" altLang="ja-JP" sz="2400" b="1" i="1">
+                                      <a:latin typeface="Cambria Math" panose="02040503050406030204" pitchFamily="18" charset="0"/>
+                                    </a:rPr>
+                                    <m:t>𝟐</m:t>
+                                  </m:r>
+                                </m:sub>
+                              </m:sSub>
+                            </m:e>
+                            <m:e>
+                              <m:sSub>
+                                <m:sSubPr>
+                                  <m:ctrlPr>
+                                    <a:rPr lang="en-US" altLang="ja-JP" sz="2400" b="1" i="1">
+                                      <a:latin typeface="Cambria Math" panose="02040503050406030204" pitchFamily="18" charset="0"/>
+                                    </a:rPr>
+                                  </m:ctrlPr>
+                                </m:sSubPr>
+                                <m:e>
+                                  <m:r>
+                                    <a:rPr lang="en-US" altLang="ja-JP" sz="2400" b="1" i="1">
+                                      <a:latin typeface="Cambria Math" panose="02040503050406030204" pitchFamily="18" charset="0"/>
+                                    </a:rPr>
+                                    <m:t>𝒊</m:t>
+                                  </m:r>
+                                </m:e>
+                                <m:sub>
+                                  <m:r>
+                                    <a:rPr lang="en-US" altLang="ja-JP" sz="2400" b="1" i="1">
+                                      <a:latin typeface="Cambria Math" panose="02040503050406030204" pitchFamily="18" charset="0"/>
+                                    </a:rPr>
+                                    <m:t>𝟑</m:t>
+                                  </m:r>
+                                </m:sub>
+                              </m:sSub>
+                            </m:e>
+                          </m:eqArr>
+                        </m:e>
+                      </m:d>
+                      <m:r>
+                        <a:rPr lang="en-US" altLang="ja-JP" sz="2400" b="0" i="1" smtClean="0">
+                          <a:latin typeface="Cambria Math" panose="02040503050406030204" pitchFamily="18" charset="0"/>
+                        </a:rPr>
+                        <m:t>=</m:t>
+                      </m:r>
+                      <m:d>
+                        <m:dPr>
+                          <m:begChr m:val="["/>
+                          <m:endChr m:val="]"/>
+                          <m:ctrlPr>
+                            <a:rPr lang="en-US" altLang="ja-JP" sz="2400" i="1">
+                              <a:latin typeface="Cambria Math" panose="02040503050406030204" pitchFamily="18" charset="0"/>
+                            </a:rPr>
+                          </m:ctrlPr>
+                        </m:dPr>
+                        <m:e>
+                          <m:r>
+                            <a:rPr lang="en-US" altLang="ja-JP" sz="2400" i="1">
+                              <a:latin typeface="Cambria Math" panose="02040503050406030204" pitchFamily="18" charset="0"/>
+                            </a:rPr>
+                            <m:t>0  0  </m:t>
+                          </m:r>
+                          <m:r>
+                            <a:rPr lang="en-US" altLang="ja-JP" sz="2400" i="1">
+                              <a:latin typeface="Cambria Math" panose="02040503050406030204" pitchFamily="18" charset="0"/>
+                            </a:rPr>
+                            <m:t>𝑔</m:t>
+                          </m:r>
+                        </m:e>
+                      </m:d>
+                      <m:sSup>
+                        <m:sSupPr>
+                          <m:ctrlPr>
+                            <a:rPr lang="en-US" altLang="ja-JP" sz="2400" i="1">
+                              <a:latin typeface="Cambria Math" panose="02040503050406030204" pitchFamily="18" charset="0"/>
+                            </a:rPr>
+                          </m:ctrlPr>
+                        </m:sSupPr>
+                        <m:e>
+                          <m:r>
+                            <a:rPr lang="en-US" altLang="ja-JP" sz="2400" i="1">
+                              <a:latin typeface="Cambria Math" panose="02040503050406030204" pitchFamily="18" charset="0"/>
+                            </a:rPr>
+                            <m:t>𝐶</m:t>
+                          </m:r>
+                        </m:e>
+                        <m:sup>
+                          <m:r>
+                            <a:rPr lang="en-US" altLang="ja-JP" sz="2400" i="1">
+                              <a:latin typeface="Cambria Math" panose="02040503050406030204" pitchFamily="18" charset="0"/>
+                            </a:rPr>
+                            <m:t>𝑇</m:t>
+                          </m:r>
+                        </m:sup>
+                      </m:sSup>
+                      <m:d>
+                        <m:dPr>
+                          <m:begChr m:val="{"/>
+                          <m:endChr m:val="}"/>
+                          <m:ctrlPr>
+                            <a:rPr lang="en-US" altLang="ja-JP" sz="2400" i="1">
+                              <a:latin typeface="Cambria Math" panose="02040503050406030204" pitchFamily="18" charset="0"/>
+                            </a:rPr>
+                          </m:ctrlPr>
+                        </m:dPr>
+                        <m:e>
+                          <m:eqArr>
+                            <m:eqArrPr>
+                              <m:ctrlPr>
+                                <a:rPr lang="en-US" altLang="ja-JP" sz="2400" b="1" i="1">
+                                  <a:latin typeface="Cambria Math" panose="02040503050406030204" pitchFamily="18" charset="0"/>
+                                </a:rPr>
+                              </m:ctrlPr>
+                            </m:eqArrPr>
+                            <m:e>
+                              <m:sSub>
+                                <m:sSubPr>
+                                  <m:ctrlPr>
+                                    <a:rPr lang="en-US" altLang="ja-JP" sz="2400" b="1" i="1">
+                                      <a:latin typeface="Cambria Math" panose="02040503050406030204" pitchFamily="18" charset="0"/>
+                                    </a:rPr>
+                                  </m:ctrlPr>
+                                </m:sSubPr>
+                                <m:e>
+                                  <m:r>
+                                    <a:rPr lang="en-US" altLang="ja-JP" sz="2400" b="1" i="1" smtClean="0">
+                                      <a:latin typeface="Cambria Math" panose="02040503050406030204" pitchFamily="18" charset="0"/>
+                                    </a:rPr>
+                                    <m:t>𝒃</m:t>
+                                  </m:r>
+                                </m:e>
+                                <m:sub>
+                                  <m:r>
+                                    <a:rPr lang="en-US" altLang="ja-JP" sz="2400" b="1" i="1">
+                                      <a:latin typeface="Cambria Math" panose="02040503050406030204" pitchFamily="18" charset="0"/>
+                                    </a:rPr>
+                                    <m:t>𝟏</m:t>
+                                  </m:r>
+                                </m:sub>
+                              </m:sSub>
+                            </m:e>
+                            <m:e>
+                              <m:sSub>
+                                <m:sSubPr>
+                                  <m:ctrlPr>
+                                    <a:rPr lang="en-US" altLang="ja-JP" sz="2400" b="1" i="1">
+                                      <a:latin typeface="Cambria Math" panose="02040503050406030204" pitchFamily="18" charset="0"/>
+                                    </a:rPr>
+                                  </m:ctrlPr>
+                                </m:sSubPr>
+                                <m:e>
+                                  <m:r>
+                                    <a:rPr lang="en-US" altLang="ja-JP" sz="2400" b="1" i="1" smtClean="0">
+                                      <a:latin typeface="Cambria Math" panose="02040503050406030204" pitchFamily="18" charset="0"/>
+                                    </a:rPr>
+                                    <m:t>𝒃</m:t>
+                                  </m:r>
+                                </m:e>
+                                <m:sub>
+                                  <m:r>
+                                    <a:rPr lang="en-US" altLang="ja-JP" sz="2400" b="1" i="1">
+                                      <a:latin typeface="Cambria Math" panose="02040503050406030204" pitchFamily="18" charset="0"/>
+                                    </a:rPr>
+                                    <m:t>𝟐</m:t>
+                                  </m:r>
+                                </m:sub>
+                              </m:sSub>
+                            </m:e>
+                            <m:e>
+                              <m:sSub>
+                                <m:sSubPr>
+                                  <m:ctrlPr>
+                                    <a:rPr lang="en-US" altLang="ja-JP" sz="2400" b="1" i="1">
+                                      <a:latin typeface="Cambria Math" panose="02040503050406030204" pitchFamily="18" charset="0"/>
+                                    </a:rPr>
+                                  </m:ctrlPr>
+                                </m:sSubPr>
+                                <m:e>
+                                  <m:r>
+                                    <a:rPr lang="en-US" altLang="ja-JP" sz="2400" b="1" i="1" smtClean="0">
+                                      <a:latin typeface="Cambria Math" panose="02040503050406030204" pitchFamily="18" charset="0"/>
+                                    </a:rPr>
+                                    <m:t>𝒃</m:t>
+                                  </m:r>
+                                </m:e>
+                                <m:sub>
+                                  <m:r>
+                                    <a:rPr lang="en-US" altLang="ja-JP" sz="2400" b="1" i="1">
+                                      <a:latin typeface="Cambria Math" panose="02040503050406030204" pitchFamily="18" charset="0"/>
+                                    </a:rPr>
+                                    <m:t>𝟑</m:t>
+                                  </m:r>
+                                </m:sub>
+                              </m:sSub>
+                            </m:e>
+                          </m:eqArr>
+                        </m:e>
+                      </m:d>
+                    </m:oMath>
+                  </m:oMathPara>
+                </a14:m>
+                <a:endParaRPr kumimoji="1" lang="ja-JP" altLang="en-US" sz="2400" dirty="0"/>
+              </a:p>
+            </p:txBody>
+          </p:sp>
+        </mc:Choice>
+        <mc:Fallback>
+          <p:sp>
+            <p:nvSpPr>
+              <p:cNvPr id="27" name="テキスト ボックス 26"/>
+              <p:cNvSpPr txBox="1">
+                <a:spLocks noRot="1" noChangeAspect="1" noMove="1" noResize="1" noEditPoints="1" noAdjustHandles="1" noChangeArrowheads="1" noChangeShapeType="1" noTextEdit="1"/>
+              </p:cNvSpPr>
+              <p:nvPr/>
+            </p:nvSpPr>
+            <p:spPr>
+              <a:xfrm>
+                <a:off x="611560" y="1599229"/>
+                <a:ext cx="6594049" cy="1271438"/>
+              </a:xfrm>
+              <a:prstGeom prst="rect">
+                <a:avLst/>
+              </a:prstGeom>
+              <a:blipFill rotWithShape="0">
+                <a:blip r:embed="rId2"/>
+                <a:stretch>
+                  <a:fillRect/>
+                </a:stretch>
+              </a:blipFill>
+            </p:spPr>
+            <p:txBody>
+              <a:bodyPr/>
+              <a:lstStyle/>
+              <a:p>
+                <a:r>
+                  <a:rPr lang="ja-JP" altLang="en-US">
+                    <a:noFill/>
+                  </a:rPr>
+                  <a:t> </a:t>
+                </a:r>
+              </a:p>
+            </p:txBody>
+          </p:sp>
+        </mc:Fallback>
+      </mc:AlternateContent>
+      <mc:AlternateContent xmlns:mc="http://schemas.openxmlformats.org/markup-compatibility/2006">
+        <mc:Choice xmlns:a14="http://schemas.microsoft.com/office/drawing/2010/main" Requires="a14">
+          <p:sp>
+            <p:nvSpPr>
+              <p:cNvPr id="59" name="テキスト ボックス 58"/>
+              <p:cNvSpPr txBox="1"/>
+              <p:nvPr/>
+            </p:nvSpPr>
+            <p:spPr>
+              <a:xfrm>
+                <a:off x="946199" y="2860359"/>
+                <a:ext cx="3914470" cy="1271438"/>
+              </a:xfrm>
+              <a:prstGeom prst="rect">
+                <a:avLst/>
+              </a:prstGeom>
+              <a:noFill/>
+            </p:spPr>
+            <p:txBody>
+              <a:bodyPr wrap="none" rtlCol="0">
+                <a:spAutoFit/>
+              </a:bodyPr>
+              <a:lstStyle/>
+              <a:p>
+                <a:pPr/>
+                <a14:m>
+                  <m:oMathPara xmlns:m="http://schemas.openxmlformats.org/officeDocument/2006/math">
+                    <m:oMathParaPr>
+                      <m:jc m:val="centerGroup"/>
+                    </m:oMathParaPr>
+                    <m:oMath xmlns:m="http://schemas.openxmlformats.org/officeDocument/2006/math">
+                      <m:r>
+                        <a:rPr lang="en-US" altLang="ja-JP" sz="2400" b="0" i="1" smtClean="0">
+                          <a:latin typeface="Cambria Math" panose="02040503050406030204" pitchFamily="18" charset="0"/>
+                        </a:rPr>
+                        <m:t>=</m:t>
+                      </m:r>
+                      <m:d>
+                        <m:dPr>
+                          <m:begChr m:val="["/>
+                          <m:endChr m:val="]"/>
+                          <m:ctrlPr>
+                            <a:rPr lang="en-US" altLang="ja-JP" sz="2400" i="1">
+                              <a:latin typeface="Cambria Math" panose="02040503050406030204" pitchFamily="18" charset="0"/>
+                            </a:rPr>
+                          </m:ctrlPr>
+                        </m:dPr>
+                        <m:e>
+                          <m:sSub>
+                            <m:sSubPr>
+                              <m:ctrlPr>
+                                <a:rPr lang="en-US" altLang="ja-JP" sz="2400" i="1" smtClean="0">
+                                  <a:latin typeface="Cambria Math" panose="02040503050406030204" pitchFamily="18" charset="0"/>
+                                </a:rPr>
+                              </m:ctrlPr>
+                            </m:sSubPr>
+                            <m:e>
+                              <m:r>
+                                <a:rPr lang="en-US" altLang="ja-JP" sz="2400" b="0" i="1" smtClean="0">
+                                  <a:latin typeface="Cambria Math" panose="02040503050406030204" pitchFamily="18" charset="0"/>
+                                </a:rPr>
+                                <m:t>𝐶</m:t>
+                              </m:r>
+                            </m:e>
+                            <m:sub>
+                              <m:r>
+                                <a:rPr lang="en-US" altLang="ja-JP" sz="2400" b="0" i="1" smtClean="0">
+                                  <a:latin typeface="Cambria Math" panose="02040503050406030204" pitchFamily="18" charset="0"/>
+                                </a:rPr>
+                                <m:t>13</m:t>
+                              </m:r>
+                            </m:sub>
+                          </m:sSub>
+                          <m:r>
+                            <a:rPr lang="en-US" altLang="ja-JP" sz="2400" b="0" i="1" smtClean="0">
+                              <a:latin typeface="Cambria Math" panose="02040503050406030204" pitchFamily="18" charset="0"/>
+                            </a:rPr>
+                            <m:t>𝑔</m:t>
+                          </m:r>
+                          <m:r>
+                            <a:rPr lang="en-US" altLang="ja-JP" sz="2400" b="0" i="1" smtClean="0">
+                              <a:latin typeface="Cambria Math" panose="02040503050406030204" pitchFamily="18" charset="0"/>
+                            </a:rPr>
+                            <m:t>   </m:t>
+                          </m:r>
+                          <m:sSub>
+                            <m:sSubPr>
+                              <m:ctrlPr>
+                                <a:rPr lang="en-US" altLang="ja-JP" sz="2400" i="1">
+                                  <a:latin typeface="Cambria Math" panose="02040503050406030204" pitchFamily="18" charset="0"/>
+                                </a:rPr>
+                              </m:ctrlPr>
+                            </m:sSubPr>
+                            <m:e>
+                              <m:r>
+                                <a:rPr lang="en-US" altLang="ja-JP" sz="2400" i="1">
+                                  <a:latin typeface="Cambria Math" panose="02040503050406030204" pitchFamily="18" charset="0"/>
+                                </a:rPr>
+                                <m:t>𝐶</m:t>
+                              </m:r>
+                            </m:e>
+                            <m:sub>
+                              <m:r>
+                                <a:rPr lang="en-US" altLang="ja-JP" sz="2400" b="0" i="1" smtClean="0">
+                                  <a:latin typeface="Cambria Math" panose="02040503050406030204" pitchFamily="18" charset="0"/>
+                                </a:rPr>
+                                <m:t>2</m:t>
+                              </m:r>
+                              <m:r>
+                                <a:rPr lang="en-US" altLang="ja-JP" sz="2400" i="1">
+                                  <a:latin typeface="Cambria Math" panose="02040503050406030204" pitchFamily="18" charset="0"/>
+                                </a:rPr>
+                                <m:t>3</m:t>
+                              </m:r>
+                            </m:sub>
+                          </m:sSub>
+                          <m:r>
+                            <a:rPr lang="en-US" altLang="ja-JP" sz="2400" i="1">
+                              <a:latin typeface="Cambria Math" panose="02040503050406030204" pitchFamily="18" charset="0"/>
+                            </a:rPr>
+                            <m:t>𝑔</m:t>
+                          </m:r>
+                          <m:sSub>
+                            <m:sSubPr>
+                              <m:ctrlPr>
+                                <a:rPr lang="en-US" altLang="ja-JP" sz="2400" i="1">
+                                  <a:latin typeface="Cambria Math" panose="02040503050406030204" pitchFamily="18" charset="0"/>
+                                </a:rPr>
+                              </m:ctrlPr>
+                            </m:sSubPr>
+                            <m:e>
+                              <m:r>
+                                <a:rPr lang="en-US" altLang="ja-JP" sz="2400" b="0" i="1" smtClean="0">
+                                  <a:latin typeface="Cambria Math" panose="02040503050406030204" pitchFamily="18" charset="0"/>
+                                </a:rPr>
+                                <m:t>   </m:t>
+                              </m:r>
+                              <m:r>
+                                <a:rPr lang="en-US" altLang="ja-JP" sz="2400" i="1">
+                                  <a:latin typeface="Cambria Math" panose="02040503050406030204" pitchFamily="18" charset="0"/>
+                                </a:rPr>
+                                <m:t>𝐶</m:t>
+                              </m:r>
+                            </m:e>
+                            <m:sub>
+                              <m:r>
+                                <a:rPr lang="en-US" altLang="ja-JP" sz="2400" b="0" i="1" smtClean="0">
+                                  <a:latin typeface="Cambria Math" panose="02040503050406030204" pitchFamily="18" charset="0"/>
+                                </a:rPr>
+                                <m:t>3</m:t>
+                              </m:r>
+                              <m:r>
+                                <a:rPr lang="en-US" altLang="ja-JP" sz="2400" i="1">
+                                  <a:latin typeface="Cambria Math" panose="02040503050406030204" pitchFamily="18" charset="0"/>
+                                </a:rPr>
+                                <m:t>3</m:t>
+                              </m:r>
+                            </m:sub>
+                          </m:sSub>
+                          <m:r>
+                            <a:rPr lang="en-US" altLang="ja-JP" sz="2400" i="1">
+                              <a:latin typeface="Cambria Math" panose="02040503050406030204" pitchFamily="18" charset="0"/>
+                            </a:rPr>
+                            <m:t>𝑔</m:t>
+                          </m:r>
+                        </m:e>
+                      </m:d>
+                      <m:d>
+                        <m:dPr>
+                          <m:begChr m:val="{"/>
+                          <m:endChr m:val="}"/>
+                          <m:ctrlPr>
+                            <a:rPr lang="en-US" altLang="ja-JP" sz="2400" i="1">
+                              <a:latin typeface="Cambria Math" panose="02040503050406030204" pitchFamily="18" charset="0"/>
+                            </a:rPr>
+                          </m:ctrlPr>
+                        </m:dPr>
+                        <m:e>
+                          <m:eqArr>
+                            <m:eqArrPr>
+                              <m:ctrlPr>
+                                <a:rPr lang="en-US" altLang="ja-JP" sz="2400" b="1" i="1">
+                                  <a:latin typeface="Cambria Math" panose="02040503050406030204" pitchFamily="18" charset="0"/>
+                                </a:rPr>
+                              </m:ctrlPr>
+                            </m:eqArrPr>
+                            <m:e>
+                              <m:sSub>
+                                <m:sSubPr>
+                                  <m:ctrlPr>
+                                    <a:rPr lang="en-US" altLang="ja-JP" sz="2400" b="1" i="1">
+                                      <a:latin typeface="Cambria Math" panose="02040503050406030204" pitchFamily="18" charset="0"/>
+                                    </a:rPr>
+                                  </m:ctrlPr>
+                                </m:sSubPr>
+                                <m:e>
+                                  <m:r>
+                                    <a:rPr lang="en-US" altLang="ja-JP" sz="2400" b="1" i="1" smtClean="0">
+                                      <a:latin typeface="Cambria Math" panose="02040503050406030204" pitchFamily="18" charset="0"/>
+                                    </a:rPr>
+                                    <m:t>𝒃</m:t>
+                                  </m:r>
+                                </m:e>
+                                <m:sub>
+                                  <m:r>
+                                    <a:rPr lang="en-US" altLang="ja-JP" sz="2400" b="1" i="1">
+                                      <a:latin typeface="Cambria Math" panose="02040503050406030204" pitchFamily="18" charset="0"/>
+                                    </a:rPr>
+                                    <m:t>𝟏</m:t>
+                                  </m:r>
+                                </m:sub>
+                              </m:sSub>
+                            </m:e>
+                            <m:e>
+                              <m:sSub>
+                                <m:sSubPr>
+                                  <m:ctrlPr>
+                                    <a:rPr lang="en-US" altLang="ja-JP" sz="2400" b="1" i="1">
+                                      <a:latin typeface="Cambria Math" panose="02040503050406030204" pitchFamily="18" charset="0"/>
+                                    </a:rPr>
+                                  </m:ctrlPr>
+                                </m:sSubPr>
+                                <m:e>
+                                  <m:r>
+                                    <a:rPr lang="en-US" altLang="ja-JP" sz="2400" b="1" i="1" smtClean="0">
+                                      <a:latin typeface="Cambria Math" panose="02040503050406030204" pitchFamily="18" charset="0"/>
+                                    </a:rPr>
+                                    <m:t>𝒃</m:t>
+                                  </m:r>
+                                </m:e>
+                                <m:sub>
+                                  <m:r>
+                                    <a:rPr lang="en-US" altLang="ja-JP" sz="2400" b="1" i="1">
+                                      <a:latin typeface="Cambria Math" panose="02040503050406030204" pitchFamily="18" charset="0"/>
+                                    </a:rPr>
+                                    <m:t>𝟐</m:t>
+                                  </m:r>
+                                </m:sub>
+                              </m:sSub>
+                            </m:e>
+                            <m:e>
+                              <m:sSub>
+                                <m:sSubPr>
+                                  <m:ctrlPr>
+                                    <a:rPr lang="en-US" altLang="ja-JP" sz="2400" b="1" i="1">
+                                      <a:latin typeface="Cambria Math" panose="02040503050406030204" pitchFamily="18" charset="0"/>
+                                    </a:rPr>
+                                  </m:ctrlPr>
+                                </m:sSubPr>
+                                <m:e>
+                                  <m:r>
+                                    <a:rPr lang="en-US" altLang="ja-JP" sz="2400" b="1" i="1" smtClean="0">
+                                      <a:latin typeface="Cambria Math" panose="02040503050406030204" pitchFamily="18" charset="0"/>
+                                    </a:rPr>
+                                    <m:t>𝒃</m:t>
+                                  </m:r>
+                                </m:e>
+                                <m:sub>
+                                  <m:r>
+                                    <a:rPr lang="en-US" altLang="ja-JP" sz="2400" b="1" i="1">
+                                      <a:latin typeface="Cambria Math" panose="02040503050406030204" pitchFamily="18" charset="0"/>
+                                    </a:rPr>
+                                    <m:t>𝟑</m:t>
+                                  </m:r>
+                                </m:sub>
+                              </m:sSub>
+                            </m:e>
+                          </m:eqArr>
+                        </m:e>
+                      </m:d>
+                    </m:oMath>
+                  </m:oMathPara>
+                </a14:m>
+                <a:endParaRPr kumimoji="1" lang="ja-JP" altLang="en-US" sz="2400" dirty="0"/>
+              </a:p>
+            </p:txBody>
+          </p:sp>
+        </mc:Choice>
+        <mc:Fallback>
+          <p:sp>
+            <p:nvSpPr>
+              <p:cNvPr id="59" name="テキスト ボックス 58"/>
+              <p:cNvSpPr txBox="1">
+                <a:spLocks noRot="1" noChangeAspect="1" noMove="1" noResize="1" noEditPoints="1" noAdjustHandles="1" noChangeArrowheads="1" noChangeShapeType="1" noTextEdit="1"/>
+              </p:cNvSpPr>
+              <p:nvPr/>
+            </p:nvSpPr>
+            <p:spPr>
+              <a:xfrm>
+                <a:off x="946199" y="2860359"/>
+                <a:ext cx="3914470" cy="1271438"/>
+              </a:xfrm>
+              <a:prstGeom prst="rect">
+                <a:avLst/>
+              </a:prstGeom>
+              <a:blipFill rotWithShape="0">
+                <a:blip r:embed="rId3"/>
+                <a:stretch>
+                  <a:fillRect/>
+                </a:stretch>
+              </a:blipFill>
+            </p:spPr>
+            <p:txBody>
+              <a:bodyPr/>
+              <a:lstStyle/>
+              <a:p>
+                <a:r>
+                  <a:rPr lang="ja-JP" altLang="en-US">
+                    <a:noFill/>
+                  </a:rPr>
+                  <a:t> </a:t>
+                </a:r>
+              </a:p>
+            </p:txBody>
+          </p:sp>
+        </mc:Fallback>
+      </mc:AlternateContent>
+      <mc:AlternateContent xmlns:mc="http://schemas.openxmlformats.org/markup-compatibility/2006">
+        <mc:Choice xmlns:a14="http://schemas.microsoft.com/office/drawing/2010/main" Requires="a14">
+          <p:sp>
+            <p:nvSpPr>
+              <p:cNvPr id="66" name="テキスト ボックス 65"/>
+              <p:cNvSpPr txBox="1"/>
+              <p:nvPr/>
+            </p:nvSpPr>
+            <p:spPr>
+              <a:xfrm>
+                <a:off x="946199" y="4081921"/>
+                <a:ext cx="2254079" cy="1266180"/>
+              </a:xfrm>
+              <a:prstGeom prst="rect">
+                <a:avLst/>
+              </a:prstGeom>
+              <a:noFill/>
+            </p:spPr>
+            <p:txBody>
+              <a:bodyPr wrap="none" rtlCol="0">
+                <a:spAutoFit/>
+              </a:bodyPr>
+              <a:lstStyle/>
+              <a:p>
+                <a:pPr/>
+                <a14:m>
+                  <m:oMathPara xmlns:m="http://schemas.openxmlformats.org/officeDocument/2006/math">
+                    <m:oMathParaPr>
+                      <m:jc m:val="centerGroup"/>
+                    </m:oMathParaPr>
+                    <m:oMath xmlns:m="http://schemas.openxmlformats.org/officeDocument/2006/math">
+                      <m:r>
+                        <a:rPr lang="en-US" altLang="ja-JP" sz="2400" b="0" i="1" smtClean="0">
+                          <a:latin typeface="Cambria Math" panose="02040503050406030204" pitchFamily="18" charset="0"/>
+                        </a:rPr>
+                        <m:t>=</m:t>
+                      </m:r>
+                      <m:sSup>
+                        <m:sSupPr>
+                          <m:ctrlPr>
+                            <a:rPr lang="en-US" altLang="ja-JP" sz="2400" i="1">
+                              <a:latin typeface="Cambria Math" panose="02040503050406030204" pitchFamily="18" charset="0"/>
+                            </a:rPr>
+                          </m:ctrlPr>
+                        </m:sSupPr>
+                        <m:e>
+                          <m:d>
+                            <m:dPr>
+                              <m:begChr m:val="{"/>
+                              <m:endChr m:val="}"/>
+                              <m:ctrlPr>
+                                <a:rPr lang="en-US" altLang="ja-JP" sz="2400" b="1" i="1">
+                                  <a:latin typeface="Cambria Math" panose="02040503050406030204" pitchFamily="18" charset="0"/>
+                                </a:rPr>
+                              </m:ctrlPr>
+                            </m:dPr>
+                            <m:e>
+                              <m:r>
+                                <a:rPr lang="en-US" altLang="ja-JP" sz="2400" b="1" i="1" smtClean="0">
+                                  <a:latin typeface="Cambria Math" panose="02040503050406030204" pitchFamily="18" charset="0"/>
+                                </a:rPr>
+                                <m:t>𝒃</m:t>
+                              </m:r>
+                            </m:e>
+                          </m:d>
+                        </m:e>
+                        <m:sup>
+                          <m:r>
+                            <a:rPr lang="en-US" altLang="ja-JP" sz="2400" i="1">
+                              <a:latin typeface="Cambria Math" panose="02040503050406030204" pitchFamily="18" charset="0"/>
+                            </a:rPr>
+                            <m:t>𝑇</m:t>
+                          </m:r>
+                        </m:sup>
+                      </m:sSup>
+                      <m:d>
+                        <m:dPr>
+                          <m:begChr m:val="["/>
+                          <m:endChr m:val="]"/>
+                          <m:ctrlPr>
+                            <a:rPr lang="en-US" altLang="ja-JP" sz="2400" i="1">
+                              <a:latin typeface="Cambria Math" panose="02040503050406030204" pitchFamily="18" charset="0"/>
+                            </a:rPr>
+                          </m:ctrlPr>
+                        </m:dPr>
+                        <m:e>
+                          <m:eqArr>
+                            <m:eqArrPr>
+                              <m:ctrlPr>
+                                <a:rPr lang="en-US" altLang="ja-JP" sz="2400" i="1">
+                                  <a:latin typeface="Cambria Math" panose="02040503050406030204" pitchFamily="18" charset="0"/>
+                                </a:rPr>
+                              </m:ctrlPr>
+                            </m:eqArrPr>
+                            <m:e>
+                              <m:sSub>
+                                <m:sSubPr>
+                                  <m:ctrlPr>
+                                    <a:rPr lang="en-US" altLang="ja-JP" sz="2400" i="1">
+                                      <a:latin typeface="Cambria Math" panose="02040503050406030204" pitchFamily="18" charset="0"/>
+                                    </a:rPr>
+                                  </m:ctrlPr>
+                                </m:sSubPr>
+                                <m:e>
+                                  <m:r>
+                                    <a:rPr lang="en-US" altLang="ja-JP" sz="2400" i="1">
+                                      <a:latin typeface="Cambria Math" panose="02040503050406030204" pitchFamily="18" charset="0"/>
+                                    </a:rPr>
+                                    <m:t>𝐶</m:t>
+                                  </m:r>
+                                </m:e>
+                                <m:sub>
+                                  <m:r>
+                                    <a:rPr lang="en-US" altLang="ja-JP" sz="2400" i="1">
+                                      <a:latin typeface="Cambria Math" panose="02040503050406030204" pitchFamily="18" charset="0"/>
+                                    </a:rPr>
+                                    <m:t>13</m:t>
+                                  </m:r>
+                                </m:sub>
+                              </m:sSub>
+                              <m:r>
+                                <a:rPr lang="en-US" altLang="ja-JP" sz="2400" i="1">
+                                  <a:latin typeface="Cambria Math" panose="02040503050406030204" pitchFamily="18" charset="0"/>
+                                </a:rPr>
+                                <m:t>𝑔</m:t>
+                              </m:r>
+                            </m:e>
+                            <m:e>
+                              <m:sSub>
+                                <m:sSubPr>
+                                  <m:ctrlPr>
+                                    <a:rPr lang="en-US" altLang="ja-JP" sz="2400" i="1">
+                                      <a:latin typeface="Cambria Math" panose="02040503050406030204" pitchFamily="18" charset="0"/>
+                                    </a:rPr>
+                                  </m:ctrlPr>
+                                </m:sSubPr>
+                                <m:e>
+                                  <m:r>
+                                    <a:rPr lang="en-US" altLang="ja-JP" sz="2400" i="1">
+                                      <a:latin typeface="Cambria Math" panose="02040503050406030204" pitchFamily="18" charset="0"/>
+                                    </a:rPr>
+                                    <m:t>𝐶</m:t>
+                                  </m:r>
+                                </m:e>
+                                <m:sub>
+                                  <m:r>
+                                    <a:rPr lang="en-US" altLang="ja-JP" sz="2400" i="1">
+                                      <a:latin typeface="Cambria Math" panose="02040503050406030204" pitchFamily="18" charset="0"/>
+                                    </a:rPr>
+                                    <m:t>2</m:t>
+                                  </m:r>
+                                  <m:r>
+                                    <a:rPr lang="en-US" altLang="ja-JP" sz="2400" i="1">
+                                      <a:latin typeface="Cambria Math" panose="02040503050406030204" pitchFamily="18" charset="0"/>
+                                    </a:rPr>
+                                    <m:t>3</m:t>
+                                  </m:r>
+                                </m:sub>
+                              </m:sSub>
+                              <m:r>
+                                <a:rPr lang="en-US" altLang="ja-JP" sz="2400" i="1">
+                                  <a:latin typeface="Cambria Math" panose="02040503050406030204" pitchFamily="18" charset="0"/>
+                                </a:rPr>
+                                <m:t>𝑔</m:t>
+                              </m:r>
+                            </m:e>
+                            <m:e>
+                              <m:sSub>
+                                <m:sSubPr>
+                                  <m:ctrlPr>
+                                    <a:rPr lang="en-US" altLang="ja-JP" sz="2400" i="1">
+                                      <a:latin typeface="Cambria Math" panose="02040503050406030204" pitchFamily="18" charset="0"/>
+                                    </a:rPr>
+                                  </m:ctrlPr>
+                                </m:sSubPr>
+                                <m:e>
+                                  <m:r>
+                                    <a:rPr lang="en-US" altLang="ja-JP" sz="2400" i="1">
+                                      <a:latin typeface="Cambria Math" panose="02040503050406030204" pitchFamily="18" charset="0"/>
+                                    </a:rPr>
+                                    <m:t>𝐶</m:t>
+                                  </m:r>
+                                </m:e>
+                                <m:sub>
+                                  <m:r>
+                                    <a:rPr lang="en-US" altLang="ja-JP" sz="2400" i="1">
+                                      <a:latin typeface="Cambria Math" panose="02040503050406030204" pitchFamily="18" charset="0"/>
+                                    </a:rPr>
+                                    <m:t>3</m:t>
+                                  </m:r>
+                                  <m:r>
+                                    <a:rPr lang="en-US" altLang="ja-JP" sz="2400" i="1">
+                                      <a:latin typeface="Cambria Math" panose="02040503050406030204" pitchFamily="18" charset="0"/>
+                                    </a:rPr>
+                                    <m:t>3</m:t>
+                                  </m:r>
+                                </m:sub>
+                              </m:sSub>
+                              <m:r>
+                                <a:rPr lang="en-US" altLang="ja-JP" sz="2400" i="1">
+                                  <a:latin typeface="Cambria Math" panose="02040503050406030204" pitchFamily="18" charset="0"/>
+                                </a:rPr>
+                                <m:t>𝑔</m:t>
+                              </m:r>
+                            </m:e>
+                          </m:eqArr>
+                        </m:e>
+                      </m:d>
+                    </m:oMath>
+                  </m:oMathPara>
+                </a14:m>
+                <a:endParaRPr kumimoji="1" lang="ja-JP" altLang="en-US" sz="2400" dirty="0"/>
+              </a:p>
+            </p:txBody>
+          </p:sp>
+        </mc:Choice>
+        <mc:Fallback>
+          <p:sp>
+            <p:nvSpPr>
+              <p:cNvPr id="66" name="テキスト ボックス 65"/>
+              <p:cNvSpPr txBox="1">
+                <a:spLocks noRot="1" noChangeAspect="1" noMove="1" noResize="1" noEditPoints="1" noAdjustHandles="1" noChangeArrowheads="1" noChangeShapeType="1" noTextEdit="1"/>
+              </p:cNvSpPr>
+              <p:nvPr/>
+            </p:nvSpPr>
+            <p:spPr>
+              <a:xfrm>
+                <a:off x="946199" y="4081921"/>
+                <a:ext cx="2254079" cy="1266180"/>
+              </a:xfrm>
+              <a:prstGeom prst="rect">
+                <a:avLst/>
+              </a:prstGeom>
+              <a:blipFill rotWithShape="0">
+                <a:blip r:embed="rId4"/>
+                <a:stretch>
+                  <a:fillRect/>
+                </a:stretch>
+              </a:blipFill>
+            </p:spPr>
+            <p:txBody>
+              <a:bodyPr/>
+              <a:lstStyle/>
+              <a:p>
+                <a:r>
+                  <a:rPr lang="ja-JP" altLang="en-US">
+                    <a:noFill/>
+                  </a:rPr>
+                  <a:t> </a:t>
+                </a:r>
+              </a:p>
+            </p:txBody>
+          </p:sp>
+        </mc:Fallback>
+      </mc:AlternateContent>
+      <mc:AlternateContent xmlns:mc="http://schemas.openxmlformats.org/markup-compatibility/2006">
+        <mc:Choice xmlns:a14="http://schemas.microsoft.com/office/drawing/2010/main" Requires="a14">
+          <p:sp>
+            <p:nvSpPr>
+              <p:cNvPr id="67" name="テキスト ボックス 66"/>
+              <p:cNvSpPr txBox="1"/>
+              <p:nvPr/>
+            </p:nvSpPr>
+            <p:spPr>
+              <a:xfrm>
+                <a:off x="3263847" y="4070157"/>
+                <a:ext cx="4556952" cy="1266180"/>
+              </a:xfrm>
+              <a:prstGeom prst="rect">
+                <a:avLst/>
+              </a:prstGeom>
+              <a:noFill/>
+            </p:spPr>
+            <p:txBody>
+              <a:bodyPr wrap="none" rtlCol="0">
+                <a:spAutoFit/>
+              </a:bodyPr>
+              <a:lstStyle/>
+              <a:p>
+                <a:pPr/>
+                <a14:m>
+                  <m:oMathPara xmlns:m="http://schemas.openxmlformats.org/officeDocument/2006/math">
+                    <m:oMathParaPr>
+                      <m:jc m:val="centerGroup"/>
+                    </m:oMathParaPr>
+                    <m:oMath xmlns:m="http://schemas.openxmlformats.org/officeDocument/2006/math">
+                      <m:sSup>
+                        <m:sSupPr>
+                          <m:ctrlPr>
+                            <a:rPr lang="en-US" altLang="ja-JP" sz="2400" i="1" smtClean="0">
+                              <a:latin typeface="Cambria Math" panose="02040503050406030204" pitchFamily="18" charset="0"/>
+                            </a:rPr>
+                          </m:ctrlPr>
+                        </m:sSupPr>
+                        <m:e>
+                          <m:d>
+                            <m:dPr>
+                              <m:begChr m:val="{"/>
+                              <m:endChr m:val="}"/>
+                              <m:ctrlPr>
+                                <a:rPr lang="en-US" altLang="ja-JP" sz="2400" b="1" i="1">
+                                  <a:latin typeface="Cambria Math" panose="02040503050406030204" pitchFamily="18" charset="0"/>
+                                </a:rPr>
+                              </m:ctrlPr>
+                            </m:dPr>
+                            <m:e>
+                              <m:r>
+                                <a:rPr lang="en-US" altLang="ja-JP" sz="2400" b="1" i="1" smtClean="0">
+                                  <a:latin typeface="Cambria Math" panose="02040503050406030204" pitchFamily="18" charset="0"/>
+                                </a:rPr>
+                                <m:t>𝒃</m:t>
+                              </m:r>
+                            </m:e>
+                          </m:d>
+                        </m:e>
+                        <m:sup>
+                          <m:r>
+                            <a:rPr lang="en-US" altLang="ja-JP" sz="2400" i="1">
+                              <a:latin typeface="Cambria Math" panose="02040503050406030204" pitchFamily="18" charset="0"/>
+                            </a:rPr>
+                            <m:t>𝑇</m:t>
+                          </m:r>
+                        </m:sup>
+                      </m:sSup>
+                      <m:d>
+                        <m:dPr>
+                          <m:begChr m:val="["/>
+                          <m:endChr m:val="]"/>
+                          <m:ctrlPr>
+                            <a:rPr lang="en-US" altLang="ja-JP" sz="2400" i="1">
+                              <a:latin typeface="Cambria Math" panose="02040503050406030204" pitchFamily="18" charset="0"/>
+                            </a:rPr>
+                          </m:ctrlPr>
+                        </m:dPr>
+                        <m:e>
+                          <m:eqArr>
+                            <m:eqArrPr>
+                              <m:ctrlPr>
+                                <a:rPr lang="en-US" altLang="ja-JP" sz="2400" i="1">
+                                  <a:latin typeface="Cambria Math" panose="02040503050406030204" pitchFamily="18" charset="0"/>
+                                </a:rPr>
+                              </m:ctrlPr>
+                            </m:eqArrPr>
+                            <m:e>
+                              <m:r>
+                                <a:rPr lang="en-US" altLang="ja-JP" sz="2400" i="1">
+                                  <a:latin typeface="Cambria Math" panose="02040503050406030204" pitchFamily="18" charset="0"/>
+                                </a:rPr>
+                                <m:t>2</m:t>
+                              </m:r>
+                              <m:d>
+                                <m:dPr>
+                                  <m:ctrlPr>
+                                    <a:rPr lang="en-US" altLang="ja-JP" sz="2400" i="1">
+                                      <a:latin typeface="Cambria Math" panose="02040503050406030204" pitchFamily="18" charset="0"/>
+                                    </a:rPr>
+                                  </m:ctrlPr>
+                                </m:dPr>
+                                <m:e>
+                                  <m:sSub>
+                                    <m:sSubPr>
+                                      <m:ctrlPr>
+                                        <a:rPr lang="en-US" altLang="ja-JP" sz="2400" i="1">
+                                          <a:latin typeface="Cambria Math" panose="02040503050406030204" pitchFamily="18" charset="0"/>
+                                        </a:rPr>
+                                      </m:ctrlPr>
+                                    </m:sSubPr>
+                                    <m:e>
+                                      <m:r>
+                                        <a:rPr lang="en-US" altLang="ja-JP" sz="2400" i="1">
+                                          <a:latin typeface="Cambria Math" panose="02040503050406030204" pitchFamily="18" charset="0"/>
+                                        </a:rPr>
+                                        <m:t>𝑞</m:t>
+                                      </m:r>
+                                    </m:e>
+                                    <m:sub>
+                                      <m:r>
+                                        <a:rPr lang="en-US" altLang="ja-JP" sz="2400" i="1">
+                                          <a:latin typeface="Cambria Math" panose="02040503050406030204" pitchFamily="18" charset="0"/>
+                                        </a:rPr>
+                                        <m:t>3</m:t>
+                                      </m:r>
+                                    </m:sub>
+                                  </m:sSub>
+                                  <m:sSub>
+                                    <m:sSubPr>
+                                      <m:ctrlPr>
+                                        <a:rPr lang="en-US" altLang="ja-JP" sz="2400" i="1">
+                                          <a:latin typeface="Cambria Math" panose="02040503050406030204" pitchFamily="18" charset="0"/>
+                                        </a:rPr>
+                                      </m:ctrlPr>
+                                    </m:sSubPr>
+                                    <m:e>
+                                      <m:r>
+                                        <a:rPr lang="en-US" altLang="ja-JP" sz="2400" i="1">
+                                          <a:latin typeface="Cambria Math" panose="02040503050406030204" pitchFamily="18" charset="0"/>
+                                        </a:rPr>
+                                        <m:t>𝑞</m:t>
+                                      </m:r>
+                                    </m:e>
+                                    <m:sub>
+                                      <m:r>
+                                        <a:rPr lang="en-US" altLang="ja-JP" sz="2400" i="1">
+                                          <a:latin typeface="Cambria Math" panose="02040503050406030204" pitchFamily="18" charset="0"/>
+                                        </a:rPr>
+                                        <m:t>1</m:t>
+                                      </m:r>
+                                    </m:sub>
+                                  </m:sSub>
+                                  <m:r>
+                                    <a:rPr lang="en-US" altLang="ja-JP" sz="2400" i="1">
+                                      <a:latin typeface="Cambria Math" panose="02040503050406030204" pitchFamily="18" charset="0"/>
+                                    </a:rPr>
+                                    <m:t>−</m:t>
+                                  </m:r>
+                                  <m:sSub>
+                                    <m:sSubPr>
+                                      <m:ctrlPr>
+                                        <a:rPr lang="en-US" altLang="ja-JP" sz="2400" i="1">
+                                          <a:latin typeface="Cambria Math" panose="02040503050406030204" pitchFamily="18" charset="0"/>
+                                        </a:rPr>
+                                      </m:ctrlPr>
+                                    </m:sSubPr>
+                                    <m:e>
+                                      <m:r>
+                                        <a:rPr lang="en-US" altLang="ja-JP" sz="2400" i="1">
+                                          <a:latin typeface="Cambria Math" panose="02040503050406030204" pitchFamily="18" charset="0"/>
+                                        </a:rPr>
+                                        <m:t>𝑞</m:t>
+                                      </m:r>
+                                    </m:e>
+                                    <m:sub>
+                                      <m:r>
+                                        <a:rPr lang="en-US" altLang="ja-JP" sz="2400" i="1">
+                                          <a:latin typeface="Cambria Math" panose="02040503050406030204" pitchFamily="18" charset="0"/>
+                                        </a:rPr>
+                                        <m:t>2</m:t>
+                                      </m:r>
+                                    </m:sub>
+                                  </m:sSub>
+                                  <m:sSub>
+                                    <m:sSubPr>
+                                      <m:ctrlPr>
+                                        <a:rPr lang="en-US" altLang="ja-JP" sz="2400" i="1">
+                                          <a:latin typeface="Cambria Math" panose="02040503050406030204" pitchFamily="18" charset="0"/>
+                                        </a:rPr>
+                                      </m:ctrlPr>
+                                    </m:sSubPr>
+                                    <m:e>
+                                      <m:r>
+                                        <a:rPr lang="en-US" altLang="ja-JP" sz="2400" i="1">
+                                          <a:latin typeface="Cambria Math" panose="02040503050406030204" pitchFamily="18" charset="0"/>
+                                        </a:rPr>
+                                        <m:t>𝑞</m:t>
+                                      </m:r>
+                                    </m:e>
+                                    <m:sub>
+                                      <m:r>
+                                        <a:rPr lang="en-US" altLang="ja-JP" sz="2400" i="1">
+                                          <a:latin typeface="Cambria Math" panose="02040503050406030204" pitchFamily="18" charset="0"/>
+                                        </a:rPr>
+                                        <m:t>4</m:t>
+                                      </m:r>
+                                    </m:sub>
+                                  </m:sSub>
+                                </m:e>
+                              </m:d>
+                              <m:r>
+                                <a:rPr lang="en-US" altLang="ja-JP" sz="2400" b="0" i="1" smtClean="0">
+                                  <a:latin typeface="Cambria Math" panose="02040503050406030204" pitchFamily="18" charset="0"/>
+                                </a:rPr>
+                                <m:t>𝑔</m:t>
+                              </m:r>
+                            </m:e>
+                            <m:e>
+                              <m:r>
+                                <a:rPr lang="en-US" altLang="ja-JP" sz="2400" i="1">
+                                  <a:latin typeface="Cambria Math" panose="02040503050406030204" pitchFamily="18" charset="0"/>
+                                </a:rPr>
+                                <m:t>2</m:t>
+                              </m:r>
+                              <m:d>
+                                <m:dPr>
+                                  <m:ctrlPr>
+                                    <a:rPr lang="en-US" altLang="ja-JP" sz="2400" i="1">
+                                      <a:latin typeface="Cambria Math" panose="02040503050406030204" pitchFamily="18" charset="0"/>
+                                    </a:rPr>
+                                  </m:ctrlPr>
+                                </m:dPr>
+                                <m:e>
+                                  <m:sSub>
+                                    <m:sSubPr>
+                                      <m:ctrlPr>
+                                        <a:rPr lang="en-US" altLang="ja-JP" sz="2400" i="1">
+                                          <a:latin typeface="Cambria Math" panose="02040503050406030204" pitchFamily="18" charset="0"/>
+                                        </a:rPr>
+                                      </m:ctrlPr>
+                                    </m:sSubPr>
+                                    <m:e>
+                                      <m:r>
+                                        <a:rPr lang="en-US" altLang="ja-JP" sz="2400" i="1">
+                                          <a:latin typeface="Cambria Math" panose="02040503050406030204" pitchFamily="18" charset="0"/>
+                                        </a:rPr>
+                                        <m:t>𝑞</m:t>
+                                      </m:r>
+                                    </m:e>
+                                    <m:sub>
+                                      <m:r>
+                                        <a:rPr lang="en-US" altLang="ja-JP" sz="2400" i="1">
+                                          <a:latin typeface="Cambria Math" panose="02040503050406030204" pitchFamily="18" charset="0"/>
+                                        </a:rPr>
+                                        <m:t>2</m:t>
+                                      </m:r>
+                                    </m:sub>
+                                  </m:sSub>
+                                  <m:sSub>
+                                    <m:sSubPr>
+                                      <m:ctrlPr>
+                                        <a:rPr lang="en-US" altLang="ja-JP" sz="2400" i="1">
+                                          <a:latin typeface="Cambria Math" panose="02040503050406030204" pitchFamily="18" charset="0"/>
+                                        </a:rPr>
+                                      </m:ctrlPr>
+                                    </m:sSubPr>
+                                    <m:e>
+                                      <m:r>
+                                        <a:rPr lang="en-US" altLang="ja-JP" sz="2400" i="1">
+                                          <a:latin typeface="Cambria Math" panose="02040503050406030204" pitchFamily="18" charset="0"/>
+                                        </a:rPr>
+                                        <m:t>𝑞</m:t>
+                                      </m:r>
+                                    </m:e>
+                                    <m:sub>
+                                      <m:r>
+                                        <a:rPr lang="en-US" altLang="ja-JP" sz="2400" i="1">
+                                          <a:latin typeface="Cambria Math" panose="02040503050406030204" pitchFamily="18" charset="0"/>
+                                        </a:rPr>
+                                        <m:t>3</m:t>
+                                      </m:r>
+                                    </m:sub>
+                                  </m:sSub>
+                                  <m:r>
+                                    <a:rPr lang="en-US" altLang="ja-JP" sz="2400" i="1">
+                                      <a:latin typeface="Cambria Math" panose="02040503050406030204" pitchFamily="18" charset="0"/>
+                                    </a:rPr>
+                                    <m:t>+</m:t>
+                                  </m:r>
+                                  <m:sSub>
+                                    <m:sSubPr>
+                                      <m:ctrlPr>
+                                        <a:rPr lang="en-US" altLang="ja-JP" sz="2400" i="1">
+                                          <a:latin typeface="Cambria Math" panose="02040503050406030204" pitchFamily="18" charset="0"/>
+                                        </a:rPr>
+                                      </m:ctrlPr>
+                                    </m:sSubPr>
+                                    <m:e>
+                                      <m:r>
+                                        <a:rPr lang="en-US" altLang="ja-JP" sz="2400" i="1">
+                                          <a:latin typeface="Cambria Math" panose="02040503050406030204" pitchFamily="18" charset="0"/>
+                                        </a:rPr>
+                                        <m:t>𝑞</m:t>
+                                      </m:r>
+                                    </m:e>
+                                    <m:sub>
+                                      <m:r>
+                                        <a:rPr lang="en-US" altLang="ja-JP" sz="2400" i="1">
+                                          <a:latin typeface="Cambria Math" panose="02040503050406030204" pitchFamily="18" charset="0"/>
+                                        </a:rPr>
+                                        <m:t>1</m:t>
+                                      </m:r>
+                                    </m:sub>
+                                  </m:sSub>
+                                  <m:sSub>
+                                    <m:sSubPr>
+                                      <m:ctrlPr>
+                                        <a:rPr lang="en-US" altLang="ja-JP" sz="2400" i="1">
+                                          <a:latin typeface="Cambria Math" panose="02040503050406030204" pitchFamily="18" charset="0"/>
+                                        </a:rPr>
+                                      </m:ctrlPr>
+                                    </m:sSubPr>
+                                    <m:e>
+                                      <m:r>
+                                        <a:rPr lang="en-US" altLang="ja-JP" sz="2400" i="1">
+                                          <a:latin typeface="Cambria Math" panose="02040503050406030204" pitchFamily="18" charset="0"/>
+                                        </a:rPr>
+                                        <m:t>𝑞</m:t>
+                                      </m:r>
+                                    </m:e>
+                                    <m:sub>
+                                      <m:r>
+                                        <a:rPr lang="en-US" altLang="ja-JP" sz="2400" i="1">
+                                          <a:latin typeface="Cambria Math" panose="02040503050406030204" pitchFamily="18" charset="0"/>
+                                        </a:rPr>
+                                        <m:t>4</m:t>
+                                      </m:r>
+                                    </m:sub>
+                                  </m:sSub>
+                                </m:e>
+                              </m:d>
+                              <m:r>
+                                <a:rPr lang="en-US" altLang="ja-JP" sz="2400" i="1">
+                                  <a:latin typeface="Cambria Math" panose="02040503050406030204" pitchFamily="18" charset="0"/>
+                                </a:rPr>
+                                <m:t>𝑔</m:t>
+                              </m:r>
+                            </m:e>
+                            <m:e>
+                              <m:d>
+                                <m:dPr>
+                                  <m:ctrlPr>
+                                    <a:rPr lang="en-US" altLang="ja-JP" sz="2400" i="1" smtClean="0">
+                                      <a:latin typeface="Cambria Math" panose="02040503050406030204" pitchFamily="18" charset="0"/>
+                                    </a:rPr>
+                                  </m:ctrlPr>
+                                </m:dPr>
+                                <m:e>
+                                  <m:sSup>
+                                    <m:sSupPr>
+                                      <m:ctrlPr>
+                                        <a:rPr lang="en-US" altLang="ja-JP" sz="2400" i="1">
+                                          <a:latin typeface="Cambria Math" panose="02040503050406030204" pitchFamily="18" charset="0"/>
+                                        </a:rPr>
+                                      </m:ctrlPr>
+                                    </m:sSupPr>
+                                    <m:e>
+                                      <m:sSub>
+                                        <m:sSubPr>
+                                          <m:ctrlPr>
+                                            <a:rPr lang="en-US" altLang="ja-JP" sz="2400" i="1">
+                                              <a:latin typeface="Cambria Math" panose="02040503050406030204" pitchFamily="18" charset="0"/>
+                                            </a:rPr>
+                                          </m:ctrlPr>
+                                        </m:sSubPr>
+                                        <m:e>
+                                          <m:r>
+                                            <a:rPr lang="en-US" altLang="ja-JP" sz="2400" i="1">
+                                              <a:latin typeface="Cambria Math" panose="02040503050406030204" pitchFamily="18" charset="0"/>
+                                            </a:rPr>
+                                            <m:t>𝑞</m:t>
+                                          </m:r>
+                                        </m:e>
+                                        <m:sub>
+                                          <m:r>
+                                            <a:rPr lang="en-US" altLang="ja-JP" sz="2400" i="1">
+                                              <a:latin typeface="Cambria Math" panose="02040503050406030204" pitchFamily="18" charset="0"/>
+                                            </a:rPr>
+                                            <m:t>3</m:t>
+                                          </m:r>
+                                        </m:sub>
+                                      </m:sSub>
+                                    </m:e>
+                                    <m:sup>
+                                      <m:r>
+                                        <a:rPr lang="en-US" altLang="ja-JP" sz="2400" i="1">
+                                          <a:latin typeface="Cambria Math" panose="02040503050406030204" pitchFamily="18" charset="0"/>
+                                        </a:rPr>
+                                        <m:t>2</m:t>
+                                      </m:r>
+                                    </m:sup>
+                                  </m:sSup>
+                                  <m:r>
+                                    <a:rPr lang="en-US" altLang="ja-JP" sz="2400" i="1">
+                                      <a:latin typeface="Cambria Math" panose="02040503050406030204" pitchFamily="18" charset="0"/>
+                                    </a:rPr>
+                                    <m:t>−</m:t>
+                                  </m:r>
+                                  <m:sSup>
+                                    <m:sSupPr>
+                                      <m:ctrlPr>
+                                        <a:rPr lang="en-US" altLang="ja-JP" sz="2400" i="1">
+                                          <a:latin typeface="Cambria Math" panose="02040503050406030204" pitchFamily="18" charset="0"/>
+                                        </a:rPr>
+                                      </m:ctrlPr>
+                                    </m:sSupPr>
+                                    <m:e>
+                                      <m:sSub>
+                                        <m:sSubPr>
+                                          <m:ctrlPr>
+                                            <a:rPr lang="en-US" altLang="ja-JP" sz="2400" i="1">
+                                              <a:latin typeface="Cambria Math" panose="02040503050406030204" pitchFamily="18" charset="0"/>
+                                            </a:rPr>
+                                          </m:ctrlPr>
+                                        </m:sSubPr>
+                                        <m:e>
+                                          <m:r>
+                                            <a:rPr lang="en-US" altLang="ja-JP" sz="2400" i="1">
+                                              <a:latin typeface="Cambria Math" panose="02040503050406030204" pitchFamily="18" charset="0"/>
+                                            </a:rPr>
+                                            <m:t>𝑞</m:t>
+                                          </m:r>
+                                        </m:e>
+                                        <m:sub>
+                                          <m:r>
+                                            <a:rPr lang="en-US" altLang="ja-JP" sz="2400" i="1">
+                                              <a:latin typeface="Cambria Math" panose="02040503050406030204" pitchFamily="18" charset="0"/>
+                                            </a:rPr>
+                                            <m:t>1</m:t>
+                                          </m:r>
+                                        </m:sub>
+                                      </m:sSub>
+                                    </m:e>
+                                    <m:sup>
+                                      <m:r>
+                                        <a:rPr lang="en-US" altLang="ja-JP" sz="2400" i="1">
+                                          <a:latin typeface="Cambria Math" panose="02040503050406030204" pitchFamily="18" charset="0"/>
+                                        </a:rPr>
+                                        <m:t>2</m:t>
+                                      </m:r>
+                                    </m:sup>
+                                  </m:sSup>
+                                  <m:r>
+                                    <a:rPr lang="en-US" altLang="ja-JP" sz="2400" i="1">
+                                      <a:latin typeface="Cambria Math" panose="02040503050406030204" pitchFamily="18" charset="0"/>
+                                    </a:rPr>
+                                    <m:t>−</m:t>
+                                  </m:r>
+                                  <m:sSup>
+                                    <m:sSupPr>
+                                      <m:ctrlPr>
+                                        <a:rPr lang="en-US" altLang="ja-JP" sz="2400" i="1">
+                                          <a:latin typeface="Cambria Math" panose="02040503050406030204" pitchFamily="18" charset="0"/>
+                                        </a:rPr>
+                                      </m:ctrlPr>
+                                    </m:sSupPr>
+                                    <m:e>
+                                      <m:sSub>
+                                        <m:sSubPr>
+                                          <m:ctrlPr>
+                                            <a:rPr lang="en-US" altLang="ja-JP" sz="2400" i="1">
+                                              <a:latin typeface="Cambria Math" panose="02040503050406030204" pitchFamily="18" charset="0"/>
+                                            </a:rPr>
+                                          </m:ctrlPr>
+                                        </m:sSubPr>
+                                        <m:e>
+                                          <m:r>
+                                            <a:rPr lang="en-US" altLang="ja-JP" sz="2400" i="1">
+                                              <a:latin typeface="Cambria Math" panose="02040503050406030204" pitchFamily="18" charset="0"/>
+                                            </a:rPr>
+                                            <m:t>𝑞</m:t>
+                                          </m:r>
+                                        </m:e>
+                                        <m:sub>
+                                          <m:r>
+                                            <a:rPr lang="en-US" altLang="ja-JP" sz="2400" i="1">
+                                              <a:latin typeface="Cambria Math" panose="02040503050406030204" pitchFamily="18" charset="0"/>
+                                            </a:rPr>
+                                            <m:t>2</m:t>
+                                          </m:r>
+                                        </m:sub>
+                                      </m:sSub>
+                                    </m:e>
+                                    <m:sup>
+                                      <m:r>
+                                        <a:rPr lang="en-US" altLang="ja-JP" sz="2400" i="1">
+                                          <a:latin typeface="Cambria Math" panose="02040503050406030204" pitchFamily="18" charset="0"/>
+                                        </a:rPr>
+                                        <m:t>2</m:t>
+                                      </m:r>
+                                    </m:sup>
+                                  </m:sSup>
+                                  <m:r>
+                                    <a:rPr lang="en-US" altLang="ja-JP" sz="2400" i="1">
+                                      <a:latin typeface="Cambria Math" panose="02040503050406030204" pitchFamily="18" charset="0"/>
+                                    </a:rPr>
+                                    <m:t>+</m:t>
+                                  </m:r>
+                                  <m:sSup>
+                                    <m:sSupPr>
+                                      <m:ctrlPr>
+                                        <a:rPr lang="en-US" altLang="ja-JP" sz="2400" i="1">
+                                          <a:latin typeface="Cambria Math" panose="02040503050406030204" pitchFamily="18" charset="0"/>
+                                        </a:rPr>
+                                      </m:ctrlPr>
+                                    </m:sSupPr>
+                                    <m:e>
+                                      <m:sSub>
+                                        <m:sSubPr>
+                                          <m:ctrlPr>
+                                            <a:rPr lang="en-US" altLang="ja-JP" sz="2400" i="1">
+                                              <a:latin typeface="Cambria Math" panose="02040503050406030204" pitchFamily="18" charset="0"/>
+                                            </a:rPr>
+                                          </m:ctrlPr>
+                                        </m:sSubPr>
+                                        <m:e>
+                                          <m:r>
+                                            <a:rPr lang="en-US" altLang="ja-JP" sz="2400" i="1">
+                                              <a:latin typeface="Cambria Math" panose="02040503050406030204" pitchFamily="18" charset="0"/>
+                                            </a:rPr>
+                                            <m:t>𝑞</m:t>
+                                          </m:r>
+                                        </m:e>
+                                        <m:sub>
+                                          <m:r>
+                                            <a:rPr lang="en-US" altLang="ja-JP" sz="2400" i="1">
+                                              <a:latin typeface="Cambria Math" panose="02040503050406030204" pitchFamily="18" charset="0"/>
+                                            </a:rPr>
+                                            <m:t>4</m:t>
+                                          </m:r>
+                                        </m:sub>
+                                      </m:sSub>
+                                    </m:e>
+                                    <m:sup>
+                                      <m:r>
+                                        <a:rPr lang="en-US" altLang="ja-JP" sz="2400" i="1">
+                                          <a:latin typeface="Cambria Math" panose="02040503050406030204" pitchFamily="18" charset="0"/>
+                                        </a:rPr>
+                                        <m:t>2</m:t>
+                                      </m:r>
+                                    </m:sup>
+                                  </m:sSup>
+                                </m:e>
+                              </m:d>
+                              <m:r>
+                                <a:rPr lang="en-US" altLang="ja-JP" sz="2400" i="1">
+                                  <a:latin typeface="Cambria Math" panose="02040503050406030204" pitchFamily="18" charset="0"/>
+                                </a:rPr>
+                                <m:t>𝑔</m:t>
+                              </m:r>
+                            </m:e>
+                          </m:eqArr>
+                        </m:e>
+                      </m:d>
+                    </m:oMath>
+                  </m:oMathPara>
+                </a14:m>
+                <a:endParaRPr kumimoji="1" lang="ja-JP" altLang="en-US" sz="2400" dirty="0"/>
+              </a:p>
+            </p:txBody>
+          </p:sp>
+        </mc:Choice>
+        <mc:Fallback>
+          <p:sp>
+            <p:nvSpPr>
+              <p:cNvPr id="67" name="テキスト ボックス 66"/>
+              <p:cNvSpPr txBox="1">
+                <a:spLocks noRot="1" noChangeAspect="1" noMove="1" noResize="1" noEditPoints="1" noAdjustHandles="1" noChangeArrowheads="1" noChangeShapeType="1" noTextEdit="1"/>
+              </p:cNvSpPr>
+              <p:nvPr/>
+            </p:nvSpPr>
+            <p:spPr>
+              <a:xfrm>
+                <a:off x="3263847" y="4070157"/>
+                <a:ext cx="4556952" cy="1266180"/>
+              </a:xfrm>
+              <a:prstGeom prst="rect">
+                <a:avLst/>
+              </a:prstGeom>
+              <a:blipFill rotWithShape="0">
+                <a:blip r:embed="rId5"/>
+                <a:stretch>
+                  <a:fillRect/>
+                </a:stretch>
+              </a:blipFill>
+            </p:spPr>
+            <p:txBody>
+              <a:bodyPr/>
+              <a:lstStyle/>
+              <a:p>
+                <a:r>
+                  <a:rPr lang="ja-JP" altLang="en-US">
+                    <a:noFill/>
+                  </a:rPr>
+                  <a:t> </a:t>
+                </a:r>
+              </a:p>
+            </p:txBody>
+          </p:sp>
+        </mc:Fallback>
+      </mc:AlternateContent>
+      <p:sp>
+        <p:nvSpPr>
+          <p:cNvPr id="8" name="テキスト ボックス 7"/>
+          <p:cNvSpPr txBox="1"/>
+          <p:nvPr/>
+        </p:nvSpPr>
+        <p:spPr>
+          <a:xfrm>
+            <a:off x="2944438" y="4484178"/>
+            <a:ext cx="511679" cy="461665"/>
+          </a:xfrm>
+          <a:prstGeom prst="rect">
+            <a:avLst/>
+          </a:prstGeom>
+          <a:noFill/>
+        </p:spPr>
+        <p:txBody>
+          <a:bodyPr wrap="none" rtlCol="0">
+            <a:spAutoFit/>
+          </a:bodyPr>
+          <a:lstStyle/>
+          <a:p>
+            <a:r>
+              <a:rPr kumimoji="1" lang="en-US" altLang="ja-JP" sz="2400" dirty="0" smtClean="0">
+                <a:latin typeface="+mj-ea"/>
+                <a:ea typeface="+mj-ea"/>
+              </a:rPr>
+              <a:t>or</a:t>
+            </a:r>
+            <a:endParaRPr kumimoji="1" lang="ja-JP" altLang="en-US" sz="2400" dirty="0">
+              <a:latin typeface="+mj-ea"/>
+              <a:ea typeface="+mj-ea"/>
+            </a:endParaRPr>
+          </a:p>
+        </p:txBody>
+      </p:sp>
+    </p:spTree>
+    <p:extLst>
+      <p:ext uri="{BB962C8B-B14F-4D97-AF65-F5344CB8AC3E}">
+        <p14:creationId xmlns:p14="http://schemas.microsoft.com/office/powerpoint/2010/main" val="1270516871"/>
       </p:ext>
     </p:extLst>
   </p:cSld>

</xml_diff>

<commit_message>
add pic of Jacobian Matrix
</commit_message>
<xml_diff>
--- a/images/images_for_readme.pptx
+++ b/images/images_for_readme.pptx
@@ -5,7 +5,7 @@
     <p:sldMasterId id="2147483660" r:id="rId1"/>
   </p:sldMasterIdLst>
   <p:notesMasterIdLst>
-    <p:notesMasterId r:id="rId11"/>
+    <p:notesMasterId r:id="rId13"/>
   </p:notesMasterIdLst>
   <p:sldIdLst>
     <p:sldId id="523" r:id="rId2"/>
@@ -17,6 +17,8 @@
     <p:sldId id="524" r:id="rId8"/>
     <p:sldId id="525" r:id="rId9"/>
     <p:sldId id="526" r:id="rId10"/>
+    <p:sldId id="527" r:id="rId11"/>
+    <p:sldId id="528" r:id="rId12"/>
   </p:sldIdLst>
   <p:sldSz cx="9144000" cy="6858000" type="screen4x3"/>
   <p:notesSz cx="6797675" cy="9926638"/>
@@ -2996,6 +2998,3839 @@
 </p:sld>
 </file>
 
+<file path=ppt/slides/slide10.xml><?xml version="1.0" encoding="utf-8"?>
+<p:sld xmlns:a="http://schemas.openxmlformats.org/drawingml/2006/main" xmlns:r="http://schemas.openxmlformats.org/officeDocument/2006/relationships" xmlns:p="http://schemas.openxmlformats.org/presentationml/2006/main">
+  <p:cSld>
+    <p:spTree>
+      <p:nvGrpSpPr>
+        <p:cNvPr id="1" name=""/>
+        <p:cNvGrpSpPr/>
+        <p:nvPr/>
+      </p:nvGrpSpPr>
+      <p:grpSpPr>
+        <a:xfrm>
+          <a:off x="0" y="0"/>
+          <a:ext cx="0" cy="0"/>
+          <a:chOff x="0" y="0"/>
+          <a:chExt cx="0" cy="0"/>
+        </a:xfrm>
+      </p:grpSpPr>
+      <p:sp>
+        <p:nvSpPr>
+          <p:cNvPr id="2" name="タイトル 1"/>
+          <p:cNvSpPr>
+            <a:spLocks noGrp="1"/>
+          </p:cNvSpPr>
+          <p:nvPr>
+            <p:ph type="title"/>
+          </p:nvPr>
+        </p:nvSpPr>
+        <p:spPr/>
+        <p:txBody>
+          <a:bodyPr/>
+          <a:lstStyle/>
+          <a:p>
+            <a:r>
+              <a:rPr lang="en-US" altLang="ja-JP" dirty="0" smtClean="0"/>
+              <a:t>Equation of State</a:t>
+            </a:r>
+            <a:endParaRPr kumimoji="1" lang="ja-JP" altLang="en-US" dirty="0"/>
+          </a:p>
+        </p:txBody>
+      </p:sp>
+      <p:sp>
+        <p:nvSpPr>
+          <p:cNvPr id="4" name="角丸四角形 3"/>
+          <p:cNvSpPr/>
+          <p:nvPr/>
+        </p:nvSpPr>
+        <p:spPr bwMode="auto">
+          <a:xfrm>
+            <a:off x="539552" y="1340768"/>
+            <a:ext cx="7344816" cy="4392488"/>
+          </a:xfrm>
+          <a:prstGeom prst="roundRect">
+            <a:avLst>
+              <a:gd name="adj" fmla="val 7825"/>
+            </a:avLst>
+          </a:prstGeom>
+          <a:noFill/>
+          <a:ln w="63500" cap="flat" cmpd="sng" algn="ctr">
+            <a:solidFill>
+              <a:schemeClr val="tx1"/>
+            </a:solidFill>
+            <a:prstDash val="solid"/>
+            <a:round/>
+            <a:headEnd type="none" w="med" len="med"/>
+            <a:tailEnd type="none" w="med" len="med"/>
+          </a:ln>
+          <a:effectLst/>
+        </p:spPr>
+        <p:txBody>
+          <a:bodyPr vert="horz" wrap="none" lIns="91440" tIns="45720" rIns="91440" bIns="45720" numCol="1" rtlCol="0" anchor="ctr" anchorCtr="0" compatLnSpc="1">
+            <a:prstTxWarp prst="textNoShape">
+              <a:avLst/>
+            </a:prstTxWarp>
+          </a:bodyPr>
+          <a:lstStyle/>
+          <a:p>
+            <a:pPr marL="0" marR="0" indent="0" algn="l" defTabSz="914400" rtl="0" eaLnBrk="1" fontAlgn="base" latinLnBrk="0" hangingPunct="1">
+              <a:lnSpc>
+                <a:spcPct val="100000"/>
+              </a:lnSpc>
+              <a:spcBef>
+                <a:spcPct val="0"/>
+              </a:spcBef>
+              <a:spcAft>
+                <a:spcPct val="0"/>
+              </a:spcAft>
+              <a:buClrTx/>
+              <a:buSzTx/>
+              <a:buFontTx/>
+              <a:buNone/>
+              <a:tabLst/>
+            </a:pPr>
+            <a:endParaRPr kumimoji="1" lang="ja-JP" altLang="en-US" sz="2400" b="0" i="0" u="none" strike="noStrike" cap="none" normalizeH="0" baseline="0" smtClean="0">
+              <a:ln>
+                <a:noFill/>
+              </a:ln>
+              <a:solidFill>
+                <a:schemeClr val="tx1"/>
+              </a:solidFill>
+              <a:effectLst/>
+              <a:latin typeface="Times New Roman" pitchFamily="18" charset="0"/>
+              <a:ea typeface="ＭＳ Ｐゴシック" pitchFamily="50" charset="-128"/>
+            </a:endParaRPr>
+          </a:p>
+        </p:txBody>
+      </p:sp>
+      <p:sp>
+        <p:nvSpPr>
+          <p:cNvPr id="5" name="テキスト ボックス 4"/>
+          <p:cNvSpPr txBox="1"/>
+          <p:nvPr/>
+        </p:nvSpPr>
+        <p:spPr>
+          <a:xfrm>
+            <a:off x="2820841" y="1100844"/>
+            <a:ext cx="2782237" cy="461665"/>
+          </a:xfrm>
+          <a:prstGeom prst="rect">
+            <a:avLst/>
+          </a:prstGeom>
+          <a:solidFill>
+            <a:srgbClr val="FFFFFF"/>
+          </a:solidFill>
+        </p:spPr>
+        <p:txBody>
+          <a:bodyPr wrap="none" rtlCol="0">
+            <a:spAutoFit/>
+          </a:bodyPr>
+          <a:lstStyle/>
+          <a:p>
+            <a:r>
+              <a:rPr lang="en-US" altLang="ja-JP" sz="2400" dirty="0" smtClean="0">
+                <a:latin typeface="+mj-ea"/>
+                <a:ea typeface="+mj-ea"/>
+              </a:rPr>
+              <a:t>Equation of State</a:t>
+            </a:r>
+            <a:endParaRPr kumimoji="1" lang="ja-JP" altLang="en-US" sz="2400" dirty="0">
+              <a:latin typeface="+mj-ea"/>
+              <a:ea typeface="+mj-ea"/>
+            </a:endParaRPr>
+          </a:p>
+        </p:txBody>
+      </p:sp>
+      <mc:AlternateContent xmlns:mc="http://schemas.openxmlformats.org/markup-compatibility/2006">
+        <mc:Choice xmlns:a14="http://schemas.microsoft.com/office/drawing/2010/main" Requires="a14">
+          <p:sp>
+            <p:nvSpPr>
+              <p:cNvPr id="10" name="テキスト ボックス 9"/>
+              <p:cNvSpPr txBox="1"/>
+              <p:nvPr/>
+            </p:nvSpPr>
+            <p:spPr>
+              <a:xfrm>
+                <a:off x="783153" y="1662860"/>
+                <a:ext cx="2770566" cy="461665"/>
+              </a:xfrm>
+              <a:prstGeom prst="rect">
+                <a:avLst/>
+              </a:prstGeom>
+              <a:noFill/>
+            </p:spPr>
+            <p:txBody>
+              <a:bodyPr wrap="none" rtlCol="0">
+                <a:spAutoFit/>
+              </a:bodyPr>
+              <a:lstStyle/>
+              <a:p>
+                <a:pPr/>
+                <a14:m>
+                  <m:oMathPara xmlns:m="http://schemas.openxmlformats.org/officeDocument/2006/math">
+                    <m:oMathParaPr>
+                      <m:jc m:val="centerGroup"/>
+                    </m:oMathParaPr>
+                    <m:oMath xmlns:m="http://schemas.openxmlformats.org/officeDocument/2006/math">
+                      <m:sSub>
+                        <m:sSubPr>
+                          <m:ctrlPr>
+                            <a:rPr lang="en-US" altLang="ja-JP" sz="2400" i="1" smtClean="0">
+                              <a:latin typeface="Cambria Math" panose="02040503050406030204" pitchFamily="18" charset="0"/>
+                            </a:rPr>
+                          </m:ctrlPr>
+                        </m:sSubPr>
+                        <m:e>
+                          <m:r>
+                            <a:rPr lang="en-US" altLang="ja-JP" sz="2400" b="1" i="1" smtClean="0">
+                              <a:latin typeface="Cambria Math" panose="02040503050406030204" pitchFamily="18" charset="0"/>
+                            </a:rPr>
+                            <m:t>𝒙</m:t>
+                          </m:r>
+                        </m:e>
+                        <m:sub>
+                          <m:r>
+                            <a:rPr lang="en-US" altLang="ja-JP" sz="2400" b="0" i="1" smtClean="0">
+                              <a:latin typeface="Cambria Math" panose="02040503050406030204" pitchFamily="18" charset="0"/>
+                            </a:rPr>
+                            <m:t>𝑡</m:t>
+                          </m:r>
+                          <m:r>
+                            <a:rPr lang="en-US" altLang="ja-JP" sz="2400" b="0" i="1" smtClean="0">
+                              <a:latin typeface="Cambria Math" panose="02040503050406030204" pitchFamily="18" charset="0"/>
+                            </a:rPr>
+                            <m:t>+1</m:t>
+                          </m:r>
+                        </m:sub>
+                      </m:sSub>
+                      <m:r>
+                        <a:rPr lang="en-US" altLang="ja-JP" sz="2400" b="0" i="1" smtClean="0">
+                          <a:latin typeface="Cambria Math" panose="02040503050406030204" pitchFamily="18" charset="0"/>
+                        </a:rPr>
+                        <m:t>=</m:t>
+                      </m:r>
+                      <m:r>
+                        <a:rPr lang="en-US" altLang="ja-JP" sz="2400" b="1" i="1" smtClean="0">
+                          <a:latin typeface="Cambria Math" panose="02040503050406030204" pitchFamily="18" charset="0"/>
+                        </a:rPr>
+                        <m:t>𝒇</m:t>
+                      </m:r>
+                      <m:d>
+                        <m:dPr>
+                          <m:ctrlPr>
+                            <a:rPr lang="en-US" altLang="ja-JP" sz="2400" b="0" i="1" smtClean="0">
+                              <a:latin typeface="Cambria Math" panose="02040503050406030204" pitchFamily="18" charset="0"/>
+                            </a:rPr>
+                          </m:ctrlPr>
+                        </m:dPr>
+                        <m:e>
+                          <m:sSub>
+                            <m:sSubPr>
+                              <m:ctrlPr>
+                                <a:rPr lang="en-US" altLang="ja-JP" sz="2400" i="1">
+                                  <a:latin typeface="Cambria Math" panose="02040503050406030204" pitchFamily="18" charset="0"/>
+                                </a:rPr>
+                              </m:ctrlPr>
+                            </m:sSubPr>
+                            <m:e>
+                              <m:r>
+                                <a:rPr lang="en-US" altLang="ja-JP" sz="2400" b="1" i="1" smtClean="0">
+                                  <a:latin typeface="Cambria Math" panose="02040503050406030204" pitchFamily="18" charset="0"/>
+                                </a:rPr>
+                                <m:t>𝒙</m:t>
+                              </m:r>
+                            </m:e>
+                            <m:sub>
+                              <m:r>
+                                <a:rPr lang="en-US" altLang="ja-JP" sz="2400" i="1">
+                                  <a:latin typeface="Cambria Math" panose="02040503050406030204" pitchFamily="18" charset="0"/>
+                                </a:rPr>
+                                <m:t>𝑡</m:t>
+                              </m:r>
+                            </m:sub>
+                          </m:sSub>
+                        </m:e>
+                      </m:d>
+                      <m:r>
+                        <a:rPr lang="en-US" altLang="ja-JP" sz="2400" b="0" i="1" smtClean="0">
+                          <a:latin typeface="Cambria Math" panose="02040503050406030204" pitchFamily="18" charset="0"/>
+                        </a:rPr>
+                        <m:t>+</m:t>
+                      </m:r>
+                      <m:sSub>
+                        <m:sSubPr>
+                          <m:ctrlPr>
+                            <a:rPr lang="en-US" altLang="ja-JP" sz="2400" b="0" i="1" smtClean="0">
+                              <a:latin typeface="Cambria Math" panose="02040503050406030204" pitchFamily="18" charset="0"/>
+                            </a:rPr>
+                          </m:ctrlPr>
+                        </m:sSubPr>
+                        <m:e>
+                          <m:r>
+                            <a:rPr lang="en-US" altLang="ja-JP" sz="2400" b="1" i="1" smtClean="0">
+                              <a:latin typeface="Cambria Math" panose="02040503050406030204" pitchFamily="18" charset="0"/>
+                            </a:rPr>
+                            <m:t>𝒘</m:t>
+                          </m:r>
+                        </m:e>
+                        <m:sub>
+                          <m:r>
+                            <a:rPr lang="en-US" altLang="ja-JP" sz="2400" b="0" i="1" smtClean="0">
+                              <a:latin typeface="Cambria Math" panose="02040503050406030204" pitchFamily="18" charset="0"/>
+                            </a:rPr>
+                            <m:t>𝑡</m:t>
+                          </m:r>
+                        </m:sub>
+                      </m:sSub>
+                    </m:oMath>
+                  </m:oMathPara>
+                </a14:m>
+                <a:endParaRPr kumimoji="1" lang="ja-JP" altLang="en-US" sz="2400" dirty="0"/>
+              </a:p>
+            </p:txBody>
+          </p:sp>
+        </mc:Choice>
+        <mc:Fallback>
+          <p:sp>
+            <p:nvSpPr>
+              <p:cNvPr id="10" name="テキスト ボックス 9"/>
+              <p:cNvSpPr txBox="1">
+                <a:spLocks noRot="1" noChangeAspect="1" noMove="1" noResize="1" noEditPoints="1" noAdjustHandles="1" noChangeArrowheads="1" noChangeShapeType="1" noTextEdit="1"/>
+              </p:cNvSpPr>
+              <p:nvPr/>
+            </p:nvSpPr>
+            <p:spPr>
+              <a:xfrm>
+                <a:off x="783153" y="1662860"/>
+                <a:ext cx="2770566" cy="461665"/>
+              </a:xfrm>
+              <a:prstGeom prst="rect">
+                <a:avLst/>
+              </a:prstGeom>
+              <a:blipFill rotWithShape="0">
+                <a:blip r:embed="rId2"/>
+                <a:stretch>
+                  <a:fillRect b="-17105"/>
+                </a:stretch>
+              </a:blipFill>
+            </p:spPr>
+            <p:txBody>
+              <a:bodyPr/>
+              <a:lstStyle/>
+              <a:p>
+                <a:r>
+                  <a:rPr lang="ja-JP" altLang="en-US">
+                    <a:noFill/>
+                  </a:rPr>
+                  <a:t> </a:t>
+                </a:r>
+              </a:p>
+            </p:txBody>
+          </p:sp>
+        </mc:Fallback>
+      </mc:AlternateContent>
+      <mc:AlternateContent xmlns:mc="http://schemas.openxmlformats.org/markup-compatibility/2006">
+        <mc:Choice xmlns:a14="http://schemas.microsoft.com/office/drawing/2010/main" Requires="a14">
+          <p:sp>
+            <p:nvSpPr>
+              <p:cNvPr id="45" name="テキスト ボックス 44"/>
+              <p:cNvSpPr txBox="1"/>
+              <p:nvPr/>
+            </p:nvSpPr>
+            <p:spPr>
+              <a:xfrm>
+                <a:off x="1069009" y="2133616"/>
+                <a:ext cx="2438103" cy="461665"/>
+              </a:xfrm>
+              <a:prstGeom prst="rect">
+                <a:avLst/>
+              </a:prstGeom>
+              <a:noFill/>
+            </p:spPr>
+            <p:txBody>
+              <a:bodyPr wrap="none" rtlCol="0">
+                <a:spAutoFit/>
+              </a:bodyPr>
+              <a:lstStyle/>
+              <a:p>
+                <a:pPr/>
+                <a14:m>
+                  <m:oMathPara xmlns:m="http://schemas.openxmlformats.org/officeDocument/2006/math">
+                    <m:oMathParaPr>
+                      <m:jc m:val="centerGroup"/>
+                    </m:oMathParaPr>
+                    <m:oMath xmlns:m="http://schemas.openxmlformats.org/officeDocument/2006/math">
+                      <m:sSub>
+                        <m:sSubPr>
+                          <m:ctrlPr>
+                            <a:rPr lang="en-US" altLang="ja-JP" sz="2400" i="1" smtClean="0">
+                              <a:latin typeface="Cambria Math" panose="02040503050406030204" pitchFamily="18" charset="0"/>
+                            </a:rPr>
+                          </m:ctrlPr>
+                        </m:sSubPr>
+                        <m:e>
+                          <m:r>
+                            <a:rPr lang="en-US" altLang="ja-JP" sz="2400" b="1" i="1" smtClean="0">
+                              <a:latin typeface="Cambria Math" panose="02040503050406030204" pitchFamily="18" charset="0"/>
+                            </a:rPr>
+                            <m:t>𝒚</m:t>
+                          </m:r>
+                        </m:e>
+                        <m:sub>
+                          <m:r>
+                            <a:rPr lang="en-US" altLang="ja-JP" sz="2400" b="0" i="1" smtClean="0">
+                              <a:latin typeface="Cambria Math" panose="02040503050406030204" pitchFamily="18" charset="0"/>
+                            </a:rPr>
+                            <m:t>𝑡</m:t>
+                          </m:r>
+                        </m:sub>
+                      </m:sSub>
+                      <m:r>
+                        <a:rPr lang="en-US" altLang="ja-JP" sz="2400" b="0" i="1" smtClean="0">
+                          <a:latin typeface="Cambria Math" panose="02040503050406030204" pitchFamily="18" charset="0"/>
+                        </a:rPr>
+                        <m:t>=</m:t>
+                      </m:r>
+                      <m:r>
+                        <a:rPr lang="en-US" altLang="ja-JP" sz="2400" b="1" i="1" smtClean="0">
+                          <a:latin typeface="Cambria Math" panose="02040503050406030204" pitchFamily="18" charset="0"/>
+                        </a:rPr>
+                        <m:t>𝒉</m:t>
+                      </m:r>
+                      <m:d>
+                        <m:dPr>
+                          <m:ctrlPr>
+                            <a:rPr lang="en-US" altLang="ja-JP" sz="2400" b="0" i="1" smtClean="0">
+                              <a:latin typeface="Cambria Math" panose="02040503050406030204" pitchFamily="18" charset="0"/>
+                            </a:rPr>
+                          </m:ctrlPr>
+                        </m:dPr>
+                        <m:e>
+                          <m:sSub>
+                            <m:sSubPr>
+                              <m:ctrlPr>
+                                <a:rPr lang="en-US" altLang="ja-JP" sz="2400" i="1">
+                                  <a:latin typeface="Cambria Math" panose="02040503050406030204" pitchFamily="18" charset="0"/>
+                                </a:rPr>
+                              </m:ctrlPr>
+                            </m:sSubPr>
+                            <m:e>
+                              <m:r>
+                                <a:rPr lang="en-US" altLang="ja-JP" sz="2400" b="1" i="1" smtClean="0">
+                                  <a:latin typeface="Cambria Math" panose="02040503050406030204" pitchFamily="18" charset="0"/>
+                                </a:rPr>
+                                <m:t>𝒙</m:t>
+                              </m:r>
+                            </m:e>
+                            <m:sub>
+                              <m:r>
+                                <a:rPr lang="en-US" altLang="ja-JP" sz="2400" i="1">
+                                  <a:latin typeface="Cambria Math" panose="02040503050406030204" pitchFamily="18" charset="0"/>
+                                </a:rPr>
+                                <m:t>𝑡</m:t>
+                              </m:r>
+                            </m:sub>
+                          </m:sSub>
+                        </m:e>
+                      </m:d>
+                      <m:r>
+                        <a:rPr lang="en-US" altLang="ja-JP" sz="2400" b="0" i="1" smtClean="0">
+                          <a:latin typeface="Cambria Math" panose="02040503050406030204" pitchFamily="18" charset="0"/>
+                        </a:rPr>
+                        <m:t>+</m:t>
+                      </m:r>
+                      <m:sSub>
+                        <m:sSubPr>
+                          <m:ctrlPr>
+                            <a:rPr lang="en-US" altLang="ja-JP" sz="2400" b="0" i="1" smtClean="0">
+                              <a:latin typeface="Cambria Math" panose="02040503050406030204" pitchFamily="18" charset="0"/>
+                            </a:rPr>
+                          </m:ctrlPr>
+                        </m:sSubPr>
+                        <m:e>
+                          <m:r>
+                            <a:rPr lang="ja-JP" altLang="en-US" sz="2400" b="1" i="1" smtClean="0">
+                              <a:latin typeface="Cambria Math" panose="02040503050406030204" pitchFamily="18" charset="0"/>
+                            </a:rPr>
+                            <m:t>𝝂</m:t>
+                          </m:r>
+                        </m:e>
+                        <m:sub>
+                          <m:r>
+                            <a:rPr lang="en-US" altLang="ja-JP" sz="2400" b="0" i="1" smtClean="0">
+                              <a:latin typeface="Cambria Math" panose="02040503050406030204" pitchFamily="18" charset="0"/>
+                            </a:rPr>
+                            <m:t>𝑡</m:t>
+                          </m:r>
+                        </m:sub>
+                      </m:sSub>
+                    </m:oMath>
+                  </m:oMathPara>
+                </a14:m>
+                <a:endParaRPr kumimoji="1" lang="ja-JP" altLang="en-US" sz="2400" dirty="0"/>
+              </a:p>
+            </p:txBody>
+          </p:sp>
+        </mc:Choice>
+        <mc:Fallback>
+          <p:sp>
+            <p:nvSpPr>
+              <p:cNvPr id="45" name="テキスト ボックス 44"/>
+              <p:cNvSpPr txBox="1">
+                <a:spLocks noRot="1" noChangeAspect="1" noMove="1" noResize="1" noEditPoints="1" noAdjustHandles="1" noChangeArrowheads="1" noChangeShapeType="1" noTextEdit="1"/>
+              </p:cNvSpPr>
+              <p:nvPr/>
+            </p:nvSpPr>
+            <p:spPr>
+              <a:xfrm>
+                <a:off x="1069009" y="2133616"/>
+                <a:ext cx="2438103" cy="461665"/>
+              </a:xfrm>
+              <a:prstGeom prst="rect">
+                <a:avLst/>
+              </a:prstGeom>
+              <a:blipFill rotWithShape="0">
+                <a:blip r:embed="rId3"/>
+                <a:stretch>
+                  <a:fillRect b="-10526"/>
+                </a:stretch>
+              </a:blipFill>
+            </p:spPr>
+            <p:txBody>
+              <a:bodyPr/>
+              <a:lstStyle/>
+              <a:p>
+                <a:r>
+                  <a:rPr lang="ja-JP" altLang="en-US">
+                    <a:noFill/>
+                  </a:rPr>
+                  <a:t> </a:t>
+                </a:r>
+              </a:p>
+            </p:txBody>
+          </p:sp>
+        </mc:Fallback>
+      </mc:AlternateContent>
+      <mc:AlternateContent xmlns:mc="http://schemas.openxmlformats.org/markup-compatibility/2006">
+        <mc:Choice xmlns:a14="http://schemas.microsoft.com/office/drawing/2010/main" Requires="a14">
+          <p:sp>
+            <p:nvSpPr>
+              <p:cNvPr id="59" name="テキスト ボックス 58"/>
+              <p:cNvSpPr txBox="1"/>
+              <p:nvPr/>
+            </p:nvSpPr>
+            <p:spPr>
+              <a:xfrm>
+                <a:off x="3710830" y="1687917"/>
+                <a:ext cx="1903470" cy="461665"/>
+              </a:xfrm>
+              <a:prstGeom prst="rect">
+                <a:avLst/>
+              </a:prstGeom>
+              <a:noFill/>
+            </p:spPr>
+            <p:txBody>
+              <a:bodyPr wrap="none" rtlCol="0">
+                <a:spAutoFit/>
+              </a:bodyPr>
+              <a:lstStyle/>
+              <a:p>
+                <a:pPr/>
+                <a14:m>
+                  <m:oMathPara xmlns:m="http://schemas.openxmlformats.org/officeDocument/2006/math">
+                    <m:oMathParaPr>
+                      <m:jc m:val="centerGroup"/>
+                    </m:oMathParaPr>
+                    <m:oMath xmlns:m="http://schemas.openxmlformats.org/officeDocument/2006/math">
+                      <m:r>
+                        <a:rPr lang="en-US" altLang="ja-JP" sz="2400" b="0" i="1" smtClean="0">
+                          <a:latin typeface="Cambria Math" panose="02040503050406030204" pitchFamily="18" charset="0"/>
+                        </a:rPr>
+                        <m:t>𝐸</m:t>
+                      </m:r>
+                      <m:d>
+                        <m:dPr>
+                          <m:begChr m:val="["/>
+                          <m:endChr m:val="]"/>
+                          <m:ctrlPr>
+                            <a:rPr lang="en-US" altLang="ja-JP" sz="2400" b="0" i="1" smtClean="0">
+                              <a:latin typeface="Cambria Math" panose="02040503050406030204" pitchFamily="18" charset="0"/>
+                            </a:rPr>
+                          </m:ctrlPr>
+                        </m:dPr>
+                        <m:e>
+                          <m:sSup>
+                            <m:sSupPr>
+                              <m:ctrlPr>
+                                <a:rPr lang="en-US" altLang="ja-JP" sz="2400" i="1" smtClean="0">
+                                  <a:latin typeface="Cambria Math" panose="02040503050406030204" pitchFamily="18" charset="0"/>
+                                </a:rPr>
+                              </m:ctrlPr>
+                            </m:sSupPr>
+                            <m:e>
+                              <m:sSub>
+                                <m:sSubPr>
+                                  <m:ctrlPr>
+                                    <a:rPr lang="en-US" altLang="ja-JP" sz="2400" i="1">
+                                      <a:latin typeface="Cambria Math" panose="02040503050406030204" pitchFamily="18" charset="0"/>
+                                    </a:rPr>
+                                  </m:ctrlPr>
+                                </m:sSubPr>
+                                <m:e>
+                                  <m:r>
+                                    <a:rPr lang="en-US" altLang="ja-JP" sz="2400" b="1" i="1">
+                                      <a:latin typeface="Cambria Math" panose="02040503050406030204" pitchFamily="18" charset="0"/>
+                                    </a:rPr>
+                                    <m:t>𝒘</m:t>
+                                  </m:r>
+                                </m:e>
+                                <m:sub>
+                                  <m:r>
+                                    <a:rPr lang="en-US" altLang="ja-JP" sz="2400" i="1">
+                                      <a:latin typeface="Cambria Math" panose="02040503050406030204" pitchFamily="18" charset="0"/>
+                                    </a:rPr>
+                                    <m:t>𝑡</m:t>
+                                  </m:r>
+                                </m:sub>
+                              </m:sSub>
+                            </m:e>
+                            <m:sup>
+                              <m:r>
+                                <a:rPr lang="en-US" altLang="ja-JP" sz="2400" b="0" i="1" smtClean="0">
+                                  <a:latin typeface="Cambria Math" panose="02040503050406030204" pitchFamily="18" charset="0"/>
+                                </a:rPr>
+                                <m:t>2</m:t>
+                              </m:r>
+                            </m:sup>
+                          </m:sSup>
+                        </m:e>
+                      </m:d>
+                      <m:r>
+                        <a:rPr lang="en-US" altLang="ja-JP" sz="2400" b="0" i="1" smtClean="0">
+                          <a:latin typeface="Cambria Math" panose="02040503050406030204" pitchFamily="18" charset="0"/>
+                        </a:rPr>
+                        <m:t>=</m:t>
+                      </m:r>
+                      <m:r>
+                        <a:rPr lang="en-US" altLang="ja-JP" sz="2400" b="1" i="1" smtClean="0">
+                          <a:latin typeface="Cambria Math" panose="02040503050406030204" pitchFamily="18" charset="0"/>
+                        </a:rPr>
+                        <m:t>𝑸</m:t>
+                      </m:r>
+                    </m:oMath>
+                  </m:oMathPara>
+                </a14:m>
+                <a:endParaRPr kumimoji="1" lang="ja-JP" altLang="en-US" sz="2400" b="1" dirty="0"/>
+              </a:p>
+            </p:txBody>
+          </p:sp>
+        </mc:Choice>
+        <mc:Fallback>
+          <p:sp>
+            <p:nvSpPr>
+              <p:cNvPr id="59" name="テキスト ボックス 58"/>
+              <p:cNvSpPr txBox="1">
+                <a:spLocks noRot="1" noChangeAspect="1" noMove="1" noResize="1" noEditPoints="1" noAdjustHandles="1" noChangeArrowheads="1" noChangeShapeType="1" noTextEdit="1"/>
+              </p:cNvSpPr>
+              <p:nvPr/>
+            </p:nvSpPr>
+            <p:spPr>
+              <a:xfrm>
+                <a:off x="3710830" y="1687917"/>
+                <a:ext cx="1903470" cy="461665"/>
+              </a:xfrm>
+              <a:prstGeom prst="rect">
+                <a:avLst/>
+              </a:prstGeom>
+              <a:blipFill rotWithShape="0">
+                <a:blip r:embed="rId4"/>
+                <a:stretch>
+                  <a:fillRect b="-11842"/>
+                </a:stretch>
+              </a:blipFill>
+            </p:spPr>
+            <p:txBody>
+              <a:bodyPr/>
+              <a:lstStyle/>
+              <a:p>
+                <a:r>
+                  <a:rPr lang="ja-JP" altLang="en-US">
+                    <a:noFill/>
+                  </a:rPr>
+                  <a:t> </a:t>
+                </a:r>
+              </a:p>
+            </p:txBody>
+          </p:sp>
+        </mc:Fallback>
+      </mc:AlternateContent>
+      <mc:AlternateContent xmlns:mc="http://schemas.openxmlformats.org/markup-compatibility/2006">
+        <mc:Choice xmlns:a14="http://schemas.microsoft.com/office/drawing/2010/main" Requires="a14">
+          <p:sp>
+            <p:nvSpPr>
+              <p:cNvPr id="63" name="テキスト ボックス 62"/>
+              <p:cNvSpPr txBox="1"/>
+              <p:nvPr/>
+            </p:nvSpPr>
+            <p:spPr>
+              <a:xfrm>
+                <a:off x="3710830" y="2159955"/>
+                <a:ext cx="1824923" cy="461665"/>
+              </a:xfrm>
+              <a:prstGeom prst="rect">
+                <a:avLst/>
+              </a:prstGeom>
+              <a:noFill/>
+            </p:spPr>
+            <p:txBody>
+              <a:bodyPr wrap="none" rtlCol="0">
+                <a:spAutoFit/>
+              </a:bodyPr>
+              <a:lstStyle/>
+              <a:p>
+                <a:pPr/>
+                <a14:m>
+                  <m:oMathPara xmlns:m="http://schemas.openxmlformats.org/officeDocument/2006/math">
+                    <m:oMathParaPr>
+                      <m:jc m:val="centerGroup"/>
+                    </m:oMathParaPr>
+                    <m:oMath xmlns:m="http://schemas.openxmlformats.org/officeDocument/2006/math">
+                      <m:r>
+                        <a:rPr lang="en-US" altLang="ja-JP" sz="2400" b="0" i="1" smtClean="0">
+                          <a:latin typeface="Cambria Math" panose="02040503050406030204" pitchFamily="18" charset="0"/>
+                        </a:rPr>
+                        <m:t>𝐸</m:t>
+                      </m:r>
+                      <m:d>
+                        <m:dPr>
+                          <m:begChr m:val="["/>
+                          <m:endChr m:val="]"/>
+                          <m:ctrlPr>
+                            <a:rPr lang="en-US" altLang="ja-JP" sz="2400" b="0" i="1" smtClean="0">
+                              <a:latin typeface="Cambria Math" panose="02040503050406030204" pitchFamily="18" charset="0"/>
+                            </a:rPr>
+                          </m:ctrlPr>
+                        </m:dPr>
+                        <m:e>
+                          <m:sSup>
+                            <m:sSupPr>
+                              <m:ctrlPr>
+                                <a:rPr lang="en-US" altLang="ja-JP" sz="2400" i="1" smtClean="0">
+                                  <a:latin typeface="Cambria Math" panose="02040503050406030204" pitchFamily="18" charset="0"/>
+                                </a:rPr>
+                              </m:ctrlPr>
+                            </m:sSupPr>
+                            <m:e>
+                              <m:sSub>
+                                <m:sSubPr>
+                                  <m:ctrlPr>
+                                    <a:rPr lang="en-US" altLang="ja-JP" sz="2400" i="1">
+                                      <a:latin typeface="Cambria Math" panose="02040503050406030204" pitchFamily="18" charset="0"/>
+                                    </a:rPr>
+                                  </m:ctrlPr>
+                                </m:sSubPr>
+                                <m:e>
+                                  <m:r>
+                                    <a:rPr lang="ja-JP" altLang="en-US" sz="2400" b="1" i="1">
+                                      <a:latin typeface="Cambria Math" panose="02040503050406030204" pitchFamily="18" charset="0"/>
+                                    </a:rPr>
+                                    <m:t>𝝂</m:t>
+                                  </m:r>
+                                </m:e>
+                                <m:sub>
+                                  <m:r>
+                                    <a:rPr lang="en-US" altLang="ja-JP" sz="2400" i="1">
+                                      <a:latin typeface="Cambria Math" panose="02040503050406030204" pitchFamily="18" charset="0"/>
+                                    </a:rPr>
+                                    <m:t>𝑡</m:t>
+                                  </m:r>
+                                </m:sub>
+                              </m:sSub>
+                            </m:e>
+                            <m:sup>
+                              <m:r>
+                                <a:rPr lang="en-US" altLang="ja-JP" sz="2400" b="0" i="1" smtClean="0">
+                                  <a:latin typeface="Cambria Math" panose="02040503050406030204" pitchFamily="18" charset="0"/>
+                                </a:rPr>
+                                <m:t>2</m:t>
+                              </m:r>
+                            </m:sup>
+                          </m:sSup>
+                        </m:e>
+                      </m:d>
+                      <m:r>
+                        <a:rPr lang="en-US" altLang="ja-JP" sz="2400" b="0" i="1" smtClean="0">
+                          <a:latin typeface="Cambria Math" panose="02040503050406030204" pitchFamily="18" charset="0"/>
+                        </a:rPr>
+                        <m:t>=</m:t>
+                      </m:r>
+                      <m:r>
+                        <a:rPr lang="en-US" altLang="ja-JP" sz="2400" b="1" i="1" smtClean="0">
+                          <a:latin typeface="Cambria Math" panose="02040503050406030204" pitchFamily="18" charset="0"/>
+                        </a:rPr>
+                        <m:t>𝑹</m:t>
+                      </m:r>
+                    </m:oMath>
+                  </m:oMathPara>
+                </a14:m>
+                <a:endParaRPr kumimoji="1" lang="ja-JP" altLang="en-US" sz="2400" b="1" dirty="0"/>
+              </a:p>
+            </p:txBody>
+          </p:sp>
+        </mc:Choice>
+        <mc:Fallback>
+          <p:sp>
+            <p:nvSpPr>
+              <p:cNvPr id="63" name="テキスト ボックス 62"/>
+              <p:cNvSpPr txBox="1">
+                <a:spLocks noRot="1" noChangeAspect="1" noMove="1" noResize="1" noEditPoints="1" noAdjustHandles="1" noChangeArrowheads="1" noChangeShapeType="1" noTextEdit="1"/>
+              </p:cNvSpPr>
+              <p:nvPr/>
+            </p:nvSpPr>
+            <p:spPr>
+              <a:xfrm>
+                <a:off x="3710830" y="2159955"/>
+                <a:ext cx="1824923" cy="461665"/>
+              </a:xfrm>
+              <a:prstGeom prst="rect">
+                <a:avLst/>
+              </a:prstGeom>
+              <a:blipFill rotWithShape="0">
+                <a:blip r:embed="rId5"/>
+                <a:stretch>
+                  <a:fillRect b="-1316"/>
+                </a:stretch>
+              </a:blipFill>
+            </p:spPr>
+            <p:txBody>
+              <a:bodyPr/>
+              <a:lstStyle/>
+              <a:p>
+                <a:r>
+                  <a:rPr lang="ja-JP" altLang="en-US">
+                    <a:noFill/>
+                  </a:rPr>
+                  <a:t> </a:t>
+                </a:r>
+              </a:p>
+            </p:txBody>
+          </p:sp>
+        </mc:Fallback>
+      </mc:AlternateContent>
+      <p:sp>
+        <p:nvSpPr>
+          <p:cNvPr id="6" name="大かっこ 5"/>
+          <p:cNvSpPr/>
+          <p:nvPr/>
+        </p:nvSpPr>
+        <p:spPr bwMode="auto">
+          <a:xfrm>
+            <a:off x="3781620" y="1725083"/>
+            <a:ext cx="1750667" cy="908700"/>
+          </a:xfrm>
+          <a:prstGeom prst="bracketPair">
+            <a:avLst/>
+          </a:prstGeom>
+          <a:noFill/>
+          <a:ln w="31750" cap="flat" cmpd="sng" algn="ctr">
+            <a:solidFill>
+              <a:schemeClr val="tx1"/>
+            </a:solidFill>
+            <a:prstDash val="solid"/>
+            <a:round/>
+            <a:headEnd type="none" w="med" len="med"/>
+            <a:tailEnd type="none" w="med" len="med"/>
+          </a:ln>
+          <a:effectLst/>
+        </p:spPr>
+        <p:txBody>
+          <a:bodyPr vert="horz" wrap="none" lIns="91440" tIns="45720" rIns="91440" bIns="45720" numCol="1" rtlCol="0" anchor="ctr" anchorCtr="0" compatLnSpc="1">
+            <a:prstTxWarp prst="textNoShape">
+              <a:avLst/>
+            </a:prstTxWarp>
+          </a:bodyPr>
+          <a:lstStyle/>
+          <a:p>
+            <a:pPr marL="0" marR="0" indent="0" algn="l" defTabSz="914400" rtl="0" eaLnBrk="1" fontAlgn="base" latinLnBrk="0" hangingPunct="1">
+              <a:lnSpc>
+                <a:spcPct val="100000"/>
+              </a:lnSpc>
+              <a:spcBef>
+                <a:spcPct val="0"/>
+              </a:spcBef>
+              <a:spcAft>
+                <a:spcPct val="0"/>
+              </a:spcAft>
+              <a:buClrTx/>
+              <a:buSzTx/>
+              <a:buFontTx/>
+              <a:buNone/>
+              <a:tabLst/>
+            </a:pPr>
+            <a:endParaRPr kumimoji="1" lang="ja-JP" altLang="en-US" sz="2400" b="0" i="0" u="none" strike="noStrike" cap="none" normalizeH="0" baseline="0" smtClean="0">
+              <a:ln>
+                <a:noFill/>
+              </a:ln>
+              <a:solidFill>
+                <a:schemeClr val="tx1"/>
+              </a:solidFill>
+              <a:effectLst/>
+              <a:latin typeface="Times New Roman" pitchFamily="18" charset="0"/>
+              <a:ea typeface="ＭＳ Ｐゴシック" pitchFamily="50" charset="-128"/>
+            </a:endParaRPr>
+          </a:p>
+        </p:txBody>
+      </p:sp>
+      <mc:AlternateContent xmlns:mc="http://schemas.openxmlformats.org/markup-compatibility/2006">
+        <mc:Choice xmlns:a14="http://schemas.microsoft.com/office/drawing/2010/main" Requires="a14">
+          <p:sp>
+            <p:nvSpPr>
+              <p:cNvPr id="7" name="正方形/長方形 6"/>
+              <p:cNvSpPr/>
+              <p:nvPr/>
+            </p:nvSpPr>
+            <p:spPr>
+              <a:xfrm>
+                <a:off x="783153" y="2922636"/>
+                <a:ext cx="1352934" cy="1112805"/>
+              </a:xfrm>
+              <a:prstGeom prst="rect">
+                <a:avLst/>
+              </a:prstGeom>
+            </p:spPr>
+            <p:txBody>
+              <a:bodyPr wrap="none">
+                <a:spAutoFit/>
+              </a:bodyPr>
+              <a:lstStyle/>
+              <a:p>
+                <a14:m>
+                  <m:oMathPara xmlns:m="http://schemas.openxmlformats.org/officeDocument/2006/math">
+                    <m:oMathParaPr>
+                      <m:jc m:val="centerGroup"/>
+                    </m:oMathParaPr>
+                    <m:oMath xmlns:m="http://schemas.openxmlformats.org/officeDocument/2006/math">
+                      <m:sSub>
+                        <m:sSubPr>
+                          <m:ctrlPr>
+                            <a:rPr lang="en-US" altLang="ja-JP" i="1" smtClean="0">
+                              <a:latin typeface="Cambria Math" panose="02040503050406030204" pitchFamily="18" charset="0"/>
+                            </a:rPr>
+                          </m:ctrlPr>
+                        </m:sSubPr>
+                        <m:e>
+                          <m:r>
+                            <a:rPr lang="en-US" altLang="ja-JP" b="1" i="1">
+                              <a:latin typeface="Cambria Math" panose="02040503050406030204" pitchFamily="18" charset="0"/>
+                            </a:rPr>
+                            <m:t>𝒙</m:t>
+                          </m:r>
+                        </m:e>
+                        <m:sub>
+                          <m:r>
+                            <a:rPr lang="en-US" altLang="ja-JP" i="1">
+                              <a:latin typeface="Cambria Math" panose="02040503050406030204" pitchFamily="18" charset="0"/>
+                            </a:rPr>
+                            <m:t>𝑡</m:t>
+                          </m:r>
+                        </m:sub>
+                      </m:sSub>
+                      <m:r>
+                        <a:rPr lang="en-US" altLang="ja-JP" b="0" i="1" smtClean="0">
+                          <a:latin typeface="Cambria Math" panose="02040503050406030204" pitchFamily="18" charset="0"/>
+                        </a:rPr>
+                        <m:t>=</m:t>
+                      </m:r>
+                      <m:d>
+                        <m:dPr>
+                          <m:begChr m:val="["/>
+                          <m:endChr m:val="]"/>
+                          <m:ctrlPr>
+                            <a:rPr lang="en-US" altLang="ja-JP" i="1">
+                              <a:latin typeface="Cambria Math" panose="02040503050406030204" pitchFamily="18" charset="0"/>
+                            </a:rPr>
+                          </m:ctrlPr>
+                        </m:dPr>
+                        <m:e>
+                          <m:eqArr>
+                            <m:eqArrPr>
+                              <m:ctrlPr>
+                                <a:rPr lang="en-US" altLang="ja-JP" i="1">
+                                  <a:latin typeface="Cambria Math" panose="02040503050406030204" pitchFamily="18" charset="0"/>
+                                </a:rPr>
+                              </m:ctrlPr>
+                            </m:eqArrPr>
+                            <m:e>
+                              <m:sSub>
+                                <m:sSubPr>
+                                  <m:ctrlPr>
+                                    <a:rPr lang="en-US" altLang="ja-JP" i="1">
+                                      <a:latin typeface="Cambria Math" panose="02040503050406030204" pitchFamily="18" charset="0"/>
+                                    </a:rPr>
+                                  </m:ctrlPr>
+                                </m:sSubPr>
+                                <m:e>
+                                  <m:r>
+                                    <a:rPr lang="en-US" altLang="ja-JP" i="1">
+                                      <a:latin typeface="Cambria Math" panose="02040503050406030204" pitchFamily="18" charset="0"/>
+                                    </a:rPr>
+                                    <m:t>𝑞</m:t>
+                                  </m:r>
+                                </m:e>
+                                <m:sub>
+                                  <m:r>
+                                    <a:rPr lang="en-US" altLang="ja-JP" i="1">
+                                      <a:latin typeface="Cambria Math" panose="02040503050406030204" pitchFamily="18" charset="0"/>
+                                    </a:rPr>
+                                    <m:t>1</m:t>
+                                  </m:r>
+                                  <m:r>
+                                    <a:rPr lang="en-US" altLang="ja-JP" i="1">
+                                      <a:latin typeface="Cambria Math" panose="02040503050406030204" pitchFamily="18" charset="0"/>
+                                    </a:rPr>
+                                    <m:t>𝑡</m:t>
+                                  </m:r>
+                                </m:sub>
+                              </m:sSub>
+                            </m:e>
+                            <m:e>
+                              <m:sSub>
+                                <m:sSubPr>
+                                  <m:ctrlPr>
+                                    <a:rPr lang="en-US" altLang="ja-JP" i="1">
+                                      <a:latin typeface="Cambria Math" panose="02040503050406030204" pitchFamily="18" charset="0"/>
+                                    </a:rPr>
+                                  </m:ctrlPr>
+                                </m:sSubPr>
+                                <m:e>
+                                  <m:r>
+                                    <a:rPr lang="en-US" altLang="ja-JP" i="1">
+                                      <a:latin typeface="Cambria Math" panose="02040503050406030204" pitchFamily="18" charset="0"/>
+                                    </a:rPr>
+                                    <m:t>𝑞</m:t>
+                                  </m:r>
+                                </m:e>
+                                <m:sub>
+                                  <m:r>
+                                    <a:rPr lang="en-US" altLang="ja-JP" i="1">
+                                      <a:latin typeface="Cambria Math" panose="02040503050406030204" pitchFamily="18" charset="0"/>
+                                    </a:rPr>
+                                    <m:t>2</m:t>
+                                  </m:r>
+                                  <m:r>
+                                    <a:rPr lang="en-US" altLang="ja-JP" i="1">
+                                      <a:latin typeface="Cambria Math" panose="02040503050406030204" pitchFamily="18" charset="0"/>
+                                    </a:rPr>
+                                    <m:t>𝑡</m:t>
+                                  </m:r>
+                                </m:sub>
+                              </m:sSub>
+                            </m:e>
+                            <m:e>
+                              <m:sSub>
+                                <m:sSubPr>
+                                  <m:ctrlPr>
+                                    <a:rPr lang="en-US" altLang="ja-JP" i="1">
+                                      <a:latin typeface="Cambria Math" panose="02040503050406030204" pitchFamily="18" charset="0"/>
+                                    </a:rPr>
+                                  </m:ctrlPr>
+                                </m:sSubPr>
+                                <m:e>
+                                  <m:r>
+                                    <a:rPr lang="en-US" altLang="ja-JP" i="1">
+                                      <a:latin typeface="Cambria Math" panose="02040503050406030204" pitchFamily="18" charset="0"/>
+                                    </a:rPr>
+                                    <m:t>𝑞</m:t>
+                                  </m:r>
+                                </m:e>
+                                <m:sub>
+                                  <m:r>
+                                    <a:rPr lang="en-US" altLang="ja-JP" i="1">
+                                      <a:latin typeface="Cambria Math" panose="02040503050406030204" pitchFamily="18" charset="0"/>
+                                    </a:rPr>
+                                    <m:t>3</m:t>
+                                  </m:r>
+                                  <m:r>
+                                    <a:rPr lang="en-US" altLang="ja-JP" i="1">
+                                      <a:latin typeface="Cambria Math" panose="02040503050406030204" pitchFamily="18" charset="0"/>
+                                    </a:rPr>
+                                    <m:t>𝑡</m:t>
+                                  </m:r>
+                                </m:sub>
+                              </m:sSub>
+                            </m:e>
+                            <m:e>
+                              <m:sSub>
+                                <m:sSubPr>
+                                  <m:ctrlPr>
+                                    <a:rPr lang="en-US" altLang="ja-JP" i="1">
+                                      <a:latin typeface="Cambria Math" panose="02040503050406030204" pitchFamily="18" charset="0"/>
+                                    </a:rPr>
+                                  </m:ctrlPr>
+                                </m:sSubPr>
+                                <m:e>
+                                  <m:r>
+                                    <a:rPr lang="en-US" altLang="ja-JP" i="1">
+                                      <a:latin typeface="Cambria Math" panose="02040503050406030204" pitchFamily="18" charset="0"/>
+                                    </a:rPr>
+                                    <m:t>𝑞</m:t>
+                                  </m:r>
+                                </m:e>
+                                <m:sub>
+                                  <m:r>
+                                    <a:rPr lang="en-US" altLang="ja-JP" i="1">
+                                      <a:latin typeface="Cambria Math" panose="02040503050406030204" pitchFamily="18" charset="0"/>
+                                    </a:rPr>
+                                    <m:t>4</m:t>
+                                  </m:r>
+                                </m:sub>
+                              </m:sSub>
+                              <m:r>
+                                <a:rPr lang="en-US" altLang="ja-JP" i="1">
+                                  <a:latin typeface="Cambria Math" panose="02040503050406030204" pitchFamily="18" charset="0"/>
+                                </a:rPr>
+                                <m:t>𝑡</m:t>
+                              </m:r>
+                            </m:e>
+                          </m:eqArr>
+                        </m:e>
+                      </m:d>
+                    </m:oMath>
+                  </m:oMathPara>
+                </a14:m>
+                <a:endParaRPr lang="ja-JP" altLang="en-US" dirty="0"/>
+              </a:p>
+            </p:txBody>
+          </p:sp>
+        </mc:Choice>
+        <mc:Fallback>
+          <p:sp>
+            <p:nvSpPr>
+              <p:cNvPr id="7" name="正方形/長方形 6"/>
+              <p:cNvSpPr>
+                <a:spLocks noRot="1" noChangeAspect="1" noMove="1" noResize="1" noEditPoints="1" noAdjustHandles="1" noChangeArrowheads="1" noChangeShapeType="1" noTextEdit="1"/>
+              </p:cNvSpPr>
+              <p:nvPr/>
+            </p:nvSpPr>
+            <p:spPr>
+              <a:xfrm>
+                <a:off x="783153" y="2922636"/>
+                <a:ext cx="1352934" cy="1112805"/>
+              </a:xfrm>
+              <a:prstGeom prst="rect">
+                <a:avLst/>
+              </a:prstGeom>
+              <a:blipFill rotWithShape="0">
+                <a:blip r:embed="rId6"/>
+                <a:stretch>
+                  <a:fillRect/>
+                </a:stretch>
+              </a:blipFill>
+            </p:spPr>
+            <p:txBody>
+              <a:bodyPr/>
+              <a:lstStyle/>
+              <a:p>
+                <a:r>
+                  <a:rPr lang="ja-JP" altLang="en-US">
+                    <a:noFill/>
+                  </a:rPr>
+                  <a:t> </a:t>
+                </a:r>
+              </a:p>
+            </p:txBody>
+          </p:sp>
+        </mc:Fallback>
+      </mc:AlternateContent>
+      <p:cxnSp>
+        <p:nvCxnSpPr>
+          <p:cNvPr id="9" name="直線コネクタ 8"/>
+          <p:cNvCxnSpPr/>
+          <p:nvPr/>
+        </p:nvCxnSpPr>
+        <p:spPr bwMode="auto">
+          <a:xfrm>
+            <a:off x="539552" y="2780928"/>
+            <a:ext cx="7344816" cy="0"/>
+          </a:xfrm>
+          <a:prstGeom prst="line">
+            <a:avLst/>
+          </a:prstGeom>
+          <a:solidFill>
+            <a:schemeClr val="accent1"/>
+          </a:solidFill>
+          <a:ln w="25400" cap="flat" cmpd="sng" algn="ctr">
+            <a:solidFill>
+              <a:schemeClr val="tx1"/>
+            </a:solidFill>
+            <a:prstDash val="sysDash"/>
+            <a:round/>
+            <a:headEnd type="none" w="med" len="med"/>
+            <a:tailEnd type="none" w="med" len="med"/>
+          </a:ln>
+          <a:effectLst/>
+        </p:spPr>
+      </p:cxnSp>
+      <mc:AlternateContent xmlns:mc="http://schemas.openxmlformats.org/markup-compatibility/2006">
+        <mc:Choice xmlns:a14="http://schemas.microsoft.com/office/drawing/2010/main" Requires="a14">
+          <p:sp>
+            <p:nvSpPr>
+              <p:cNvPr id="64" name="正方形/長方形 63"/>
+              <p:cNvSpPr/>
+              <p:nvPr/>
+            </p:nvSpPr>
+            <p:spPr>
+              <a:xfrm>
+                <a:off x="1979712" y="3024494"/>
+                <a:ext cx="1337867" cy="825675"/>
+              </a:xfrm>
+              <a:prstGeom prst="rect">
+                <a:avLst/>
+              </a:prstGeom>
+            </p:spPr>
+            <p:txBody>
+              <a:bodyPr wrap="none">
+                <a:spAutoFit/>
+              </a:bodyPr>
+              <a:lstStyle/>
+              <a:p>
+                <a14:m>
+                  <m:oMathPara xmlns:m="http://schemas.openxmlformats.org/officeDocument/2006/math">
+                    <m:oMathParaPr>
+                      <m:jc m:val="centerGroup"/>
+                    </m:oMathParaPr>
+                    <m:oMath xmlns:m="http://schemas.openxmlformats.org/officeDocument/2006/math">
+                      <m:sSub>
+                        <m:sSubPr>
+                          <m:ctrlPr>
+                            <a:rPr lang="en-US" altLang="ja-JP" i="1" smtClean="0">
+                              <a:latin typeface="Cambria Math" panose="02040503050406030204" pitchFamily="18" charset="0"/>
+                            </a:rPr>
+                          </m:ctrlPr>
+                        </m:sSubPr>
+                        <m:e>
+                          <m:r>
+                            <a:rPr lang="en-US" altLang="ja-JP" b="1" i="1" smtClean="0">
+                              <a:latin typeface="Cambria Math" panose="02040503050406030204" pitchFamily="18" charset="0"/>
+                            </a:rPr>
+                            <m:t>𝒚</m:t>
+                          </m:r>
+                        </m:e>
+                        <m:sub>
+                          <m:r>
+                            <a:rPr lang="en-US" altLang="ja-JP" i="1">
+                              <a:latin typeface="Cambria Math" panose="02040503050406030204" pitchFamily="18" charset="0"/>
+                            </a:rPr>
+                            <m:t>𝑡</m:t>
+                          </m:r>
+                        </m:sub>
+                      </m:sSub>
+                      <m:r>
+                        <a:rPr lang="en-US" altLang="ja-JP" b="0" i="1" smtClean="0">
+                          <a:latin typeface="Cambria Math" panose="02040503050406030204" pitchFamily="18" charset="0"/>
+                        </a:rPr>
+                        <m:t>=</m:t>
+                      </m:r>
+                      <m:d>
+                        <m:dPr>
+                          <m:begChr m:val="["/>
+                          <m:endChr m:val="]"/>
+                          <m:ctrlPr>
+                            <a:rPr lang="en-US" altLang="ja-JP" i="1">
+                              <a:latin typeface="Cambria Math" panose="02040503050406030204" pitchFamily="18" charset="0"/>
+                            </a:rPr>
+                          </m:ctrlPr>
+                        </m:dPr>
+                        <m:e>
+                          <m:eqArr>
+                            <m:eqArrPr>
+                              <m:ctrlPr>
+                                <a:rPr lang="en-US" altLang="ja-JP" i="1">
+                                  <a:latin typeface="Cambria Math" panose="02040503050406030204" pitchFamily="18" charset="0"/>
+                                </a:rPr>
+                              </m:ctrlPr>
+                            </m:eqArrPr>
+                            <m:e>
+                              <m:sSub>
+                                <m:sSubPr>
+                                  <m:ctrlPr>
+                                    <a:rPr lang="en-US" altLang="ja-JP" i="1">
+                                      <a:latin typeface="Cambria Math" panose="02040503050406030204" pitchFamily="18" charset="0"/>
+                                    </a:rPr>
+                                  </m:ctrlPr>
+                                </m:sSubPr>
+                                <m:e>
+                                  <m:r>
+                                    <a:rPr lang="en-US" altLang="ja-JP" b="0" i="1" smtClean="0">
+                                      <a:latin typeface="Cambria Math" panose="02040503050406030204" pitchFamily="18" charset="0"/>
+                                    </a:rPr>
+                                    <m:t>𝑎</m:t>
+                                  </m:r>
+                                </m:e>
+                                <m:sub>
+                                  <m:r>
+                                    <a:rPr lang="en-US" altLang="ja-JP" b="0" i="1" smtClean="0">
+                                      <a:latin typeface="Cambria Math" panose="02040503050406030204" pitchFamily="18" charset="0"/>
+                                    </a:rPr>
+                                    <m:t>𝑥</m:t>
+                                  </m:r>
+                                  <m:r>
+                                    <a:rPr lang="en-US" altLang="ja-JP" i="1">
+                                      <a:latin typeface="Cambria Math" panose="02040503050406030204" pitchFamily="18" charset="0"/>
+                                    </a:rPr>
+                                    <m:t>𝑡</m:t>
+                                  </m:r>
+                                </m:sub>
+                              </m:sSub>
+                            </m:e>
+                            <m:e>
+                              <m:sSub>
+                                <m:sSubPr>
+                                  <m:ctrlPr>
+                                    <a:rPr lang="en-US" altLang="ja-JP" i="1">
+                                      <a:latin typeface="Cambria Math" panose="02040503050406030204" pitchFamily="18" charset="0"/>
+                                    </a:rPr>
+                                  </m:ctrlPr>
+                                </m:sSubPr>
+                                <m:e>
+                                  <m:r>
+                                    <a:rPr lang="en-US" altLang="ja-JP" i="1">
+                                      <a:latin typeface="Cambria Math" panose="02040503050406030204" pitchFamily="18" charset="0"/>
+                                    </a:rPr>
+                                    <m:t>𝑎</m:t>
+                                  </m:r>
+                                </m:e>
+                                <m:sub>
+                                  <m:r>
+                                    <a:rPr lang="en-US" altLang="ja-JP" b="0" i="1" smtClean="0">
+                                      <a:latin typeface="Cambria Math" panose="02040503050406030204" pitchFamily="18" charset="0"/>
+                                    </a:rPr>
+                                    <m:t>𝑦</m:t>
+                                  </m:r>
+                                  <m:r>
+                                    <a:rPr lang="en-US" altLang="ja-JP" i="1">
+                                      <a:latin typeface="Cambria Math" panose="02040503050406030204" pitchFamily="18" charset="0"/>
+                                    </a:rPr>
+                                    <m:t>𝑡</m:t>
+                                  </m:r>
+                                </m:sub>
+                              </m:sSub>
+                            </m:e>
+                            <m:e>
+                              <m:sSub>
+                                <m:sSubPr>
+                                  <m:ctrlPr>
+                                    <a:rPr lang="en-US" altLang="ja-JP" i="1">
+                                      <a:latin typeface="Cambria Math" panose="02040503050406030204" pitchFamily="18" charset="0"/>
+                                    </a:rPr>
+                                  </m:ctrlPr>
+                                </m:sSubPr>
+                                <m:e>
+                                  <m:r>
+                                    <a:rPr lang="en-US" altLang="ja-JP" i="1">
+                                      <a:latin typeface="Cambria Math" panose="02040503050406030204" pitchFamily="18" charset="0"/>
+                                    </a:rPr>
+                                    <m:t>𝑎</m:t>
+                                  </m:r>
+                                </m:e>
+                                <m:sub>
+                                  <m:r>
+                                    <a:rPr lang="en-US" altLang="ja-JP" b="0" i="1" smtClean="0">
+                                      <a:latin typeface="Cambria Math" panose="02040503050406030204" pitchFamily="18" charset="0"/>
+                                    </a:rPr>
+                                    <m:t>𝑧</m:t>
+                                  </m:r>
+                                  <m:r>
+                                    <a:rPr lang="en-US" altLang="ja-JP" i="1">
+                                      <a:latin typeface="Cambria Math" panose="02040503050406030204" pitchFamily="18" charset="0"/>
+                                    </a:rPr>
+                                    <m:t>𝑡</m:t>
+                                  </m:r>
+                                </m:sub>
+                              </m:sSub>
+                            </m:e>
+                          </m:eqArr>
+                        </m:e>
+                      </m:d>
+                    </m:oMath>
+                  </m:oMathPara>
+                </a14:m>
+                <a:endParaRPr lang="ja-JP" altLang="en-US" dirty="0"/>
+              </a:p>
+            </p:txBody>
+          </p:sp>
+        </mc:Choice>
+        <mc:Fallback>
+          <p:sp>
+            <p:nvSpPr>
+              <p:cNvPr id="64" name="正方形/長方形 63"/>
+              <p:cNvSpPr>
+                <a:spLocks noRot="1" noChangeAspect="1" noMove="1" noResize="1" noEditPoints="1" noAdjustHandles="1" noChangeArrowheads="1" noChangeShapeType="1" noTextEdit="1"/>
+              </p:cNvSpPr>
+              <p:nvPr/>
+            </p:nvSpPr>
+            <p:spPr>
+              <a:xfrm>
+                <a:off x="1979712" y="3024494"/>
+                <a:ext cx="1337867" cy="825675"/>
+              </a:xfrm>
+              <a:prstGeom prst="rect">
+                <a:avLst/>
+              </a:prstGeom>
+              <a:blipFill rotWithShape="0">
+                <a:blip r:embed="rId7"/>
+                <a:stretch>
+                  <a:fillRect/>
+                </a:stretch>
+              </a:blipFill>
+            </p:spPr>
+            <p:txBody>
+              <a:bodyPr/>
+              <a:lstStyle/>
+              <a:p>
+                <a:r>
+                  <a:rPr lang="ja-JP" altLang="en-US">
+                    <a:noFill/>
+                  </a:rPr>
+                  <a:t> </a:t>
+                </a:r>
+              </a:p>
+            </p:txBody>
+          </p:sp>
+        </mc:Fallback>
+      </mc:AlternateContent>
+      <mc:AlternateContent xmlns:mc="http://schemas.openxmlformats.org/markup-compatibility/2006">
+        <mc:Choice xmlns:a14="http://schemas.microsoft.com/office/drawing/2010/main" Requires="a14">
+          <p:sp>
+            <p:nvSpPr>
+              <p:cNvPr id="65" name="テキスト ボックス 64"/>
+              <p:cNvSpPr txBox="1"/>
+              <p:nvPr/>
+            </p:nvSpPr>
+            <p:spPr>
+              <a:xfrm>
+                <a:off x="3138876" y="2899231"/>
+                <a:ext cx="2146165" cy="1159613"/>
+              </a:xfrm>
+              <a:prstGeom prst="rect">
+                <a:avLst/>
+              </a:prstGeom>
+              <a:noFill/>
+            </p:spPr>
+            <p:txBody>
+              <a:bodyPr wrap="none" rtlCol="0">
+                <a:spAutoFit/>
+              </a:bodyPr>
+              <a:lstStyle/>
+              <a:p>
+                <a:pPr/>
+                <a14:m>
+                  <m:oMathPara xmlns:m="http://schemas.openxmlformats.org/officeDocument/2006/math">
+                    <m:oMathParaPr>
+                      <m:jc m:val="centerGroup"/>
+                    </m:oMathParaPr>
+                    <m:oMath xmlns:m="http://schemas.openxmlformats.org/officeDocument/2006/math">
+                      <m:r>
+                        <a:rPr lang="en-US" altLang="ja-JP" b="1" i="1" smtClean="0">
+                          <a:latin typeface="Cambria Math" panose="02040503050406030204" pitchFamily="18" charset="0"/>
+                        </a:rPr>
+                        <m:t>𝑸</m:t>
+                      </m:r>
+                      <m:r>
+                        <a:rPr lang="en-US" altLang="ja-JP" b="1" i="1" smtClean="0">
+                          <a:latin typeface="Cambria Math" panose="02040503050406030204" pitchFamily="18" charset="0"/>
+                        </a:rPr>
+                        <m:t>=</m:t>
+                      </m:r>
+                      <m:d>
+                        <m:dPr>
+                          <m:begChr m:val="["/>
+                          <m:endChr m:val="]"/>
+                          <m:ctrlPr>
+                            <a:rPr lang="en-US" altLang="ja-JP" b="1" i="1" smtClean="0">
+                              <a:latin typeface="Cambria Math" panose="02040503050406030204" pitchFamily="18" charset="0"/>
+                            </a:rPr>
+                          </m:ctrlPr>
+                        </m:dPr>
+                        <m:e>
+                          <m:eqArr>
+                            <m:eqArrPr>
+                              <m:ctrlPr>
+                                <a:rPr lang="en-US" altLang="ja-JP" b="1" i="1">
+                                  <a:latin typeface="Cambria Math" panose="02040503050406030204" pitchFamily="18" charset="0"/>
+                                </a:rPr>
+                              </m:ctrlPr>
+                            </m:eqArrPr>
+                            <m:e>
+                              <m:sSub>
+                                <m:sSubPr>
+                                  <m:ctrlPr>
+                                    <a:rPr lang="en-US" altLang="ja-JP" b="0" i="1">
+                                      <a:latin typeface="Cambria Math" panose="02040503050406030204" pitchFamily="18" charset="0"/>
+                                    </a:rPr>
+                                  </m:ctrlPr>
+                                </m:sSubPr>
+                                <m:e>
+                                  <m:r>
+                                    <a:rPr lang="en-US" altLang="ja-JP" b="0" i="1" smtClean="0">
+                                      <a:latin typeface="Cambria Math" panose="02040503050406030204" pitchFamily="18" charset="0"/>
+                                    </a:rPr>
+                                    <m:t>𝑄</m:t>
+                                  </m:r>
+                                </m:e>
+                                <m:sub>
+                                  <m:r>
+                                    <a:rPr lang="en-US" altLang="ja-JP" i="1">
+                                      <a:latin typeface="Cambria Math" panose="02040503050406030204" pitchFamily="18" charset="0"/>
+                                    </a:rPr>
+                                    <m:t>1</m:t>
+                                  </m:r>
+                                </m:sub>
+                              </m:sSub>
+                              <m:r>
+                                <a:rPr lang="en-US" altLang="ja-JP" b="0" i="1" smtClean="0">
+                                  <a:latin typeface="Cambria Math" panose="02040503050406030204" pitchFamily="18" charset="0"/>
+                                </a:rPr>
+                                <m:t>&amp; 0 &amp; 0 &amp; 0 </m:t>
+                              </m:r>
+                            </m:e>
+                            <m:e>
+                              <m:r>
+                                <a:rPr lang="en-US" altLang="ja-JP" b="0" i="1" smtClean="0">
+                                  <a:latin typeface="Cambria Math" panose="02040503050406030204" pitchFamily="18" charset="0"/>
+                                </a:rPr>
+                                <m:t>0 &amp; </m:t>
+                              </m:r>
+                              <m:sSub>
+                                <m:sSubPr>
+                                  <m:ctrlPr>
+                                    <a:rPr lang="en-US" altLang="ja-JP" b="0" i="1" smtClean="0">
+                                      <a:latin typeface="Cambria Math" panose="02040503050406030204" pitchFamily="18" charset="0"/>
+                                    </a:rPr>
+                                  </m:ctrlPr>
+                                </m:sSubPr>
+                                <m:e>
+                                  <m:r>
+                                    <a:rPr lang="en-US" altLang="ja-JP" i="1">
+                                      <a:latin typeface="Cambria Math" panose="02040503050406030204" pitchFamily="18" charset="0"/>
+                                    </a:rPr>
+                                    <m:t>𝑄</m:t>
+                                  </m:r>
+                                </m:e>
+                                <m:sub>
+                                  <m:r>
+                                    <a:rPr lang="en-US" altLang="ja-JP" b="0" i="1" smtClean="0">
+                                      <a:latin typeface="Cambria Math" panose="02040503050406030204" pitchFamily="18" charset="0"/>
+                                    </a:rPr>
+                                    <m:t>2</m:t>
+                                  </m:r>
+                                </m:sub>
+                              </m:sSub>
+                              <m:r>
+                                <a:rPr lang="en-US" altLang="ja-JP" b="0" i="1" smtClean="0">
+                                  <a:latin typeface="Cambria Math" panose="02040503050406030204" pitchFamily="18" charset="0"/>
+                                </a:rPr>
+                                <m:t>&amp; 0 &amp; 0 </m:t>
+                              </m:r>
+                            </m:e>
+                            <m:e>
+                              <m:r>
+                                <a:rPr lang="en-US" altLang="ja-JP" b="0" i="1" smtClean="0">
+                                  <a:latin typeface="Cambria Math" panose="02040503050406030204" pitchFamily="18" charset="0"/>
+                                </a:rPr>
+                                <m:t>0 &amp; 0 &amp; </m:t>
+                              </m:r>
+                              <m:sSub>
+                                <m:sSubPr>
+                                  <m:ctrlPr>
+                                    <a:rPr lang="en-US" altLang="ja-JP" b="0" i="1" smtClean="0">
+                                      <a:latin typeface="Cambria Math" panose="02040503050406030204" pitchFamily="18" charset="0"/>
+                                    </a:rPr>
+                                  </m:ctrlPr>
+                                </m:sSubPr>
+                                <m:e>
+                                  <m:r>
+                                    <a:rPr lang="en-US" altLang="ja-JP" i="1">
+                                      <a:latin typeface="Cambria Math" panose="02040503050406030204" pitchFamily="18" charset="0"/>
+                                    </a:rPr>
+                                    <m:t>𝑄</m:t>
+                                  </m:r>
+                                </m:e>
+                                <m:sub>
+                                  <m:r>
+                                    <a:rPr lang="en-US" altLang="ja-JP" b="0" i="1" smtClean="0">
+                                      <a:latin typeface="Cambria Math" panose="02040503050406030204" pitchFamily="18" charset="0"/>
+                                    </a:rPr>
+                                    <m:t>3</m:t>
+                                  </m:r>
+                                </m:sub>
+                              </m:sSub>
+                              <m:r>
+                                <a:rPr lang="en-US" altLang="ja-JP" b="0" i="1" smtClean="0">
+                                  <a:latin typeface="Cambria Math" panose="02040503050406030204" pitchFamily="18" charset="0"/>
+                                </a:rPr>
+                                <m:t>&amp; 0 </m:t>
+                              </m:r>
+                            </m:e>
+                            <m:e>
+                              <m:r>
+                                <a:rPr lang="en-US" altLang="ja-JP" b="0" i="1" smtClean="0">
+                                  <a:latin typeface="Cambria Math" panose="02040503050406030204" pitchFamily="18" charset="0"/>
+                                </a:rPr>
+                                <m:t>0 &amp; 0 &amp; 0 &amp; </m:t>
+                              </m:r>
+                              <m:sSub>
+                                <m:sSubPr>
+                                  <m:ctrlPr>
+                                    <a:rPr lang="en-US" altLang="ja-JP" b="0" i="1" smtClean="0">
+                                      <a:latin typeface="Cambria Math" panose="02040503050406030204" pitchFamily="18" charset="0"/>
+                                    </a:rPr>
+                                  </m:ctrlPr>
+                                </m:sSubPr>
+                                <m:e>
+                                  <m:r>
+                                    <a:rPr lang="en-US" altLang="ja-JP" i="1">
+                                      <a:latin typeface="Cambria Math" panose="02040503050406030204" pitchFamily="18" charset="0"/>
+                                    </a:rPr>
+                                    <m:t>𝑄</m:t>
+                                  </m:r>
+                                </m:e>
+                                <m:sub>
+                                  <m:r>
+                                    <a:rPr lang="en-US" altLang="ja-JP" b="0" i="1" smtClean="0">
+                                      <a:latin typeface="Cambria Math" panose="02040503050406030204" pitchFamily="18" charset="0"/>
+                                    </a:rPr>
+                                    <m:t>4</m:t>
+                                  </m:r>
+                                </m:sub>
+                              </m:sSub>
+                            </m:e>
+                          </m:eqArr>
+                        </m:e>
+                      </m:d>
+                    </m:oMath>
+                  </m:oMathPara>
+                </a14:m>
+                <a:endParaRPr kumimoji="1" lang="ja-JP" altLang="en-US" b="1" dirty="0"/>
+              </a:p>
+            </p:txBody>
+          </p:sp>
+        </mc:Choice>
+        <mc:Fallback>
+          <p:sp>
+            <p:nvSpPr>
+              <p:cNvPr id="65" name="テキスト ボックス 64"/>
+              <p:cNvSpPr txBox="1">
+                <a:spLocks noRot="1" noChangeAspect="1" noMove="1" noResize="1" noEditPoints="1" noAdjustHandles="1" noChangeArrowheads="1" noChangeShapeType="1" noTextEdit="1"/>
+              </p:cNvSpPr>
+              <p:nvPr/>
+            </p:nvSpPr>
+            <p:spPr>
+              <a:xfrm>
+                <a:off x="3138876" y="2899231"/>
+                <a:ext cx="2146165" cy="1159613"/>
+              </a:xfrm>
+              <a:prstGeom prst="rect">
+                <a:avLst/>
+              </a:prstGeom>
+              <a:blipFill rotWithShape="0">
+                <a:blip r:embed="rId8"/>
+                <a:stretch>
+                  <a:fillRect/>
+                </a:stretch>
+              </a:blipFill>
+            </p:spPr>
+            <p:txBody>
+              <a:bodyPr/>
+              <a:lstStyle/>
+              <a:p>
+                <a:r>
+                  <a:rPr lang="ja-JP" altLang="en-US">
+                    <a:noFill/>
+                  </a:rPr>
+                  <a:t> </a:t>
+                </a:r>
+              </a:p>
+            </p:txBody>
+          </p:sp>
+        </mc:Fallback>
+      </mc:AlternateContent>
+      <mc:AlternateContent xmlns:mc="http://schemas.openxmlformats.org/markup-compatibility/2006">
+        <mc:Choice xmlns:a14="http://schemas.microsoft.com/office/drawing/2010/main" Requires="a14">
+          <p:sp>
+            <p:nvSpPr>
+              <p:cNvPr id="66" name="テキスト ボックス 65"/>
+              <p:cNvSpPr txBox="1"/>
+              <p:nvPr/>
+            </p:nvSpPr>
+            <p:spPr>
+              <a:xfrm>
+                <a:off x="5148064" y="2992686"/>
+                <a:ext cx="1811265" cy="972702"/>
+              </a:xfrm>
+              <a:prstGeom prst="rect">
+                <a:avLst/>
+              </a:prstGeom>
+              <a:noFill/>
+            </p:spPr>
+            <p:txBody>
+              <a:bodyPr wrap="none" rtlCol="0">
+                <a:spAutoFit/>
+              </a:bodyPr>
+              <a:lstStyle/>
+              <a:p>
+                <a:pPr/>
+                <a14:m>
+                  <m:oMathPara xmlns:m="http://schemas.openxmlformats.org/officeDocument/2006/math">
+                    <m:oMathParaPr>
+                      <m:jc m:val="centerGroup"/>
+                    </m:oMathParaPr>
+                    <m:oMath xmlns:m="http://schemas.openxmlformats.org/officeDocument/2006/math">
+                      <m:r>
+                        <a:rPr lang="en-US" altLang="ja-JP" b="1" i="1" smtClean="0">
+                          <a:latin typeface="Cambria Math" panose="02040503050406030204" pitchFamily="18" charset="0"/>
+                        </a:rPr>
+                        <m:t>𝑹</m:t>
+                      </m:r>
+                      <m:r>
+                        <a:rPr lang="en-US" altLang="ja-JP" b="1" i="1" smtClean="0">
+                          <a:latin typeface="Cambria Math" panose="02040503050406030204" pitchFamily="18" charset="0"/>
+                        </a:rPr>
+                        <m:t>=</m:t>
+                      </m:r>
+                      <m:d>
+                        <m:dPr>
+                          <m:begChr m:val="["/>
+                          <m:endChr m:val="]"/>
+                          <m:ctrlPr>
+                            <a:rPr lang="en-US" altLang="ja-JP" b="1" i="1" smtClean="0">
+                              <a:latin typeface="Cambria Math" panose="02040503050406030204" pitchFamily="18" charset="0"/>
+                            </a:rPr>
+                          </m:ctrlPr>
+                        </m:dPr>
+                        <m:e>
+                          <m:eqArr>
+                            <m:eqArrPr>
+                              <m:ctrlPr>
+                                <a:rPr lang="en-US" altLang="ja-JP" b="0" i="1">
+                                  <a:latin typeface="Cambria Math" panose="02040503050406030204" pitchFamily="18" charset="0"/>
+                                </a:rPr>
+                              </m:ctrlPr>
+                            </m:eqArrPr>
+                            <m:e>
+                              <m:sSub>
+                                <m:sSubPr>
+                                  <m:ctrlPr>
+                                    <a:rPr lang="en-US" altLang="ja-JP" b="0" i="1" smtClean="0">
+                                      <a:latin typeface="Cambria Math" panose="02040503050406030204" pitchFamily="18" charset="0"/>
+                                    </a:rPr>
+                                  </m:ctrlPr>
+                                </m:sSubPr>
+                                <m:e>
+                                  <m:r>
+                                    <a:rPr lang="en-US" altLang="ja-JP" b="0" i="1" smtClean="0">
+                                      <a:latin typeface="Cambria Math" panose="02040503050406030204" pitchFamily="18" charset="0"/>
+                                    </a:rPr>
+                                    <m:t>𝑅</m:t>
+                                  </m:r>
+                                </m:e>
+                                <m:sub>
+                                  <m:r>
+                                    <a:rPr lang="en-US" altLang="ja-JP" b="0" i="1" smtClean="0">
+                                      <a:latin typeface="Cambria Math" panose="02040503050406030204" pitchFamily="18" charset="0"/>
+                                    </a:rPr>
+                                    <m:t>1</m:t>
+                                  </m:r>
+                                </m:sub>
+                              </m:sSub>
+                              <m:r>
+                                <a:rPr lang="en-US" altLang="ja-JP" b="0" i="1" smtClean="0">
+                                  <a:latin typeface="Cambria Math" panose="02040503050406030204" pitchFamily="18" charset="0"/>
+                                </a:rPr>
+                                <m:t>&amp; 0 &amp; 0</m:t>
+                              </m:r>
+                            </m:e>
+                            <m:e>
+                              <m:r>
+                                <a:rPr lang="en-US" altLang="ja-JP" b="0" i="1" smtClean="0">
+                                  <a:latin typeface="Cambria Math" panose="02040503050406030204" pitchFamily="18" charset="0"/>
+                                </a:rPr>
+                                <m:t>0 &amp; </m:t>
+                              </m:r>
+                              <m:sSub>
+                                <m:sSubPr>
+                                  <m:ctrlPr>
+                                    <a:rPr lang="en-US" altLang="ja-JP" b="0" i="1" smtClean="0">
+                                      <a:latin typeface="Cambria Math" panose="02040503050406030204" pitchFamily="18" charset="0"/>
+                                    </a:rPr>
+                                  </m:ctrlPr>
+                                </m:sSubPr>
+                                <m:e>
+                                  <m:r>
+                                    <a:rPr lang="en-US" altLang="ja-JP" b="0" i="1" smtClean="0">
+                                      <a:latin typeface="Cambria Math" panose="02040503050406030204" pitchFamily="18" charset="0"/>
+                                    </a:rPr>
+                                    <m:t>𝑅</m:t>
+                                  </m:r>
+                                </m:e>
+                                <m:sub>
+                                  <m:r>
+                                    <a:rPr lang="en-US" altLang="ja-JP" b="0" i="1" smtClean="0">
+                                      <a:latin typeface="Cambria Math" panose="02040503050406030204" pitchFamily="18" charset="0"/>
+                                    </a:rPr>
+                                    <m:t>2</m:t>
+                                  </m:r>
+                                </m:sub>
+                              </m:sSub>
+                              <m:r>
+                                <a:rPr lang="en-US" altLang="ja-JP" b="0" i="1" smtClean="0">
+                                  <a:latin typeface="Cambria Math" panose="02040503050406030204" pitchFamily="18" charset="0"/>
+                                </a:rPr>
+                                <m:t>&amp; 0</m:t>
+                              </m:r>
+                            </m:e>
+                            <m:e>
+                              <m:r>
+                                <a:rPr lang="en-US" altLang="ja-JP" b="0" i="1" smtClean="0">
+                                  <a:latin typeface="Cambria Math" panose="02040503050406030204" pitchFamily="18" charset="0"/>
+                                </a:rPr>
+                                <m:t>0 &amp; 0 &amp; </m:t>
+                              </m:r>
+                              <m:sSub>
+                                <m:sSubPr>
+                                  <m:ctrlPr>
+                                    <a:rPr lang="en-US" altLang="ja-JP" b="0" i="1" smtClean="0">
+                                      <a:latin typeface="Cambria Math" panose="02040503050406030204" pitchFamily="18" charset="0"/>
+                                    </a:rPr>
+                                  </m:ctrlPr>
+                                </m:sSubPr>
+                                <m:e>
+                                  <m:r>
+                                    <a:rPr lang="en-US" altLang="ja-JP" b="0" i="1" smtClean="0">
+                                      <a:latin typeface="Cambria Math" panose="02040503050406030204" pitchFamily="18" charset="0"/>
+                                    </a:rPr>
+                                    <m:t>𝑅</m:t>
+                                  </m:r>
+                                </m:e>
+                                <m:sub>
+                                  <m:r>
+                                    <a:rPr lang="en-US" altLang="ja-JP" b="0" i="1" smtClean="0">
+                                      <a:latin typeface="Cambria Math" panose="02040503050406030204" pitchFamily="18" charset="0"/>
+                                    </a:rPr>
+                                    <m:t>3</m:t>
+                                  </m:r>
+                                </m:sub>
+                              </m:sSub>
+                            </m:e>
+                          </m:eqArr>
+                        </m:e>
+                      </m:d>
+                    </m:oMath>
+                  </m:oMathPara>
+                </a14:m>
+                <a:endParaRPr kumimoji="1" lang="ja-JP" altLang="en-US" b="1" dirty="0"/>
+              </a:p>
+            </p:txBody>
+          </p:sp>
+        </mc:Choice>
+        <mc:Fallback>
+          <p:sp>
+            <p:nvSpPr>
+              <p:cNvPr id="66" name="テキスト ボックス 65"/>
+              <p:cNvSpPr txBox="1">
+                <a:spLocks noRot="1" noChangeAspect="1" noMove="1" noResize="1" noEditPoints="1" noAdjustHandles="1" noChangeArrowheads="1" noChangeShapeType="1" noTextEdit="1"/>
+              </p:cNvSpPr>
+              <p:nvPr/>
+            </p:nvSpPr>
+            <p:spPr>
+              <a:xfrm>
+                <a:off x="5148064" y="2992686"/>
+                <a:ext cx="1811265" cy="972702"/>
+              </a:xfrm>
+              <a:prstGeom prst="rect">
+                <a:avLst/>
+              </a:prstGeom>
+              <a:blipFill rotWithShape="0">
+                <a:blip r:embed="rId9"/>
+                <a:stretch>
+                  <a:fillRect/>
+                </a:stretch>
+              </a:blipFill>
+            </p:spPr>
+            <p:txBody>
+              <a:bodyPr/>
+              <a:lstStyle/>
+              <a:p>
+                <a:r>
+                  <a:rPr lang="ja-JP" altLang="en-US">
+                    <a:noFill/>
+                  </a:rPr>
+                  <a:t> </a:t>
+                </a:r>
+              </a:p>
+            </p:txBody>
+          </p:sp>
+        </mc:Fallback>
+      </mc:AlternateContent>
+      <mc:AlternateContent xmlns:mc="http://schemas.openxmlformats.org/markup-compatibility/2006">
+        <mc:Choice xmlns:a14="http://schemas.microsoft.com/office/drawing/2010/main" Requires="a14">
+          <p:sp>
+            <p:nvSpPr>
+              <p:cNvPr id="67" name="テキスト ボックス 66"/>
+              <p:cNvSpPr txBox="1"/>
+              <p:nvPr/>
+            </p:nvSpPr>
+            <p:spPr>
+              <a:xfrm>
+                <a:off x="539552" y="4625533"/>
+                <a:ext cx="1090811" cy="369332"/>
+              </a:xfrm>
+              <a:prstGeom prst="rect">
+                <a:avLst/>
+              </a:prstGeom>
+              <a:noFill/>
+            </p:spPr>
+            <p:txBody>
+              <a:bodyPr wrap="none" rtlCol="0">
+                <a:spAutoFit/>
+              </a:bodyPr>
+              <a:lstStyle/>
+              <a:p>
+                <a:pPr/>
+                <a14:m>
+                  <m:oMathPara xmlns:m="http://schemas.openxmlformats.org/officeDocument/2006/math">
+                    <m:oMathParaPr>
+                      <m:jc m:val="centerGroup"/>
+                    </m:oMathParaPr>
+                    <m:oMath xmlns:m="http://schemas.openxmlformats.org/officeDocument/2006/math">
+                      <m:r>
+                        <a:rPr lang="en-US" altLang="ja-JP" b="1" i="1" smtClean="0">
+                          <a:latin typeface="Cambria Math" panose="02040503050406030204" pitchFamily="18" charset="0"/>
+                        </a:rPr>
+                        <m:t>𝒇</m:t>
+                      </m:r>
+                      <m:d>
+                        <m:dPr>
+                          <m:ctrlPr>
+                            <a:rPr lang="en-US" altLang="ja-JP" b="0" i="1" smtClean="0">
+                              <a:latin typeface="Cambria Math" panose="02040503050406030204" pitchFamily="18" charset="0"/>
+                            </a:rPr>
+                          </m:ctrlPr>
+                        </m:dPr>
+                        <m:e>
+                          <m:sSub>
+                            <m:sSubPr>
+                              <m:ctrlPr>
+                                <a:rPr lang="en-US" altLang="ja-JP" i="1">
+                                  <a:latin typeface="Cambria Math" panose="02040503050406030204" pitchFamily="18" charset="0"/>
+                                </a:rPr>
+                              </m:ctrlPr>
+                            </m:sSubPr>
+                            <m:e>
+                              <m:r>
+                                <a:rPr lang="en-US" altLang="ja-JP" b="1" i="1" smtClean="0">
+                                  <a:latin typeface="Cambria Math" panose="02040503050406030204" pitchFamily="18" charset="0"/>
+                                </a:rPr>
+                                <m:t>𝒙</m:t>
+                              </m:r>
+                            </m:e>
+                            <m:sub>
+                              <m:r>
+                                <a:rPr lang="en-US" altLang="ja-JP" i="1">
+                                  <a:latin typeface="Cambria Math" panose="02040503050406030204" pitchFamily="18" charset="0"/>
+                                </a:rPr>
+                                <m:t>𝑡</m:t>
+                              </m:r>
+                            </m:sub>
+                          </m:sSub>
+                        </m:e>
+                      </m:d>
+                      <m:r>
+                        <a:rPr lang="en-US" altLang="ja-JP" b="0" i="1" smtClean="0">
+                          <a:latin typeface="Cambria Math" panose="02040503050406030204" pitchFamily="18" charset="0"/>
+                        </a:rPr>
+                        <m:t>=</m:t>
+                      </m:r>
+                    </m:oMath>
+                  </m:oMathPara>
+                </a14:m>
+                <a:endParaRPr kumimoji="1" lang="ja-JP" altLang="en-US" dirty="0"/>
+              </a:p>
+            </p:txBody>
+          </p:sp>
+        </mc:Choice>
+        <mc:Fallback>
+          <p:sp>
+            <p:nvSpPr>
+              <p:cNvPr id="67" name="テキスト ボックス 66"/>
+              <p:cNvSpPr txBox="1">
+                <a:spLocks noRot="1" noChangeAspect="1" noMove="1" noResize="1" noEditPoints="1" noAdjustHandles="1" noChangeArrowheads="1" noChangeShapeType="1" noTextEdit="1"/>
+              </p:cNvSpPr>
+              <p:nvPr/>
+            </p:nvSpPr>
+            <p:spPr>
+              <a:xfrm>
+                <a:off x="539552" y="4625533"/>
+                <a:ext cx="1090811" cy="369332"/>
+              </a:xfrm>
+              <a:prstGeom prst="rect">
+                <a:avLst/>
+              </a:prstGeom>
+              <a:blipFill rotWithShape="0">
+                <a:blip r:embed="rId10"/>
+                <a:stretch>
+                  <a:fillRect b="-13333"/>
+                </a:stretch>
+              </a:blipFill>
+            </p:spPr>
+            <p:txBody>
+              <a:bodyPr/>
+              <a:lstStyle/>
+              <a:p>
+                <a:r>
+                  <a:rPr lang="ja-JP" altLang="en-US">
+                    <a:noFill/>
+                  </a:rPr>
+                  <a:t> </a:t>
+                </a:r>
+              </a:p>
+            </p:txBody>
+          </p:sp>
+        </mc:Fallback>
+      </mc:AlternateContent>
+      <p:pic>
+        <p:nvPicPr>
+          <p:cNvPr id="13" name="図 12"/>
+          <p:cNvPicPr>
+            <a:picLocks noChangeAspect="1"/>
+          </p:cNvPicPr>
+          <p:nvPr/>
+        </p:nvPicPr>
+        <p:blipFill rotWithShape="1">
+          <a:blip r:embed="rId11">
+            <a:extLst>
+              <a:ext uri="{28A0092B-C50C-407E-A947-70E740481C1C}">
+                <a14:useLocalDpi xmlns:a14="http://schemas.microsoft.com/office/drawing/2010/main" val="0"/>
+              </a:ext>
+            </a:extLst>
+          </a:blip>
+          <a:srcRect l="14594" t="55876" r="34814" b="2218"/>
+          <a:stretch/>
+        </p:blipFill>
+        <p:spPr>
+          <a:xfrm>
+            <a:off x="1448079" y="4169270"/>
+            <a:ext cx="2736304" cy="1420774"/>
+          </a:xfrm>
+          <a:prstGeom prst="rect">
+            <a:avLst/>
+          </a:prstGeom>
+        </p:spPr>
+      </p:pic>
+      <mc:AlternateContent xmlns:mc="http://schemas.openxmlformats.org/markup-compatibility/2006">
+        <mc:Choice xmlns:a14="http://schemas.microsoft.com/office/drawing/2010/main" Requires="a14">
+          <p:sp>
+            <p:nvSpPr>
+              <p:cNvPr id="86" name="テキスト ボックス 85"/>
+              <p:cNvSpPr txBox="1"/>
+              <p:nvPr/>
+            </p:nvSpPr>
+            <p:spPr>
+              <a:xfrm>
+                <a:off x="4079101" y="4319392"/>
+                <a:ext cx="3858812" cy="972702"/>
+              </a:xfrm>
+              <a:prstGeom prst="rect">
+                <a:avLst/>
+              </a:prstGeom>
+              <a:noFill/>
+            </p:spPr>
+            <p:txBody>
+              <a:bodyPr wrap="none" rtlCol="0">
+                <a:spAutoFit/>
+              </a:bodyPr>
+              <a:lstStyle/>
+              <a:p>
+                <a:pPr/>
+                <a14:m>
+                  <m:oMathPara xmlns:m="http://schemas.openxmlformats.org/officeDocument/2006/math">
+                    <m:oMathParaPr>
+                      <m:jc m:val="centerGroup"/>
+                    </m:oMathParaPr>
+                    <m:oMath xmlns:m="http://schemas.openxmlformats.org/officeDocument/2006/math">
+                      <m:r>
+                        <a:rPr lang="en-US" altLang="ja-JP" b="1" i="1" smtClean="0">
+                          <a:latin typeface="Cambria Math" panose="02040503050406030204" pitchFamily="18" charset="0"/>
+                        </a:rPr>
+                        <m:t>𝒉</m:t>
+                      </m:r>
+                      <m:d>
+                        <m:dPr>
+                          <m:ctrlPr>
+                            <a:rPr lang="en-US" altLang="ja-JP" b="0" i="1" smtClean="0">
+                              <a:latin typeface="Cambria Math" panose="02040503050406030204" pitchFamily="18" charset="0"/>
+                            </a:rPr>
+                          </m:ctrlPr>
+                        </m:dPr>
+                        <m:e>
+                          <m:sSub>
+                            <m:sSubPr>
+                              <m:ctrlPr>
+                                <a:rPr lang="en-US" altLang="ja-JP" i="1">
+                                  <a:latin typeface="Cambria Math" panose="02040503050406030204" pitchFamily="18" charset="0"/>
+                                </a:rPr>
+                              </m:ctrlPr>
+                            </m:sSubPr>
+                            <m:e>
+                              <m:r>
+                                <a:rPr lang="en-US" altLang="ja-JP" b="1" i="1" smtClean="0">
+                                  <a:latin typeface="Cambria Math" panose="02040503050406030204" pitchFamily="18" charset="0"/>
+                                </a:rPr>
+                                <m:t>𝒙</m:t>
+                              </m:r>
+                            </m:e>
+                            <m:sub>
+                              <m:r>
+                                <a:rPr lang="en-US" altLang="ja-JP" i="1">
+                                  <a:latin typeface="Cambria Math" panose="02040503050406030204" pitchFamily="18" charset="0"/>
+                                </a:rPr>
+                                <m:t>𝑡</m:t>
+                              </m:r>
+                            </m:sub>
+                          </m:sSub>
+                        </m:e>
+                      </m:d>
+                      <m:r>
+                        <a:rPr lang="en-US" altLang="ja-JP" b="0" i="1" smtClean="0">
+                          <a:latin typeface="Cambria Math" panose="02040503050406030204" pitchFamily="18" charset="0"/>
+                        </a:rPr>
+                        <m:t>=</m:t>
+                      </m:r>
+                      <m:d>
+                        <m:dPr>
+                          <m:begChr m:val="["/>
+                          <m:endChr m:val="]"/>
+                          <m:ctrlPr>
+                            <a:rPr lang="en-US" altLang="ja-JP" i="1">
+                              <a:latin typeface="Cambria Math" panose="02040503050406030204" pitchFamily="18" charset="0"/>
+                            </a:rPr>
+                          </m:ctrlPr>
+                        </m:dPr>
+                        <m:e>
+                          <m:eqArr>
+                            <m:eqArrPr>
+                              <m:ctrlPr>
+                                <a:rPr lang="en-US" altLang="ja-JP" i="1">
+                                  <a:latin typeface="Cambria Math" panose="02040503050406030204" pitchFamily="18" charset="0"/>
+                                </a:rPr>
+                              </m:ctrlPr>
+                            </m:eqArrPr>
+                            <m:e>
+                              <m:r>
+                                <a:rPr lang="en-US" altLang="ja-JP" i="1">
+                                  <a:latin typeface="Cambria Math" panose="02040503050406030204" pitchFamily="18" charset="0"/>
+                                </a:rPr>
+                                <m:t>2</m:t>
+                              </m:r>
+                              <m:d>
+                                <m:dPr>
+                                  <m:ctrlPr>
+                                    <a:rPr lang="en-US" altLang="ja-JP" i="1">
+                                      <a:latin typeface="Cambria Math" panose="02040503050406030204" pitchFamily="18" charset="0"/>
+                                    </a:rPr>
+                                  </m:ctrlPr>
+                                </m:dPr>
+                                <m:e>
+                                  <m:sSub>
+                                    <m:sSubPr>
+                                      <m:ctrlPr>
+                                        <a:rPr lang="en-US" altLang="ja-JP" i="1">
+                                          <a:latin typeface="Cambria Math" panose="02040503050406030204" pitchFamily="18" charset="0"/>
+                                        </a:rPr>
+                                      </m:ctrlPr>
+                                    </m:sSubPr>
+                                    <m:e>
+                                      <m:r>
+                                        <a:rPr lang="en-US" altLang="ja-JP" i="1">
+                                          <a:latin typeface="Cambria Math" panose="02040503050406030204" pitchFamily="18" charset="0"/>
+                                        </a:rPr>
+                                        <m:t>𝑞</m:t>
+                                      </m:r>
+                                    </m:e>
+                                    <m:sub>
+                                      <m:r>
+                                        <a:rPr lang="en-US" altLang="ja-JP" i="1">
+                                          <a:latin typeface="Cambria Math" panose="02040503050406030204" pitchFamily="18" charset="0"/>
+                                        </a:rPr>
+                                        <m:t>3</m:t>
+                                      </m:r>
+                                    </m:sub>
+                                  </m:sSub>
+                                  <m:sSub>
+                                    <m:sSubPr>
+                                      <m:ctrlPr>
+                                        <a:rPr lang="en-US" altLang="ja-JP" i="1">
+                                          <a:latin typeface="Cambria Math" panose="02040503050406030204" pitchFamily="18" charset="0"/>
+                                        </a:rPr>
+                                      </m:ctrlPr>
+                                    </m:sSubPr>
+                                    <m:e>
+                                      <m:r>
+                                        <a:rPr lang="en-US" altLang="ja-JP" i="1">
+                                          <a:latin typeface="Cambria Math" panose="02040503050406030204" pitchFamily="18" charset="0"/>
+                                        </a:rPr>
+                                        <m:t>𝑞</m:t>
+                                      </m:r>
+                                    </m:e>
+                                    <m:sub>
+                                      <m:r>
+                                        <a:rPr lang="en-US" altLang="ja-JP" i="1">
+                                          <a:latin typeface="Cambria Math" panose="02040503050406030204" pitchFamily="18" charset="0"/>
+                                        </a:rPr>
+                                        <m:t>1</m:t>
+                                      </m:r>
+                                    </m:sub>
+                                  </m:sSub>
+                                  <m:r>
+                                    <a:rPr lang="en-US" altLang="ja-JP" i="1">
+                                      <a:latin typeface="Cambria Math" panose="02040503050406030204" pitchFamily="18" charset="0"/>
+                                    </a:rPr>
+                                    <m:t>−</m:t>
+                                  </m:r>
+                                  <m:sSub>
+                                    <m:sSubPr>
+                                      <m:ctrlPr>
+                                        <a:rPr lang="en-US" altLang="ja-JP" i="1">
+                                          <a:latin typeface="Cambria Math" panose="02040503050406030204" pitchFamily="18" charset="0"/>
+                                        </a:rPr>
+                                      </m:ctrlPr>
+                                    </m:sSubPr>
+                                    <m:e>
+                                      <m:r>
+                                        <a:rPr lang="en-US" altLang="ja-JP" i="1">
+                                          <a:latin typeface="Cambria Math" panose="02040503050406030204" pitchFamily="18" charset="0"/>
+                                        </a:rPr>
+                                        <m:t>𝑞</m:t>
+                                      </m:r>
+                                    </m:e>
+                                    <m:sub>
+                                      <m:r>
+                                        <a:rPr lang="en-US" altLang="ja-JP" i="1">
+                                          <a:latin typeface="Cambria Math" panose="02040503050406030204" pitchFamily="18" charset="0"/>
+                                        </a:rPr>
+                                        <m:t>2</m:t>
+                                      </m:r>
+                                    </m:sub>
+                                  </m:sSub>
+                                  <m:sSub>
+                                    <m:sSubPr>
+                                      <m:ctrlPr>
+                                        <a:rPr lang="en-US" altLang="ja-JP" i="1">
+                                          <a:latin typeface="Cambria Math" panose="02040503050406030204" pitchFamily="18" charset="0"/>
+                                        </a:rPr>
+                                      </m:ctrlPr>
+                                    </m:sSubPr>
+                                    <m:e>
+                                      <m:r>
+                                        <a:rPr lang="en-US" altLang="ja-JP" i="1">
+                                          <a:latin typeface="Cambria Math" panose="02040503050406030204" pitchFamily="18" charset="0"/>
+                                        </a:rPr>
+                                        <m:t>𝑞</m:t>
+                                      </m:r>
+                                    </m:e>
+                                    <m:sub>
+                                      <m:r>
+                                        <a:rPr lang="en-US" altLang="ja-JP" i="1">
+                                          <a:latin typeface="Cambria Math" panose="02040503050406030204" pitchFamily="18" charset="0"/>
+                                        </a:rPr>
+                                        <m:t>4</m:t>
+                                      </m:r>
+                                    </m:sub>
+                                  </m:sSub>
+                                </m:e>
+                              </m:d>
+                              <m:r>
+                                <a:rPr lang="en-US" altLang="ja-JP" i="1">
+                                  <a:latin typeface="Cambria Math" panose="02040503050406030204" pitchFamily="18" charset="0"/>
+                                </a:rPr>
+                                <m:t>𝑔</m:t>
+                              </m:r>
+                            </m:e>
+                            <m:e>
+                              <m:r>
+                                <a:rPr lang="en-US" altLang="ja-JP" i="1">
+                                  <a:latin typeface="Cambria Math" panose="02040503050406030204" pitchFamily="18" charset="0"/>
+                                </a:rPr>
+                                <m:t>2</m:t>
+                              </m:r>
+                              <m:d>
+                                <m:dPr>
+                                  <m:ctrlPr>
+                                    <a:rPr lang="en-US" altLang="ja-JP" i="1">
+                                      <a:latin typeface="Cambria Math" panose="02040503050406030204" pitchFamily="18" charset="0"/>
+                                    </a:rPr>
+                                  </m:ctrlPr>
+                                </m:dPr>
+                                <m:e>
+                                  <m:sSub>
+                                    <m:sSubPr>
+                                      <m:ctrlPr>
+                                        <a:rPr lang="en-US" altLang="ja-JP" i="1">
+                                          <a:latin typeface="Cambria Math" panose="02040503050406030204" pitchFamily="18" charset="0"/>
+                                        </a:rPr>
+                                      </m:ctrlPr>
+                                    </m:sSubPr>
+                                    <m:e>
+                                      <m:r>
+                                        <a:rPr lang="en-US" altLang="ja-JP" i="1">
+                                          <a:latin typeface="Cambria Math" panose="02040503050406030204" pitchFamily="18" charset="0"/>
+                                        </a:rPr>
+                                        <m:t>𝑞</m:t>
+                                      </m:r>
+                                    </m:e>
+                                    <m:sub>
+                                      <m:r>
+                                        <a:rPr lang="en-US" altLang="ja-JP" i="1">
+                                          <a:latin typeface="Cambria Math" panose="02040503050406030204" pitchFamily="18" charset="0"/>
+                                        </a:rPr>
+                                        <m:t>2</m:t>
+                                      </m:r>
+                                    </m:sub>
+                                  </m:sSub>
+                                  <m:sSub>
+                                    <m:sSubPr>
+                                      <m:ctrlPr>
+                                        <a:rPr lang="en-US" altLang="ja-JP" i="1">
+                                          <a:latin typeface="Cambria Math" panose="02040503050406030204" pitchFamily="18" charset="0"/>
+                                        </a:rPr>
+                                      </m:ctrlPr>
+                                    </m:sSubPr>
+                                    <m:e>
+                                      <m:r>
+                                        <a:rPr lang="en-US" altLang="ja-JP" i="1">
+                                          <a:latin typeface="Cambria Math" panose="02040503050406030204" pitchFamily="18" charset="0"/>
+                                        </a:rPr>
+                                        <m:t>𝑞</m:t>
+                                      </m:r>
+                                    </m:e>
+                                    <m:sub>
+                                      <m:r>
+                                        <a:rPr lang="en-US" altLang="ja-JP" i="1">
+                                          <a:latin typeface="Cambria Math" panose="02040503050406030204" pitchFamily="18" charset="0"/>
+                                        </a:rPr>
+                                        <m:t>3</m:t>
+                                      </m:r>
+                                    </m:sub>
+                                  </m:sSub>
+                                  <m:r>
+                                    <a:rPr lang="en-US" altLang="ja-JP" i="1">
+                                      <a:latin typeface="Cambria Math" panose="02040503050406030204" pitchFamily="18" charset="0"/>
+                                    </a:rPr>
+                                    <m:t>+</m:t>
+                                  </m:r>
+                                  <m:sSub>
+                                    <m:sSubPr>
+                                      <m:ctrlPr>
+                                        <a:rPr lang="en-US" altLang="ja-JP" i="1">
+                                          <a:latin typeface="Cambria Math" panose="02040503050406030204" pitchFamily="18" charset="0"/>
+                                        </a:rPr>
+                                      </m:ctrlPr>
+                                    </m:sSubPr>
+                                    <m:e>
+                                      <m:r>
+                                        <a:rPr lang="en-US" altLang="ja-JP" i="1">
+                                          <a:latin typeface="Cambria Math" panose="02040503050406030204" pitchFamily="18" charset="0"/>
+                                        </a:rPr>
+                                        <m:t>𝑞</m:t>
+                                      </m:r>
+                                    </m:e>
+                                    <m:sub>
+                                      <m:r>
+                                        <a:rPr lang="en-US" altLang="ja-JP" i="1">
+                                          <a:latin typeface="Cambria Math" panose="02040503050406030204" pitchFamily="18" charset="0"/>
+                                        </a:rPr>
+                                        <m:t>1</m:t>
+                                      </m:r>
+                                    </m:sub>
+                                  </m:sSub>
+                                  <m:sSub>
+                                    <m:sSubPr>
+                                      <m:ctrlPr>
+                                        <a:rPr lang="en-US" altLang="ja-JP" i="1">
+                                          <a:latin typeface="Cambria Math" panose="02040503050406030204" pitchFamily="18" charset="0"/>
+                                        </a:rPr>
+                                      </m:ctrlPr>
+                                    </m:sSubPr>
+                                    <m:e>
+                                      <m:r>
+                                        <a:rPr lang="en-US" altLang="ja-JP" i="1">
+                                          <a:latin typeface="Cambria Math" panose="02040503050406030204" pitchFamily="18" charset="0"/>
+                                        </a:rPr>
+                                        <m:t>𝑞</m:t>
+                                      </m:r>
+                                    </m:e>
+                                    <m:sub>
+                                      <m:r>
+                                        <a:rPr lang="en-US" altLang="ja-JP" i="1">
+                                          <a:latin typeface="Cambria Math" panose="02040503050406030204" pitchFamily="18" charset="0"/>
+                                        </a:rPr>
+                                        <m:t>4</m:t>
+                                      </m:r>
+                                    </m:sub>
+                                  </m:sSub>
+                                </m:e>
+                              </m:d>
+                              <m:r>
+                                <a:rPr lang="en-US" altLang="ja-JP" i="1">
+                                  <a:latin typeface="Cambria Math" panose="02040503050406030204" pitchFamily="18" charset="0"/>
+                                </a:rPr>
+                                <m:t>𝑔</m:t>
+                              </m:r>
+                            </m:e>
+                            <m:e>
+                              <m:d>
+                                <m:dPr>
+                                  <m:ctrlPr>
+                                    <a:rPr lang="en-US" altLang="ja-JP" i="1">
+                                      <a:latin typeface="Cambria Math" panose="02040503050406030204" pitchFamily="18" charset="0"/>
+                                    </a:rPr>
+                                  </m:ctrlPr>
+                                </m:dPr>
+                                <m:e>
+                                  <m:sSup>
+                                    <m:sSupPr>
+                                      <m:ctrlPr>
+                                        <a:rPr lang="en-US" altLang="ja-JP" i="1">
+                                          <a:latin typeface="Cambria Math" panose="02040503050406030204" pitchFamily="18" charset="0"/>
+                                        </a:rPr>
+                                      </m:ctrlPr>
+                                    </m:sSupPr>
+                                    <m:e>
+                                      <m:sSub>
+                                        <m:sSubPr>
+                                          <m:ctrlPr>
+                                            <a:rPr lang="en-US" altLang="ja-JP" i="1">
+                                              <a:latin typeface="Cambria Math" panose="02040503050406030204" pitchFamily="18" charset="0"/>
+                                            </a:rPr>
+                                          </m:ctrlPr>
+                                        </m:sSubPr>
+                                        <m:e>
+                                          <m:r>
+                                            <a:rPr lang="en-US" altLang="ja-JP" i="1">
+                                              <a:latin typeface="Cambria Math" panose="02040503050406030204" pitchFamily="18" charset="0"/>
+                                            </a:rPr>
+                                            <m:t>𝑞</m:t>
+                                          </m:r>
+                                        </m:e>
+                                        <m:sub>
+                                          <m:r>
+                                            <a:rPr lang="en-US" altLang="ja-JP" i="1">
+                                              <a:latin typeface="Cambria Math" panose="02040503050406030204" pitchFamily="18" charset="0"/>
+                                            </a:rPr>
+                                            <m:t>3</m:t>
+                                          </m:r>
+                                        </m:sub>
+                                      </m:sSub>
+                                    </m:e>
+                                    <m:sup>
+                                      <m:r>
+                                        <a:rPr lang="en-US" altLang="ja-JP" i="1">
+                                          <a:latin typeface="Cambria Math" panose="02040503050406030204" pitchFamily="18" charset="0"/>
+                                        </a:rPr>
+                                        <m:t>2</m:t>
+                                      </m:r>
+                                    </m:sup>
+                                  </m:sSup>
+                                  <m:r>
+                                    <a:rPr lang="en-US" altLang="ja-JP" i="1">
+                                      <a:latin typeface="Cambria Math" panose="02040503050406030204" pitchFamily="18" charset="0"/>
+                                    </a:rPr>
+                                    <m:t>−</m:t>
+                                  </m:r>
+                                  <m:sSup>
+                                    <m:sSupPr>
+                                      <m:ctrlPr>
+                                        <a:rPr lang="en-US" altLang="ja-JP" i="1">
+                                          <a:latin typeface="Cambria Math" panose="02040503050406030204" pitchFamily="18" charset="0"/>
+                                        </a:rPr>
+                                      </m:ctrlPr>
+                                    </m:sSupPr>
+                                    <m:e>
+                                      <m:sSub>
+                                        <m:sSubPr>
+                                          <m:ctrlPr>
+                                            <a:rPr lang="en-US" altLang="ja-JP" i="1">
+                                              <a:latin typeface="Cambria Math" panose="02040503050406030204" pitchFamily="18" charset="0"/>
+                                            </a:rPr>
+                                          </m:ctrlPr>
+                                        </m:sSubPr>
+                                        <m:e>
+                                          <m:r>
+                                            <a:rPr lang="en-US" altLang="ja-JP" i="1">
+                                              <a:latin typeface="Cambria Math" panose="02040503050406030204" pitchFamily="18" charset="0"/>
+                                            </a:rPr>
+                                            <m:t>𝑞</m:t>
+                                          </m:r>
+                                        </m:e>
+                                        <m:sub>
+                                          <m:r>
+                                            <a:rPr lang="en-US" altLang="ja-JP" i="1">
+                                              <a:latin typeface="Cambria Math" panose="02040503050406030204" pitchFamily="18" charset="0"/>
+                                            </a:rPr>
+                                            <m:t>1</m:t>
+                                          </m:r>
+                                        </m:sub>
+                                      </m:sSub>
+                                    </m:e>
+                                    <m:sup>
+                                      <m:r>
+                                        <a:rPr lang="en-US" altLang="ja-JP" i="1">
+                                          <a:latin typeface="Cambria Math" panose="02040503050406030204" pitchFamily="18" charset="0"/>
+                                        </a:rPr>
+                                        <m:t>2</m:t>
+                                      </m:r>
+                                    </m:sup>
+                                  </m:sSup>
+                                  <m:r>
+                                    <a:rPr lang="en-US" altLang="ja-JP" i="1">
+                                      <a:latin typeface="Cambria Math" panose="02040503050406030204" pitchFamily="18" charset="0"/>
+                                    </a:rPr>
+                                    <m:t>−</m:t>
+                                  </m:r>
+                                  <m:sSup>
+                                    <m:sSupPr>
+                                      <m:ctrlPr>
+                                        <a:rPr lang="en-US" altLang="ja-JP" i="1">
+                                          <a:latin typeface="Cambria Math" panose="02040503050406030204" pitchFamily="18" charset="0"/>
+                                        </a:rPr>
+                                      </m:ctrlPr>
+                                    </m:sSupPr>
+                                    <m:e>
+                                      <m:sSub>
+                                        <m:sSubPr>
+                                          <m:ctrlPr>
+                                            <a:rPr lang="en-US" altLang="ja-JP" i="1">
+                                              <a:latin typeface="Cambria Math" panose="02040503050406030204" pitchFamily="18" charset="0"/>
+                                            </a:rPr>
+                                          </m:ctrlPr>
+                                        </m:sSubPr>
+                                        <m:e>
+                                          <m:r>
+                                            <a:rPr lang="en-US" altLang="ja-JP" i="1">
+                                              <a:latin typeface="Cambria Math" panose="02040503050406030204" pitchFamily="18" charset="0"/>
+                                            </a:rPr>
+                                            <m:t>𝑞</m:t>
+                                          </m:r>
+                                        </m:e>
+                                        <m:sub>
+                                          <m:r>
+                                            <a:rPr lang="en-US" altLang="ja-JP" i="1">
+                                              <a:latin typeface="Cambria Math" panose="02040503050406030204" pitchFamily="18" charset="0"/>
+                                            </a:rPr>
+                                            <m:t>2</m:t>
+                                          </m:r>
+                                        </m:sub>
+                                      </m:sSub>
+                                    </m:e>
+                                    <m:sup>
+                                      <m:r>
+                                        <a:rPr lang="en-US" altLang="ja-JP" i="1">
+                                          <a:latin typeface="Cambria Math" panose="02040503050406030204" pitchFamily="18" charset="0"/>
+                                        </a:rPr>
+                                        <m:t>2</m:t>
+                                      </m:r>
+                                    </m:sup>
+                                  </m:sSup>
+                                  <m:r>
+                                    <a:rPr lang="en-US" altLang="ja-JP" i="1">
+                                      <a:latin typeface="Cambria Math" panose="02040503050406030204" pitchFamily="18" charset="0"/>
+                                    </a:rPr>
+                                    <m:t>+</m:t>
+                                  </m:r>
+                                  <m:sSup>
+                                    <m:sSupPr>
+                                      <m:ctrlPr>
+                                        <a:rPr lang="en-US" altLang="ja-JP" i="1">
+                                          <a:latin typeface="Cambria Math" panose="02040503050406030204" pitchFamily="18" charset="0"/>
+                                        </a:rPr>
+                                      </m:ctrlPr>
+                                    </m:sSupPr>
+                                    <m:e>
+                                      <m:sSub>
+                                        <m:sSubPr>
+                                          <m:ctrlPr>
+                                            <a:rPr lang="en-US" altLang="ja-JP" i="1">
+                                              <a:latin typeface="Cambria Math" panose="02040503050406030204" pitchFamily="18" charset="0"/>
+                                            </a:rPr>
+                                          </m:ctrlPr>
+                                        </m:sSubPr>
+                                        <m:e>
+                                          <m:r>
+                                            <a:rPr lang="en-US" altLang="ja-JP" i="1">
+                                              <a:latin typeface="Cambria Math" panose="02040503050406030204" pitchFamily="18" charset="0"/>
+                                            </a:rPr>
+                                            <m:t>𝑞</m:t>
+                                          </m:r>
+                                        </m:e>
+                                        <m:sub>
+                                          <m:r>
+                                            <a:rPr lang="en-US" altLang="ja-JP" i="1">
+                                              <a:latin typeface="Cambria Math" panose="02040503050406030204" pitchFamily="18" charset="0"/>
+                                            </a:rPr>
+                                            <m:t>4</m:t>
+                                          </m:r>
+                                        </m:sub>
+                                      </m:sSub>
+                                    </m:e>
+                                    <m:sup>
+                                      <m:r>
+                                        <a:rPr lang="en-US" altLang="ja-JP" i="1">
+                                          <a:latin typeface="Cambria Math" panose="02040503050406030204" pitchFamily="18" charset="0"/>
+                                        </a:rPr>
+                                        <m:t>2</m:t>
+                                      </m:r>
+                                    </m:sup>
+                                  </m:sSup>
+                                </m:e>
+                              </m:d>
+                              <m:r>
+                                <a:rPr lang="en-US" altLang="ja-JP" i="1">
+                                  <a:latin typeface="Cambria Math" panose="02040503050406030204" pitchFamily="18" charset="0"/>
+                                </a:rPr>
+                                <m:t>𝑔</m:t>
+                              </m:r>
+                            </m:e>
+                          </m:eqArr>
+                        </m:e>
+                      </m:d>
+                    </m:oMath>
+                  </m:oMathPara>
+                </a14:m>
+                <a:endParaRPr kumimoji="1" lang="ja-JP" altLang="en-US" dirty="0"/>
+              </a:p>
+            </p:txBody>
+          </p:sp>
+        </mc:Choice>
+        <mc:Fallback>
+          <p:sp>
+            <p:nvSpPr>
+              <p:cNvPr id="86" name="テキスト ボックス 85"/>
+              <p:cNvSpPr txBox="1">
+                <a:spLocks noRot="1" noChangeAspect="1" noMove="1" noResize="1" noEditPoints="1" noAdjustHandles="1" noChangeArrowheads="1" noChangeShapeType="1" noTextEdit="1"/>
+              </p:cNvSpPr>
+              <p:nvPr/>
+            </p:nvSpPr>
+            <p:spPr>
+              <a:xfrm>
+                <a:off x="4079101" y="4319392"/>
+                <a:ext cx="3858812" cy="972702"/>
+              </a:xfrm>
+              <a:prstGeom prst="rect">
+                <a:avLst/>
+              </a:prstGeom>
+              <a:blipFill rotWithShape="0">
+                <a:blip r:embed="rId12"/>
+                <a:stretch>
+                  <a:fillRect/>
+                </a:stretch>
+              </a:blipFill>
+            </p:spPr>
+            <p:txBody>
+              <a:bodyPr/>
+              <a:lstStyle/>
+              <a:p>
+                <a:r>
+                  <a:rPr lang="ja-JP" altLang="en-US">
+                    <a:noFill/>
+                  </a:rPr>
+                  <a:t> </a:t>
+                </a:r>
+              </a:p>
+            </p:txBody>
+          </p:sp>
+        </mc:Fallback>
+      </mc:AlternateContent>
+    </p:spTree>
+    <p:extLst>
+      <p:ext uri="{BB962C8B-B14F-4D97-AF65-F5344CB8AC3E}">
+        <p14:creationId xmlns:p14="http://schemas.microsoft.com/office/powerpoint/2010/main" val="2416771007"/>
+      </p:ext>
+    </p:extLst>
+  </p:cSld>
+  <p:clrMapOvr>
+    <a:masterClrMapping/>
+  </p:clrMapOvr>
+</p:sld>
+</file>
+
+<file path=ppt/slides/slide11.xml><?xml version="1.0" encoding="utf-8"?>
+<p:sld xmlns:a="http://schemas.openxmlformats.org/drawingml/2006/main" xmlns:r="http://schemas.openxmlformats.org/officeDocument/2006/relationships" xmlns:p="http://schemas.openxmlformats.org/presentationml/2006/main">
+  <p:cSld>
+    <p:spTree>
+      <p:nvGrpSpPr>
+        <p:cNvPr id="1" name=""/>
+        <p:cNvGrpSpPr/>
+        <p:nvPr/>
+      </p:nvGrpSpPr>
+      <p:grpSpPr>
+        <a:xfrm>
+          <a:off x="0" y="0"/>
+          <a:ext cx="0" cy="0"/>
+          <a:chOff x="0" y="0"/>
+          <a:chExt cx="0" cy="0"/>
+        </a:xfrm>
+      </p:grpSpPr>
+      <p:sp>
+        <p:nvSpPr>
+          <p:cNvPr id="2" name="タイトル 1"/>
+          <p:cNvSpPr>
+            <a:spLocks noGrp="1"/>
+          </p:cNvSpPr>
+          <p:nvPr>
+            <p:ph type="title"/>
+          </p:nvPr>
+        </p:nvSpPr>
+        <p:spPr/>
+        <p:txBody>
+          <a:bodyPr/>
+          <a:lstStyle/>
+          <a:p>
+            <a:r>
+              <a:rPr lang="en-US" altLang="ja-JP" dirty="0" smtClean="0"/>
+              <a:t>Jacobian Matrix</a:t>
+            </a:r>
+            <a:endParaRPr kumimoji="1" lang="ja-JP" altLang="en-US" dirty="0"/>
+          </a:p>
+        </p:txBody>
+      </p:sp>
+      <p:sp>
+        <p:nvSpPr>
+          <p:cNvPr id="4" name="角丸四角形 3"/>
+          <p:cNvSpPr/>
+          <p:nvPr/>
+        </p:nvSpPr>
+        <p:spPr bwMode="auto">
+          <a:xfrm>
+            <a:off x="539552" y="1340768"/>
+            <a:ext cx="7344816" cy="3456384"/>
+          </a:xfrm>
+          <a:prstGeom prst="roundRect">
+            <a:avLst>
+              <a:gd name="adj" fmla="val 7825"/>
+            </a:avLst>
+          </a:prstGeom>
+          <a:noFill/>
+          <a:ln w="63500" cap="flat" cmpd="sng" algn="ctr">
+            <a:solidFill>
+              <a:schemeClr val="tx1"/>
+            </a:solidFill>
+            <a:prstDash val="solid"/>
+            <a:round/>
+            <a:headEnd type="none" w="med" len="med"/>
+            <a:tailEnd type="none" w="med" len="med"/>
+          </a:ln>
+          <a:effectLst/>
+        </p:spPr>
+        <p:txBody>
+          <a:bodyPr vert="horz" wrap="none" lIns="91440" tIns="45720" rIns="91440" bIns="45720" numCol="1" rtlCol="0" anchor="ctr" anchorCtr="0" compatLnSpc="1">
+            <a:prstTxWarp prst="textNoShape">
+              <a:avLst/>
+            </a:prstTxWarp>
+          </a:bodyPr>
+          <a:lstStyle/>
+          <a:p>
+            <a:pPr marL="0" marR="0" indent="0" algn="l" defTabSz="914400" rtl="0" eaLnBrk="1" fontAlgn="base" latinLnBrk="0" hangingPunct="1">
+              <a:lnSpc>
+                <a:spcPct val="100000"/>
+              </a:lnSpc>
+              <a:spcBef>
+                <a:spcPct val="0"/>
+              </a:spcBef>
+              <a:spcAft>
+                <a:spcPct val="0"/>
+              </a:spcAft>
+              <a:buClrTx/>
+              <a:buSzTx/>
+              <a:buFontTx/>
+              <a:buNone/>
+              <a:tabLst/>
+            </a:pPr>
+            <a:endParaRPr kumimoji="1" lang="ja-JP" altLang="en-US" sz="2400" b="0" i="0" u="none" strike="noStrike" cap="none" normalizeH="0" baseline="0" smtClean="0">
+              <a:ln>
+                <a:noFill/>
+              </a:ln>
+              <a:solidFill>
+                <a:schemeClr val="tx1"/>
+              </a:solidFill>
+              <a:effectLst/>
+              <a:latin typeface="Times New Roman" pitchFamily="18" charset="0"/>
+              <a:ea typeface="ＭＳ Ｐゴシック" pitchFamily="50" charset="-128"/>
+            </a:endParaRPr>
+          </a:p>
+        </p:txBody>
+      </p:sp>
+      <p:sp>
+        <p:nvSpPr>
+          <p:cNvPr id="5" name="テキスト ボックス 4"/>
+          <p:cNvSpPr txBox="1"/>
+          <p:nvPr/>
+        </p:nvSpPr>
+        <p:spPr>
+          <a:xfrm>
+            <a:off x="2780083" y="1093824"/>
+            <a:ext cx="2594941" cy="461665"/>
+          </a:xfrm>
+          <a:prstGeom prst="rect">
+            <a:avLst/>
+          </a:prstGeom>
+          <a:solidFill>
+            <a:srgbClr val="FFFFFF"/>
+          </a:solidFill>
+        </p:spPr>
+        <p:txBody>
+          <a:bodyPr wrap="none" rtlCol="0">
+            <a:spAutoFit/>
+          </a:bodyPr>
+          <a:lstStyle/>
+          <a:p>
+            <a:pPr algn="just"/>
+            <a:r>
+              <a:rPr lang="en-US" altLang="ja-JP" sz="2400" dirty="0" smtClean="0">
+                <a:latin typeface="+mj-ea"/>
+                <a:ea typeface="+mj-ea"/>
+              </a:rPr>
+              <a:t>Jacobian Matrix</a:t>
+            </a:r>
+            <a:endParaRPr kumimoji="1" lang="ja-JP" altLang="en-US" sz="2400" dirty="0">
+              <a:latin typeface="+mj-ea"/>
+              <a:ea typeface="+mj-ea"/>
+            </a:endParaRPr>
+          </a:p>
+        </p:txBody>
+      </p:sp>
+      <mc:AlternateContent xmlns:mc="http://schemas.openxmlformats.org/markup-compatibility/2006">
+        <mc:Choice xmlns:a14="http://schemas.microsoft.com/office/drawing/2010/main" Requires="a14">
+          <p:sp>
+            <p:nvSpPr>
+              <p:cNvPr id="10" name="テキスト ボックス 9"/>
+              <p:cNvSpPr txBox="1"/>
+              <p:nvPr/>
+            </p:nvSpPr>
+            <p:spPr>
+              <a:xfrm>
+                <a:off x="846256" y="1986680"/>
+                <a:ext cx="2268250" cy="871521"/>
+              </a:xfrm>
+              <a:prstGeom prst="rect">
+                <a:avLst/>
+              </a:prstGeom>
+              <a:noFill/>
+            </p:spPr>
+            <p:txBody>
+              <a:bodyPr wrap="none" rtlCol="0">
+                <a:spAutoFit/>
+              </a:bodyPr>
+              <a:lstStyle/>
+              <a:p>
+                <a:pPr/>
+                <a14:m>
+                  <m:oMathPara xmlns:m="http://schemas.openxmlformats.org/officeDocument/2006/math">
+                    <m:oMathParaPr>
+                      <m:jc m:val="centerGroup"/>
+                    </m:oMathParaPr>
+                    <m:oMath xmlns:m="http://schemas.openxmlformats.org/officeDocument/2006/math">
+                      <m:sSub>
+                        <m:sSubPr>
+                          <m:ctrlPr>
+                            <a:rPr lang="en-US" altLang="ja-JP" sz="2400" i="1" smtClean="0">
+                              <a:latin typeface="Cambria Math" panose="02040503050406030204" pitchFamily="18" charset="0"/>
+                            </a:rPr>
+                          </m:ctrlPr>
+                        </m:sSubPr>
+                        <m:e>
+                          <m:r>
+                            <a:rPr lang="en-US" altLang="ja-JP" sz="2400" b="1" i="1" smtClean="0">
+                              <a:latin typeface="Cambria Math" panose="02040503050406030204" pitchFamily="18" charset="0"/>
+                            </a:rPr>
+                            <m:t>𝑨</m:t>
+                          </m:r>
+                        </m:e>
+                        <m:sub>
+                          <m:r>
+                            <a:rPr lang="en-US" altLang="ja-JP" sz="2400" b="0" i="1" smtClean="0">
+                              <a:latin typeface="Cambria Math" panose="02040503050406030204" pitchFamily="18" charset="0"/>
+                            </a:rPr>
+                            <m:t>𝑡</m:t>
+                          </m:r>
+                        </m:sub>
+                      </m:sSub>
+                      <m:r>
+                        <a:rPr lang="en-US" altLang="ja-JP" sz="2400" b="0" i="1" smtClean="0">
+                          <a:latin typeface="Cambria Math" panose="02040503050406030204" pitchFamily="18" charset="0"/>
+                        </a:rPr>
+                        <m:t>=</m:t>
+                      </m:r>
+                      <m:f>
+                        <m:fPr>
+                          <m:ctrlPr>
+                            <a:rPr lang="en-US" altLang="ja-JP" sz="2400" b="0" i="1" smtClean="0">
+                              <a:latin typeface="Cambria Math" panose="02040503050406030204" pitchFamily="18" charset="0"/>
+                            </a:rPr>
+                          </m:ctrlPr>
+                        </m:fPr>
+                        <m:num>
+                          <m:r>
+                            <a:rPr lang="en-US" altLang="ja-JP" sz="2400" b="0" i="1" smtClean="0">
+                              <a:latin typeface="Cambria Math" panose="02040503050406030204" pitchFamily="18" charset="0"/>
+                            </a:rPr>
+                            <m:t>𝜕</m:t>
+                          </m:r>
+                          <m:r>
+                            <a:rPr lang="en-US" altLang="ja-JP" sz="2400" b="1" i="1">
+                              <a:latin typeface="Cambria Math" panose="02040503050406030204" pitchFamily="18" charset="0"/>
+                            </a:rPr>
+                            <m:t>𝒇</m:t>
+                          </m:r>
+                          <m:d>
+                            <m:dPr>
+                              <m:ctrlPr>
+                                <a:rPr lang="en-US" altLang="ja-JP" sz="2400" i="1">
+                                  <a:latin typeface="Cambria Math" panose="02040503050406030204" pitchFamily="18" charset="0"/>
+                                </a:rPr>
+                              </m:ctrlPr>
+                            </m:dPr>
+                            <m:e>
+                              <m:sSub>
+                                <m:sSubPr>
+                                  <m:ctrlPr>
+                                    <a:rPr lang="en-US" altLang="ja-JP" sz="2400" i="1">
+                                      <a:latin typeface="Cambria Math" panose="02040503050406030204" pitchFamily="18" charset="0"/>
+                                    </a:rPr>
+                                  </m:ctrlPr>
+                                </m:sSubPr>
+                                <m:e>
+                                  <m:r>
+                                    <a:rPr lang="en-US" altLang="ja-JP" sz="2400" b="1" i="1">
+                                      <a:latin typeface="Cambria Math" panose="02040503050406030204" pitchFamily="18" charset="0"/>
+                                    </a:rPr>
+                                    <m:t>𝒙</m:t>
+                                  </m:r>
+                                </m:e>
+                                <m:sub>
+                                  <m:r>
+                                    <a:rPr lang="en-US" altLang="ja-JP" sz="2400" b="0" i="1" smtClean="0">
+                                      <a:latin typeface="Cambria Math" panose="02040503050406030204" pitchFamily="18" charset="0"/>
+                                    </a:rPr>
+                                    <m:t>𝑖</m:t>
+                                  </m:r>
+                                </m:sub>
+                              </m:sSub>
+                            </m:e>
+                          </m:d>
+                        </m:num>
+                        <m:den>
+                          <m:r>
+                            <a:rPr lang="en-US" altLang="ja-JP" sz="2400" b="0" i="1" smtClean="0">
+                              <a:latin typeface="Cambria Math" panose="02040503050406030204" pitchFamily="18" charset="0"/>
+                            </a:rPr>
+                            <m:t>𝜕</m:t>
+                          </m:r>
+                          <m:sSub>
+                            <m:sSubPr>
+                              <m:ctrlPr>
+                                <a:rPr lang="en-US" altLang="ja-JP" sz="2400" b="0" i="1" smtClean="0">
+                                  <a:latin typeface="Cambria Math" panose="02040503050406030204" pitchFamily="18" charset="0"/>
+                                </a:rPr>
+                              </m:ctrlPr>
+                            </m:sSubPr>
+                            <m:e>
+                              <m:r>
+                                <a:rPr lang="en-US" altLang="ja-JP" sz="2400" b="0" i="1" smtClean="0">
+                                  <a:latin typeface="Cambria Math" panose="02040503050406030204" pitchFamily="18" charset="0"/>
+                                </a:rPr>
+                                <m:t>𝑥</m:t>
+                              </m:r>
+                            </m:e>
+                            <m:sub>
+                              <m:r>
+                                <a:rPr lang="en-US" altLang="ja-JP" sz="2400" b="0" i="1" smtClean="0">
+                                  <a:latin typeface="Cambria Math" panose="02040503050406030204" pitchFamily="18" charset="0"/>
+                                </a:rPr>
+                                <m:t>𝑖</m:t>
+                              </m:r>
+                            </m:sub>
+                          </m:sSub>
+                        </m:den>
+                      </m:f>
+                      <m:r>
+                        <a:rPr lang="en-US" altLang="ja-JP" sz="2400" b="0" i="1" smtClean="0">
+                          <a:latin typeface="Cambria Math" panose="02040503050406030204" pitchFamily="18" charset="0"/>
+                        </a:rPr>
+                        <m:t>=</m:t>
+                      </m:r>
+                    </m:oMath>
+                  </m:oMathPara>
+                </a14:m>
+                <a:endParaRPr kumimoji="1" lang="ja-JP" altLang="en-US" sz="2400" dirty="0"/>
+              </a:p>
+            </p:txBody>
+          </p:sp>
+        </mc:Choice>
+        <mc:Fallback>
+          <p:sp>
+            <p:nvSpPr>
+              <p:cNvPr id="10" name="テキスト ボックス 9"/>
+              <p:cNvSpPr txBox="1">
+                <a:spLocks noRot="1" noChangeAspect="1" noMove="1" noResize="1" noEditPoints="1" noAdjustHandles="1" noChangeArrowheads="1" noChangeShapeType="1" noTextEdit="1"/>
+              </p:cNvSpPr>
+              <p:nvPr/>
+            </p:nvSpPr>
+            <p:spPr>
+              <a:xfrm>
+                <a:off x="846256" y="1986680"/>
+                <a:ext cx="2268250" cy="871521"/>
+              </a:xfrm>
+              <a:prstGeom prst="rect">
+                <a:avLst/>
+              </a:prstGeom>
+              <a:blipFill rotWithShape="0">
+                <a:blip r:embed="rId2"/>
+                <a:stretch>
+                  <a:fillRect/>
+                </a:stretch>
+              </a:blipFill>
+            </p:spPr>
+            <p:txBody>
+              <a:bodyPr/>
+              <a:lstStyle/>
+              <a:p>
+                <a:r>
+                  <a:rPr lang="ja-JP" altLang="en-US">
+                    <a:noFill/>
+                  </a:rPr>
+                  <a:t> </a:t>
+                </a:r>
+              </a:p>
+            </p:txBody>
+          </p:sp>
+        </mc:Fallback>
+      </mc:AlternateContent>
+      <mc:AlternateContent xmlns:mc="http://schemas.openxmlformats.org/markup-compatibility/2006">
+        <mc:Choice xmlns:a14="http://schemas.microsoft.com/office/drawing/2010/main" Requires="a14">
+          <p:sp>
+            <p:nvSpPr>
+              <p:cNvPr id="45" name="テキスト ボックス 44"/>
+              <p:cNvSpPr txBox="1"/>
+              <p:nvPr/>
+            </p:nvSpPr>
+            <p:spPr>
+              <a:xfrm>
+                <a:off x="829431" y="3370336"/>
+                <a:ext cx="6765057" cy="1266180"/>
+              </a:xfrm>
+              <a:prstGeom prst="rect">
+                <a:avLst/>
+              </a:prstGeom>
+              <a:noFill/>
+            </p:spPr>
+            <p:txBody>
+              <a:bodyPr wrap="none" rtlCol="0">
+                <a:spAutoFit/>
+              </a:bodyPr>
+              <a:lstStyle/>
+              <a:p>
+                <a:pPr/>
+                <a14:m>
+                  <m:oMathPara xmlns:m="http://schemas.openxmlformats.org/officeDocument/2006/math">
+                    <m:oMathParaPr>
+                      <m:jc m:val="centerGroup"/>
+                    </m:oMathParaPr>
+                    <m:oMath xmlns:m="http://schemas.openxmlformats.org/officeDocument/2006/math">
+                      <m:sSub>
+                        <m:sSubPr>
+                          <m:ctrlPr>
+                            <a:rPr lang="en-US" altLang="ja-JP" sz="2400" b="1" i="1" smtClean="0">
+                              <a:latin typeface="Cambria Math" panose="02040503050406030204" pitchFamily="18" charset="0"/>
+                            </a:rPr>
+                          </m:ctrlPr>
+                        </m:sSubPr>
+                        <m:e>
+                          <m:r>
+                            <a:rPr lang="en-US" altLang="ja-JP" sz="2400" b="1" i="1" smtClean="0">
+                              <a:latin typeface="Cambria Math" panose="02040503050406030204" pitchFamily="18" charset="0"/>
+                            </a:rPr>
+                            <m:t>𝑪</m:t>
+                          </m:r>
+                        </m:e>
+                        <m:sub>
+                          <m:r>
+                            <a:rPr lang="en-US" altLang="ja-JP" sz="2400" b="0" i="1" smtClean="0">
+                              <a:latin typeface="Cambria Math" panose="02040503050406030204" pitchFamily="18" charset="0"/>
+                            </a:rPr>
+                            <m:t>𝑡</m:t>
+                          </m:r>
+                        </m:sub>
+                      </m:sSub>
+                      <m:r>
+                        <a:rPr lang="en-US" altLang="ja-JP" sz="2400" b="0" i="1" smtClean="0">
+                          <a:latin typeface="Cambria Math" panose="02040503050406030204" pitchFamily="18" charset="0"/>
+                        </a:rPr>
+                        <m:t>=</m:t>
+                      </m:r>
+                      <m:f>
+                        <m:fPr>
+                          <m:ctrlPr>
+                            <a:rPr lang="en-US" altLang="ja-JP" sz="2400" b="1" i="1" smtClean="0">
+                              <a:latin typeface="Cambria Math" panose="02040503050406030204" pitchFamily="18" charset="0"/>
+                            </a:rPr>
+                          </m:ctrlPr>
+                        </m:fPr>
+                        <m:num>
+                          <m:r>
+                            <a:rPr lang="en-US" altLang="ja-JP" sz="2400" i="1">
+                              <a:latin typeface="Cambria Math" panose="02040503050406030204" pitchFamily="18" charset="0"/>
+                            </a:rPr>
+                            <m:t>𝜕</m:t>
+                          </m:r>
+                          <m:r>
+                            <a:rPr lang="en-US" altLang="ja-JP" sz="2400" b="1" i="1" smtClean="0">
+                              <a:latin typeface="Cambria Math" panose="02040503050406030204" pitchFamily="18" charset="0"/>
+                            </a:rPr>
+                            <m:t>𝒉</m:t>
+                          </m:r>
+                          <m:d>
+                            <m:dPr>
+                              <m:ctrlPr>
+                                <a:rPr lang="en-US" altLang="ja-JP" sz="2400" b="1" i="1">
+                                  <a:latin typeface="Cambria Math" panose="02040503050406030204" pitchFamily="18" charset="0"/>
+                                </a:rPr>
+                              </m:ctrlPr>
+                            </m:dPr>
+                            <m:e>
+                              <m:sSub>
+                                <m:sSubPr>
+                                  <m:ctrlPr>
+                                    <a:rPr lang="en-US" altLang="ja-JP" sz="2400" b="1" i="1">
+                                      <a:latin typeface="Cambria Math" panose="02040503050406030204" pitchFamily="18" charset="0"/>
+                                    </a:rPr>
+                                  </m:ctrlPr>
+                                </m:sSubPr>
+                                <m:e>
+                                  <m:r>
+                                    <a:rPr lang="en-US" altLang="ja-JP" sz="2400" b="1" i="1">
+                                      <a:latin typeface="Cambria Math" panose="02040503050406030204" pitchFamily="18" charset="0"/>
+                                    </a:rPr>
+                                    <m:t>𝒙</m:t>
+                                  </m:r>
+                                </m:e>
+                                <m:sub>
+                                  <m:r>
+                                    <a:rPr lang="en-US" altLang="ja-JP" sz="2400" i="1">
+                                      <a:latin typeface="Cambria Math" panose="02040503050406030204" pitchFamily="18" charset="0"/>
+                                    </a:rPr>
+                                    <m:t>𝑖</m:t>
+                                  </m:r>
+                                </m:sub>
+                              </m:sSub>
+                            </m:e>
+                          </m:d>
+                        </m:num>
+                        <m:den>
+                          <m:r>
+                            <a:rPr lang="en-US" altLang="ja-JP" sz="2400" i="1">
+                              <a:latin typeface="Cambria Math" panose="02040503050406030204" pitchFamily="18" charset="0"/>
+                            </a:rPr>
+                            <m:t>𝜕</m:t>
+                          </m:r>
+                          <m:sSub>
+                            <m:sSubPr>
+                              <m:ctrlPr>
+                                <a:rPr lang="en-US" altLang="ja-JP" sz="2400" i="1">
+                                  <a:latin typeface="Cambria Math" panose="02040503050406030204" pitchFamily="18" charset="0"/>
+                                </a:rPr>
+                              </m:ctrlPr>
+                            </m:sSubPr>
+                            <m:e>
+                              <m:r>
+                                <a:rPr lang="en-US" altLang="ja-JP" sz="2400" i="1">
+                                  <a:latin typeface="Cambria Math" panose="02040503050406030204" pitchFamily="18" charset="0"/>
+                                </a:rPr>
+                                <m:t>𝑥</m:t>
+                              </m:r>
+                            </m:e>
+                            <m:sub>
+                              <m:r>
+                                <a:rPr lang="en-US" altLang="ja-JP" sz="2400" i="1">
+                                  <a:latin typeface="Cambria Math" panose="02040503050406030204" pitchFamily="18" charset="0"/>
+                                </a:rPr>
+                                <m:t>𝑖</m:t>
+                              </m:r>
+                            </m:sub>
+                          </m:sSub>
+                        </m:den>
+                      </m:f>
+                      <m:r>
+                        <a:rPr lang="en-US" altLang="ja-JP" sz="2400" b="0" i="1" smtClean="0">
+                          <a:latin typeface="Cambria Math" panose="02040503050406030204" pitchFamily="18" charset="0"/>
+                        </a:rPr>
+                        <m:t>=</m:t>
+                      </m:r>
+                      <m:d>
+                        <m:dPr>
+                          <m:begChr m:val="["/>
+                          <m:endChr m:val="]"/>
+                          <m:ctrlPr>
+                            <a:rPr lang="en-US" altLang="ja-JP" sz="2400" b="0" i="1" smtClean="0">
+                              <a:latin typeface="Cambria Math" panose="02040503050406030204" pitchFamily="18" charset="0"/>
+                            </a:rPr>
+                          </m:ctrlPr>
+                        </m:dPr>
+                        <m:e>
+                          <m:eqArr>
+                            <m:eqArrPr>
+                              <m:ctrlPr>
+                                <a:rPr lang="en-US" altLang="ja-JP" sz="2400" b="0" i="1" smtClean="0">
+                                  <a:latin typeface="Cambria Math" panose="02040503050406030204" pitchFamily="18" charset="0"/>
+                                </a:rPr>
+                              </m:ctrlPr>
+                            </m:eqArrPr>
+                            <m:e>
+                              <m:r>
+                                <a:rPr lang="en-US" altLang="ja-JP" sz="2400" b="0" i="1" smtClean="0">
+                                  <a:latin typeface="Cambria Math" panose="02040503050406030204" pitchFamily="18" charset="0"/>
+                                </a:rPr>
+                                <m:t>2</m:t>
+                              </m:r>
+                              <m:sSub>
+                                <m:sSubPr>
+                                  <m:ctrlPr>
+                                    <a:rPr lang="en-US" altLang="ja-JP" sz="2400" b="0" i="1" smtClean="0">
+                                      <a:latin typeface="Cambria Math" panose="02040503050406030204" pitchFamily="18" charset="0"/>
+                                    </a:rPr>
+                                  </m:ctrlPr>
+                                </m:sSubPr>
+                                <m:e>
+                                  <m:r>
+                                    <a:rPr lang="en-US" altLang="ja-JP" sz="2400" b="0" i="1" smtClean="0">
+                                      <a:latin typeface="Cambria Math" panose="02040503050406030204" pitchFamily="18" charset="0"/>
+                                    </a:rPr>
+                                    <m:t>𝑞</m:t>
+                                  </m:r>
+                                </m:e>
+                                <m:sub>
+                                  <m:r>
+                                    <a:rPr lang="en-US" altLang="ja-JP" sz="2400" b="0" i="1" smtClean="0">
+                                      <a:latin typeface="Cambria Math" panose="02040503050406030204" pitchFamily="18" charset="0"/>
+                                    </a:rPr>
+                                    <m:t>3</m:t>
+                                  </m:r>
+                                </m:sub>
+                              </m:sSub>
+                              <m:r>
+                                <a:rPr lang="en-US" altLang="ja-JP" sz="2400" b="0" i="1" smtClean="0">
+                                  <a:latin typeface="Cambria Math" panose="02040503050406030204" pitchFamily="18" charset="0"/>
+                                </a:rPr>
+                                <m:t>𝑔</m:t>
+                              </m:r>
+                              <m:r>
+                                <a:rPr lang="en-US" altLang="ja-JP" sz="2400" b="0" i="1" smtClean="0">
+                                  <a:latin typeface="Cambria Math" panose="02040503050406030204" pitchFamily="18" charset="0"/>
+                                </a:rPr>
+                                <m:t> &amp; −2</m:t>
+                              </m:r>
+                              <m:sSub>
+                                <m:sSubPr>
+                                  <m:ctrlPr>
+                                    <a:rPr lang="en-US" altLang="ja-JP" sz="2400" b="0" i="1" smtClean="0">
+                                      <a:latin typeface="Cambria Math" panose="02040503050406030204" pitchFamily="18" charset="0"/>
+                                    </a:rPr>
+                                  </m:ctrlPr>
+                                </m:sSubPr>
+                                <m:e>
+                                  <m:r>
+                                    <a:rPr lang="en-US" altLang="ja-JP" sz="2400" b="0" i="1" smtClean="0">
+                                      <a:latin typeface="Cambria Math" panose="02040503050406030204" pitchFamily="18" charset="0"/>
+                                    </a:rPr>
+                                    <m:t>𝑞</m:t>
+                                  </m:r>
+                                </m:e>
+                                <m:sub>
+                                  <m:r>
+                                    <a:rPr lang="en-US" altLang="ja-JP" sz="2400" b="0" i="1" smtClean="0">
+                                      <a:latin typeface="Cambria Math" panose="02040503050406030204" pitchFamily="18" charset="0"/>
+                                    </a:rPr>
+                                    <m:t>4</m:t>
+                                  </m:r>
+                                </m:sub>
+                              </m:sSub>
+                              <m:r>
+                                <a:rPr lang="en-US" altLang="ja-JP" sz="2400" b="0" i="1" smtClean="0">
+                                  <a:latin typeface="Cambria Math" panose="02040503050406030204" pitchFamily="18" charset="0"/>
+                                </a:rPr>
+                                <m:t>𝑔</m:t>
+                              </m:r>
+                              <m:r>
+                                <a:rPr lang="en-US" altLang="ja-JP" sz="2400" b="0" i="1" smtClean="0">
+                                  <a:latin typeface="Cambria Math" panose="02040503050406030204" pitchFamily="18" charset="0"/>
+                                </a:rPr>
+                                <m:t> &amp; 2</m:t>
+                              </m:r>
+                              <m:sSub>
+                                <m:sSubPr>
+                                  <m:ctrlPr>
+                                    <a:rPr lang="en-US" altLang="ja-JP" sz="2400" b="0" i="1" smtClean="0">
+                                      <a:latin typeface="Cambria Math" panose="02040503050406030204" pitchFamily="18" charset="0"/>
+                                    </a:rPr>
+                                  </m:ctrlPr>
+                                </m:sSubPr>
+                                <m:e>
+                                  <m:r>
+                                    <a:rPr lang="en-US" altLang="ja-JP" sz="2400" b="0" i="1" smtClean="0">
+                                      <a:latin typeface="Cambria Math" panose="02040503050406030204" pitchFamily="18" charset="0"/>
+                                    </a:rPr>
+                                    <m:t>𝑞</m:t>
+                                  </m:r>
+                                </m:e>
+                                <m:sub>
+                                  <m:r>
+                                    <a:rPr lang="en-US" altLang="ja-JP" sz="2400" b="0" i="1" smtClean="0">
+                                      <a:latin typeface="Cambria Math" panose="02040503050406030204" pitchFamily="18" charset="0"/>
+                                    </a:rPr>
+                                    <m:t>1</m:t>
+                                  </m:r>
+                                </m:sub>
+                              </m:sSub>
+                              <m:r>
+                                <a:rPr lang="en-US" altLang="ja-JP" sz="2400" b="0" i="1" smtClean="0">
+                                  <a:latin typeface="Cambria Math" panose="02040503050406030204" pitchFamily="18" charset="0"/>
+                                </a:rPr>
+                                <m:t>𝑔</m:t>
+                              </m:r>
+                              <m:r>
+                                <a:rPr lang="en-US" altLang="ja-JP" sz="2400" b="0" i="1" smtClean="0">
+                                  <a:latin typeface="Cambria Math" panose="02040503050406030204" pitchFamily="18" charset="0"/>
+                                </a:rPr>
+                                <m:t> &amp; −2</m:t>
+                              </m:r>
+                              <m:sSub>
+                                <m:sSubPr>
+                                  <m:ctrlPr>
+                                    <a:rPr lang="en-US" altLang="ja-JP" sz="2400" b="0" i="1" smtClean="0">
+                                      <a:latin typeface="Cambria Math" panose="02040503050406030204" pitchFamily="18" charset="0"/>
+                                    </a:rPr>
+                                  </m:ctrlPr>
+                                </m:sSubPr>
+                                <m:e>
+                                  <m:r>
+                                    <a:rPr lang="en-US" altLang="ja-JP" sz="2400" b="0" i="1" smtClean="0">
+                                      <a:latin typeface="Cambria Math" panose="02040503050406030204" pitchFamily="18" charset="0"/>
+                                    </a:rPr>
+                                    <m:t>𝑞</m:t>
+                                  </m:r>
+                                </m:e>
+                                <m:sub>
+                                  <m:r>
+                                    <a:rPr lang="en-US" altLang="ja-JP" sz="2400" b="0" i="1" smtClean="0">
+                                      <a:latin typeface="Cambria Math" panose="02040503050406030204" pitchFamily="18" charset="0"/>
+                                    </a:rPr>
+                                    <m:t>2</m:t>
+                                  </m:r>
+                                </m:sub>
+                              </m:sSub>
+                              <m:r>
+                                <a:rPr lang="en-US" altLang="ja-JP" sz="2400" b="0" i="1" smtClean="0">
+                                  <a:latin typeface="Cambria Math" panose="02040503050406030204" pitchFamily="18" charset="0"/>
+                                </a:rPr>
+                                <m:t>𝑔</m:t>
+                              </m:r>
+                              <m:r>
+                                <a:rPr lang="en-US" altLang="ja-JP" sz="2400" b="0" i="1" smtClean="0">
+                                  <a:latin typeface="Cambria Math" panose="02040503050406030204" pitchFamily="18" charset="0"/>
+                                </a:rPr>
+                                <m:t> </m:t>
+                              </m:r>
+                            </m:e>
+                            <m:e>
+                              <m:r>
+                                <a:rPr lang="en-US" altLang="ja-JP" sz="2400" i="1">
+                                  <a:latin typeface="Cambria Math" panose="02040503050406030204" pitchFamily="18" charset="0"/>
+                                </a:rPr>
+                                <m:t>2</m:t>
+                              </m:r>
+                              <m:sSub>
+                                <m:sSubPr>
+                                  <m:ctrlPr>
+                                    <a:rPr lang="en-US" altLang="ja-JP" sz="2400" i="1">
+                                      <a:latin typeface="Cambria Math" panose="02040503050406030204" pitchFamily="18" charset="0"/>
+                                    </a:rPr>
+                                  </m:ctrlPr>
+                                </m:sSubPr>
+                                <m:e>
+                                  <m:r>
+                                    <a:rPr lang="en-US" altLang="ja-JP" sz="2400" i="1">
+                                      <a:latin typeface="Cambria Math" panose="02040503050406030204" pitchFamily="18" charset="0"/>
+                                    </a:rPr>
+                                    <m:t>𝑞</m:t>
+                                  </m:r>
+                                </m:e>
+                                <m:sub>
+                                  <m:r>
+                                    <a:rPr lang="en-US" altLang="ja-JP" sz="2400" b="0" i="1" smtClean="0">
+                                      <a:latin typeface="Cambria Math" panose="02040503050406030204" pitchFamily="18" charset="0"/>
+                                    </a:rPr>
+                                    <m:t>4</m:t>
+                                  </m:r>
+                                </m:sub>
+                              </m:sSub>
+                              <m:r>
+                                <a:rPr lang="en-US" altLang="ja-JP" sz="2400" i="1">
+                                  <a:latin typeface="Cambria Math" panose="02040503050406030204" pitchFamily="18" charset="0"/>
+                                </a:rPr>
+                                <m:t>𝑔</m:t>
+                              </m:r>
+                              <m:r>
+                                <a:rPr lang="en-US" altLang="ja-JP" sz="2400" i="1">
+                                  <a:latin typeface="Cambria Math" panose="02040503050406030204" pitchFamily="18" charset="0"/>
+                                </a:rPr>
+                                <m:t> &amp;    </m:t>
+                              </m:r>
+                              <m:r>
+                                <a:rPr lang="en-US" altLang="ja-JP" sz="2400" i="1">
+                                  <a:latin typeface="Cambria Math" panose="02040503050406030204" pitchFamily="18" charset="0"/>
+                                </a:rPr>
+                                <m:t>2</m:t>
+                              </m:r>
+                              <m:sSub>
+                                <m:sSubPr>
+                                  <m:ctrlPr>
+                                    <a:rPr lang="en-US" altLang="ja-JP" sz="2400" i="1">
+                                      <a:latin typeface="Cambria Math" panose="02040503050406030204" pitchFamily="18" charset="0"/>
+                                    </a:rPr>
+                                  </m:ctrlPr>
+                                </m:sSubPr>
+                                <m:e>
+                                  <m:r>
+                                    <a:rPr lang="en-US" altLang="ja-JP" sz="2400" i="1">
+                                      <a:latin typeface="Cambria Math" panose="02040503050406030204" pitchFamily="18" charset="0"/>
+                                    </a:rPr>
+                                    <m:t>𝑞</m:t>
+                                  </m:r>
+                                </m:e>
+                                <m:sub>
+                                  <m:r>
+                                    <a:rPr lang="en-US" altLang="ja-JP" sz="2400" b="0" i="1" smtClean="0">
+                                      <a:latin typeface="Cambria Math" panose="02040503050406030204" pitchFamily="18" charset="0"/>
+                                    </a:rPr>
+                                    <m:t>3</m:t>
+                                  </m:r>
+                                </m:sub>
+                              </m:sSub>
+                              <m:r>
+                                <a:rPr lang="en-US" altLang="ja-JP" sz="2400" i="1">
+                                  <a:latin typeface="Cambria Math" panose="02040503050406030204" pitchFamily="18" charset="0"/>
+                                </a:rPr>
+                                <m:t>𝑔</m:t>
+                              </m:r>
+                              <m:r>
+                                <a:rPr lang="en-US" altLang="ja-JP" sz="2400" i="1">
+                                  <a:latin typeface="Cambria Math" panose="02040503050406030204" pitchFamily="18" charset="0"/>
+                                </a:rPr>
+                                <m:t> &amp; 2</m:t>
+                              </m:r>
+                              <m:sSub>
+                                <m:sSubPr>
+                                  <m:ctrlPr>
+                                    <a:rPr lang="en-US" altLang="ja-JP" sz="2400" i="1">
+                                      <a:latin typeface="Cambria Math" panose="02040503050406030204" pitchFamily="18" charset="0"/>
+                                    </a:rPr>
+                                  </m:ctrlPr>
+                                </m:sSubPr>
+                                <m:e>
+                                  <m:r>
+                                    <a:rPr lang="en-US" altLang="ja-JP" sz="2400" i="1">
+                                      <a:latin typeface="Cambria Math" panose="02040503050406030204" pitchFamily="18" charset="0"/>
+                                    </a:rPr>
+                                    <m:t>𝑞</m:t>
+                                  </m:r>
+                                </m:e>
+                                <m:sub>
+                                  <m:r>
+                                    <a:rPr lang="en-US" altLang="ja-JP" sz="2400" b="0" i="1" smtClean="0">
+                                      <a:latin typeface="Cambria Math" panose="02040503050406030204" pitchFamily="18" charset="0"/>
+                                    </a:rPr>
+                                    <m:t>2</m:t>
+                                  </m:r>
+                                </m:sub>
+                              </m:sSub>
+                              <m:r>
+                                <a:rPr lang="en-US" altLang="ja-JP" sz="2400" i="1">
+                                  <a:latin typeface="Cambria Math" panose="02040503050406030204" pitchFamily="18" charset="0"/>
+                                </a:rPr>
+                                <m:t>𝑔</m:t>
+                              </m:r>
+                              <m:r>
+                                <a:rPr lang="en-US" altLang="ja-JP" sz="2400" i="1">
+                                  <a:latin typeface="Cambria Math" panose="02040503050406030204" pitchFamily="18" charset="0"/>
+                                </a:rPr>
+                                <m:t> &amp;     </m:t>
+                              </m:r>
+                              <m:r>
+                                <a:rPr lang="en-US" altLang="ja-JP" sz="2400" i="1">
+                                  <a:latin typeface="Cambria Math" panose="02040503050406030204" pitchFamily="18" charset="0"/>
+                                </a:rPr>
+                                <m:t>2</m:t>
+                              </m:r>
+                              <m:sSub>
+                                <m:sSubPr>
+                                  <m:ctrlPr>
+                                    <a:rPr lang="en-US" altLang="ja-JP" sz="2400" i="1">
+                                      <a:latin typeface="Cambria Math" panose="02040503050406030204" pitchFamily="18" charset="0"/>
+                                    </a:rPr>
+                                  </m:ctrlPr>
+                                </m:sSubPr>
+                                <m:e>
+                                  <m:r>
+                                    <a:rPr lang="en-US" altLang="ja-JP" sz="2400" i="1">
+                                      <a:latin typeface="Cambria Math" panose="02040503050406030204" pitchFamily="18" charset="0"/>
+                                    </a:rPr>
+                                    <m:t>𝑞</m:t>
+                                  </m:r>
+                                </m:e>
+                                <m:sub>
+                                  <m:r>
+                                    <a:rPr lang="en-US" altLang="ja-JP" sz="2400" b="0" i="1" smtClean="0">
+                                      <a:latin typeface="Cambria Math" panose="02040503050406030204" pitchFamily="18" charset="0"/>
+                                    </a:rPr>
+                                    <m:t>1</m:t>
+                                  </m:r>
+                                </m:sub>
+                              </m:sSub>
+                              <m:r>
+                                <a:rPr lang="en-US" altLang="ja-JP" sz="2400" i="1">
+                                  <a:latin typeface="Cambria Math" panose="02040503050406030204" pitchFamily="18" charset="0"/>
+                                </a:rPr>
+                                <m:t>𝑔</m:t>
+                              </m:r>
+                            </m:e>
+                            <m:e>
+                              <m:r>
+                                <a:rPr lang="en-US" altLang="ja-JP" sz="2400" b="0" i="1" smtClean="0">
+                                  <a:latin typeface="Cambria Math" panose="02040503050406030204" pitchFamily="18" charset="0"/>
+                                </a:rPr>
+                                <m:t> −</m:t>
+                              </m:r>
+                              <m:r>
+                                <a:rPr lang="en-US" altLang="ja-JP" sz="2400" i="1">
+                                  <a:latin typeface="Cambria Math" panose="02040503050406030204" pitchFamily="18" charset="0"/>
+                                </a:rPr>
+                                <m:t>2</m:t>
+                              </m:r>
+                              <m:sSub>
+                                <m:sSubPr>
+                                  <m:ctrlPr>
+                                    <a:rPr lang="en-US" altLang="ja-JP" sz="2400" i="1">
+                                      <a:latin typeface="Cambria Math" panose="02040503050406030204" pitchFamily="18" charset="0"/>
+                                    </a:rPr>
+                                  </m:ctrlPr>
+                                </m:sSubPr>
+                                <m:e>
+                                  <m:r>
+                                    <a:rPr lang="en-US" altLang="ja-JP" sz="2400" i="1">
+                                      <a:latin typeface="Cambria Math" panose="02040503050406030204" pitchFamily="18" charset="0"/>
+                                    </a:rPr>
+                                    <m:t>𝑞</m:t>
+                                  </m:r>
+                                </m:e>
+                                <m:sub>
+                                  <m:r>
+                                    <a:rPr lang="en-US" altLang="ja-JP" sz="2400" b="0" i="1" smtClean="0">
+                                      <a:latin typeface="Cambria Math" panose="02040503050406030204" pitchFamily="18" charset="0"/>
+                                    </a:rPr>
+                                    <m:t>1</m:t>
+                                  </m:r>
+                                </m:sub>
+                              </m:sSub>
+                              <m:r>
+                                <a:rPr lang="en-US" altLang="ja-JP" sz="2400" i="1">
+                                  <a:latin typeface="Cambria Math" panose="02040503050406030204" pitchFamily="18" charset="0"/>
+                                </a:rPr>
+                                <m:t>𝑔</m:t>
+                              </m:r>
+                              <m:r>
+                                <a:rPr lang="en-US" altLang="ja-JP" sz="2400" i="1">
+                                  <a:latin typeface="Cambria Math" panose="02040503050406030204" pitchFamily="18" charset="0"/>
+                                </a:rPr>
+                                <m:t> &amp; −2</m:t>
+                              </m:r>
+                              <m:sSub>
+                                <m:sSubPr>
+                                  <m:ctrlPr>
+                                    <a:rPr lang="en-US" altLang="ja-JP" sz="2400" i="1">
+                                      <a:latin typeface="Cambria Math" panose="02040503050406030204" pitchFamily="18" charset="0"/>
+                                    </a:rPr>
+                                  </m:ctrlPr>
+                                </m:sSubPr>
+                                <m:e>
+                                  <m:r>
+                                    <a:rPr lang="en-US" altLang="ja-JP" sz="2400" i="1">
+                                      <a:latin typeface="Cambria Math" panose="02040503050406030204" pitchFamily="18" charset="0"/>
+                                    </a:rPr>
+                                    <m:t>𝑞</m:t>
+                                  </m:r>
+                                </m:e>
+                                <m:sub>
+                                  <m:r>
+                                    <a:rPr lang="en-US" altLang="ja-JP" sz="2400" b="0" i="1" smtClean="0">
+                                      <a:latin typeface="Cambria Math" panose="02040503050406030204" pitchFamily="18" charset="0"/>
+                                    </a:rPr>
+                                    <m:t>2</m:t>
+                                  </m:r>
+                                </m:sub>
+                              </m:sSub>
+                              <m:r>
+                                <a:rPr lang="en-US" altLang="ja-JP" sz="2400" i="1">
+                                  <a:latin typeface="Cambria Math" panose="02040503050406030204" pitchFamily="18" charset="0"/>
+                                </a:rPr>
+                                <m:t>𝑔</m:t>
+                              </m:r>
+                              <m:r>
+                                <a:rPr lang="en-US" altLang="ja-JP" sz="2400" i="1">
+                                  <a:latin typeface="Cambria Math" panose="02040503050406030204" pitchFamily="18" charset="0"/>
+                                </a:rPr>
+                                <m:t> &amp; 2</m:t>
+                              </m:r>
+                              <m:sSub>
+                                <m:sSubPr>
+                                  <m:ctrlPr>
+                                    <a:rPr lang="en-US" altLang="ja-JP" sz="2400" i="1">
+                                      <a:latin typeface="Cambria Math" panose="02040503050406030204" pitchFamily="18" charset="0"/>
+                                    </a:rPr>
+                                  </m:ctrlPr>
+                                </m:sSubPr>
+                                <m:e>
+                                  <m:r>
+                                    <a:rPr lang="en-US" altLang="ja-JP" sz="2400" i="1">
+                                      <a:latin typeface="Cambria Math" panose="02040503050406030204" pitchFamily="18" charset="0"/>
+                                    </a:rPr>
+                                    <m:t>𝑞</m:t>
+                                  </m:r>
+                                </m:e>
+                                <m:sub>
+                                  <m:r>
+                                    <a:rPr lang="en-US" altLang="ja-JP" sz="2400" b="0" i="1" smtClean="0">
+                                      <a:latin typeface="Cambria Math" panose="02040503050406030204" pitchFamily="18" charset="0"/>
+                                    </a:rPr>
+                                    <m:t>3</m:t>
+                                  </m:r>
+                                </m:sub>
+                              </m:sSub>
+                              <m:r>
+                                <a:rPr lang="en-US" altLang="ja-JP" sz="2400" i="1">
+                                  <a:latin typeface="Cambria Math" panose="02040503050406030204" pitchFamily="18" charset="0"/>
+                                </a:rPr>
+                                <m:t>𝑔</m:t>
+                              </m:r>
+                              <m:r>
+                                <a:rPr lang="en-US" altLang="ja-JP" sz="2400" i="1">
+                                  <a:latin typeface="Cambria Math" panose="02040503050406030204" pitchFamily="18" charset="0"/>
+                                </a:rPr>
+                                <m:t> &amp;     </m:t>
+                              </m:r>
+                              <m:r>
+                                <a:rPr lang="en-US" altLang="ja-JP" sz="2400" i="1">
+                                  <a:latin typeface="Cambria Math" panose="02040503050406030204" pitchFamily="18" charset="0"/>
+                                </a:rPr>
+                                <m:t>2</m:t>
+                              </m:r>
+                              <m:sSub>
+                                <m:sSubPr>
+                                  <m:ctrlPr>
+                                    <a:rPr lang="en-US" altLang="ja-JP" sz="2400" i="1">
+                                      <a:latin typeface="Cambria Math" panose="02040503050406030204" pitchFamily="18" charset="0"/>
+                                    </a:rPr>
+                                  </m:ctrlPr>
+                                </m:sSubPr>
+                                <m:e>
+                                  <m:r>
+                                    <a:rPr lang="en-US" altLang="ja-JP" sz="2400" i="1">
+                                      <a:latin typeface="Cambria Math" panose="02040503050406030204" pitchFamily="18" charset="0"/>
+                                    </a:rPr>
+                                    <m:t>𝑞</m:t>
+                                  </m:r>
+                                </m:e>
+                                <m:sub>
+                                  <m:r>
+                                    <a:rPr lang="en-US" altLang="ja-JP" sz="2400" b="0" i="1" smtClean="0">
+                                      <a:latin typeface="Cambria Math" panose="02040503050406030204" pitchFamily="18" charset="0"/>
+                                    </a:rPr>
+                                    <m:t>4</m:t>
+                                  </m:r>
+                                </m:sub>
+                              </m:sSub>
+                              <m:r>
+                                <a:rPr lang="en-US" altLang="ja-JP" sz="2400" i="1">
+                                  <a:latin typeface="Cambria Math" panose="02040503050406030204" pitchFamily="18" charset="0"/>
+                                </a:rPr>
+                                <m:t>𝑔</m:t>
+                              </m:r>
+                            </m:e>
+                          </m:eqArr>
+                        </m:e>
+                      </m:d>
+                    </m:oMath>
+                  </m:oMathPara>
+                </a14:m>
+                <a:endParaRPr kumimoji="1" lang="ja-JP" altLang="en-US" sz="2400" dirty="0"/>
+              </a:p>
+            </p:txBody>
+          </p:sp>
+        </mc:Choice>
+        <mc:Fallback>
+          <p:sp>
+            <p:nvSpPr>
+              <p:cNvPr id="45" name="テキスト ボックス 44"/>
+              <p:cNvSpPr txBox="1">
+                <a:spLocks noRot="1" noChangeAspect="1" noMove="1" noResize="1" noEditPoints="1" noAdjustHandles="1" noChangeArrowheads="1" noChangeShapeType="1" noTextEdit="1"/>
+              </p:cNvSpPr>
+              <p:nvPr/>
+            </p:nvSpPr>
+            <p:spPr>
+              <a:xfrm>
+                <a:off x="829431" y="3370336"/>
+                <a:ext cx="6765057" cy="1266180"/>
+              </a:xfrm>
+              <a:prstGeom prst="rect">
+                <a:avLst/>
+              </a:prstGeom>
+              <a:blipFill rotWithShape="0">
+                <a:blip r:embed="rId3"/>
+                <a:stretch>
+                  <a:fillRect/>
+                </a:stretch>
+              </a:blipFill>
+            </p:spPr>
+            <p:txBody>
+              <a:bodyPr/>
+              <a:lstStyle/>
+              <a:p>
+                <a:r>
+                  <a:rPr lang="ja-JP" altLang="en-US">
+                    <a:noFill/>
+                  </a:rPr>
+                  <a:t> </a:t>
+                </a:r>
+              </a:p>
+            </p:txBody>
+          </p:sp>
+        </mc:Fallback>
+      </mc:AlternateContent>
+      <p:pic>
+        <p:nvPicPr>
+          <p:cNvPr id="18" name="図 17"/>
+          <p:cNvPicPr>
+            <a:picLocks noChangeAspect="1"/>
+          </p:cNvPicPr>
+          <p:nvPr/>
+        </p:nvPicPr>
+        <p:blipFill rotWithShape="1">
+          <a:blip r:embed="rId4">
+            <a:extLst>
+              <a:ext uri="{28A0092B-C50C-407E-A947-70E740481C1C}">
+                <a14:useLocalDpi xmlns:a14="http://schemas.microsoft.com/office/drawing/2010/main" val="0"/>
+              </a:ext>
+            </a:extLst>
+          </a:blip>
+          <a:srcRect l="14594" t="55876" r="34814" b="2218"/>
+          <a:stretch/>
+        </p:blipFill>
+        <p:spPr>
+          <a:xfrm>
+            <a:off x="3136210" y="1580724"/>
+            <a:ext cx="3398058" cy="1764377"/>
+          </a:xfrm>
+          <a:prstGeom prst="rect">
+            <a:avLst/>
+          </a:prstGeom>
+        </p:spPr>
+      </p:pic>
+      <p:sp>
+        <p:nvSpPr>
+          <p:cNvPr id="3" name="正方形/長方形 2"/>
+          <p:cNvSpPr/>
+          <p:nvPr/>
+        </p:nvSpPr>
+        <p:spPr bwMode="auto">
+          <a:xfrm>
+            <a:off x="6156176" y="2204865"/>
+            <a:ext cx="648072" cy="720080"/>
+          </a:xfrm>
+          <a:prstGeom prst="rect">
+            <a:avLst/>
+          </a:prstGeom>
+          <a:solidFill>
+            <a:srgbClr val="FFFFFF"/>
+          </a:solidFill>
+          <a:ln w="9525" cap="flat" cmpd="sng" algn="ctr">
+            <a:noFill/>
+            <a:prstDash val="solid"/>
+            <a:round/>
+            <a:headEnd type="none" w="med" len="med"/>
+            <a:tailEnd type="none" w="med" len="med"/>
+          </a:ln>
+          <a:effectLst/>
+        </p:spPr>
+        <p:txBody>
+          <a:bodyPr vert="horz" wrap="none" lIns="91440" tIns="45720" rIns="91440" bIns="45720" numCol="1" rtlCol="0" anchor="ctr" anchorCtr="0" compatLnSpc="1">
+            <a:prstTxWarp prst="textNoShape">
+              <a:avLst/>
+            </a:prstTxWarp>
+          </a:bodyPr>
+          <a:lstStyle/>
+          <a:p>
+            <a:pPr marL="0" marR="0" indent="0" algn="l" defTabSz="914400" rtl="0" eaLnBrk="1" fontAlgn="base" latinLnBrk="0" hangingPunct="1">
+              <a:lnSpc>
+                <a:spcPct val="100000"/>
+              </a:lnSpc>
+              <a:spcBef>
+                <a:spcPct val="0"/>
+              </a:spcBef>
+              <a:spcAft>
+                <a:spcPct val="0"/>
+              </a:spcAft>
+              <a:buClrTx/>
+              <a:buSzTx/>
+              <a:buFontTx/>
+              <a:buNone/>
+              <a:tabLst/>
+            </a:pPr>
+            <a:endParaRPr kumimoji="1" lang="ja-JP" altLang="en-US" sz="2400" b="0" i="0" u="none" strike="noStrike" cap="none" normalizeH="0" baseline="0" smtClean="0">
+              <a:ln>
+                <a:noFill/>
+              </a:ln>
+              <a:solidFill>
+                <a:schemeClr val="tx1"/>
+              </a:solidFill>
+              <a:effectLst/>
+              <a:latin typeface="Times New Roman" pitchFamily="18" charset="0"/>
+              <a:ea typeface="ＭＳ Ｐゴシック" pitchFamily="50" charset="-128"/>
+            </a:endParaRPr>
+          </a:p>
+        </p:txBody>
+      </p:sp>
+    </p:spTree>
+    <p:extLst>
+      <p:ext uri="{BB962C8B-B14F-4D97-AF65-F5344CB8AC3E}">
+        <p14:creationId xmlns:p14="http://schemas.microsoft.com/office/powerpoint/2010/main" val="3181463620"/>
+      </p:ext>
+    </p:extLst>
+  </p:cSld>
+  <p:clrMapOvr>
+    <a:masterClrMapping/>
+  </p:clrMapOvr>
+</p:sld>
+</file>
+
 <file path=ppt/slides/slide2.xml><?xml version="1.0" encoding="utf-8"?>
 <p:sld xmlns:a="http://schemas.openxmlformats.org/drawingml/2006/main" xmlns:r="http://schemas.openxmlformats.org/officeDocument/2006/relationships" xmlns:p="http://schemas.openxmlformats.org/presentationml/2006/main">
   <p:cSld>
@@ -20567,8 +24402,8 @@
           </a:p>
         </p:txBody>
       </p:sp>
-      <mc:AlternateContent xmlns:mc="http://schemas.openxmlformats.org/markup-compatibility/2006">
-        <mc:Choice xmlns:a14="http://schemas.microsoft.com/office/drawing/2010/main" Requires="a14">
+      <mc:AlternateContent xmlns:mc="http://schemas.openxmlformats.org/markup-compatibility/2006" xmlns:a14="http://schemas.microsoft.com/office/drawing/2010/main">
+        <mc:Choice Requires="a14">
           <p:sp>
             <p:nvSpPr>
               <p:cNvPr id="10" name="テキスト ボックス 9"/>
@@ -20725,7 +24560,7 @@
             </p:txBody>
           </p:sp>
         </mc:Choice>
-        <mc:Fallback>
+        <mc:Fallback xmlns="">
           <p:sp>
             <p:nvSpPr>
               <p:cNvPr id="10" name="テキスト ボックス 9"/>
@@ -20764,8 +24599,8 @@
           </p:sp>
         </mc:Fallback>
       </mc:AlternateContent>
-      <mc:AlternateContent xmlns:mc="http://schemas.openxmlformats.org/markup-compatibility/2006">
-        <mc:Choice xmlns:a14="http://schemas.microsoft.com/office/drawing/2010/main" Requires="a14">
+      <mc:AlternateContent xmlns:mc="http://schemas.openxmlformats.org/markup-compatibility/2006" xmlns:a14="http://schemas.microsoft.com/office/drawing/2010/main">
+        <mc:Choice Requires="a14">
           <p:sp>
             <p:nvSpPr>
               <p:cNvPr id="11" name="テキスト ボックス 10"/>
@@ -20788,6 +24623,7 @@
               </a:bodyPr>
               <a:lstStyle/>
               <a:p>
+                <a:pPr/>
                 <a14:m>
                   <m:oMathPara xmlns:m="http://schemas.openxmlformats.org/officeDocument/2006/math">
                     <m:oMathParaPr>
@@ -21470,7 +25306,7 @@
             </p:txBody>
           </p:sp>
         </mc:Choice>
-        <mc:Fallback>
+        <mc:Fallback xmlns="">
           <p:sp>
             <p:nvSpPr>
               <p:cNvPr id="11" name="テキスト ボックス 10"/>
@@ -21573,8 +25409,8 @@
           </a:p>
         </p:txBody>
       </p:sp>
-      <mc:AlternateContent xmlns:mc="http://schemas.openxmlformats.org/markup-compatibility/2006">
-        <mc:Choice xmlns:a14="http://schemas.microsoft.com/office/drawing/2010/main" Requires="a14">
+      <mc:AlternateContent xmlns:mc="http://schemas.openxmlformats.org/markup-compatibility/2006" xmlns:a14="http://schemas.microsoft.com/office/drawing/2010/main">
+        <mc:Choice Requires="a14">
           <p:sp>
             <p:nvSpPr>
               <p:cNvPr id="26" name="正方形/長方形 25"/>
@@ -21636,7 +25472,7 @@
             </p:txBody>
           </p:sp>
         </mc:Choice>
-        <mc:Fallback>
+        <mc:Fallback xmlns="">
           <p:sp>
             <p:nvSpPr>
               <p:cNvPr id="26" name="正方形/長方形 25"/>
@@ -21675,8 +25511,8 @@
           </p:sp>
         </mc:Fallback>
       </mc:AlternateContent>
-      <mc:AlternateContent xmlns:mc="http://schemas.openxmlformats.org/markup-compatibility/2006">
-        <mc:Choice xmlns:a14="http://schemas.microsoft.com/office/drawing/2010/main" Requires="a14">
+      <mc:AlternateContent xmlns:mc="http://schemas.openxmlformats.org/markup-compatibility/2006" xmlns:a14="http://schemas.microsoft.com/office/drawing/2010/main">
+        <mc:Choice Requires="a14">
           <p:sp>
             <p:nvSpPr>
               <p:cNvPr id="28" name="正方形/長方形 27"/>
@@ -21744,7 +25580,7 @@
             </p:txBody>
           </p:sp>
         </mc:Choice>
-        <mc:Fallback>
+        <mc:Fallback xmlns="">
           <p:sp>
             <p:nvSpPr>
               <p:cNvPr id="28" name="正方形/長方形 27"/>
@@ -21783,8 +25619,8 @@
           </p:sp>
         </mc:Fallback>
       </mc:AlternateContent>
-      <mc:AlternateContent xmlns:mc="http://schemas.openxmlformats.org/markup-compatibility/2006">
-        <mc:Choice xmlns:a14="http://schemas.microsoft.com/office/drawing/2010/main" Requires="a14">
+      <mc:AlternateContent xmlns:mc="http://schemas.openxmlformats.org/markup-compatibility/2006" xmlns:a14="http://schemas.microsoft.com/office/drawing/2010/main">
+        <mc:Choice Requires="a14">
           <p:sp>
             <p:nvSpPr>
               <p:cNvPr id="29" name="正方形/長方形 28"/>
@@ -21827,7 +25663,7 @@
             </p:txBody>
           </p:sp>
         </mc:Choice>
-        <mc:Fallback>
+        <mc:Fallback xmlns="">
           <p:sp>
             <p:nvSpPr>
               <p:cNvPr id="29" name="正方形/長方形 28"/>
@@ -21866,8 +25702,8 @@
           </p:sp>
         </mc:Fallback>
       </mc:AlternateContent>
-      <mc:AlternateContent xmlns:mc="http://schemas.openxmlformats.org/markup-compatibility/2006">
-        <mc:Choice xmlns:a14="http://schemas.microsoft.com/office/drawing/2010/main" Requires="a14">
+      <mc:AlternateContent xmlns:mc="http://schemas.openxmlformats.org/markup-compatibility/2006" xmlns:a14="http://schemas.microsoft.com/office/drawing/2010/main">
+        <mc:Choice Requires="a14">
           <p:sp>
             <p:nvSpPr>
               <p:cNvPr id="30" name="正方形/長方形 29"/>
@@ -21910,7 +25746,7 @@
             </p:txBody>
           </p:sp>
         </mc:Choice>
-        <mc:Fallback>
+        <mc:Fallback xmlns="">
           <p:sp>
             <p:nvSpPr>
               <p:cNvPr id="30" name="正方形/長方形 29"/>
@@ -21949,8 +25785,8 @@
           </p:sp>
         </mc:Fallback>
       </mc:AlternateContent>
-      <mc:AlternateContent xmlns:mc="http://schemas.openxmlformats.org/markup-compatibility/2006">
-        <mc:Choice xmlns:a14="http://schemas.microsoft.com/office/drawing/2010/main" Requires="a14">
+      <mc:AlternateContent xmlns:mc="http://schemas.openxmlformats.org/markup-compatibility/2006" xmlns:a14="http://schemas.microsoft.com/office/drawing/2010/main">
+        <mc:Choice Requires="a14">
           <p:sp>
             <p:nvSpPr>
               <p:cNvPr id="31" name="正方形/長方形 30"/>
@@ -21993,7 +25829,7 @@
             </p:txBody>
           </p:sp>
         </mc:Choice>
-        <mc:Fallback>
+        <mc:Fallback xmlns="">
           <p:sp>
             <p:nvSpPr>
               <p:cNvPr id="31" name="正方形/長方形 30"/>
@@ -22032,8 +25868,8 @@
           </p:sp>
         </mc:Fallback>
       </mc:AlternateContent>
-      <mc:AlternateContent xmlns:mc="http://schemas.openxmlformats.org/markup-compatibility/2006">
-        <mc:Choice xmlns:a14="http://schemas.microsoft.com/office/drawing/2010/main" Requires="a14">
+      <mc:AlternateContent xmlns:mc="http://schemas.openxmlformats.org/markup-compatibility/2006" xmlns:a14="http://schemas.microsoft.com/office/drawing/2010/main">
+        <mc:Choice Requires="a14">
           <p:sp>
             <p:nvSpPr>
               <p:cNvPr id="32" name="正方形/長方形 31"/>
@@ -22076,7 +25912,7 @@
             </p:txBody>
           </p:sp>
         </mc:Choice>
-        <mc:Fallback>
+        <mc:Fallback xmlns="">
           <p:sp>
             <p:nvSpPr>
               <p:cNvPr id="32" name="正方形/長方形 31"/>
@@ -22115,8 +25951,8 @@
           </p:sp>
         </mc:Fallback>
       </mc:AlternateContent>
-      <mc:AlternateContent xmlns:mc="http://schemas.openxmlformats.org/markup-compatibility/2006">
-        <mc:Choice xmlns:a14="http://schemas.microsoft.com/office/drawing/2010/main" Requires="a14">
+      <mc:AlternateContent xmlns:mc="http://schemas.openxmlformats.org/markup-compatibility/2006" xmlns:a14="http://schemas.microsoft.com/office/drawing/2010/main">
+        <mc:Choice Requires="a14">
           <p:sp>
             <p:nvSpPr>
               <p:cNvPr id="33" name="正方形/長方形 32"/>
@@ -22178,7 +26014,7 @@
             </p:txBody>
           </p:sp>
         </mc:Choice>
-        <mc:Fallback>
+        <mc:Fallback xmlns="">
           <p:sp>
             <p:nvSpPr>
               <p:cNvPr id="33" name="正方形/長方形 32"/>
@@ -22217,8 +26053,8 @@
           </p:sp>
         </mc:Fallback>
       </mc:AlternateContent>
-      <mc:AlternateContent xmlns:mc="http://schemas.openxmlformats.org/markup-compatibility/2006">
-        <mc:Choice xmlns:a14="http://schemas.microsoft.com/office/drawing/2010/main" Requires="a14">
+      <mc:AlternateContent xmlns:mc="http://schemas.openxmlformats.org/markup-compatibility/2006" xmlns:a14="http://schemas.microsoft.com/office/drawing/2010/main">
+        <mc:Choice Requires="a14">
           <p:sp>
             <p:nvSpPr>
               <p:cNvPr id="34" name="正方形/長方形 33"/>
@@ -22280,7 +26116,7 @@
             </p:txBody>
           </p:sp>
         </mc:Choice>
-        <mc:Fallback>
+        <mc:Fallback xmlns="">
           <p:sp>
             <p:nvSpPr>
               <p:cNvPr id="34" name="正方形/長方形 33"/>
@@ -22319,8 +26155,8 @@
           </p:sp>
         </mc:Fallback>
       </mc:AlternateContent>
-      <mc:AlternateContent xmlns:mc="http://schemas.openxmlformats.org/markup-compatibility/2006">
-        <mc:Choice xmlns:a14="http://schemas.microsoft.com/office/drawing/2010/main" Requires="a14">
+      <mc:AlternateContent xmlns:mc="http://schemas.openxmlformats.org/markup-compatibility/2006" xmlns:a14="http://schemas.microsoft.com/office/drawing/2010/main">
+        <mc:Choice Requires="a14">
           <p:sp>
             <p:nvSpPr>
               <p:cNvPr id="35" name="正方形/長方形 34"/>
@@ -22382,7 +26218,7 @@
             </p:txBody>
           </p:sp>
         </mc:Choice>
-        <mc:Fallback>
+        <mc:Fallback xmlns="">
           <p:sp>
             <p:nvSpPr>
               <p:cNvPr id="35" name="正方形/長方形 34"/>
@@ -22421,8 +26257,8 @@
           </p:sp>
         </mc:Fallback>
       </mc:AlternateContent>
-      <mc:AlternateContent xmlns:mc="http://schemas.openxmlformats.org/markup-compatibility/2006">
-        <mc:Choice xmlns:a14="http://schemas.microsoft.com/office/drawing/2010/main" Requires="a14">
+      <mc:AlternateContent xmlns:mc="http://schemas.openxmlformats.org/markup-compatibility/2006" xmlns:a14="http://schemas.microsoft.com/office/drawing/2010/main">
+        <mc:Choice Requires="a14">
           <p:sp>
             <p:nvSpPr>
               <p:cNvPr id="36" name="正方形/長方形 35"/>
@@ -22484,7 +26320,7 @@
             </p:txBody>
           </p:sp>
         </mc:Choice>
-        <mc:Fallback>
+        <mc:Fallback xmlns="">
           <p:sp>
             <p:nvSpPr>
               <p:cNvPr id="36" name="正方形/長方形 35"/>
@@ -22523,8 +26359,8 @@
           </p:sp>
         </mc:Fallback>
       </mc:AlternateContent>
-      <mc:AlternateContent xmlns:mc="http://schemas.openxmlformats.org/markup-compatibility/2006">
-        <mc:Choice xmlns:a14="http://schemas.microsoft.com/office/drawing/2010/main" Requires="a14">
+      <mc:AlternateContent xmlns:mc="http://schemas.openxmlformats.org/markup-compatibility/2006" xmlns:a14="http://schemas.microsoft.com/office/drawing/2010/main">
+        <mc:Choice Requires="a14">
           <p:sp>
             <p:nvSpPr>
               <p:cNvPr id="37" name="正方形/長方形 36"/>
@@ -22586,7 +26422,7 @@
             </p:txBody>
           </p:sp>
         </mc:Choice>
-        <mc:Fallback>
+        <mc:Fallback xmlns="">
           <p:sp>
             <p:nvSpPr>
               <p:cNvPr id="37" name="正方形/長方形 36"/>
@@ -22625,8 +26461,8 @@
           </p:sp>
         </mc:Fallback>
       </mc:AlternateContent>
-      <mc:AlternateContent xmlns:mc="http://schemas.openxmlformats.org/markup-compatibility/2006">
-        <mc:Choice xmlns:a14="http://schemas.microsoft.com/office/drawing/2010/main" Requires="a14">
+      <mc:AlternateContent xmlns:mc="http://schemas.openxmlformats.org/markup-compatibility/2006" xmlns:a14="http://schemas.microsoft.com/office/drawing/2010/main">
+        <mc:Choice Requires="a14">
           <p:sp>
             <p:nvSpPr>
               <p:cNvPr id="38" name="正方形/長方形 37"/>
@@ -22694,7 +26530,7 @@
             </p:txBody>
           </p:sp>
         </mc:Choice>
-        <mc:Fallback>
+        <mc:Fallback xmlns="">
           <p:sp>
             <p:nvSpPr>
               <p:cNvPr id="38" name="正方形/長方形 37"/>
@@ -22733,8 +26569,8 @@
           </p:sp>
         </mc:Fallback>
       </mc:AlternateContent>
-      <mc:AlternateContent xmlns:mc="http://schemas.openxmlformats.org/markup-compatibility/2006">
-        <mc:Choice xmlns:a14="http://schemas.microsoft.com/office/drawing/2010/main" Requires="a14">
+      <mc:AlternateContent xmlns:mc="http://schemas.openxmlformats.org/markup-compatibility/2006" xmlns:a14="http://schemas.microsoft.com/office/drawing/2010/main">
+        <mc:Choice Requires="a14">
           <p:sp>
             <p:nvSpPr>
               <p:cNvPr id="39" name="正方形/長方形 38"/>
@@ -22802,7 +26638,7 @@
             </p:txBody>
           </p:sp>
         </mc:Choice>
-        <mc:Fallback>
+        <mc:Fallback xmlns="">
           <p:sp>
             <p:nvSpPr>
               <p:cNvPr id="39" name="正方形/長方形 38"/>
@@ -22841,8 +26677,8 @@
           </p:sp>
         </mc:Fallback>
       </mc:AlternateContent>
-      <mc:AlternateContent xmlns:mc="http://schemas.openxmlformats.org/markup-compatibility/2006">
-        <mc:Choice xmlns:a14="http://schemas.microsoft.com/office/drawing/2010/main" Requires="a14">
+      <mc:AlternateContent xmlns:mc="http://schemas.openxmlformats.org/markup-compatibility/2006" xmlns:a14="http://schemas.microsoft.com/office/drawing/2010/main">
+        <mc:Choice Requires="a14">
           <p:sp>
             <p:nvSpPr>
               <p:cNvPr id="40" name="正方形/長方形 39"/>
@@ -22910,7 +26746,7 @@
             </p:txBody>
           </p:sp>
         </mc:Choice>
-        <mc:Fallback>
+        <mc:Fallback xmlns="">
           <p:sp>
             <p:nvSpPr>
               <p:cNvPr id="40" name="正方形/長方形 39"/>
@@ -22949,8 +26785,8 @@
           </p:sp>
         </mc:Fallback>
       </mc:AlternateContent>
-      <mc:AlternateContent xmlns:mc="http://schemas.openxmlformats.org/markup-compatibility/2006">
-        <mc:Choice xmlns:a14="http://schemas.microsoft.com/office/drawing/2010/main" Requires="a14">
+      <mc:AlternateContent xmlns:mc="http://schemas.openxmlformats.org/markup-compatibility/2006" xmlns:a14="http://schemas.microsoft.com/office/drawing/2010/main">
+        <mc:Choice Requires="a14">
           <p:sp>
             <p:nvSpPr>
               <p:cNvPr id="41" name="正方形/長方形 40"/>
@@ -23018,7 +26854,7 @@
             </p:txBody>
           </p:sp>
         </mc:Choice>
-        <mc:Fallback>
+        <mc:Fallback xmlns="">
           <p:sp>
             <p:nvSpPr>
               <p:cNvPr id="41" name="正方形/長方形 40"/>
@@ -23057,8 +26893,8 @@
           </p:sp>
         </mc:Fallback>
       </mc:AlternateContent>
-      <mc:AlternateContent xmlns:mc="http://schemas.openxmlformats.org/markup-compatibility/2006">
-        <mc:Choice xmlns:a14="http://schemas.microsoft.com/office/drawing/2010/main" Requires="a14">
+      <mc:AlternateContent xmlns:mc="http://schemas.openxmlformats.org/markup-compatibility/2006" xmlns:a14="http://schemas.microsoft.com/office/drawing/2010/main">
+        <mc:Choice Requires="a14">
           <p:sp>
             <p:nvSpPr>
               <p:cNvPr id="42" name="正方形/長方形 41"/>
@@ -23126,7 +26962,7 @@
             </p:txBody>
           </p:sp>
         </mc:Choice>
-        <mc:Fallback>
+        <mc:Fallback xmlns="">
           <p:sp>
             <p:nvSpPr>
               <p:cNvPr id="42" name="正方形/長方形 41"/>
@@ -23165,8 +27001,8 @@
           </p:sp>
         </mc:Fallback>
       </mc:AlternateContent>
-      <mc:AlternateContent xmlns:mc="http://schemas.openxmlformats.org/markup-compatibility/2006">
-        <mc:Choice xmlns:a14="http://schemas.microsoft.com/office/drawing/2010/main" Requires="a14">
+      <mc:AlternateContent xmlns:mc="http://schemas.openxmlformats.org/markup-compatibility/2006" xmlns:a14="http://schemas.microsoft.com/office/drawing/2010/main">
+        <mc:Choice Requires="a14">
           <p:sp>
             <p:nvSpPr>
               <p:cNvPr id="43" name="テキスト ボックス 42"/>
@@ -23562,7 +27398,7 @@
             </p:txBody>
           </p:sp>
         </mc:Choice>
-        <mc:Fallback>
+        <mc:Fallback xmlns="">
           <p:sp>
             <p:nvSpPr>
               <p:cNvPr id="43" name="テキスト ボックス 42"/>
@@ -23665,8 +27501,8 @@
           </a:p>
         </p:txBody>
       </p:sp>
-      <mc:AlternateContent xmlns:mc="http://schemas.openxmlformats.org/markup-compatibility/2006">
-        <mc:Choice xmlns:a14="http://schemas.microsoft.com/office/drawing/2010/main" Requires="a14">
+      <mc:AlternateContent xmlns:mc="http://schemas.openxmlformats.org/markup-compatibility/2006" xmlns:a14="http://schemas.microsoft.com/office/drawing/2010/main">
+        <mc:Choice Requires="a14">
           <p:sp>
             <p:nvSpPr>
               <p:cNvPr id="46" name="正方形/長方形 45"/>
@@ -23767,7 +27603,7 @@
             </p:txBody>
           </p:sp>
         </mc:Choice>
-        <mc:Fallback>
+        <mc:Fallback xmlns="">
           <p:sp>
             <p:nvSpPr>
               <p:cNvPr id="46" name="正方形/長方形 45"/>
@@ -23806,8 +27642,8 @@
           </p:sp>
         </mc:Fallback>
       </mc:AlternateContent>
-      <mc:AlternateContent xmlns:mc="http://schemas.openxmlformats.org/markup-compatibility/2006">
-        <mc:Choice xmlns:a14="http://schemas.microsoft.com/office/drawing/2010/main" Requires="a14">
+      <mc:AlternateContent xmlns:mc="http://schemas.openxmlformats.org/markup-compatibility/2006" xmlns:a14="http://schemas.microsoft.com/office/drawing/2010/main">
+        <mc:Choice Requires="a14">
           <p:sp>
             <p:nvSpPr>
               <p:cNvPr id="47" name="正方形/長方形 46"/>
@@ -23914,7 +27750,7 @@
             </p:txBody>
           </p:sp>
         </mc:Choice>
-        <mc:Fallback>
+        <mc:Fallback xmlns="">
           <p:sp>
             <p:nvSpPr>
               <p:cNvPr id="47" name="正方形/長方形 46"/>
@@ -23953,8 +27789,8 @@
           </p:sp>
         </mc:Fallback>
       </mc:AlternateContent>
-      <mc:AlternateContent xmlns:mc="http://schemas.openxmlformats.org/markup-compatibility/2006">
-        <mc:Choice xmlns:a14="http://schemas.microsoft.com/office/drawing/2010/main" Requires="a14">
+      <mc:AlternateContent xmlns:mc="http://schemas.openxmlformats.org/markup-compatibility/2006" xmlns:a14="http://schemas.microsoft.com/office/drawing/2010/main">
+        <mc:Choice Requires="a14">
           <p:sp>
             <p:nvSpPr>
               <p:cNvPr id="48" name="正方形/長方形 47"/>
@@ -23997,7 +27833,7 @@
             </p:txBody>
           </p:sp>
         </mc:Choice>
-        <mc:Fallback>
+        <mc:Fallback xmlns="">
           <p:sp>
             <p:nvSpPr>
               <p:cNvPr id="48" name="正方形/長方形 47"/>
@@ -24036,8 +27872,8 @@
           </p:sp>
         </mc:Fallback>
       </mc:AlternateContent>
-      <mc:AlternateContent xmlns:mc="http://schemas.openxmlformats.org/markup-compatibility/2006">
-        <mc:Choice xmlns:a14="http://schemas.microsoft.com/office/drawing/2010/main" Requires="a14">
+      <mc:AlternateContent xmlns:mc="http://schemas.openxmlformats.org/markup-compatibility/2006" xmlns:a14="http://schemas.microsoft.com/office/drawing/2010/main">
+        <mc:Choice Requires="a14">
           <p:sp>
             <p:nvSpPr>
               <p:cNvPr id="49" name="正方形/長方形 48"/>
@@ -24080,7 +27916,7 @@
             </p:txBody>
           </p:sp>
         </mc:Choice>
-        <mc:Fallback>
+        <mc:Fallback xmlns="">
           <p:sp>
             <p:nvSpPr>
               <p:cNvPr id="49" name="正方形/長方形 48"/>
@@ -24119,8 +27955,8 @@
           </p:sp>
         </mc:Fallback>
       </mc:AlternateContent>
-      <mc:AlternateContent xmlns:mc="http://schemas.openxmlformats.org/markup-compatibility/2006">
-        <mc:Choice xmlns:a14="http://schemas.microsoft.com/office/drawing/2010/main" Requires="a14">
+      <mc:AlternateContent xmlns:mc="http://schemas.openxmlformats.org/markup-compatibility/2006" xmlns:a14="http://schemas.microsoft.com/office/drawing/2010/main">
+        <mc:Choice Requires="a14">
           <p:sp>
             <p:nvSpPr>
               <p:cNvPr id="50" name="正方形/長方形 49"/>
@@ -24163,7 +27999,7 @@
             </p:txBody>
           </p:sp>
         </mc:Choice>
-        <mc:Fallback>
+        <mc:Fallback xmlns="">
           <p:sp>
             <p:nvSpPr>
               <p:cNvPr id="50" name="正方形/長方形 49"/>
@@ -24202,8 +28038,8 @@
           </p:sp>
         </mc:Fallback>
       </mc:AlternateContent>
-      <mc:AlternateContent xmlns:mc="http://schemas.openxmlformats.org/markup-compatibility/2006">
-        <mc:Choice xmlns:a14="http://schemas.microsoft.com/office/drawing/2010/main" Requires="a14">
+      <mc:AlternateContent xmlns:mc="http://schemas.openxmlformats.org/markup-compatibility/2006" xmlns:a14="http://schemas.microsoft.com/office/drawing/2010/main">
+        <mc:Choice Requires="a14">
           <p:sp>
             <p:nvSpPr>
               <p:cNvPr id="51" name="正方形/長方形 50"/>
@@ -24246,7 +28082,7 @@
             </p:txBody>
           </p:sp>
         </mc:Choice>
-        <mc:Fallback>
+        <mc:Fallback xmlns="">
           <p:sp>
             <p:nvSpPr>
               <p:cNvPr id="51" name="正方形/長方形 50"/>
@@ -24285,8 +28121,8 @@
           </p:sp>
         </mc:Fallback>
       </mc:AlternateContent>
-      <mc:AlternateContent xmlns:mc="http://schemas.openxmlformats.org/markup-compatibility/2006">
-        <mc:Choice xmlns:a14="http://schemas.microsoft.com/office/drawing/2010/main" Requires="a14">
+      <mc:AlternateContent xmlns:mc="http://schemas.openxmlformats.org/markup-compatibility/2006" xmlns:a14="http://schemas.microsoft.com/office/drawing/2010/main">
+        <mc:Choice Requires="a14">
           <p:sp>
             <p:nvSpPr>
               <p:cNvPr id="52" name="正方形/長方形 51"/>
@@ -24387,7 +28223,7 @@
             </p:txBody>
           </p:sp>
         </mc:Choice>
-        <mc:Fallback>
+        <mc:Fallback xmlns="">
           <p:sp>
             <p:nvSpPr>
               <p:cNvPr id="52" name="正方形/長方形 51"/>
@@ -24426,8 +28262,8 @@
           </p:sp>
         </mc:Fallback>
       </mc:AlternateContent>
-      <mc:AlternateContent xmlns:mc="http://schemas.openxmlformats.org/markup-compatibility/2006">
-        <mc:Choice xmlns:a14="http://schemas.microsoft.com/office/drawing/2010/main" Requires="a14">
+      <mc:AlternateContent xmlns:mc="http://schemas.openxmlformats.org/markup-compatibility/2006" xmlns:a14="http://schemas.microsoft.com/office/drawing/2010/main">
+        <mc:Choice Requires="a14">
           <p:sp>
             <p:nvSpPr>
               <p:cNvPr id="53" name="正方形/長方形 52"/>
@@ -24528,7 +28364,7 @@
             </p:txBody>
           </p:sp>
         </mc:Choice>
-        <mc:Fallback>
+        <mc:Fallback xmlns="">
           <p:sp>
             <p:nvSpPr>
               <p:cNvPr id="53" name="正方形/長方形 52"/>
@@ -24567,8 +28403,8 @@
           </p:sp>
         </mc:Fallback>
       </mc:AlternateContent>
-      <mc:AlternateContent xmlns:mc="http://schemas.openxmlformats.org/markup-compatibility/2006">
-        <mc:Choice xmlns:a14="http://schemas.microsoft.com/office/drawing/2010/main" Requires="a14">
+      <mc:AlternateContent xmlns:mc="http://schemas.openxmlformats.org/markup-compatibility/2006" xmlns:a14="http://schemas.microsoft.com/office/drawing/2010/main">
+        <mc:Choice Requires="a14">
           <p:sp>
             <p:nvSpPr>
               <p:cNvPr id="54" name="正方形/長方形 53"/>
@@ -24669,7 +28505,7 @@
             </p:txBody>
           </p:sp>
         </mc:Choice>
-        <mc:Fallback>
+        <mc:Fallback xmlns="">
           <p:sp>
             <p:nvSpPr>
               <p:cNvPr id="54" name="正方形/長方形 53"/>
@@ -24708,8 +28544,8 @@
           </p:sp>
         </mc:Fallback>
       </mc:AlternateContent>
-      <mc:AlternateContent xmlns:mc="http://schemas.openxmlformats.org/markup-compatibility/2006">
-        <mc:Choice xmlns:a14="http://schemas.microsoft.com/office/drawing/2010/main" Requires="a14">
+      <mc:AlternateContent xmlns:mc="http://schemas.openxmlformats.org/markup-compatibility/2006" xmlns:a14="http://schemas.microsoft.com/office/drawing/2010/main">
+        <mc:Choice Requires="a14">
           <p:sp>
             <p:nvSpPr>
               <p:cNvPr id="55" name="正方形/長方形 54"/>
@@ -24810,7 +28646,7 @@
             </p:txBody>
           </p:sp>
         </mc:Choice>
-        <mc:Fallback>
+        <mc:Fallback xmlns="">
           <p:sp>
             <p:nvSpPr>
               <p:cNvPr id="55" name="正方形/長方形 54"/>
@@ -24849,8 +28685,8 @@
           </p:sp>
         </mc:Fallback>
       </mc:AlternateContent>
-      <mc:AlternateContent xmlns:mc="http://schemas.openxmlformats.org/markup-compatibility/2006">
-        <mc:Choice xmlns:a14="http://schemas.microsoft.com/office/drawing/2010/main" Requires="a14">
+      <mc:AlternateContent xmlns:mc="http://schemas.openxmlformats.org/markup-compatibility/2006" xmlns:a14="http://schemas.microsoft.com/office/drawing/2010/main">
+        <mc:Choice Requires="a14">
           <p:sp>
             <p:nvSpPr>
               <p:cNvPr id="56" name="正方形/長方形 55"/>
@@ -24951,7 +28787,7 @@
             </p:txBody>
           </p:sp>
         </mc:Choice>
-        <mc:Fallback>
+        <mc:Fallback xmlns="">
           <p:sp>
             <p:nvSpPr>
               <p:cNvPr id="56" name="正方形/長方形 55"/>
@@ -24990,8 +28826,8 @@
           </p:sp>
         </mc:Fallback>
       </mc:AlternateContent>
-      <mc:AlternateContent xmlns:mc="http://schemas.openxmlformats.org/markup-compatibility/2006">
-        <mc:Choice xmlns:a14="http://schemas.microsoft.com/office/drawing/2010/main" Requires="a14">
+      <mc:AlternateContent xmlns:mc="http://schemas.openxmlformats.org/markup-compatibility/2006" xmlns:a14="http://schemas.microsoft.com/office/drawing/2010/main">
+        <mc:Choice Requires="a14">
           <p:sp>
             <p:nvSpPr>
               <p:cNvPr id="57" name="正方形/長方形 56"/>
@@ -25098,7 +28934,7 @@
             </p:txBody>
           </p:sp>
         </mc:Choice>
-        <mc:Fallback>
+        <mc:Fallback xmlns="">
           <p:sp>
             <p:nvSpPr>
               <p:cNvPr id="57" name="正方形/長方形 56"/>
@@ -25137,8 +28973,8 @@
           </p:sp>
         </mc:Fallback>
       </mc:AlternateContent>
-      <mc:AlternateContent xmlns:mc="http://schemas.openxmlformats.org/markup-compatibility/2006">
-        <mc:Choice xmlns:a14="http://schemas.microsoft.com/office/drawing/2010/main" Requires="a14">
+      <mc:AlternateContent xmlns:mc="http://schemas.openxmlformats.org/markup-compatibility/2006" xmlns:a14="http://schemas.microsoft.com/office/drawing/2010/main">
+        <mc:Choice Requires="a14">
           <p:sp>
             <p:nvSpPr>
               <p:cNvPr id="58" name="正方形/長方形 57"/>
@@ -25245,7 +29081,7 @@
             </p:txBody>
           </p:sp>
         </mc:Choice>
-        <mc:Fallback>
+        <mc:Fallback xmlns="">
           <p:sp>
             <p:nvSpPr>
               <p:cNvPr id="58" name="正方形/長方形 57"/>
@@ -25284,8 +29120,8 @@
           </p:sp>
         </mc:Fallback>
       </mc:AlternateContent>
-      <mc:AlternateContent xmlns:mc="http://schemas.openxmlformats.org/markup-compatibility/2006">
-        <mc:Choice xmlns:a14="http://schemas.microsoft.com/office/drawing/2010/main" Requires="a14">
+      <mc:AlternateContent xmlns:mc="http://schemas.openxmlformats.org/markup-compatibility/2006" xmlns:a14="http://schemas.microsoft.com/office/drawing/2010/main">
+        <mc:Choice Requires="a14">
           <p:sp>
             <p:nvSpPr>
               <p:cNvPr id="60" name="正方形/長方形 59"/>
@@ -25392,7 +29228,7 @@
             </p:txBody>
           </p:sp>
         </mc:Choice>
-        <mc:Fallback>
+        <mc:Fallback xmlns="">
           <p:sp>
             <p:nvSpPr>
               <p:cNvPr id="60" name="正方形/長方形 59"/>
@@ -25431,8 +29267,8 @@
           </p:sp>
         </mc:Fallback>
       </mc:AlternateContent>
-      <mc:AlternateContent xmlns:mc="http://schemas.openxmlformats.org/markup-compatibility/2006">
-        <mc:Choice xmlns:a14="http://schemas.microsoft.com/office/drawing/2010/main" Requires="a14">
+      <mc:AlternateContent xmlns:mc="http://schemas.openxmlformats.org/markup-compatibility/2006" xmlns:a14="http://schemas.microsoft.com/office/drawing/2010/main">
+        <mc:Choice Requires="a14">
           <p:sp>
             <p:nvSpPr>
               <p:cNvPr id="61" name="正方形/長方形 60"/>
@@ -25539,7 +29375,7 @@
             </p:txBody>
           </p:sp>
         </mc:Choice>
-        <mc:Fallback>
+        <mc:Fallback xmlns="">
           <p:sp>
             <p:nvSpPr>
               <p:cNvPr id="61" name="正方形/長方形 60"/>
@@ -25578,8 +29414,8 @@
           </p:sp>
         </mc:Fallback>
       </mc:AlternateContent>
-      <mc:AlternateContent xmlns:mc="http://schemas.openxmlformats.org/markup-compatibility/2006">
-        <mc:Choice xmlns:a14="http://schemas.microsoft.com/office/drawing/2010/main" Requires="a14">
+      <mc:AlternateContent xmlns:mc="http://schemas.openxmlformats.org/markup-compatibility/2006" xmlns:a14="http://schemas.microsoft.com/office/drawing/2010/main">
+        <mc:Choice Requires="a14">
           <p:sp>
             <p:nvSpPr>
               <p:cNvPr id="62" name="正方形/長方形 61"/>
@@ -25686,7 +29522,7 @@
             </p:txBody>
           </p:sp>
         </mc:Choice>
-        <mc:Fallback>
+        <mc:Fallback xmlns="">
           <p:sp>
             <p:nvSpPr>
               <p:cNvPr id="62" name="正方形/長方形 61"/>

</xml_diff>

<commit_message>
add pic of EKF
</commit_message>
<xml_diff>
--- a/images/images_for_readme.pptx
+++ b/images/images_for_readme.pptx
@@ -5,7 +5,7 @@
     <p:sldMasterId id="2147483660" r:id="rId1"/>
   </p:sldMasterIdLst>
   <p:notesMasterIdLst>
-    <p:notesMasterId r:id="rId13"/>
+    <p:notesMasterId r:id="rId15"/>
   </p:notesMasterIdLst>
   <p:sldIdLst>
     <p:sldId id="523" r:id="rId2"/>
@@ -19,6 +19,8 @@
     <p:sldId id="526" r:id="rId10"/>
     <p:sldId id="527" r:id="rId11"/>
     <p:sldId id="528" r:id="rId12"/>
+    <p:sldId id="529" r:id="rId13"/>
+    <p:sldId id="530" r:id="rId14"/>
   </p:sldIdLst>
   <p:sldSz cx="9144000" cy="6858000" type="screen4x3"/>
   <p:notesSz cx="6797675" cy="9926638"/>
@@ -3142,8 +3144,8 @@
           </a:p>
         </p:txBody>
       </p:sp>
-      <mc:AlternateContent xmlns:mc="http://schemas.openxmlformats.org/markup-compatibility/2006">
-        <mc:Choice xmlns:a14="http://schemas.microsoft.com/office/drawing/2010/main" Requires="a14">
+      <mc:AlternateContent xmlns:mc="http://schemas.openxmlformats.org/markup-compatibility/2006" xmlns:a14="http://schemas.microsoft.com/office/drawing/2010/main">
+        <mc:Choice Requires="a14">
           <p:sp>
             <p:nvSpPr>
               <p:cNvPr id="10" name="テキスト ボックス 9"/>
@@ -3291,7 +3293,7 @@
             </p:txBody>
           </p:sp>
         </mc:Choice>
-        <mc:Fallback>
+        <mc:Fallback xmlns="">
           <p:sp>
             <p:nvSpPr>
               <p:cNvPr id="10" name="テキスト ボックス 9"/>
@@ -3330,8 +3332,8 @@
           </p:sp>
         </mc:Fallback>
       </mc:AlternateContent>
-      <mc:AlternateContent xmlns:mc="http://schemas.openxmlformats.org/markup-compatibility/2006">
-        <mc:Choice xmlns:a14="http://schemas.microsoft.com/office/drawing/2010/main" Requires="a14">
+      <mc:AlternateContent xmlns:mc="http://schemas.openxmlformats.org/markup-compatibility/2006" xmlns:a14="http://schemas.microsoft.com/office/drawing/2010/main">
+        <mc:Choice Requires="a14">
           <p:sp>
             <p:nvSpPr>
               <p:cNvPr id="45" name="テキスト ボックス 44"/>
@@ -3473,7 +3475,7 @@
             </p:txBody>
           </p:sp>
         </mc:Choice>
-        <mc:Fallback>
+        <mc:Fallback xmlns="">
           <p:sp>
             <p:nvSpPr>
               <p:cNvPr id="45" name="テキスト ボックス 44"/>
@@ -3512,8 +3514,8 @@
           </p:sp>
         </mc:Fallback>
       </mc:AlternateContent>
-      <mc:AlternateContent xmlns:mc="http://schemas.openxmlformats.org/markup-compatibility/2006">
-        <mc:Choice xmlns:a14="http://schemas.microsoft.com/office/drawing/2010/main" Requires="a14">
+      <mc:AlternateContent xmlns:mc="http://schemas.openxmlformats.org/markup-compatibility/2006" xmlns:a14="http://schemas.microsoft.com/office/drawing/2010/main">
+        <mc:Choice Requires="a14">
           <p:sp>
             <p:nvSpPr>
               <p:cNvPr id="59" name="テキスト ボックス 58"/>
@@ -3626,7 +3628,7 @@
             </p:txBody>
           </p:sp>
         </mc:Choice>
-        <mc:Fallback>
+        <mc:Fallback xmlns="">
           <p:sp>
             <p:nvSpPr>
               <p:cNvPr id="59" name="テキスト ボックス 58"/>
@@ -3665,8 +3667,8 @@
           </p:sp>
         </mc:Fallback>
       </mc:AlternateContent>
-      <mc:AlternateContent xmlns:mc="http://schemas.openxmlformats.org/markup-compatibility/2006">
-        <mc:Choice xmlns:a14="http://schemas.microsoft.com/office/drawing/2010/main" Requires="a14">
+      <mc:AlternateContent xmlns:mc="http://schemas.openxmlformats.org/markup-compatibility/2006" xmlns:a14="http://schemas.microsoft.com/office/drawing/2010/main">
+        <mc:Choice Requires="a14">
           <p:sp>
             <p:nvSpPr>
               <p:cNvPr id="63" name="テキスト ボックス 62"/>
@@ -3779,7 +3781,7 @@
             </p:txBody>
           </p:sp>
         </mc:Choice>
-        <mc:Fallback>
+        <mc:Fallback xmlns="">
           <p:sp>
             <p:nvSpPr>
               <p:cNvPr id="63" name="テキスト ボックス 62"/>
@@ -3882,8 +3884,8 @@
           </a:p>
         </p:txBody>
       </p:sp>
-      <mc:AlternateContent xmlns:mc="http://schemas.openxmlformats.org/markup-compatibility/2006">
-        <mc:Choice xmlns:a14="http://schemas.microsoft.com/office/drawing/2010/main" Requires="a14">
+      <mc:AlternateContent xmlns:mc="http://schemas.openxmlformats.org/markup-compatibility/2006" xmlns:a14="http://schemas.microsoft.com/office/drawing/2010/main">
+        <mc:Choice Requires="a14">
           <p:sp>
             <p:nvSpPr>
               <p:cNvPr id="7" name="正方形/長方形 6"/>
@@ -3905,6 +3907,7 @@
               </a:bodyPr>
               <a:lstStyle/>
               <a:p>
+                <a:pPr/>
                 <a14:m>
                   <m:oMathPara xmlns:m="http://schemas.openxmlformats.org/officeDocument/2006/math">
                     <m:oMathParaPr>
@@ -4104,7 +4107,7 @@
             </p:txBody>
           </p:sp>
         </mc:Choice>
-        <mc:Fallback>
+        <mc:Fallback xmlns="">
           <p:sp>
             <p:nvSpPr>
               <p:cNvPr id="7" name="正方形/長方形 6"/>
@@ -4172,8 +4175,8 @@
           <a:effectLst/>
         </p:spPr>
       </p:cxnSp>
-      <mc:AlternateContent xmlns:mc="http://schemas.openxmlformats.org/markup-compatibility/2006">
-        <mc:Choice xmlns:a14="http://schemas.microsoft.com/office/drawing/2010/main" Requires="a14">
+      <mc:AlternateContent xmlns:mc="http://schemas.openxmlformats.org/markup-compatibility/2006" xmlns:a14="http://schemas.microsoft.com/office/drawing/2010/main">
+        <mc:Choice Requires="a14">
           <p:sp>
             <p:nvSpPr>
               <p:cNvPr id="64" name="正方形/長方形 63"/>
@@ -4195,6 +4198,7 @@
               </a:bodyPr>
               <a:lstStyle/>
               <a:p>
+                <a:pPr/>
                 <a14:m>
                   <m:oMathPara xmlns:m="http://schemas.openxmlformats.org/officeDocument/2006/math">
                     <m:oMathParaPr>
@@ -4361,7 +4365,7 @@
             </p:txBody>
           </p:sp>
         </mc:Choice>
-        <mc:Fallback>
+        <mc:Fallback xmlns="">
           <p:sp>
             <p:nvSpPr>
               <p:cNvPr id="64" name="正方形/長方形 63"/>
@@ -4400,8 +4404,8 @@
           </p:sp>
         </mc:Fallback>
       </mc:AlternateContent>
-      <mc:AlternateContent xmlns:mc="http://schemas.openxmlformats.org/markup-compatibility/2006">
-        <mc:Choice xmlns:a14="http://schemas.microsoft.com/office/drawing/2010/main" Requires="a14">
+      <mc:AlternateContent xmlns:mc="http://schemas.openxmlformats.org/markup-compatibility/2006" xmlns:a14="http://schemas.microsoft.com/office/drawing/2010/main">
+        <mc:Choice Requires="a14">
           <p:sp>
             <p:nvSpPr>
               <p:cNvPr id="65" name="テキスト ボックス 64"/>
@@ -4617,7 +4621,7 @@
             </p:txBody>
           </p:sp>
         </mc:Choice>
-        <mc:Fallback>
+        <mc:Fallback xmlns="">
           <p:sp>
             <p:nvSpPr>
               <p:cNvPr id="65" name="テキスト ボックス 64"/>
@@ -4656,8 +4660,8 @@
           </p:sp>
         </mc:Fallback>
       </mc:AlternateContent>
-      <mc:AlternateContent xmlns:mc="http://schemas.openxmlformats.org/markup-compatibility/2006">
-        <mc:Choice xmlns:a14="http://schemas.microsoft.com/office/drawing/2010/main" Requires="a14">
+      <mc:AlternateContent xmlns:mc="http://schemas.openxmlformats.org/markup-compatibility/2006" xmlns:a14="http://schemas.microsoft.com/office/drawing/2010/main">
+        <mc:Choice Requires="a14">
           <p:sp>
             <p:nvSpPr>
               <p:cNvPr id="66" name="テキスト ボックス 65"/>
@@ -4834,7 +4838,7 @@
             </p:txBody>
           </p:sp>
         </mc:Choice>
-        <mc:Fallback>
+        <mc:Fallback xmlns="">
           <p:sp>
             <p:nvSpPr>
               <p:cNvPr id="66" name="テキスト ボックス 65"/>
@@ -4873,8 +4877,8 @@
           </p:sp>
         </mc:Fallback>
       </mc:AlternateContent>
-      <mc:AlternateContent xmlns:mc="http://schemas.openxmlformats.org/markup-compatibility/2006">
-        <mc:Choice xmlns:a14="http://schemas.microsoft.com/office/drawing/2010/main" Requires="a14">
+      <mc:AlternateContent xmlns:mc="http://schemas.openxmlformats.org/markup-compatibility/2006" xmlns:a14="http://schemas.microsoft.com/office/drawing/2010/main">
+        <mc:Choice Requires="a14">
           <p:sp>
             <p:nvSpPr>
               <p:cNvPr id="67" name="テキスト ボックス 66"/>
@@ -4960,7 +4964,7 @@
             </p:txBody>
           </p:sp>
         </mc:Choice>
-        <mc:Fallback>
+        <mc:Fallback xmlns="">
           <p:sp>
             <p:nvSpPr>
               <p:cNvPr id="67" name="テキスト ボックス 66"/>
@@ -5028,8 +5032,8 @@
           </a:prstGeom>
         </p:spPr>
       </p:pic>
-      <mc:AlternateContent xmlns:mc="http://schemas.openxmlformats.org/markup-compatibility/2006">
-        <mc:Choice xmlns:a14="http://schemas.microsoft.com/office/drawing/2010/main" Requires="a14">
+      <mc:AlternateContent xmlns:mc="http://schemas.openxmlformats.org/markup-compatibility/2006" xmlns:a14="http://schemas.microsoft.com/office/drawing/2010/main">
+        <mc:Choice Requires="a14">
           <p:sp>
             <p:nvSpPr>
               <p:cNvPr id="86" name="テキスト ボックス 85"/>
@@ -5612,7 +5616,7 @@
             </p:txBody>
           </p:sp>
         </mc:Choice>
-        <mc:Fallback>
+        <mc:Fallback xmlns="">
           <p:sp>
             <p:nvSpPr>
               <p:cNvPr id="86" name="テキスト ボックス 85"/>
@@ -5809,8 +5813,8 @@
           </a:p>
         </p:txBody>
       </p:sp>
-      <mc:AlternateContent xmlns:mc="http://schemas.openxmlformats.org/markup-compatibility/2006">
-        <mc:Choice xmlns:a14="http://schemas.microsoft.com/office/drawing/2010/main" Requires="a14">
+      <mc:AlternateContent xmlns:mc="http://schemas.openxmlformats.org/markup-compatibility/2006" xmlns:a14="http://schemas.microsoft.com/office/drawing/2010/main">
+        <mc:Choice Requires="a14">
           <p:sp>
             <p:nvSpPr>
               <p:cNvPr id="10" name="テキスト ボックス 9"/>
@@ -5977,7 +5981,7 @@
             </p:txBody>
           </p:sp>
         </mc:Choice>
-        <mc:Fallback>
+        <mc:Fallback xmlns="">
           <p:sp>
             <p:nvSpPr>
               <p:cNvPr id="10" name="テキスト ボックス 9"/>
@@ -6016,8 +6020,8 @@
           </p:sp>
         </mc:Fallback>
       </mc:AlternateContent>
-      <mc:AlternateContent xmlns:mc="http://schemas.openxmlformats.org/markup-compatibility/2006">
-        <mc:Choice xmlns:a14="http://schemas.microsoft.com/office/drawing/2010/main" Requires="a14">
+      <mc:AlternateContent xmlns:mc="http://schemas.openxmlformats.org/markup-compatibility/2006" xmlns:a14="http://schemas.microsoft.com/office/drawing/2010/main">
+        <mc:Choice Requires="a14">
           <p:sp>
             <p:nvSpPr>
               <p:cNvPr id="45" name="テキスト ボックス 44"/>
@@ -6393,13 +6397,7 @@
                                 <a:rPr lang="en-US" altLang="ja-JP" sz="2400" i="1">
                                   <a:latin typeface="Cambria Math" panose="02040503050406030204" pitchFamily="18" charset="0"/>
                                 </a:rPr>
-                                <m:t> &amp;    </m:t>
-                              </m:r>
-                              <m:r>
-                                <a:rPr lang="en-US" altLang="ja-JP" sz="2400" i="1">
-                                  <a:latin typeface="Cambria Math" panose="02040503050406030204" pitchFamily="18" charset="0"/>
-                                </a:rPr>
-                                <m:t>2</m:t>
+                                <m:t> &amp;    2</m:t>
                               </m:r>
                               <m:sSub>
                                 <m:sSubPr>
@@ -6473,13 +6471,7 @@
                                 <a:rPr lang="en-US" altLang="ja-JP" sz="2400" i="1">
                                   <a:latin typeface="Cambria Math" panose="02040503050406030204" pitchFamily="18" charset="0"/>
                                 </a:rPr>
-                                <m:t> &amp;     </m:t>
-                              </m:r>
-                              <m:r>
-                                <a:rPr lang="en-US" altLang="ja-JP" sz="2400" i="1">
-                                  <a:latin typeface="Cambria Math" panose="02040503050406030204" pitchFamily="18" charset="0"/>
-                                </a:rPr>
-                                <m:t>2</m:t>
+                                <m:t> &amp;     2</m:t>
                               </m:r>
                               <m:sSub>
                                 <m:sSubPr>
@@ -6635,13 +6627,7 @@
                                 <a:rPr lang="en-US" altLang="ja-JP" sz="2400" i="1">
                                   <a:latin typeface="Cambria Math" panose="02040503050406030204" pitchFamily="18" charset="0"/>
                                 </a:rPr>
-                                <m:t> &amp;     </m:t>
-                              </m:r>
-                              <m:r>
-                                <a:rPr lang="en-US" altLang="ja-JP" sz="2400" i="1">
-                                  <a:latin typeface="Cambria Math" panose="02040503050406030204" pitchFamily="18" charset="0"/>
-                                </a:rPr>
-                                <m:t>2</m:t>
+                                <m:t> &amp;     2</m:t>
                               </m:r>
                               <m:sSub>
                                 <m:sSubPr>
@@ -6686,7 +6672,7 @@
             </p:txBody>
           </p:sp>
         </mc:Choice>
-        <mc:Fallback>
+        <mc:Fallback xmlns="">
           <p:sp>
             <p:nvSpPr>
               <p:cNvPr id="45" name="テキスト ボックス 44"/>
@@ -6822,6 +6808,3055 @@
     <p:extLst>
       <p:ext uri="{BB962C8B-B14F-4D97-AF65-F5344CB8AC3E}">
         <p14:creationId xmlns:p14="http://schemas.microsoft.com/office/powerpoint/2010/main" val="3181463620"/>
+      </p:ext>
+    </p:extLst>
+  </p:cSld>
+  <p:clrMapOvr>
+    <a:masterClrMapping/>
+  </p:clrMapOvr>
+</p:sld>
+</file>
+
+<file path=ppt/slides/slide12.xml><?xml version="1.0" encoding="utf-8"?>
+<p:sld xmlns:a="http://schemas.openxmlformats.org/drawingml/2006/main" xmlns:r="http://schemas.openxmlformats.org/officeDocument/2006/relationships" xmlns:p="http://schemas.openxmlformats.org/presentationml/2006/main">
+  <p:cSld>
+    <p:spTree>
+      <p:nvGrpSpPr>
+        <p:cNvPr id="1" name=""/>
+        <p:cNvGrpSpPr/>
+        <p:nvPr/>
+      </p:nvGrpSpPr>
+      <p:grpSpPr>
+        <a:xfrm>
+          <a:off x="0" y="0"/>
+          <a:ext cx="0" cy="0"/>
+          <a:chOff x="0" y="0"/>
+          <a:chExt cx="0" cy="0"/>
+        </a:xfrm>
+      </p:grpSpPr>
+      <p:sp>
+        <p:nvSpPr>
+          <p:cNvPr id="2" name="タイトル 1"/>
+          <p:cNvSpPr>
+            <a:spLocks noGrp="1"/>
+          </p:cNvSpPr>
+          <p:nvPr>
+            <p:ph type="title"/>
+          </p:nvPr>
+        </p:nvSpPr>
+        <p:spPr/>
+        <p:txBody>
+          <a:bodyPr/>
+          <a:lstStyle/>
+          <a:p>
+            <a:r>
+              <a:rPr kumimoji="1" lang="en-US" altLang="ja-JP" dirty="0" smtClean="0"/>
+              <a:t>EKF Algorithm</a:t>
+            </a:r>
+            <a:endParaRPr kumimoji="1" lang="ja-JP" altLang="en-US" dirty="0"/>
+          </a:p>
+        </p:txBody>
+      </p:sp>
+      <p:sp>
+        <p:nvSpPr>
+          <p:cNvPr id="4" name="角丸四角形 3"/>
+          <p:cNvSpPr/>
+          <p:nvPr/>
+        </p:nvSpPr>
+        <p:spPr bwMode="auto">
+          <a:xfrm>
+            <a:off x="539552" y="1340768"/>
+            <a:ext cx="7344816" cy="3600400"/>
+          </a:xfrm>
+          <a:prstGeom prst="roundRect">
+            <a:avLst>
+              <a:gd name="adj" fmla="val 7825"/>
+            </a:avLst>
+          </a:prstGeom>
+          <a:noFill/>
+          <a:ln w="63500" cap="flat" cmpd="sng" algn="ctr">
+            <a:solidFill>
+              <a:schemeClr val="tx1"/>
+            </a:solidFill>
+            <a:prstDash val="solid"/>
+            <a:round/>
+            <a:headEnd type="none" w="med" len="med"/>
+            <a:tailEnd type="none" w="med" len="med"/>
+          </a:ln>
+          <a:effectLst/>
+        </p:spPr>
+        <p:txBody>
+          <a:bodyPr vert="horz" wrap="none" lIns="91440" tIns="45720" rIns="91440" bIns="45720" numCol="1" rtlCol="0" anchor="ctr" anchorCtr="0" compatLnSpc="1">
+            <a:prstTxWarp prst="textNoShape">
+              <a:avLst/>
+            </a:prstTxWarp>
+          </a:bodyPr>
+          <a:lstStyle/>
+          <a:p>
+            <a:pPr marL="0" marR="0" indent="0" algn="l" defTabSz="914400" rtl="0" eaLnBrk="1" fontAlgn="base" latinLnBrk="0" hangingPunct="1">
+              <a:lnSpc>
+                <a:spcPct val="100000"/>
+              </a:lnSpc>
+              <a:spcBef>
+                <a:spcPct val="0"/>
+              </a:spcBef>
+              <a:spcAft>
+                <a:spcPct val="0"/>
+              </a:spcAft>
+              <a:buClrTx/>
+              <a:buSzTx/>
+              <a:buFontTx/>
+              <a:buNone/>
+              <a:tabLst/>
+            </a:pPr>
+            <a:endParaRPr kumimoji="1" lang="ja-JP" altLang="en-US" sz="2400" b="0" i="0" u="none" strike="noStrike" cap="none" normalizeH="0" baseline="0" smtClean="0">
+              <a:ln>
+                <a:noFill/>
+              </a:ln>
+              <a:solidFill>
+                <a:schemeClr val="tx1"/>
+              </a:solidFill>
+              <a:effectLst/>
+              <a:latin typeface="Times New Roman" pitchFamily="18" charset="0"/>
+              <a:ea typeface="ＭＳ Ｐゴシック" pitchFamily="50" charset="-128"/>
+            </a:endParaRPr>
+          </a:p>
+        </p:txBody>
+      </p:sp>
+      <p:sp>
+        <p:nvSpPr>
+          <p:cNvPr id="5" name="テキスト ボックス 4"/>
+          <p:cNvSpPr txBox="1"/>
+          <p:nvPr/>
+        </p:nvSpPr>
+        <p:spPr>
+          <a:xfrm>
+            <a:off x="2880751" y="1093824"/>
+            <a:ext cx="2393604" cy="461665"/>
+          </a:xfrm>
+          <a:prstGeom prst="rect">
+            <a:avLst/>
+          </a:prstGeom>
+          <a:solidFill>
+            <a:srgbClr val="FFFFFF"/>
+          </a:solidFill>
+        </p:spPr>
+        <p:txBody>
+          <a:bodyPr wrap="none" rtlCol="0">
+            <a:spAutoFit/>
+          </a:bodyPr>
+          <a:lstStyle/>
+          <a:p>
+            <a:pPr algn="just"/>
+            <a:r>
+              <a:rPr lang="en-US" altLang="ja-JP" sz="2400" dirty="0">
+                <a:latin typeface="+mj-ea"/>
+                <a:ea typeface="+mj-ea"/>
+              </a:rPr>
+              <a:t>EKF Algorithm</a:t>
+            </a:r>
+            <a:endParaRPr kumimoji="1" lang="ja-JP" altLang="en-US" sz="2400" dirty="0">
+              <a:latin typeface="+mj-ea"/>
+              <a:ea typeface="+mj-ea"/>
+            </a:endParaRPr>
+          </a:p>
+        </p:txBody>
+      </p:sp>
+      <p:sp>
+        <p:nvSpPr>
+          <p:cNvPr id="6" name="テキスト ボックス 5"/>
+          <p:cNvSpPr txBox="1"/>
+          <p:nvPr/>
+        </p:nvSpPr>
+        <p:spPr>
+          <a:xfrm>
+            <a:off x="933378" y="1891354"/>
+            <a:ext cx="2062359" cy="369332"/>
+          </a:xfrm>
+          <a:prstGeom prst="rect">
+            <a:avLst/>
+          </a:prstGeom>
+          <a:noFill/>
+        </p:spPr>
+        <p:txBody>
+          <a:bodyPr wrap="none" rtlCol="0">
+            <a:spAutoFit/>
+          </a:bodyPr>
+          <a:lstStyle/>
+          <a:p>
+            <a:r>
+              <a:rPr kumimoji="1" lang="en-US" altLang="ja-JP" dirty="0" smtClean="0">
+                <a:latin typeface="+mj-ea"/>
+                <a:ea typeface="+mj-ea"/>
+              </a:rPr>
+              <a:t>Prediction Step :</a:t>
+            </a:r>
+            <a:endParaRPr kumimoji="1" lang="ja-JP" altLang="en-US" dirty="0">
+              <a:latin typeface="+mj-ea"/>
+              <a:ea typeface="+mj-ea"/>
+            </a:endParaRPr>
+          </a:p>
+        </p:txBody>
+      </p:sp>
+      <p:sp>
+        <p:nvSpPr>
+          <p:cNvPr id="11" name="テキスト ボックス 10"/>
+          <p:cNvSpPr txBox="1"/>
+          <p:nvPr/>
+        </p:nvSpPr>
+        <p:spPr>
+          <a:xfrm>
+            <a:off x="933378" y="3063637"/>
+            <a:ext cx="1839093" cy="369332"/>
+          </a:xfrm>
+          <a:prstGeom prst="rect">
+            <a:avLst/>
+          </a:prstGeom>
+          <a:noFill/>
+        </p:spPr>
+        <p:txBody>
+          <a:bodyPr wrap="none" rtlCol="0">
+            <a:spAutoFit/>
+          </a:bodyPr>
+          <a:lstStyle/>
+          <a:p>
+            <a:r>
+              <a:rPr kumimoji="1" lang="en-US" altLang="ja-JP" dirty="0" smtClean="0">
+                <a:latin typeface="+mj-ea"/>
+                <a:ea typeface="+mj-ea"/>
+              </a:rPr>
+              <a:t>Filtering Step :</a:t>
+            </a:r>
+            <a:endParaRPr kumimoji="1" lang="ja-JP" altLang="en-US" dirty="0">
+              <a:latin typeface="+mj-ea"/>
+              <a:ea typeface="+mj-ea"/>
+            </a:endParaRPr>
+          </a:p>
+        </p:txBody>
+      </p:sp>
+      <mc:AlternateContent xmlns:mc="http://schemas.openxmlformats.org/markup-compatibility/2006">
+        <mc:Choice xmlns:a14="http://schemas.microsoft.com/office/drawing/2010/main" Requires="a14">
+          <p:sp>
+            <p:nvSpPr>
+              <p:cNvPr id="12" name="テキスト ボックス 11"/>
+              <p:cNvSpPr txBox="1"/>
+              <p:nvPr/>
+            </p:nvSpPr>
+            <p:spPr>
+              <a:xfrm>
+                <a:off x="3007815" y="1845187"/>
+                <a:ext cx="2245166" cy="461665"/>
+              </a:xfrm>
+              <a:prstGeom prst="rect">
+                <a:avLst/>
+              </a:prstGeom>
+              <a:noFill/>
+            </p:spPr>
+            <p:txBody>
+              <a:bodyPr wrap="none" rtlCol="0">
+                <a:spAutoFit/>
+              </a:bodyPr>
+              <a:lstStyle/>
+              <a:p>
+                <a:pPr/>
+                <a14:m>
+                  <m:oMathPara xmlns:m="http://schemas.openxmlformats.org/officeDocument/2006/math">
+                    <m:oMathParaPr>
+                      <m:jc m:val="centerGroup"/>
+                    </m:oMathParaPr>
+                    <m:oMath xmlns:m="http://schemas.openxmlformats.org/officeDocument/2006/math">
+                      <m:sSub>
+                        <m:sSubPr>
+                          <m:ctrlPr>
+                            <a:rPr lang="en-US" altLang="ja-JP" sz="2400" i="1" smtClean="0">
+                              <a:latin typeface="Cambria Math" panose="02040503050406030204" pitchFamily="18" charset="0"/>
+                            </a:rPr>
+                          </m:ctrlPr>
+                        </m:sSubPr>
+                        <m:e>
+                          <m:acc>
+                            <m:accPr>
+                              <m:chr m:val="̂"/>
+                              <m:ctrlPr>
+                                <a:rPr lang="en-US" altLang="ja-JP" sz="2400" b="1" i="1" smtClean="0">
+                                  <a:latin typeface="Cambria Math" panose="02040503050406030204" pitchFamily="18" charset="0"/>
+                                </a:rPr>
+                              </m:ctrlPr>
+                            </m:accPr>
+                            <m:e>
+                              <m:sSup>
+                                <m:sSupPr>
+                                  <m:ctrlPr>
+                                    <a:rPr lang="en-US" altLang="ja-JP" sz="2400" b="1" i="1" smtClean="0">
+                                      <a:latin typeface="Cambria Math" panose="02040503050406030204" pitchFamily="18" charset="0"/>
+                                    </a:rPr>
+                                  </m:ctrlPr>
+                                </m:sSupPr>
+                                <m:e>
+                                  <m:r>
+                                    <a:rPr lang="en-US" altLang="ja-JP" sz="2400" b="1" i="1" smtClean="0">
+                                      <a:latin typeface="Cambria Math" panose="02040503050406030204" pitchFamily="18" charset="0"/>
+                                    </a:rPr>
+                                    <m:t>𝒙</m:t>
+                                  </m:r>
+                                </m:e>
+                                <m:sup>
+                                  <m:r>
+                                    <a:rPr lang="en-US" altLang="ja-JP" sz="2400" b="1" i="1" smtClean="0">
+                                      <a:latin typeface="Cambria Math" panose="02040503050406030204" pitchFamily="18" charset="0"/>
+                                    </a:rPr>
+                                    <m:t>−</m:t>
+                                  </m:r>
+                                </m:sup>
+                              </m:sSup>
+                            </m:e>
+                          </m:acc>
+                        </m:e>
+                        <m:sub>
+                          <m:r>
+                            <a:rPr lang="en-US" altLang="ja-JP" sz="2400" b="0" i="1" smtClean="0">
+                              <a:latin typeface="Cambria Math" panose="02040503050406030204" pitchFamily="18" charset="0"/>
+                            </a:rPr>
+                            <m:t>𝑡</m:t>
+                          </m:r>
+                        </m:sub>
+                      </m:sSub>
+                      <m:r>
+                        <a:rPr lang="en-US" altLang="ja-JP" sz="2400" b="0" i="1" smtClean="0">
+                          <a:latin typeface="Cambria Math" panose="02040503050406030204" pitchFamily="18" charset="0"/>
+                        </a:rPr>
+                        <m:t>=</m:t>
+                      </m:r>
+                      <m:r>
+                        <a:rPr lang="en-US" altLang="ja-JP" sz="2400" b="1" i="1" smtClean="0">
+                          <a:latin typeface="Cambria Math" panose="02040503050406030204" pitchFamily="18" charset="0"/>
+                        </a:rPr>
+                        <m:t>𝒇</m:t>
+                      </m:r>
+                      <m:d>
+                        <m:dPr>
+                          <m:ctrlPr>
+                            <a:rPr lang="en-US" altLang="ja-JP" sz="2400" b="0" i="1" smtClean="0">
+                              <a:latin typeface="Cambria Math" panose="02040503050406030204" pitchFamily="18" charset="0"/>
+                            </a:rPr>
+                          </m:ctrlPr>
+                        </m:dPr>
+                        <m:e>
+                          <m:sSub>
+                            <m:sSubPr>
+                              <m:ctrlPr>
+                                <a:rPr lang="en-US" altLang="ja-JP" sz="2400" i="1">
+                                  <a:latin typeface="Cambria Math" panose="02040503050406030204" pitchFamily="18" charset="0"/>
+                                </a:rPr>
+                              </m:ctrlPr>
+                            </m:sSubPr>
+                            <m:e>
+                              <m:acc>
+                                <m:accPr>
+                                  <m:chr m:val="̂"/>
+                                  <m:ctrlPr>
+                                    <a:rPr lang="en-US" altLang="ja-JP" sz="2400" b="1" i="1">
+                                      <a:latin typeface="Cambria Math" panose="02040503050406030204" pitchFamily="18" charset="0"/>
+                                    </a:rPr>
+                                  </m:ctrlPr>
+                                </m:accPr>
+                                <m:e>
+                                  <m:r>
+                                    <a:rPr lang="en-US" altLang="ja-JP" sz="2400" b="1" i="1">
+                                      <a:latin typeface="Cambria Math" panose="02040503050406030204" pitchFamily="18" charset="0"/>
+                                    </a:rPr>
+                                    <m:t>𝒙</m:t>
+                                  </m:r>
+                                </m:e>
+                              </m:acc>
+                            </m:e>
+                            <m:sub>
+                              <m:r>
+                                <a:rPr lang="en-US" altLang="ja-JP" sz="2400" i="1">
+                                  <a:latin typeface="Cambria Math" panose="02040503050406030204" pitchFamily="18" charset="0"/>
+                                </a:rPr>
+                                <m:t>𝑡</m:t>
+                              </m:r>
+                              <m:r>
+                                <a:rPr lang="en-US" altLang="ja-JP" sz="2400" i="1">
+                                  <a:latin typeface="Cambria Math" panose="02040503050406030204" pitchFamily="18" charset="0"/>
+                                </a:rPr>
+                                <m:t>−1</m:t>
+                              </m:r>
+                            </m:sub>
+                          </m:sSub>
+                        </m:e>
+                      </m:d>
+                    </m:oMath>
+                  </m:oMathPara>
+                </a14:m>
+                <a:endParaRPr kumimoji="1" lang="ja-JP" altLang="en-US" sz="2400" dirty="0"/>
+              </a:p>
+            </p:txBody>
+          </p:sp>
+        </mc:Choice>
+        <mc:Fallback>
+          <p:sp>
+            <p:nvSpPr>
+              <p:cNvPr id="12" name="テキスト ボックス 11"/>
+              <p:cNvSpPr txBox="1">
+                <a:spLocks noRot="1" noChangeAspect="1" noMove="1" noResize="1" noEditPoints="1" noAdjustHandles="1" noChangeArrowheads="1" noChangeShapeType="1" noTextEdit="1"/>
+              </p:cNvSpPr>
+              <p:nvPr/>
+            </p:nvSpPr>
+            <p:spPr>
+              <a:xfrm>
+                <a:off x="3007815" y="1845187"/>
+                <a:ext cx="2245166" cy="461665"/>
+              </a:xfrm>
+              <a:prstGeom prst="rect">
+                <a:avLst/>
+              </a:prstGeom>
+              <a:blipFill rotWithShape="0">
+                <a:blip r:embed="rId2"/>
+                <a:stretch>
+                  <a:fillRect t="-8000" b="-18667"/>
+                </a:stretch>
+              </a:blipFill>
+            </p:spPr>
+            <p:txBody>
+              <a:bodyPr/>
+              <a:lstStyle/>
+              <a:p>
+                <a:r>
+                  <a:rPr lang="ja-JP" altLang="en-US">
+                    <a:noFill/>
+                  </a:rPr>
+                  <a:t> </a:t>
+                </a:r>
+              </a:p>
+            </p:txBody>
+          </p:sp>
+        </mc:Fallback>
+      </mc:AlternateContent>
+      <mc:AlternateContent xmlns:mc="http://schemas.openxmlformats.org/markup-compatibility/2006">
+        <mc:Choice xmlns:a14="http://schemas.microsoft.com/office/drawing/2010/main" Requires="a14">
+          <p:sp>
+            <p:nvSpPr>
+              <p:cNvPr id="13" name="テキスト ボックス 12"/>
+              <p:cNvSpPr txBox="1"/>
+              <p:nvPr/>
+            </p:nvSpPr>
+            <p:spPr>
+              <a:xfrm>
+                <a:off x="2991460" y="2416637"/>
+                <a:ext cx="3844001" cy="461665"/>
+              </a:xfrm>
+              <a:prstGeom prst="rect">
+                <a:avLst/>
+              </a:prstGeom>
+              <a:noFill/>
+            </p:spPr>
+            <p:txBody>
+              <a:bodyPr wrap="none" rtlCol="0">
+                <a:spAutoFit/>
+              </a:bodyPr>
+              <a:lstStyle/>
+              <a:p>
+                <a:pPr/>
+                <a14:m>
+                  <m:oMathPara xmlns:m="http://schemas.openxmlformats.org/officeDocument/2006/math">
+                    <m:oMathParaPr>
+                      <m:jc m:val="centerGroup"/>
+                    </m:oMathParaPr>
+                    <m:oMath xmlns:m="http://schemas.openxmlformats.org/officeDocument/2006/math">
+                      <m:sSub>
+                        <m:sSubPr>
+                          <m:ctrlPr>
+                            <a:rPr lang="en-US" altLang="ja-JP" sz="2400" i="1" smtClean="0">
+                              <a:latin typeface="Cambria Math" panose="02040503050406030204" pitchFamily="18" charset="0"/>
+                            </a:rPr>
+                          </m:ctrlPr>
+                        </m:sSubPr>
+                        <m:e>
+                          <m:sSup>
+                            <m:sSupPr>
+                              <m:ctrlPr>
+                                <a:rPr lang="en-US" altLang="ja-JP" sz="2400" i="1" smtClean="0">
+                                  <a:latin typeface="Cambria Math" panose="02040503050406030204" pitchFamily="18" charset="0"/>
+                                </a:rPr>
+                              </m:ctrlPr>
+                            </m:sSupPr>
+                            <m:e>
+                              <m:r>
+                                <a:rPr lang="en-US" altLang="ja-JP" sz="2400" b="1" i="1" smtClean="0">
+                                  <a:latin typeface="Cambria Math" panose="02040503050406030204" pitchFamily="18" charset="0"/>
+                                </a:rPr>
+                                <m:t>𝑷</m:t>
+                              </m:r>
+                            </m:e>
+                            <m:sup>
+                              <m:r>
+                                <a:rPr lang="en-US" altLang="ja-JP" sz="2400" b="0" i="1" smtClean="0">
+                                  <a:latin typeface="Cambria Math" panose="02040503050406030204" pitchFamily="18" charset="0"/>
+                                </a:rPr>
+                                <m:t>−</m:t>
+                              </m:r>
+                            </m:sup>
+                          </m:sSup>
+                        </m:e>
+                        <m:sub>
+                          <m:r>
+                            <a:rPr lang="en-US" altLang="ja-JP" sz="2400" b="0" i="1" smtClean="0">
+                              <a:latin typeface="Cambria Math" panose="02040503050406030204" pitchFamily="18" charset="0"/>
+                            </a:rPr>
+                            <m:t>𝑡</m:t>
+                          </m:r>
+                        </m:sub>
+                      </m:sSub>
+                      <m:r>
+                        <a:rPr lang="en-US" altLang="ja-JP" sz="2400" b="0" i="1" smtClean="0">
+                          <a:latin typeface="Cambria Math" panose="02040503050406030204" pitchFamily="18" charset="0"/>
+                        </a:rPr>
+                        <m:t>=</m:t>
+                      </m:r>
+                      <m:sSub>
+                        <m:sSubPr>
+                          <m:ctrlPr>
+                            <a:rPr lang="en-US" altLang="ja-JP" sz="2400" b="0" i="1" smtClean="0">
+                              <a:latin typeface="Cambria Math" panose="02040503050406030204" pitchFamily="18" charset="0"/>
+                            </a:rPr>
+                          </m:ctrlPr>
+                        </m:sSubPr>
+                        <m:e>
+                          <m:r>
+                            <a:rPr lang="en-US" altLang="ja-JP" sz="2400" b="1" i="1" smtClean="0">
+                              <a:latin typeface="Cambria Math" panose="02040503050406030204" pitchFamily="18" charset="0"/>
+                            </a:rPr>
+                            <m:t>𝑨</m:t>
+                          </m:r>
+                        </m:e>
+                        <m:sub>
+                          <m:r>
+                            <a:rPr lang="en-US" altLang="ja-JP" sz="2400" b="0" i="1" smtClean="0">
+                              <a:latin typeface="Cambria Math" panose="02040503050406030204" pitchFamily="18" charset="0"/>
+                            </a:rPr>
+                            <m:t>𝑡</m:t>
+                          </m:r>
+                          <m:r>
+                            <a:rPr lang="en-US" altLang="ja-JP" sz="2400" b="0" i="1" smtClean="0">
+                              <a:latin typeface="Cambria Math" panose="02040503050406030204" pitchFamily="18" charset="0"/>
+                            </a:rPr>
+                            <m:t>−1</m:t>
+                          </m:r>
+                        </m:sub>
+                      </m:sSub>
+                      <m:sSub>
+                        <m:sSubPr>
+                          <m:ctrlPr>
+                            <a:rPr lang="en-US" altLang="ja-JP" sz="2400" b="0" i="1" smtClean="0">
+                              <a:latin typeface="Cambria Math" panose="02040503050406030204" pitchFamily="18" charset="0"/>
+                            </a:rPr>
+                          </m:ctrlPr>
+                        </m:sSubPr>
+                        <m:e>
+                          <m:r>
+                            <a:rPr lang="en-US" altLang="ja-JP" sz="2400" b="1" i="1" smtClean="0">
+                              <a:latin typeface="Cambria Math" panose="02040503050406030204" pitchFamily="18" charset="0"/>
+                            </a:rPr>
+                            <m:t>𝑷</m:t>
+                          </m:r>
+                        </m:e>
+                        <m:sub>
+                          <m:r>
+                            <a:rPr lang="en-US" altLang="ja-JP" sz="2400" b="0" i="1" smtClean="0">
+                              <a:latin typeface="Cambria Math" panose="02040503050406030204" pitchFamily="18" charset="0"/>
+                            </a:rPr>
+                            <m:t>𝑡</m:t>
+                          </m:r>
+                          <m:r>
+                            <a:rPr lang="en-US" altLang="ja-JP" sz="2400" b="0" i="1" smtClean="0">
+                              <a:latin typeface="Cambria Math" panose="02040503050406030204" pitchFamily="18" charset="0"/>
+                            </a:rPr>
+                            <m:t>−1</m:t>
+                          </m:r>
+                        </m:sub>
+                      </m:sSub>
+                      <m:sSub>
+                        <m:sSubPr>
+                          <m:ctrlPr>
+                            <a:rPr lang="en-US" altLang="ja-JP" sz="2400" b="0" i="1" smtClean="0">
+                              <a:latin typeface="Cambria Math" panose="02040503050406030204" pitchFamily="18" charset="0"/>
+                            </a:rPr>
+                          </m:ctrlPr>
+                        </m:sSubPr>
+                        <m:e>
+                          <m:sSup>
+                            <m:sSupPr>
+                              <m:ctrlPr>
+                                <a:rPr lang="en-US" altLang="ja-JP" sz="2400" b="0" i="1" smtClean="0">
+                                  <a:latin typeface="Cambria Math" panose="02040503050406030204" pitchFamily="18" charset="0"/>
+                                </a:rPr>
+                              </m:ctrlPr>
+                            </m:sSupPr>
+                            <m:e>
+                              <m:r>
+                                <a:rPr lang="en-US" altLang="ja-JP" sz="2400" b="1" i="1" smtClean="0">
+                                  <a:latin typeface="Cambria Math" panose="02040503050406030204" pitchFamily="18" charset="0"/>
+                                </a:rPr>
+                                <m:t>𝑨</m:t>
+                              </m:r>
+                            </m:e>
+                            <m:sup>
+                              <m:r>
+                                <a:rPr lang="en-US" altLang="ja-JP" sz="2400" b="0" i="1" smtClean="0">
+                                  <a:latin typeface="Cambria Math" panose="02040503050406030204" pitchFamily="18" charset="0"/>
+                                </a:rPr>
+                                <m:t>𝑇</m:t>
+                              </m:r>
+                            </m:sup>
+                          </m:sSup>
+                        </m:e>
+                        <m:sub>
+                          <m:r>
+                            <a:rPr lang="en-US" altLang="ja-JP" sz="2400" b="0" i="1" smtClean="0">
+                              <a:latin typeface="Cambria Math" panose="02040503050406030204" pitchFamily="18" charset="0"/>
+                            </a:rPr>
+                            <m:t>𝑡</m:t>
+                          </m:r>
+                          <m:r>
+                            <a:rPr lang="en-US" altLang="ja-JP" sz="2400" b="0" i="1" smtClean="0">
+                              <a:latin typeface="Cambria Math" panose="02040503050406030204" pitchFamily="18" charset="0"/>
+                            </a:rPr>
+                            <m:t>−1</m:t>
+                          </m:r>
+                        </m:sub>
+                      </m:sSub>
+                      <m:r>
+                        <a:rPr lang="en-US" altLang="ja-JP" sz="2400" b="0" i="1" smtClean="0">
+                          <a:latin typeface="Cambria Math" panose="02040503050406030204" pitchFamily="18" charset="0"/>
+                        </a:rPr>
+                        <m:t>+</m:t>
+                      </m:r>
+                      <m:r>
+                        <a:rPr lang="en-US" altLang="ja-JP" sz="2400" b="1" i="1" smtClean="0">
+                          <a:latin typeface="Cambria Math" panose="02040503050406030204" pitchFamily="18" charset="0"/>
+                        </a:rPr>
+                        <m:t>𝑸</m:t>
+                      </m:r>
+                    </m:oMath>
+                  </m:oMathPara>
+                </a14:m>
+                <a:endParaRPr kumimoji="1" lang="ja-JP" altLang="en-US" sz="2400" b="1" dirty="0"/>
+              </a:p>
+            </p:txBody>
+          </p:sp>
+        </mc:Choice>
+        <mc:Fallback>
+          <p:sp>
+            <p:nvSpPr>
+              <p:cNvPr id="13" name="テキスト ボックス 12"/>
+              <p:cNvSpPr txBox="1">
+                <a:spLocks noRot="1" noChangeAspect="1" noMove="1" noResize="1" noEditPoints="1" noAdjustHandles="1" noChangeArrowheads="1" noChangeShapeType="1" noTextEdit="1"/>
+              </p:cNvSpPr>
+              <p:nvPr/>
+            </p:nvSpPr>
+            <p:spPr>
+              <a:xfrm>
+                <a:off x="2991460" y="2416637"/>
+                <a:ext cx="3844001" cy="461665"/>
+              </a:xfrm>
+              <a:prstGeom prst="rect">
+                <a:avLst/>
+              </a:prstGeom>
+              <a:blipFill rotWithShape="0">
+                <a:blip r:embed="rId3"/>
+                <a:stretch>
+                  <a:fillRect b="-13158"/>
+                </a:stretch>
+              </a:blipFill>
+            </p:spPr>
+            <p:txBody>
+              <a:bodyPr/>
+              <a:lstStyle/>
+              <a:p>
+                <a:r>
+                  <a:rPr lang="ja-JP" altLang="en-US">
+                    <a:noFill/>
+                  </a:rPr>
+                  <a:t> </a:t>
+                </a:r>
+              </a:p>
+            </p:txBody>
+          </p:sp>
+        </mc:Fallback>
+      </mc:AlternateContent>
+      <mc:AlternateContent xmlns:mc="http://schemas.openxmlformats.org/markup-compatibility/2006">
+        <mc:Choice xmlns:a14="http://schemas.microsoft.com/office/drawing/2010/main" Requires="a14">
+          <p:sp>
+            <p:nvSpPr>
+              <p:cNvPr id="14" name="テキスト ボックス 13"/>
+              <p:cNvSpPr txBox="1"/>
+              <p:nvPr/>
+            </p:nvSpPr>
+            <p:spPr>
+              <a:xfrm>
+                <a:off x="2991460" y="2988087"/>
+                <a:ext cx="4314643" cy="461665"/>
+              </a:xfrm>
+              <a:prstGeom prst="rect">
+                <a:avLst/>
+              </a:prstGeom>
+              <a:noFill/>
+            </p:spPr>
+            <p:txBody>
+              <a:bodyPr wrap="none" rtlCol="0">
+                <a:spAutoFit/>
+              </a:bodyPr>
+              <a:lstStyle/>
+              <a:p>
+                <a:pPr/>
+                <a14:m>
+                  <m:oMathPara xmlns:m="http://schemas.openxmlformats.org/officeDocument/2006/math">
+                    <m:oMathParaPr>
+                      <m:jc m:val="centerGroup"/>
+                    </m:oMathParaPr>
+                    <m:oMath xmlns:m="http://schemas.openxmlformats.org/officeDocument/2006/math">
+                      <m:sSub>
+                        <m:sSubPr>
+                          <m:ctrlPr>
+                            <a:rPr lang="en-US" altLang="ja-JP" sz="2400" i="1" smtClean="0">
+                              <a:latin typeface="Cambria Math" panose="02040503050406030204" pitchFamily="18" charset="0"/>
+                            </a:rPr>
+                          </m:ctrlPr>
+                        </m:sSubPr>
+                        <m:e>
+                          <m:r>
+                            <a:rPr lang="en-US" altLang="ja-JP" sz="2400" b="1" i="1" smtClean="0">
+                              <a:latin typeface="Cambria Math" panose="02040503050406030204" pitchFamily="18" charset="0"/>
+                            </a:rPr>
+                            <m:t>𝒈</m:t>
+                          </m:r>
+                        </m:e>
+                        <m:sub>
+                          <m:r>
+                            <a:rPr lang="en-US" altLang="ja-JP" sz="2400" b="0" i="1" smtClean="0">
+                              <a:latin typeface="Cambria Math" panose="02040503050406030204" pitchFamily="18" charset="0"/>
+                            </a:rPr>
+                            <m:t>𝑡</m:t>
+                          </m:r>
+                        </m:sub>
+                      </m:sSub>
+                      <m:r>
+                        <a:rPr lang="en-US" altLang="ja-JP" sz="2400" b="0" i="1" smtClean="0">
+                          <a:latin typeface="Cambria Math" panose="02040503050406030204" pitchFamily="18" charset="0"/>
+                        </a:rPr>
+                        <m:t>=</m:t>
+                      </m:r>
+                      <m:sSub>
+                        <m:sSubPr>
+                          <m:ctrlPr>
+                            <a:rPr lang="en-US" altLang="ja-JP" sz="2400" i="1">
+                              <a:latin typeface="Cambria Math" panose="02040503050406030204" pitchFamily="18" charset="0"/>
+                            </a:rPr>
+                          </m:ctrlPr>
+                        </m:sSubPr>
+                        <m:e>
+                          <m:sSup>
+                            <m:sSupPr>
+                              <m:ctrlPr>
+                                <a:rPr lang="en-US" altLang="ja-JP" sz="2400" i="1">
+                                  <a:latin typeface="Cambria Math" panose="02040503050406030204" pitchFamily="18" charset="0"/>
+                                </a:rPr>
+                              </m:ctrlPr>
+                            </m:sSupPr>
+                            <m:e>
+                              <m:r>
+                                <a:rPr lang="en-US" altLang="ja-JP" sz="2400" b="1" i="1">
+                                  <a:latin typeface="Cambria Math" panose="02040503050406030204" pitchFamily="18" charset="0"/>
+                                </a:rPr>
+                                <m:t>𝑷</m:t>
+                              </m:r>
+                            </m:e>
+                            <m:sup>
+                              <m:r>
+                                <a:rPr lang="en-US" altLang="ja-JP" sz="2400" i="1">
+                                  <a:latin typeface="Cambria Math" panose="02040503050406030204" pitchFamily="18" charset="0"/>
+                                </a:rPr>
+                                <m:t>−</m:t>
+                              </m:r>
+                            </m:sup>
+                          </m:sSup>
+                        </m:e>
+                        <m:sub>
+                          <m:r>
+                            <a:rPr lang="en-US" altLang="ja-JP" sz="2400" i="1">
+                              <a:latin typeface="Cambria Math" panose="02040503050406030204" pitchFamily="18" charset="0"/>
+                            </a:rPr>
+                            <m:t>𝑡</m:t>
+                          </m:r>
+                        </m:sub>
+                      </m:sSub>
+                      <m:sSub>
+                        <m:sSubPr>
+                          <m:ctrlPr>
+                            <a:rPr lang="en-US" altLang="ja-JP" sz="2400" i="1" smtClean="0">
+                              <a:latin typeface="Cambria Math" panose="02040503050406030204" pitchFamily="18" charset="0"/>
+                            </a:rPr>
+                          </m:ctrlPr>
+                        </m:sSubPr>
+                        <m:e>
+                          <m:r>
+                            <a:rPr lang="en-US" altLang="ja-JP" sz="2400" b="1" i="1" smtClean="0">
+                              <a:latin typeface="Cambria Math" panose="02040503050406030204" pitchFamily="18" charset="0"/>
+                            </a:rPr>
+                            <m:t>𝑪</m:t>
+                          </m:r>
+                        </m:e>
+                        <m:sub>
+                          <m:r>
+                            <a:rPr lang="en-US" altLang="ja-JP" sz="2400" b="0" i="1" smtClean="0">
+                              <a:latin typeface="Cambria Math" panose="02040503050406030204" pitchFamily="18" charset="0"/>
+                            </a:rPr>
+                            <m:t>𝑡</m:t>
+                          </m:r>
+                        </m:sub>
+                      </m:sSub>
+                      <m:sSup>
+                        <m:sSupPr>
+                          <m:ctrlPr>
+                            <a:rPr lang="en-US" altLang="ja-JP" sz="2400" i="1" smtClean="0">
+                              <a:latin typeface="Cambria Math" panose="02040503050406030204" pitchFamily="18" charset="0"/>
+                            </a:rPr>
+                          </m:ctrlPr>
+                        </m:sSupPr>
+                        <m:e>
+                          <m:d>
+                            <m:dPr>
+                              <m:ctrlPr>
+                                <a:rPr lang="en-US" altLang="ja-JP" sz="2400" i="1" smtClean="0">
+                                  <a:latin typeface="Cambria Math" panose="02040503050406030204" pitchFamily="18" charset="0"/>
+                                </a:rPr>
+                              </m:ctrlPr>
+                            </m:dPr>
+                            <m:e>
+                              <m:sSub>
+                                <m:sSubPr>
+                                  <m:ctrlPr>
+                                    <a:rPr lang="en-US" altLang="ja-JP" sz="2400" i="1">
+                                      <a:latin typeface="Cambria Math" panose="02040503050406030204" pitchFamily="18" charset="0"/>
+                                    </a:rPr>
+                                  </m:ctrlPr>
+                                </m:sSubPr>
+                                <m:e>
+                                  <m:sSup>
+                                    <m:sSupPr>
+                                      <m:ctrlPr>
+                                        <a:rPr lang="en-US" altLang="ja-JP" sz="2400" i="1">
+                                          <a:latin typeface="Cambria Math" panose="02040503050406030204" pitchFamily="18" charset="0"/>
+                                        </a:rPr>
+                                      </m:ctrlPr>
+                                    </m:sSupPr>
+                                    <m:e>
+                                      <m:r>
+                                        <a:rPr lang="en-US" altLang="ja-JP" sz="2400" b="1" i="1" smtClean="0">
+                                          <a:latin typeface="Cambria Math" panose="02040503050406030204" pitchFamily="18" charset="0"/>
+                                        </a:rPr>
+                                        <m:t>𝑪</m:t>
+                                      </m:r>
+                                    </m:e>
+                                    <m:sup>
+                                      <m:r>
+                                        <a:rPr lang="en-US" altLang="ja-JP" sz="2400" i="1">
+                                          <a:latin typeface="Cambria Math" panose="02040503050406030204" pitchFamily="18" charset="0"/>
+                                        </a:rPr>
+                                        <m:t>𝑇</m:t>
+                                      </m:r>
+                                    </m:sup>
+                                  </m:sSup>
+                                </m:e>
+                                <m:sub>
+                                  <m:r>
+                                    <a:rPr lang="en-US" altLang="ja-JP" sz="2400" i="1">
+                                      <a:latin typeface="Cambria Math" panose="02040503050406030204" pitchFamily="18" charset="0"/>
+                                    </a:rPr>
+                                    <m:t>𝑡</m:t>
+                                  </m:r>
+                                </m:sub>
+                              </m:sSub>
+                              <m:sSub>
+                                <m:sSubPr>
+                                  <m:ctrlPr>
+                                    <a:rPr lang="en-US" altLang="ja-JP" sz="2400" i="1">
+                                      <a:latin typeface="Cambria Math" panose="02040503050406030204" pitchFamily="18" charset="0"/>
+                                    </a:rPr>
+                                  </m:ctrlPr>
+                                </m:sSubPr>
+                                <m:e>
+                                  <m:sSup>
+                                    <m:sSupPr>
+                                      <m:ctrlPr>
+                                        <a:rPr lang="en-US" altLang="ja-JP" sz="2400" i="1">
+                                          <a:latin typeface="Cambria Math" panose="02040503050406030204" pitchFamily="18" charset="0"/>
+                                        </a:rPr>
+                                      </m:ctrlPr>
+                                    </m:sSupPr>
+                                    <m:e>
+                                      <m:r>
+                                        <a:rPr lang="en-US" altLang="ja-JP" sz="2400" b="1" i="1">
+                                          <a:latin typeface="Cambria Math" panose="02040503050406030204" pitchFamily="18" charset="0"/>
+                                        </a:rPr>
+                                        <m:t>𝑷</m:t>
+                                      </m:r>
+                                    </m:e>
+                                    <m:sup>
+                                      <m:r>
+                                        <a:rPr lang="en-US" altLang="ja-JP" sz="2400" i="1">
+                                          <a:latin typeface="Cambria Math" panose="02040503050406030204" pitchFamily="18" charset="0"/>
+                                        </a:rPr>
+                                        <m:t>−</m:t>
+                                      </m:r>
+                                    </m:sup>
+                                  </m:sSup>
+                                </m:e>
+                                <m:sub>
+                                  <m:r>
+                                    <a:rPr lang="en-US" altLang="ja-JP" sz="2400" i="1">
+                                      <a:latin typeface="Cambria Math" panose="02040503050406030204" pitchFamily="18" charset="0"/>
+                                    </a:rPr>
+                                    <m:t>𝑡</m:t>
+                                  </m:r>
+                                </m:sub>
+                              </m:sSub>
+                              <m:sSub>
+                                <m:sSubPr>
+                                  <m:ctrlPr>
+                                    <a:rPr lang="en-US" altLang="ja-JP" sz="2400" i="1">
+                                      <a:latin typeface="Cambria Math" panose="02040503050406030204" pitchFamily="18" charset="0"/>
+                                    </a:rPr>
+                                  </m:ctrlPr>
+                                </m:sSubPr>
+                                <m:e>
+                                  <m:r>
+                                    <a:rPr lang="en-US" altLang="ja-JP" sz="2400" b="1" i="1">
+                                      <a:latin typeface="Cambria Math" panose="02040503050406030204" pitchFamily="18" charset="0"/>
+                                    </a:rPr>
+                                    <m:t>𝑪</m:t>
+                                  </m:r>
+                                </m:e>
+                                <m:sub>
+                                  <m:r>
+                                    <a:rPr lang="en-US" altLang="ja-JP" sz="2400" i="1">
+                                      <a:latin typeface="Cambria Math" panose="02040503050406030204" pitchFamily="18" charset="0"/>
+                                    </a:rPr>
+                                    <m:t>𝑡</m:t>
+                                  </m:r>
+                                </m:sub>
+                              </m:sSub>
+                              <m:r>
+                                <a:rPr lang="en-US" altLang="ja-JP" sz="2400" b="0" i="1" smtClean="0">
+                                  <a:latin typeface="Cambria Math" panose="02040503050406030204" pitchFamily="18" charset="0"/>
+                                </a:rPr>
+                                <m:t>+</m:t>
+                              </m:r>
+                              <m:r>
+                                <a:rPr lang="en-US" altLang="ja-JP" sz="2400" b="1" i="1" smtClean="0">
+                                  <a:latin typeface="Cambria Math" panose="02040503050406030204" pitchFamily="18" charset="0"/>
+                                </a:rPr>
+                                <m:t>𝑹</m:t>
+                              </m:r>
+                            </m:e>
+                          </m:d>
+                        </m:e>
+                        <m:sup>
+                          <m:r>
+                            <a:rPr lang="en-US" altLang="ja-JP" sz="2400" b="0" i="1" smtClean="0">
+                              <a:latin typeface="Cambria Math" panose="02040503050406030204" pitchFamily="18" charset="0"/>
+                            </a:rPr>
+                            <m:t>−1</m:t>
+                          </m:r>
+                        </m:sup>
+                      </m:sSup>
+                    </m:oMath>
+                  </m:oMathPara>
+                </a14:m>
+                <a:endParaRPr kumimoji="1" lang="ja-JP" altLang="en-US" sz="2400" b="1" dirty="0"/>
+              </a:p>
+            </p:txBody>
+          </p:sp>
+        </mc:Choice>
+        <mc:Fallback>
+          <p:sp>
+            <p:nvSpPr>
+              <p:cNvPr id="14" name="テキスト ボックス 13"/>
+              <p:cNvSpPr txBox="1">
+                <a:spLocks noRot="1" noChangeAspect="1" noMove="1" noResize="1" noEditPoints="1" noAdjustHandles="1" noChangeArrowheads="1" noChangeShapeType="1" noTextEdit="1"/>
+              </p:cNvSpPr>
+              <p:nvPr/>
+            </p:nvSpPr>
+            <p:spPr>
+              <a:xfrm>
+                <a:off x="2991460" y="2988087"/>
+                <a:ext cx="4314643" cy="461665"/>
+              </a:xfrm>
+              <a:prstGeom prst="rect">
+                <a:avLst/>
+              </a:prstGeom>
+              <a:blipFill rotWithShape="0">
+                <a:blip r:embed="rId4"/>
+                <a:stretch>
+                  <a:fillRect b="-10526"/>
+                </a:stretch>
+              </a:blipFill>
+            </p:spPr>
+            <p:txBody>
+              <a:bodyPr/>
+              <a:lstStyle/>
+              <a:p>
+                <a:r>
+                  <a:rPr lang="ja-JP" altLang="en-US">
+                    <a:noFill/>
+                  </a:rPr>
+                  <a:t> </a:t>
+                </a:r>
+              </a:p>
+            </p:txBody>
+          </p:sp>
+        </mc:Fallback>
+      </mc:AlternateContent>
+      <mc:AlternateContent xmlns:mc="http://schemas.openxmlformats.org/markup-compatibility/2006">
+        <mc:Choice xmlns:a14="http://schemas.microsoft.com/office/drawing/2010/main" Requires="a14">
+          <p:sp>
+            <p:nvSpPr>
+              <p:cNvPr id="15" name="テキスト ボックス 14"/>
+              <p:cNvSpPr txBox="1"/>
+              <p:nvPr/>
+            </p:nvSpPr>
+            <p:spPr>
+              <a:xfrm>
+                <a:off x="3007815" y="3559537"/>
+                <a:ext cx="4044632" cy="461665"/>
+              </a:xfrm>
+              <a:prstGeom prst="rect">
+                <a:avLst/>
+              </a:prstGeom>
+              <a:noFill/>
+            </p:spPr>
+            <p:txBody>
+              <a:bodyPr wrap="none" rtlCol="0">
+                <a:spAutoFit/>
+              </a:bodyPr>
+              <a:lstStyle/>
+              <a:p>
+                <a:pPr/>
+                <a14:m>
+                  <m:oMathPara xmlns:m="http://schemas.openxmlformats.org/officeDocument/2006/math">
+                    <m:oMathParaPr>
+                      <m:jc m:val="centerGroup"/>
+                    </m:oMathParaPr>
+                    <m:oMath xmlns:m="http://schemas.openxmlformats.org/officeDocument/2006/math">
+                      <m:sSub>
+                        <m:sSubPr>
+                          <m:ctrlPr>
+                            <a:rPr lang="en-US" altLang="ja-JP" sz="2400" i="1" smtClean="0">
+                              <a:latin typeface="Cambria Math" panose="02040503050406030204" pitchFamily="18" charset="0"/>
+                            </a:rPr>
+                          </m:ctrlPr>
+                        </m:sSubPr>
+                        <m:e>
+                          <m:acc>
+                            <m:accPr>
+                              <m:chr m:val="̂"/>
+                              <m:ctrlPr>
+                                <a:rPr lang="en-US" altLang="ja-JP" sz="2400" b="1" i="1" smtClean="0">
+                                  <a:latin typeface="Cambria Math" panose="02040503050406030204" pitchFamily="18" charset="0"/>
+                                </a:rPr>
+                              </m:ctrlPr>
+                            </m:accPr>
+                            <m:e>
+                              <m:r>
+                                <a:rPr lang="en-US" altLang="ja-JP" sz="2400" b="1" i="1" smtClean="0">
+                                  <a:latin typeface="Cambria Math" panose="02040503050406030204" pitchFamily="18" charset="0"/>
+                                </a:rPr>
+                                <m:t>𝒙</m:t>
+                              </m:r>
+                            </m:e>
+                          </m:acc>
+                        </m:e>
+                        <m:sub>
+                          <m:r>
+                            <a:rPr lang="en-US" altLang="ja-JP" sz="2400" b="0" i="1" smtClean="0">
+                              <a:latin typeface="Cambria Math" panose="02040503050406030204" pitchFamily="18" charset="0"/>
+                            </a:rPr>
+                            <m:t>𝑡</m:t>
+                          </m:r>
+                        </m:sub>
+                      </m:sSub>
+                      <m:r>
+                        <a:rPr lang="en-US" altLang="ja-JP" sz="2400" b="0" i="1" smtClean="0">
+                          <a:latin typeface="Cambria Math" panose="02040503050406030204" pitchFamily="18" charset="0"/>
+                        </a:rPr>
+                        <m:t>=</m:t>
+                      </m:r>
+                      <m:sSub>
+                        <m:sSubPr>
+                          <m:ctrlPr>
+                            <a:rPr lang="en-US" altLang="ja-JP" sz="2400" i="1">
+                              <a:latin typeface="Cambria Math" panose="02040503050406030204" pitchFamily="18" charset="0"/>
+                            </a:rPr>
+                          </m:ctrlPr>
+                        </m:sSubPr>
+                        <m:e>
+                          <m:acc>
+                            <m:accPr>
+                              <m:chr m:val="̂"/>
+                              <m:ctrlPr>
+                                <a:rPr lang="en-US" altLang="ja-JP" sz="2400" b="1" i="1">
+                                  <a:latin typeface="Cambria Math" panose="02040503050406030204" pitchFamily="18" charset="0"/>
+                                </a:rPr>
+                              </m:ctrlPr>
+                            </m:accPr>
+                            <m:e>
+                              <m:sSup>
+                                <m:sSupPr>
+                                  <m:ctrlPr>
+                                    <a:rPr lang="en-US" altLang="ja-JP" sz="2400" b="1" i="1">
+                                      <a:latin typeface="Cambria Math" panose="02040503050406030204" pitchFamily="18" charset="0"/>
+                                    </a:rPr>
+                                  </m:ctrlPr>
+                                </m:sSupPr>
+                                <m:e>
+                                  <m:r>
+                                    <a:rPr lang="en-US" altLang="ja-JP" sz="2400" b="1" i="1">
+                                      <a:latin typeface="Cambria Math" panose="02040503050406030204" pitchFamily="18" charset="0"/>
+                                    </a:rPr>
+                                    <m:t>𝒙</m:t>
+                                  </m:r>
+                                </m:e>
+                                <m:sup>
+                                  <m:r>
+                                    <a:rPr lang="en-US" altLang="ja-JP" sz="2400" b="1" i="1">
+                                      <a:latin typeface="Cambria Math" panose="02040503050406030204" pitchFamily="18" charset="0"/>
+                                    </a:rPr>
+                                    <m:t>−</m:t>
+                                  </m:r>
+                                </m:sup>
+                              </m:sSup>
+                            </m:e>
+                          </m:acc>
+                        </m:e>
+                        <m:sub>
+                          <m:r>
+                            <a:rPr lang="en-US" altLang="ja-JP" sz="2400" i="1">
+                              <a:latin typeface="Cambria Math" panose="02040503050406030204" pitchFamily="18" charset="0"/>
+                            </a:rPr>
+                            <m:t>𝑡</m:t>
+                          </m:r>
+                        </m:sub>
+                      </m:sSub>
+                      <m:r>
+                        <a:rPr lang="en-US" altLang="ja-JP" sz="2400" b="1" i="1" smtClean="0">
+                          <a:latin typeface="Cambria Math" panose="02040503050406030204" pitchFamily="18" charset="0"/>
+                        </a:rPr>
+                        <m:t>+</m:t>
+                      </m:r>
+                      <m:sSub>
+                        <m:sSubPr>
+                          <m:ctrlPr>
+                            <a:rPr lang="en-US" altLang="ja-JP" sz="2400" i="1">
+                              <a:latin typeface="Cambria Math" panose="02040503050406030204" pitchFamily="18" charset="0"/>
+                            </a:rPr>
+                          </m:ctrlPr>
+                        </m:sSubPr>
+                        <m:e>
+                          <m:r>
+                            <a:rPr lang="en-US" altLang="ja-JP" sz="2400" b="1" i="1">
+                              <a:latin typeface="Cambria Math" panose="02040503050406030204" pitchFamily="18" charset="0"/>
+                            </a:rPr>
+                            <m:t>𝒈</m:t>
+                          </m:r>
+                        </m:e>
+                        <m:sub>
+                          <m:r>
+                            <a:rPr lang="en-US" altLang="ja-JP" sz="2400" i="1">
+                              <a:latin typeface="Cambria Math" panose="02040503050406030204" pitchFamily="18" charset="0"/>
+                            </a:rPr>
+                            <m:t>𝑡</m:t>
+                          </m:r>
+                        </m:sub>
+                      </m:sSub>
+                      <m:d>
+                        <m:dPr>
+                          <m:begChr m:val="{"/>
+                          <m:endChr m:val="}"/>
+                          <m:ctrlPr>
+                            <a:rPr lang="en-US" altLang="ja-JP" sz="2400" i="1" smtClean="0">
+                              <a:latin typeface="Cambria Math" panose="02040503050406030204" pitchFamily="18" charset="0"/>
+                            </a:rPr>
+                          </m:ctrlPr>
+                        </m:dPr>
+                        <m:e>
+                          <m:sSub>
+                            <m:sSubPr>
+                              <m:ctrlPr>
+                                <a:rPr lang="en-US" altLang="ja-JP" sz="2400" i="1" smtClean="0">
+                                  <a:latin typeface="Cambria Math" panose="02040503050406030204" pitchFamily="18" charset="0"/>
+                                </a:rPr>
+                              </m:ctrlPr>
+                            </m:sSubPr>
+                            <m:e>
+                              <m:r>
+                                <a:rPr lang="en-US" altLang="ja-JP" sz="2400" b="1" i="1" smtClean="0">
+                                  <a:latin typeface="Cambria Math" panose="02040503050406030204" pitchFamily="18" charset="0"/>
+                                </a:rPr>
+                                <m:t>𝒚</m:t>
+                              </m:r>
+                            </m:e>
+                            <m:sub>
+                              <m:r>
+                                <a:rPr lang="en-US" altLang="ja-JP" sz="2400" b="0" i="1" smtClean="0">
+                                  <a:latin typeface="Cambria Math" panose="02040503050406030204" pitchFamily="18" charset="0"/>
+                                </a:rPr>
+                                <m:t>𝑡</m:t>
+                              </m:r>
+                            </m:sub>
+                          </m:sSub>
+                          <m:r>
+                            <a:rPr lang="en-US" altLang="ja-JP" sz="2400" b="0" i="1" smtClean="0">
+                              <a:latin typeface="Cambria Math" panose="02040503050406030204" pitchFamily="18" charset="0"/>
+                            </a:rPr>
+                            <m:t>−</m:t>
+                          </m:r>
+                          <m:r>
+                            <a:rPr lang="en-US" altLang="ja-JP" sz="2400" b="1" i="1">
+                              <a:latin typeface="Cambria Math" panose="02040503050406030204" pitchFamily="18" charset="0"/>
+                            </a:rPr>
+                            <m:t>𝒉</m:t>
+                          </m:r>
+                          <m:d>
+                            <m:dPr>
+                              <m:ctrlPr>
+                                <a:rPr lang="en-US" altLang="ja-JP" sz="2400" i="1">
+                                  <a:latin typeface="Cambria Math" panose="02040503050406030204" pitchFamily="18" charset="0"/>
+                                </a:rPr>
+                              </m:ctrlPr>
+                            </m:dPr>
+                            <m:e>
+                              <m:sSub>
+                                <m:sSubPr>
+                                  <m:ctrlPr>
+                                    <a:rPr lang="en-US" altLang="ja-JP" sz="2400" i="1">
+                                      <a:latin typeface="Cambria Math" panose="02040503050406030204" pitchFamily="18" charset="0"/>
+                                    </a:rPr>
+                                  </m:ctrlPr>
+                                </m:sSubPr>
+                                <m:e>
+                                  <m:acc>
+                                    <m:accPr>
+                                      <m:chr m:val="̂"/>
+                                      <m:ctrlPr>
+                                        <a:rPr lang="en-US" altLang="ja-JP" sz="2400" b="1" i="1">
+                                          <a:latin typeface="Cambria Math" panose="02040503050406030204" pitchFamily="18" charset="0"/>
+                                        </a:rPr>
+                                      </m:ctrlPr>
+                                    </m:accPr>
+                                    <m:e>
+                                      <m:sSup>
+                                        <m:sSupPr>
+                                          <m:ctrlPr>
+                                            <a:rPr lang="en-US" altLang="ja-JP" sz="2400" b="1" i="1">
+                                              <a:latin typeface="Cambria Math" panose="02040503050406030204" pitchFamily="18" charset="0"/>
+                                            </a:rPr>
+                                          </m:ctrlPr>
+                                        </m:sSupPr>
+                                        <m:e>
+                                          <m:r>
+                                            <a:rPr lang="en-US" altLang="ja-JP" sz="2400" b="1" i="1">
+                                              <a:latin typeface="Cambria Math" panose="02040503050406030204" pitchFamily="18" charset="0"/>
+                                            </a:rPr>
+                                            <m:t>𝒙</m:t>
+                                          </m:r>
+                                        </m:e>
+                                        <m:sup>
+                                          <m:r>
+                                            <a:rPr lang="en-US" altLang="ja-JP" sz="2400" b="1" i="1">
+                                              <a:latin typeface="Cambria Math" panose="02040503050406030204" pitchFamily="18" charset="0"/>
+                                            </a:rPr>
+                                            <m:t>−</m:t>
+                                          </m:r>
+                                        </m:sup>
+                                      </m:sSup>
+                                    </m:e>
+                                  </m:acc>
+                                </m:e>
+                                <m:sub>
+                                  <m:r>
+                                    <a:rPr lang="en-US" altLang="ja-JP" sz="2400" i="1">
+                                      <a:latin typeface="Cambria Math" panose="02040503050406030204" pitchFamily="18" charset="0"/>
+                                    </a:rPr>
+                                    <m:t>𝑡</m:t>
+                                  </m:r>
+                                </m:sub>
+                              </m:sSub>
+                            </m:e>
+                          </m:d>
+                        </m:e>
+                      </m:d>
+                    </m:oMath>
+                  </m:oMathPara>
+                </a14:m>
+                <a:endParaRPr kumimoji="1" lang="ja-JP" altLang="en-US" sz="2400" dirty="0"/>
+              </a:p>
+            </p:txBody>
+          </p:sp>
+        </mc:Choice>
+        <mc:Fallback>
+          <p:sp>
+            <p:nvSpPr>
+              <p:cNvPr id="15" name="テキスト ボックス 14"/>
+              <p:cNvSpPr txBox="1">
+                <a:spLocks noRot="1" noChangeAspect="1" noMove="1" noResize="1" noEditPoints="1" noAdjustHandles="1" noChangeArrowheads="1" noChangeShapeType="1" noTextEdit="1"/>
+              </p:cNvSpPr>
+              <p:nvPr/>
+            </p:nvSpPr>
+            <p:spPr>
+              <a:xfrm>
+                <a:off x="3007815" y="3559537"/>
+                <a:ext cx="4044632" cy="461665"/>
+              </a:xfrm>
+              <a:prstGeom prst="rect">
+                <a:avLst/>
+              </a:prstGeom>
+              <a:blipFill rotWithShape="0">
+                <a:blip r:embed="rId5"/>
+                <a:stretch>
+                  <a:fillRect t="-7895" r="-10241" b="-10526"/>
+                </a:stretch>
+              </a:blipFill>
+            </p:spPr>
+            <p:txBody>
+              <a:bodyPr/>
+              <a:lstStyle/>
+              <a:p>
+                <a:r>
+                  <a:rPr lang="ja-JP" altLang="en-US">
+                    <a:noFill/>
+                  </a:rPr>
+                  <a:t> </a:t>
+                </a:r>
+              </a:p>
+            </p:txBody>
+          </p:sp>
+        </mc:Fallback>
+      </mc:AlternateContent>
+      <mc:AlternateContent xmlns:mc="http://schemas.openxmlformats.org/markup-compatibility/2006">
+        <mc:Choice xmlns:a14="http://schemas.microsoft.com/office/drawing/2010/main" Requires="a14">
+          <p:sp>
+            <p:nvSpPr>
+              <p:cNvPr id="16" name="テキスト ボックス 15"/>
+              <p:cNvSpPr txBox="1"/>
+              <p:nvPr/>
+            </p:nvSpPr>
+            <p:spPr>
+              <a:xfrm>
+                <a:off x="3007815" y="4100518"/>
+                <a:ext cx="3124189" cy="461665"/>
+              </a:xfrm>
+              <a:prstGeom prst="rect">
+                <a:avLst/>
+              </a:prstGeom>
+              <a:noFill/>
+            </p:spPr>
+            <p:txBody>
+              <a:bodyPr wrap="none" rtlCol="0">
+                <a:spAutoFit/>
+              </a:bodyPr>
+              <a:lstStyle/>
+              <a:p>
+                <a:pPr/>
+                <a14:m>
+                  <m:oMathPara xmlns:m="http://schemas.openxmlformats.org/officeDocument/2006/math">
+                    <m:oMathParaPr>
+                      <m:jc m:val="centerGroup"/>
+                    </m:oMathParaPr>
+                    <m:oMath xmlns:m="http://schemas.openxmlformats.org/officeDocument/2006/math">
+                      <m:sSub>
+                        <m:sSubPr>
+                          <m:ctrlPr>
+                            <a:rPr lang="en-US" altLang="ja-JP" sz="2400" i="1" smtClean="0">
+                              <a:latin typeface="Cambria Math" panose="02040503050406030204" pitchFamily="18" charset="0"/>
+                            </a:rPr>
+                          </m:ctrlPr>
+                        </m:sSubPr>
+                        <m:e>
+                          <m:r>
+                            <a:rPr lang="en-US" altLang="ja-JP" sz="2400" b="1" i="1">
+                              <a:latin typeface="Cambria Math" panose="02040503050406030204" pitchFamily="18" charset="0"/>
+                            </a:rPr>
+                            <m:t>𝑷</m:t>
+                          </m:r>
+                        </m:e>
+                        <m:sub>
+                          <m:r>
+                            <a:rPr lang="en-US" altLang="ja-JP" sz="2400" i="1">
+                              <a:latin typeface="Cambria Math" panose="02040503050406030204" pitchFamily="18" charset="0"/>
+                            </a:rPr>
+                            <m:t>𝑡</m:t>
+                          </m:r>
+                        </m:sub>
+                      </m:sSub>
+                      <m:r>
+                        <a:rPr lang="en-US" altLang="ja-JP" sz="2400" b="0" i="1" smtClean="0">
+                          <a:latin typeface="Cambria Math" panose="02040503050406030204" pitchFamily="18" charset="0"/>
+                        </a:rPr>
+                        <m:t>=</m:t>
+                      </m:r>
+                      <m:d>
+                        <m:dPr>
+                          <m:begChr m:val="{"/>
+                          <m:endChr m:val="}"/>
+                          <m:ctrlPr>
+                            <a:rPr lang="en-US" altLang="ja-JP" sz="2400" i="1" smtClean="0">
+                              <a:latin typeface="Cambria Math" panose="02040503050406030204" pitchFamily="18" charset="0"/>
+                            </a:rPr>
+                          </m:ctrlPr>
+                        </m:dPr>
+                        <m:e>
+                          <m:r>
+                            <a:rPr lang="en-US" altLang="ja-JP" sz="2400" b="1" i="1" smtClean="0">
+                              <a:latin typeface="Cambria Math" panose="02040503050406030204" pitchFamily="18" charset="0"/>
+                            </a:rPr>
+                            <m:t>𝑰</m:t>
+                          </m:r>
+                          <m:r>
+                            <a:rPr lang="en-US" altLang="ja-JP" sz="2400" b="0" i="1" smtClean="0">
+                              <a:latin typeface="Cambria Math" panose="02040503050406030204" pitchFamily="18" charset="0"/>
+                            </a:rPr>
+                            <m:t>−</m:t>
+                          </m:r>
+                          <m:sSub>
+                            <m:sSubPr>
+                              <m:ctrlPr>
+                                <a:rPr lang="en-US" altLang="ja-JP" sz="2400" i="1">
+                                  <a:latin typeface="Cambria Math" panose="02040503050406030204" pitchFamily="18" charset="0"/>
+                                </a:rPr>
+                              </m:ctrlPr>
+                            </m:sSubPr>
+                            <m:e>
+                              <m:r>
+                                <a:rPr lang="en-US" altLang="ja-JP" sz="2400" b="1" i="1">
+                                  <a:latin typeface="Cambria Math" panose="02040503050406030204" pitchFamily="18" charset="0"/>
+                                </a:rPr>
+                                <m:t>𝒈</m:t>
+                              </m:r>
+                            </m:e>
+                            <m:sub>
+                              <m:r>
+                                <a:rPr lang="en-US" altLang="ja-JP" sz="2400" i="1">
+                                  <a:latin typeface="Cambria Math" panose="02040503050406030204" pitchFamily="18" charset="0"/>
+                                </a:rPr>
+                                <m:t>𝑡</m:t>
+                              </m:r>
+                            </m:sub>
+                          </m:sSub>
+                          <m:sSub>
+                            <m:sSubPr>
+                              <m:ctrlPr>
+                                <a:rPr lang="en-US" altLang="ja-JP" sz="2400" i="1">
+                                  <a:latin typeface="Cambria Math" panose="02040503050406030204" pitchFamily="18" charset="0"/>
+                                </a:rPr>
+                              </m:ctrlPr>
+                            </m:sSubPr>
+                            <m:e>
+                              <m:sSup>
+                                <m:sSupPr>
+                                  <m:ctrlPr>
+                                    <a:rPr lang="en-US" altLang="ja-JP" sz="2400" i="1">
+                                      <a:latin typeface="Cambria Math" panose="02040503050406030204" pitchFamily="18" charset="0"/>
+                                    </a:rPr>
+                                  </m:ctrlPr>
+                                </m:sSupPr>
+                                <m:e>
+                                  <m:r>
+                                    <a:rPr lang="en-US" altLang="ja-JP" sz="2400" b="1" i="1">
+                                      <a:latin typeface="Cambria Math" panose="02040503050406030204" pitchFamily="18" charset="0"/>
+                                    </a:rPr>
+                                    <m:t>𝑪</m:t>
+                                  </m:r>
+                                </m:e>
+                                <m:sup>
+                                  <m:r>
+                                    <a:rPr lang="en-US" altLang="ja-JP" sz="2400" i="1">
+                                      <a:latin typeface="Cambria Math" panose="02040503050406030204" pitchFamily="18" charset="0"/>
+                                    </a:rPr>
+                                    <m:t>𝑇</m:t>
+                                  </m:r>
+                                </m:sup>
+                              </m:sSup>
+                            </m:e>
+                            <m:sub>
+                              <m:r>
+                                <a:rPr lang="en-US" altLang="ja-JP" sz="2400" i="1">
+                                  <a:latin typeface="Cambria Math" panose="02040503050406030204" pitchFamily="18" charset="0"/>
+                                </a:rPr>
+                                <m:t>𝑡</m:t>
+                              </m:r>
+                            </m:sub>
+                          </m:sSub>
+                        </m:e>
+                      </m:d>
+                      <m:sSub>
+                        <m:sSubPr>
+                          <m:ctrlPr>
+                            <a:rPr lang="en-US" altLang="ja-JP" sz="2400" i="1">
+                              <a:latin typeface="Cambria Math" panose="02040503050406030204" pitchFamily="18" charset="0"/>
+                            </a:rPr>
+                          </m:ctrlPr>
+                        </m:sSubPr>
+                        <m:e>
+                          <m:sSup>
+                            <m:sSupPr>
+                              <m:ctrlPr>
+                                <a:rPr lang="en-US" altLang="ja-JP" sz="2400" i="1">
+                                  <a:latin typeface="Cambria Math" panose="02040503050406030204" pitchFamily="18" charset="0"/>
+                                </a:rPr>
+                              </m:ctrlPr>
+                            </m:sSupPr>
+                            <m:e>
+                              <m:r>
+                                <a:rPr lang="en-US" altLang="ja-JP" sz="2400" b="1" i="1">
+                                  <a:latin typeface="Cambria Math" panose="02040503050406030204" pitchFamily="18" charset="0"/>
+                                </a:rPr>
+                                <m:t>𝑷</m:t>
+                              </m:r>
+                            </m:e>
+                            <m:sup>
+                              <m:r>
+                                <a:rPr lang="en-US" altLang="ja-JP" sz="2400" i="1">
+                                  <a:latin typeface="Cambria Math" panose="02040503050406030204" pitchFamily="18" charset="0"/>
+                                </a:rPr>
+                                <m:t>−</m:t>
+                              </m:r>
+                            </m:sup>
+                          </m:sSup>
+                        </m:e>
+                        <m:sub>
+                          <m:r>
+                            <a:rPr lang="en-US" altLang="ja-JP" sz="2400" i="1">
+                              <a:latin typeface="Cambria Math" panose="02040503050406030204" pitchFamily="18" charset="0"/>
+                            </a:rPr>
+                            <m:t>𝑡</m:t>
+                          </m:r>
+                        </m:sub>
+                      </m:sSub>
+                    </m:oMath>
+                  </m:oMathPara>
+                </a14:m>
+                <a:endParaRPr kumimoji="1" lang="ja-JP" altLang="en-US" sz="2400" dirty="0"/>
+              </a:p>
+            </p:txBody>
+          </p:sp>
+        </mc:Choice>
+        <mc:Fallback>
+          <p:sp>
+            <p:nvSpPr>
+              <p:cNvPr id="16" name="テキスト ボックス 15"/>
+              <p:cNvSpPr txBox="1">
+                <a:spLocks noRot="1" noChangeAspect="1" noMove="1" noResize="1" noEditPoints="1" noAdjustHandles="1" noChangeArrowheads="1" noChangeShapeType="1" noTextEdit="1"/>
+              </p:cNvSpPr>
+              <p:nvPr/>
+            </p:nvSpPr>
+            <p:spPr>
+              <a:xfrm>
+                <a:off x="3007815" y="4100518"/>
+                <a:ext cx="3124189" cy="461665"/>
+              </a:xfrm>
+              <a:prstGeom prst="rect">
+                <a:avLst/>
+              </a:prstGeom>
+              <a:blipFill rotWithShape="0">
+                <a:blip r:embed="rId6"/>
+                <a:stretch>
+                  <a:fillRect b="-12000"/>
+                </a:stretch>
+              </a:blipFill>
+            </p:spPr>
+            <p:txBody>
+              <a:bodyPr/>
+              <a:lstStyle/>
+              <a:p>
+                <a:r>
+                  <a:rPr lang="ja-JP" altLang="en-US">
+                    <a:noFill/>
+                  </a:rPr>
+                  <a:t> </a:t>
+                </a:r>
+              </a:p>
+            </p:txBody>
+          </p:sp>
+        </mc:Fallback>
+      </mc:AlternateContent>
+      <mc:AlternateContent xmlns:mc="http://schemas.openxmlformats.org/markup-compatibility/2006">
+        <mc:Choice xmlns:a14="http://schemas.microsoft.com/office/drawing/2010/main" Requires="a14">
+          <p:sp>
+            <p:nvSpPr>
+              <p:cNvPr id="17" name="テキスト ボックス 16"/>
+              <p:cNvSpPr txBox="1"/>
+              <p:nvPr/>
+            </p:nvSpPr>
+            <p:spPr>
+              <a:xfrm>
+                <a:off x="1081772" y="1594412"/>
+                <a:ext cx="1612364" cy="338554"/>
+              </a:xfrm>
+              <a:prstGeom prst="rect">
+                <a:avLst/>
+              </a:prstGeom>
+              <a:noFill/>
+            </p:spPr>
+            <p:txBody>
+              <a:bodyPr wrap="none" rtlCol="0">
+                <a:spAutoFit/>
+              </a:bodyPr>
+              <a:lstStyle/>
+              <a:p>
+                <a:pPr/>
+                <a14:m>
+                  <m:oMathPara xmlns:m="http://schemas.openxmlformats.org/officeDocument/2006/math">
+                    <m:oMathParaPr>
+                      <m:jc m:val="centerGroup"/>
+                    </m:oMathParaPr>
+                    <m:oMath xmlns:m="http://schemas.openxmlformats.org/officeDocument/2006/math">
+                      <m:r>
+                        <a:rPr lang="en-US" altLang="ja-JP" sz="1600" i="1" smtClean="0">
+                          <a:latin typeface="Cambria Math" panose="02040503050406030204" pitchFamily="18" charset="0"/>
+                        </a:rPr>
+                        <m:t>𝑡</m:t>
+                      </m:r>
+                      <m:r>
+                        <a:rPr lang="en-US" altLang="ja-JP" sz="1600" b="0" i="1" smtClean="0">
+                          <a:latin typeface="Cambria Math" panose="02040503050406030204" pitchFamily="18" charset="0"/>
+                        </a:rPr>
+                        <m:t>=</m:t>
+                      </m:r>
+                      <m:r>
+                        <a:rPr lang="en-US" altLang="ja-JP" sz="1600" b="0" i="1" smtClean="0">
+                          <a:latin typeface="Cambria Math" panose="02040503050406030204" pitchFamily="18" charset="0"/>
+                        </a:rPr>
+                        <m:t>1, 2, 3 … </m:t>
+                      </m:r>
+                      <m:r>
+                        <a:rPr lang="en-US" altLang="ja-JP" sz="1600" b="0" i="1" smtClean="0">
+                          <a:latin typeface="Cambria Math" panose="02040503050406030204" pitchFamily="18" charset="0"/>
+                        </a:rPr>
+                        <m:t>𝑁</m:t>
+                      </m:r>
+                    </m:oMath>
+                  </m:oMathPara>
+                </a14:m>
+                <a:endParaRPr kumimoji="1" lang="ja-JP" altLang="en-US" sz="1600" dirty="0"/>
+              </a:p>
+            </p:txBody>
+          </p:sp>
+        </mc:Choice>
+        <mc:Fallback>
+          <p:sp>
+            <p:nvSpPr>
+              <p:cNvPr id="17" name="テキスト ボックス 16"/>
+              <p:cNvSpPr txBox="1">
+                <a:spLocks noRot="1" noChangeAspect="1" noMove="1" noResize="1" noEditPoints="1" noAdjustHandles="1" noChangeArrowheads="1" noChangeShapeType="1" noTextEdit="1"/>
+              </p:cNvSpPr>
+              <p:nvPr/>
+            </p:nvSpPr>
+            <p:spPr>
+              <a:xfrm>
+                <a:off x="1081772" y="1594412"/>
+                <a:ext cx="1612364" cy="338554"/>
+              </a:xfrm>
+              <a:prstGeom prst="rect">
+                <a:avLst/>
+              </a:prstGeom>
+              <a:blipFill rotWithShape="0">
+                <a:blip r:embed="rId7"/>
+                <a:stretch>
+                  <a:fillRect/>
+                </a:stretch>
+              </a:blipFill>
+            </p:spPr>
+            <p:txBody>
+              <a:bodyPr/>
+              <a:lstStyle/>
+              <a:p>
+                <a:r>
+                  <a:rPr lang="ja-JP" altLang="en-US">
+                    <a:noFill/>
+                  </a:rPr>
+                  <a:t> </a:t>
+                </a:r>
+              </a:p>
+            </p:txBody>
+          </p:sp>
+        </mc:Fallback>
+      </mc:AlternateContent>
+    </p:spTree>
+    <p:extLst>
+      <p:ext uri="{BB962C8B-B14F-4D97-AF65-F5344CB8AC3E}">
+        <p14:creationId xmlns:p14="http://schemas.microsoft.com/office/powerpoint/2010/main" val="410681282"/>
+      </p:ext>
+    </p:extLst>
+  </p:cSld>
+  <p:clrMapOvr>
+    <a:masterClrMapping/>
+  </p:clrMapOvr>
+</p:sld>
+</file>
+
+<file path=ppt/slides/slide13.xml><?xml version="1.0" encoding="utf-8"?>
+<p:sld xmlns:a="http://schemas.openxmlformats.org/drawingml/2006/main" xmlns:r="http://schemas.openxmlformats.org/officeDocument/2006/relationships" xmlns:p="http://schemas.openxmlformats.org/presentationml/2006/main">
+  <p:cSld>
+    <p:spTree>
+      <p:nvGrpSpPr>
+        <p:cNvPr id="1" name=""/>
+        <p:cNvGrpSpPr/>
+        <p:nvPr/>
+      </p:nvGrpSpPr>
+      <p:grpSpPr>
+        <a:xfrm>
+          <a:off x="0" y="0"/>
+          <a:ext cx="0" cy="0"/>
+          <a:chOff x="0" y="0"/>
+          <a:chExt cx="0" cy="0"/>
+        </a:xfrm>
+      </p:grpSpPr>
+      <p:sp>
+        <p:nvSpPr>
+          <p:cNvPr id="2" name="タイトル 1"/>
+          <p:cNvSpPr>
+            <a:spLocks noGrp="1"/>
+          </p:cNvSpPr>
+          <p:nvPr>
+            <p:ph type="title"/>
+          </p:nvPr>
+        </p:nvSpPr>
+        <p:spPr/>
+        <p:txBody>
+          <a:bodyPr/>
+          <a:lstStyle/>
+          <a:p>
+            <a:r>
+              <a:rPr kumimoji="1" lang="en-US" altLang="ja-JP" dirty="0" smtClean="0"/>
+              <a:t>Initial Values</a:t>
+            </a:r>
+            <a:endParaRPr kumimoji="1" lang="ja-JP" altLang="en-US" dirty="0"/>
+          </a:p>
+        </p:txBody>
+      </p:sp>
+      <p:sp>
+        <p:nvSpPr>
+          <p:cNvPr id="4" name="角丸四角形 3"/>
+          <p:cNvSpPr/>
+          <p:nvPr/>
+        </p:nvSpPr>
+        <p:spPr bwMode="auto">
+          <a:xfrm>
+            <a:off x="539552" y="1340768"/>
+            <a:ext cx="7344816" cy="3600400"/>
+          </a:xfrm>
+          <a:prstGeom prst="roundRect">
+            <a:avLst>
+              <a:gd name="adj" fmla="val 7825"/>
+            </a:avLst>
+          </a:prstGeom>
+          <a:noFill/>
+          <a:ln w="63500" cap="flat" cmpd="sng" algn="ctr">
+            <a:solidFill>
+              <a:schemeClr val="tx1"/>
+            </a:solidFill>
+            <a:prstDash val="solid"/>
+            <a:round/>
+            <a:headEnd type="none" w="med" len="med"/>
+            <a:tailEnd type="none" w="med" len="med"/>
+          </a:ln>
+          <a:effectLst/>
+        </p:spPr>
+        <p:txBody>
+          <a:bodyPr vert="horz" wrap="none" lIns="91440" tIns="45720" rIns="91440" bIns="45720" numCol="1" rtlCol="0" anchor="ctr" anchorCtr="0" compatLnSpc="1">
+            <a:prstTxWarp prst="textNoShape">
+              <a:avLst/>
+            </a:prstTxWarp>
+          </a:bodyPr>
+          <a:lstStyle/>
+          <a:p>
+            <a:pPr marL="0" marR="0" indent="0" algn="l" defTabSz="914400" rtl="0" eaLnBrk="1" fontAlgn="base" latinLnBrk="0" hangingPunct="1">
+              <a:lnSpc>
+                <a:spcPct val="100000"/>
+              </a:lnSpc>
+              <a:spcBef>
+                <a:spcPct val="0"/>
+              </a:spcBef>
+              <a:spcAft>
+                <a:spcPct val="0"/>
+              </a:spcAft>
+              <a:buClrTx/>
+              <a:buSzTx/>
+              <a:buFontTx/>
+              <a:buNone/>
+              <a:tabLst/>
+            </a:pPr>
+            <a:endParaRPr kumimoji="1" lang="ja-JP" altLang="en-US" sz="2400" b="0" i="0" u="none" strike="noStrike" cap="none" normalizeH="0" baseline="0" smtClean="0">
+              <a:ln>
+                <a:noFill/>
+              </a:ln>
+              <a:solidFill>
+                <a:schemeClr val="tx1"/>
+              </a:solidFill>
+              <a:effectLst/>
+              <a:latin typeface="Times New Roman" pitchFamily="18" charset="0"/>
+              <a:ea typeface="ＭＳ Ｐゴシック" pitchFamily="50" charset="-128"/>
+            </a:endParaRPr>
+          </a:p>
+        </p:txBody>
+      </p:sp>
+      <p:sp>
+        <p:nvSpPr>
+          <p:cNvPr id="5" name="テキスト ボックス 4"/>
+          <p:cNvSpPr txBox="1"/>
+          <p:nvPr/>
+        </p:nvSpPr>
+        <p:spPr>
+          <a:xfrm>
+            <a:off x="3122141" y="1097797"/>
+            <a:ext cx="2130840" cy="461665"/>
+          </a:xfrm>
+          <a:prstGeom prst="rect">
+            <a:avLst/>
+          </a:prstGeom>
+          <a:solidFill>
+            <a:srgbClr val="FFFFFF"/>
+          </a:solidFill>
+        </p:spPr>
+        <p:txBody>
+          <a:bodyPr wrap="none" rtlCol="0">
+            <a:spAutoFit/>
+          </a:bodyPr>
+          <a:lstStyle/>
+          <a:p>
+            <a:pPr algn="just"/>
+            <a:r>
+              <a:rPr lang="en-US" altLang="ja-JP" sz="2400" dirty="0">
+                <a:latin typeface="+mj-ea"/>
+                <a:ea typeface="+mj-ea"/>
+              </a:rPr>
+              <a:t>Initial Values</a:t>
+            </a:r>
+            <a:endParaRPr kumimoji="1" lang="ja-JP" altLang="en-US" sz="2400" dirty="0">
+              <a:latin typeface="+mj-ea"/>
+              <a:ea typeface="+mj-ea"/>
+            </a:endParaRPr>
+          </a:p>
+        </p:txBody>
+      </p:sp>
+      <mc:AlternateContent xmlns:mc="http://schemas.openxmlformats.org/markup-compatibility/2006">
+        <mc:Choice xmlns:a14="http://schemas.microsoft.com/office/drawing/2010/main" Requires="a14">
+          <p:sp>
+            <p:nvSpPr>
+              <p:cNvPr id="7" name="正方形/長方形 6"/>
+              <p:cNvSpPr/>
+              <p:nvPr/>
+            </p:nvSpPr>
+            <p:spPr>
+              <a:xfrm>
+                <a:off x="683568" y="1670163"/>
+                <a:ext cx="1737078" cy="1452962"/>
+              </a:xfrm>
+              <a:prstGeom prst="rect">
+                <a:avLst/>
+              </a:prstGeom>
+            </p:spPr>
+            <p:txBody>
+              <a:bodyPr wrap="none">
+                <a:spAutoFit/>
+              </a:bodyPr>
+              <a:lstStyle/>
+              <a:p>
+                <a14:m>
+                  <m:oMathPara xmlns:m="http://schemas.openxmlformats.org/officeDocument/2006/math">
+                    <m:oMathParaPr>
+                      <m:jc m:val="centerGroup"/>
+                    </m:oMathParaPr>
+                    <m:oMath xmlns:m="http://schemas.openxmlformats.org/officeDocument/2006/math">
+                      <m:sSub>
+                        <m:sSubPr>
+                          <m:ctrlPr>
+                            <a:rPr lang="en-US" altLang="ja-JP" sz="2400" i="1" smtClean="0">
+                              <a:latin typeface="Cambria Math" panose="02040503050406030204" pitchFamily="18" charset="0"/>
+                            </a:rPr>
+                          </m:ctrlPr>
+                        </m:sSubPr>
+                        <m:e>
+                          <m:acc>
+                            <m:accPr>
+                              <m:chr m:val="̂"/>
+                              <m:ctrlPr>
+                                <a:rPr lang="en-US" altLang="ja-JP" sz="2400" b="1" i="1">
+                                  <a:latin typeface="Cambria Math" panose="02040503050406030204" pitchFamily="18" charset="0"/>
+                                </a:rPr>
+                              </m:ctrlPr>
+                            </m:accPr>
+                            <m:e>
+                              <m:r>
+                                <a:rPr lang="en-US" altLang="ja-JP" sz="2400" b="1" i="1">
+                                  <a:latin typeface="Cambria Math" panose="02040503050406030204" pitchFamily="18" charset="0"/>
+                                </a:rPr>
+                                <m:t>𝒙</m:t>
+                              </m:r>
+                            </m:e>
+                          </m:acc>
+                        </m:e>
+                        <m:sub>
+                          <m:r>
+                            <a:rPr lang="en-US" altLang="ja-JP" sz="2400" b="0" i="1" smtClean="0">
+                              <a:latin typeface="Cambria Math" panose="02040503050406030204" pitchFamily="18" charset="0"/>
+                            </a:rPr>
+                            <m:t>0</m:t>
+                          </m:r>
+                        </m:sub>
+                      </m:sSub>
+                      <m:r>
+                        <a:rPr lang="en-US" altLang="ja-JP" sz="2400" b="0" i="1" smtClean="0">
+                          <a:latin typeface="Cambria Math" panose="02040503050406030204" pitchFamily="18" charset="0"/>
+                        </a:rPr>
+                        <m:t>=</m:t>
+                      </m:r>
+                      <m:d>
+                        <m:dPr>
+                          <m:begChr m:val="["/>
+                          <m:endChr m:val="]"/>
+                          <m:ctrlPr>
+                            <a:rPr lang="en-US" altLang="ja-JP" sz="2400" b="0" i="1" smtClean="0">
+                              <a:latin typeface="Cambria Math" panose="02040503050406030204" pitchFamily="18" charset="0"/>
+                            </a:rPr>
+                          </m:ctrlPr>
+                        </m:dPr>
+                        <m:e>
+                          <m:eqArr>
+                            <m:eqArrPr>
+                              <m:ctrlPr>
+                                <a:rPr lang="en-US" altLang="ja-JP" sz="2400" b="0" i="1" smtClean="0">
+                                  <a:latin typeface="Cambria Math" panose="02040503050406030204" pitchFamily="18" charset="0"/>
+                                </a:rPr>
+                              </m:ctrlPr>
+                            </m:eqArrPr>
+                            <m:e>
+                              <m:r>
+                                <a:rPr lang="en-US" altLang="ja-JP" sz="2400" b="0" i="1" smtClean="0">
+                                  <a:latin typeface="Cambria Math" panose="02040503050406030204" pitchFamily="18" charset="0"/>
+                                </a:rPr>
+                                <m:t>0</m:t>
+                              </m:r>
+                            </m:e>
+                            <m:e>
+                              <m:r>
+                                <a:rPr lang="en-US" altLang="ja-JP" sz="2400" b="0" i="1" smtClean="0">
+                                  <a:latin typeface="Cambria Math" panose="02040503050406030204" pitchFamily="18" charset="0"/>
+                                </a:rPr>
+                                <m:t>0</m:t>
+                              </m:r>
+                            </m:e>
+                            <m:e>
+                              <m:r>
+                                <a:rPr lang="en-US" altLang="ja-JP" sz="2400" b="0" i="1" smtClean="0">
+                                  <a:latin typeface="Cambria Math" panose="02040503050406030204" pitchFamily="18" charset="0"/>
+                                </a:rPr>
+                                <m:t>0</m:t>
+                              </m:r>
+                            </m:e>
+                            <m:e>
+                              <m:r>
+                                <a:rPr lang="en-US" altLang="ja-JP" sz="2400" b="0" i="1" smtClean="0">
+                                  <a:latin typeface="Cambria Math" panose="02040503050406030204" pitchFamily="18" charset="0"/>
+                                </a:rPr>
+                                <m:t>1.0</m:t>
+                              </m:r>
+                            </m:e>
+                          </m:eqArr>
+                        </m:e>
+                      </m:d>
+                    </m:oMath>
+                  </m:oMathPara>
+                </a14:m>
+                <a:endParaRPr lang="ja-JP" altLang="en-US" sz="2400" dirty="0"/>
+              </a:p>
+            </p:txBody>
+          </p:sp>
+        </mc:Choice>
+        <mc:Fallback>
+          <p:sp>
+            <p:nvSpPr>
+              <p:cNvPr id="7" name="正方形/長方形 6"/>
+              <p:cNvSpPr>
+                <a:spLocks noRot="1" noChangeAspect="1" noMove="1" noResize="1" noEditPoints="1" noAdjustHandles="1" noChangeArrowheads="1" noChangeShapeType="1" noTextEdit="1"/>
+              </p:cNvSpPr>
+              <p:nvPr/>
+            </p:nvSpPr>
+            <p:spPr>
+              <a:xfrm>
+                <a:off x="683568" y="1670163"/>
+                <a:ext cx="1737078" cy="1452962"/>
+              </a:xfrm>
+              <a:prstGeom prst="rect">
+                <a:avLst/>
+              </a:prstGeom>
+              <a:blipFill rotWithShape="0">
+                <a:blip r:embed="rId2"/>
+                <a:stretch>
+                  <a:fillRect/>
+                </a:stretch>
+              </a:blipFill>
+            </p:spPr>
+            <p:txBody>
+              <a:bodyPr/>
+              <a:lstStyle/>
+              <a:p>
+                <a:r>
+                  <a:rPr lang="ja-JP" altLang="en-US">
+                    <a:noFill/>
+                  </a:rPr>
+                  <a:t> </a:t>
+                </a:r>
+              </a:p>
+            </p:txBody>
+          </p:sp>
+        </mc:Fallback>
+      </mc:AlternateContent>
+      <mc:AlternateContent xmlns:mc="http://schemas.openxmlformats.org/markup-compatibility/2006">
+        <mc:Choice xmlns:a14="http://schemas.microsoft.com/office/drawing/2010/main" Requires="a14">
+          <p:sp>
+            <p:nvSpPr>
+              <p:cNvPr id="18" name="正方形/長方形 17"/>
+              <p:cNvSpPr/>
+              <p:nvPr/>
+            </p:nvSpPr>
+            <p:spPr>
+              <a:xfrm>
+                <a:off x="2253602" y="1666715"/>
+                <a:ext cx="1737078" cy="1452962"/>
+              </a:xfrm>
+              <a:prstGeom prst="rect">
+                <a:avLst/>
+              </a:prstGeom>
+            </p:spPr>
+            <p:txBody>
+              <a:bodyPr wrap="none">
+                <a:spAutoFit/>
+              </a:bodyPr>
+              <a:lstStyle/>
+              <a:p>
+                <a14:m>
+                  <m:oMathPara xmlns:m="http://schemas.openxmlformats.org/officeDocument/2006/math">
+                    <m:oMathParaPr>
+                      <m:jc m:val="centerGroup"/>
+                    </m:oMathParaPr>
+                    <m:oMath xmlns:m="http://schemas.openxmlformats.org/officeDocument/2006/math">
+                      <m:sSub>
+                        <m:sSubPr>
+                          <m:ctrlPr>
+                            <a:rPr lang="en-US" altLang="ja-JP" sz="2400" i="1" smtClean="0">
+                              <a:latin typeface="Cambria Math" panose="02040503050406030204" pitchFamily="18" charset="0"/>
+                            </a:rPr>
+                          </m:ctrlPr>
+                        </m:sSubPr>
+                        <m:e>
+                          <m:acc>
+                            <m:accPr>
+                              <m:chr m:val="̂"/>
+                              <m:ctrlPr>
+                                <a:rPr lang="en-US" altLang="ja-JP" sz="2400" b="1" i="1">
+                                  <a:latin typeface="Cambria Math" panose="02040503050406030204" pitchFamily="18" charset="0"/>
+                                </a:rPr>
+                              </m:ctrlPr>
+                            </m:accPr>
+                            <m:e>
+                              <m:r>
+                                <a:rPr lang="en-US" altLang="ja-JP" sz="2400" b="1" i="1">
+                                  <a:latin typeface="Cambria Math" panose="02040503050406030204" pitchFamily="18" charset="0"/>
+                                </a:rPr>
+                                <m:t>𝒙</m:t>
+                              </m:r>
+                            </m:e>
+                          </m:acc>
+                        </m:e>
+                        <m:sub>
+                          <m:r>
+                            <a:rPr lang="en-US" altLang="ja-JP" sz="2400" b="0" i="1" smtClean="0">
+                              <a:latin typeface="Cambria Math" panose="02040503050406030204" pitchFamily="18" charset="0"/>
+                            </a:rPr>
+                            <m:t>0</m:t>
+                          </m:r>
+                        </m:sub>
+                      </m:sSub>
+                      <m:r>
+                        <a:rPr lang="en-US" altLang="ja-JP" sz="2400" b="0" i="1" smtClean="0">
+                          <a:latin typeface="Cambria Math" panose="02040503050406030204" pitchFamily="18" charset="0"/>
+                        </a:rPr>
+                        <m:t>=</m:t>
+                      </m:r>
+                      <m:d>
+                        <m:dPr>
+                          <m:begChr m:val="["/>
+                          <m:endChr m:val="]"/>
+                          <m:ctrlPr>
+                            <a:rPr lang="en-US" altLang="ja-JP" sz="2400" b="0" i="1" smtClean="0">
+                              <a:latin typeface="Cambria Math" panose="02040503050406030204" pitchFamily="18" charset="0"/>
+                            </a:rPr>
+                          </m:ctrlPr>
+                        </m:dPr>
+                        <m:e>
+                          <m:eqArr>
+                            <m:eqArrPr>
+                              <m:ctrlPr>
+                                <a:rPr lang="en-US" altLang="ja-JP" sz="2400" b="0" i="1" smtClean="0">
+                                  <a:latin typeface="Cambria Math" panose="02040503050406030204" pitchFamily="18" charset="0"/>
+                                </a:rPr>
+                              </m:ctrlPr>
+                            </m:eqArrPr>
+                            <m:e>
+                              <m:r>
+                                <a:rPr lang="en-US" altLang="ja-JP" sz="2400" b="0" i="1" smtClean="0">
+                                  <a:latin typeface="Cambria Math" panose="02040503050406030204" pitchFamily="18" charset="0"/>
+                                </a:rPr>
+                                <m:t>0</m:t>
+                              </m:r>
+                            </m:e>
+                            <m:e>
+                              <m:r>
+                                <a:rPr lang="en-US" altLang="ja-JP" sz="2400" b="0" i="1" smtClean="0">
+                                  <a:latin typeface="Cambria Math" panose="02040503050406030204" pitchFamily="18" charset="0"/>
+                                </a:rPr>
+                                <m:t>0</m:t>
+                              </m:r>
+                            </m:e>
+                            <m:e>
+                              <m:r>
+                                <a:rPr lang="en-US" altLang="ja-JP" sz="2400" b="0" i="1" smtClean="0">
+                                  <a:latin typeface="Cambria Math" panose="02040503050406030204" pitchFamily="18" charset="0"/>
+                                </a:rPr>
+                                <m:t>0</m:t>
+                              </m:r>
+                            </m:e>
+                            <m:e>
+                              <m:r>
+                                <a:rPr lang="en-US" altLang="ja-JP" sz="2400" b="0" i="1" smtClean="0">
+                                  <a:latin typeface="Cambria Math" panose="02040503050406030204" pitchFamily="18" charset="0"/>
+                                </a:rPr>
+                                <m:t>1.0</m:t>
+                              </m:r>
+                            </m:e>
+                          </m:eqArr>
+                        </m:e>
+                      </m:d>
+                    </m:oMath>
+                  </m:oMathPara>
+                </a14:m>
+                <a:endParaRPr lang="ja-JP" altLang="en-US" sz="2400" dirty="0"/>
+              </a:p>
+            </p:txBody>
+          </p:sp>
+        </mc:Choice>
+        <mc:Fallback>
+          <p:sp>
+            <p:nvSpPr>
+              <p:cNvPr id="18" name="正方形/長方形 17"/>
+              <p:cNvSpPr>
+                <a:spLocks noRot="1" noChangeAspect="1" noMove="1" noResize="1" noEditPoints="1" noAdjustHandles="1" noChangeArrowheads="1" noChangeShapeType="1" noTextEdit="1"/>
+              </p:cNvSpPr>
+              <p:nvPr/>
+            </p:nvSpPr>
+            <p:spPr>
+              <a:xfrm>
+                <a:off x="2253602" y="1666715"/>
+                <a:ext cx="1737078" cy="1452962"/>
+              </a:xfrm>
+              <a:prstGeom prst="rect">
+                <a:avLst/>
+              </a:prstGeom>
+              <a:blipFill rotWithShape="0">
+                <a:blip r:embed="rId3"/>
+                <a:stretch>
+                  <a:fillRect/>
+                </a:stretch>
+              </a:blipFill>
+            </p:spPr>
+            <p:txBody>
+              <a:bodyPr/>
+              <a:lstStyle/>
+              <a:p>
+                <a:r>
+                  <a:rPr lang="ja-JP" altLang="en-US">
+                    <a:noFill/>
+                  </a:rPr>
+                  <a:t> </a:t>
+                </a:r>
+              </a:p>
+            </p:txBody>
+          </p:sp>
+        </mc:Fallback>
+      </mc:AlternateContent>
+      <mc:AlternateContent xmlns:mc="http://schemas.openxmlformats.org/markup-compatibility/2006">
+        <mc:Choice xmlns:a14="http://schemas.microsoft.com/office/drawing/2010/main" Requires="a14">
+          <p:sp>
+            <p:nvSpPr>
+              <p:cNvPr id="19" name="テキスト ボックス 18"/>
+              <p:cNvSpPr txBox="1"/>
+              <p:nvPr/>
+            </p:nvSpPr>
+            <p:spPr>
+              <a:xfrm>
+                <a:off x="675899" y="3226930"/>
+                <a:ext cx="3865930" cy="1452962"/>
+              </a:xfrm>
+              <a:prstGeom prst="rect">
+                <a:avLst/>
+              </a:prstGeom>
+              <a:noFill/>
+            </p:spPr>
+            <p:txBody>
+              <a:bodyPr wrap="none" rtlCol="0">
+                <a:spAutoFit/>
+              </a:bodyPr>
+              <a:lstStyle/>
+              <a:p>
+                <a:pPr/>
+                <a14:m>
+                  <m:oMathPara xmlns:m="http://schemas.openxmlformats.org/officeDocument/2006/math">
+                    <m:oMathParaPr>
+                      <m:jc m:val="centerGroup"/>
+                    </m:oMathParaPr>
+                    <m:oMath xmlns:m="http://schemas.openxmlformats.org/officeDocument/2006/math">
+                      <m:r>
+                        <a:rPr lang="en-US" altLang="ja-JP" sz="2400" b="1" i="1" smtClean="0">
+                          <a:latin typeface="Cambria Math" panose="02040503050406030204" pitchFamily="18" charset="0"/>
+                        </a:rPr>
+                        <m:t>𝑸</m:t>
+                      </m:r>
+                      <m:r>
+                        <a:rPr lang="en-US" altLang="ja-JP" sz="2400" b="1" i="1" smtClean="0">
+                          <a:latin typeface="Cambria Math" panose="02040503050406030204" pitchFamily="18" charset="0"/>
+                        </a:rPr>
+                        <m:t>=</m:t>
+                      </m:r>
+                      <m:d>
+                        <m:dPr>
+                          <m:begChr m:val="["/>
+                          <m:endChr m:val="]"/>
+                          <m:ctrlPr>
+                            <a:rPr lang="en-US" altLang="ja-JP" sz="2400" b="1" i="1" smtClean="0">
+                              <a:latin typeface="Cambria Math" panose="02040503050406030204" pitchFamily="18" charset="0"/>
+                            </a:rPr>
+                          </m:ctrlPr>
+                        </m:dPr>
+                        <m:e>
+                          <m:eqArr>
+                            <m:eqArrPr>
+                              <m:ctrlPr>
+                                <a:rPr lang="en-US" altLang="ja-JP" sz="2400" b="1" i="1">
+                                  <a:latin typeface="Cambria Math" panose="02040503050406030204" pitchFamily="18" charset="0"/>
+                                </a:rPr>
+                              </m:ctrlPr>
+                            </m:eqArrPr>
+                            <m:e>
+                              <m:r>
+                                <a:rPr lang="en-US" altLang="ja-JP" sz="2400" b="0" i="1" smtClean="0">
+                                  <a:latin typeface="Cambria Math" panose="02040503050406030204" pitchFamily="18" charset="0"/>
+                                </a:rPr>
+                                <m:t>0.01</m:t>
+                              </m:r>
+                              <m:r>
+                                <a:rPr lang="en-US" altLang="ja-JP" sz="2400" b="0" i="1" smtClean="0">
+                                  <a:latin typeface="Cambria Math" panose="02040503050406030204" pitchFamily="18" charset="0"/>
+                                </a:rPr>
+                                <m:t>&amp; </m:t>
+                              </m:r>
+                              <m:r>
+                                <a:rPr lang="en-US" altLang="ja-JP" sz="2400" b="0" i="1" smtClean="0">
+                                  <a:latin typeface="Cambria Math" panose="02040503050406030204" pitchFamily="18" charset="0"/>
+                                </a:rPr>
+                                <m:t>   </m:t>
+                              </m:r>
+                              <m:r>
+                                <a:rPr lang="en-US" altLang="ja-JP" sz="2400" b="0" i="1" smtClean="0">
+                                  <a:latin typeface="Cambria Math" panose="02040503050406030204" pitchFamily="18" charset="0"/>
+                                </a:rPr>
+                                <m:t>0 &amp; 0</m:t>
+                              </m:r>
+                              <m:r>
+                                <a:rPr lang="en-US" altLang="ja-JP" sz="2400" b="0" i="1" smtClean="0">
+                                  <a:latin typeface="Cambria Math" panose="02040503050406030204" pitchFamily="18" charset="0"/>
+                                </a:rPr>
+                                <m:t>  </m:t>
+                              </m:r>
+                              <m:r>
+                                <a:rPr lang="en-US" altLang="ja-JP" sz="2400" b="0" i="1" smtClean="0">
+                                  <a:latin typeface="Cambria Math" panose="02040503050406030204" pitchFamily="18" charset="0"/>
+                                </a:rPr>
+                                <m:t> &amp; </m:t>
+                              </m:r>
+                              <m:r>
+                                <a:rPr lang="en-US" altLang="ja-JP" sz="2400" b="0" i="1" smtClean="0">
+                                  <a:latin typeface="Cambria Math" panose="02040503050406030204" pitchFamily="18" charset="0"/>
+                                </a:rPr>
+                                <m:t>   </m:t>
+                              </m:r>
+                              <m:r>
+                                <a:rPr lang="en-US" altLang="ja-JP" sz="2400" b="0" i="1" smtClean="0">
+                                  <a:latin typeface="Cambria Math" panose="02040503050406030204" pitchFamily="18" charset="0"/>
+                                </a:rPr>
+                                <m:t>0 </m:t>
+                              </m:r>
+                            </m:e>
+                            <m:e>
+                              <m:r>
+                                <a:rPr lang="en-US" altLang="ja-JP" sz="2400" b="0" i="1" smtClean="0">
+                                  <a:latin typeface="Cambria Math" panose="02040503050406030204" pitchFamily="18" charset="0"/>
+                                </a:rPr>
+                                <m:t>0</m:t>
+                              </m:r>
+                              <m:r>
+                                <a:rPr lang="en-US" altLang="ja-JP" sz="2400" b="0" i="1" smtClean="0">
+                                  <a:latin typeface="Cambria Math" panose="02040503050406030204" pitchFamily="18" charset="0"/>
+                                </a:rPr>
+                                <m:t>  </m:t>
+                              </m:r>
+                              <m:r>
+                                <a:rPr lang="en-US" altLang="ja-JP" sz="2400" b="0" i="1" smtClean="0">
+                                  <a:latin typeface="Cambria Math" panose="02040503050406030204" pitchFamily="18" charset="0"/>
+                                </a:rPr>
+                                <m:t> &amp; </m:t>
+                              </m:r>
+                              <m:r>
+                                <a:rPr lang="en-US" altLang="ja-JP" sz="2400" b="0" i="1" smtClean="0">
+                                  <a:latin typeface="Cambria Math" panose="02040503050406030204" pitchFamily="18" charset="0"/>
+                                </a:rPr>
+                                <m:t>0.01&amp; </m:t>
+                              </m:r>
+                              <m:r>
+                                <a:rPr lang="en-US" altLang="ja-JP" sz="2400" b="0" i="1" smtClean="0">
+                                  <a:latin typeface="Cambria Math" panose="02040503050406030204" pitchFamily="18" charset="0"/>
+                                </a:rPr>
+                                <m:t>0</m:t>
+                              </m:r>
+                              <m:r>
+                                <a:rPr lang="en-US" altLang="ja-JP" sz="2400" b="0" i="1" smtClean="0">
+                                  <a:latin typeface="Cambria Math" panose="02040503050406030204" pitchFamily="18" charset="0"/>
+                                </a:rPr>
+                                <m:t>  </m:t>
+                              </m:r>
+                              <m:r>
+                                <a:rPr lang="en-US" altLang="ja-JP" sz="2400" b="0" i="1" smtClean="0">
+                                  <a:latin typeface="Cambria Math" panose="02040503050406030204" pitchFamily="18" charset="0"/>
+                                </a:rPr>
+                                <m:t> &amp; </m:t>
+                              </m:r>
+                              <m:r>
+                                <a:rPr lang="en-US" altLang="ja-JP" sz="2400" b="0" i="1" smtClean="0">
+                                  <a:latin typeface="Cambria Math" panose="02040503050406030204" pitchFamily="18" charset="0"/>
+                                </a:rPr>
+                                <m:t>   </m:t>
+                              </m:r>
+                              <m:r>
+                                <a:rPr lang="en-US" altLang="ja-JP" sz="2400" b="0" i="1" smtClean="0">
+                                  <a:latin typeface="Cambria Math" panose="02040503050406030204" pitchFamily="18" charset="0"/>
+                                </a:rPr>
+                                <m:t>0 </m:t>
+                              </m:r>
+                            </m:e>
+                            <m:e>
+                              <m:r>
+                                <a:rPr lang="en-US" altLang="ja-JP" sz="2400" b="0" i="1" smtClean="0">
+                                  <a:latin typeface="Cambria Math" panose="02040503050406030204" pitchFamily="18" charset="0"/>
+                                </a:rPr>
+                                <m:t>0</m:t>
+                              </m:r>
+                              <m:r>
+                                <a:rPr lang="en-US" altLang="ja-JP" sz="2400" b="0" i="1" smtClean="0">
+                                  <a:latin typeface="Cambria Math" panose="02040503050406030204" pitchFamily="18" charset="0"/>
+                                </a:rPr>
+                                <m:t>  </m:t>
+                              </m:r>
+                              <m:r>
+                                <a:rPr lang="en-US" altLang="ja-JP" sz="2400" b="0" i="1" smtClean="0">
+                                  <a:latin typeface="Cambria Math" panose="02040503050406030204" pitchFamily="18" charset="0"/>
+                                </a:rPr>
+                                <m:t> &amp; </m:t>
+                              </m:r>
+                              <m:r>
+                                <a:rPr lang="en-US" altLang="ja-JP" sz="2400" b="0" i="1" smtClean="0">
+                                  <a:latin typeface="Cambria Math" panose="02040503050406030204" pitchFamily="18" charset="0"/>
+                                </a:rPr>
+                                <m:t>   </m:t>
+                              </m:r>
+                              <m:r>
+                                <a:rPr lang="en-US" altLang="ja-JP" sz="2400" b="0" i="1" smtClean="0">
+                                  <a:latin typeface="Cambria Math" panose="02040503050406030204" pitchFamily="18" charset="0"/>
+                                </a:rPr>
+                                <m:t>0 &amp; </m:t>
+                              </m:r>
+                              <m:r>
+                                <a:rPr lang="en-US" altLang="ja-JP" sz="2400" b="0" i="1" smtClean="0">
+                                  <a:latin typeface="Cambria Math" panose="02040503050406030204" pitchFamily="18" charset="0"/>
+                                </a:rPr>
+                                <m:t>0.01</m:t>
+                              </m:r>
+                              <m:r>
+                                <a:rPr lang="en-US" altLang="ja-JP" sz="2400" b="0" i="1" smtClean="0">
+                                  <a:latin typeface="Cambria Math" panose="02040503050406030204" pitchFamily="18" charset="0"/>
+                                </a:rPr>
+                                <m:t>&amp; </m:t>
+                              </m:r>
+                              <m:r>
+                                <a:rPr lang="en-US" altLang="ja-JP" sz="2400" b="0" i="1" smtClean="0">
+                                  <a:latin typeface="Cambria Math" panose="02040503050406030204" pitchFamily="18" charset="0"/>
+                                </a:rPr>
+                                <m:t>   </m:t>
+                              </m:r>
+                              <m:r>
+                                <a:rPr lang="en-US" altLang="ja-JP" sz="2400" b="0" i="1" smtClean="0">
+                                  <a:latin typeface="Cambria Math" panose="02040503050406030204" pitchFamily="18" charset="0"/>
+                                </a:rPr>
+                                <m:t>0 </m:t>
+                              </m:r>
+                            </m:e>
+                            <m:e>
+                              <m:r>
+                                <a:rPr lang="en-US" altLang="ja-JP" sz="2400" b="0" i="1" smtClean="0">
+                                  <a:latin typeface="Cambria Math" panose="02040503050406030204" pitchFamily="18" charset="0"/>
+                                </a:rPr>
+                                <m:t>0</m:t>
+                              </m:r>
+                              <m:r>
+                                <a:rPr lang="en-US" altLang="ja-JP" sz="2400" b="0" i="1" smtClean="0">
+                                  <a:latin typeface="Cambria Math" panose="02040503050406030204" pitchFamily="18" charset="0"/>
+                                </a:rPr>
+                                <m:t>  </m:t>
+                              </m:r>
+                              <m:r>
+                                <a:rPr lang="en-US" altLang="ja-JP" sz="2400" b="0" i="1" smtClean="0">
+                                  <a:latin typeface="Cambria Math" panose="02040503050406030204" pitchFamily="18" charset="0"/>
+                                </a:rPr>
+                                <m:t> &amp; </m:t>
+                              </m:r>
+                              <m:r>
+                                <a:rPr lang="en-US" altLang="ja-JP" sz="2400" b="0" i="1" smtClean="0">
+                                  <a:latin typeface="Cambria Math" panose="02040503050406030204" pitchFamily="18" charset="0"/>
+                                </a:rPr>
+                                <m:t>   </m:t>
+                              </m:r>
+                              <m:r>
+                                <a:rPr lang="en-US" altLang="ja-JP" sz="2400" b="0" i="1" smtClean="0">
+                                  <a:latin typeface="Cambria Math" panose="02040503050406030204" pitchFamily="18" charset="0"/>
+                                </a:rPr>
+                                <m:t>0 &amp; 0</m:t>
+                              </m:r>
+                              <m:r>
+                                <a:rPr lang="en-US" altLang="ja-JP" sz="2400" b="0" i="1" smtClean="0">
+                                  <a:latin typeface="Cambria Math" panose="02040503050406030204" pitchFamily="18" charset="0"/>
+                                </a:rPr>
+                                <m:t>  </m:t>
+                              </m:r>
+                              <m:r>
+                                <a:rPr lang="en-US" altLang="ja-JP" sz="2400" b="0" i="1" smtClean="0">
+                                  <a:latin typeface="Cambria Math" panose="02040503050406030204" pitchFamily="18" charset="0"/>
+                                </a:rPr>
+                                <m:t> &amp; </m:t>
+                              </m:r>
+                              <m:r>
+                                <a:rPr lang="en-US" altLang="ja-JP" sz="2400" b="0" i="1" smtClean="0">
+                                  <a:latin typeface="Cambria Math" panose="02040503050406030204" pitchFamily="18" charset="0"/>
+                                </a:rPr>
+                                <m:t>0.01</m:t>
+                              </m:r>
+                            </m:e>
+                          </m:eqArr>
+                        </m:e>
+                      </m:d>
+                    </m:oMath>
+                  </m:oMathPara>
+                </a14:m>
+                <a:endParaRPr kumimoji="1" lang="ja-JP" altLang="en-US" sz="2400" b="1" dirty="0"/>
+              </a:p>
+            </p:txBody>
+          </p:sp>
+        </mc:Choice>
+        <mc:Fallback>
+          <p:sp>
+            <p:nvSpPr>
+              <p:cNvPr id="19" name="テキスト ボックス 18"/>
+              <p:cNvSpPr txBox="1">
+                <a:spLocks noRot="1" noChangeAspect="1" noMove="1" noResize="1" noEditPoints="1" noAdjustHandles="1" noChangeArrowheads="1" noChangeShapeType="1" noTextEdit="1"/>
+              </p:cNvSpPr>
+              <p:nvPr/>
+            </p:nvSpPr>
+            <p:spPr>
+              <a:xfrm>
+                <a:off x="675899" y="3226930"/>
+                <a:ext cx="3865930" cy="1452962"/>
+              </a:xfrm>
+              <a:prstGeom prst="rect">
+                <a:avLst/>
+              </a:prstGeom>
+              <a:blipFill rotWithShape="0">
+                <a:blip r:embed="rId4"/>
+                <a:stretch>
+                  <a:fillRect/>
+                </a:stretch>
+              </a:blipFill>
+            </p:spPr>
+            <p:txBody>
+              <a:bodyPr/>
+              <a:lstStyle/>
+              <a:p>
+                <a:r>
+                  <a:rPr lang="ja-JP" altLang="en-US">
+                    <a:noFill/>
+                  </a:rPr>
+                  <a:t> </a:t>
+                </a:r>
+              </a:p>
+            </p:txBody>
+          </p:sp>
+        </mc:Fallback>
+      </mc:AlternateContent>
+      <mc:AlternateContent xmlns:mc="http://schemas.openxmlformats.org/markup-compatibility/2006">
+        <mc:Choice xmlns:a14="http://schemas.microsoft.com/office/drawing/2010/main" Requires="a14">
+          <p:sp>
+            <p:nvSpPr>
+              <p:cNvPr id="20" name="テキスト ボックス 19"/>
+              <p:cNvSpPr txBox="1"/>
+              <p:nvPr/>
+            </p:nvSpPr>
+            <p:spPr>
+              <a:xfrm>
+                <a:off x="4517338" y="3450291"/>
+                <a:ext cx="2691506" cy="1068947"/>
+              </a:xfrm>
+              <a:prstGeom prst="rect">
+                <a:avLst/>
+              </a:prstGeom>
+              <a:noFill/>
+            </p:spPr>
+            <p:txBody>
+              <a:bodyPr wrap="none" rtlCol="0">
+                <a:spAutoFit/>
+              </a:bodyPr>
+              <a:lstStyle/>
+              <a:p>
+                <a:pPr/>
+                <a14:m>
+                  <m:oMathPara xmlns:m="http://schemas.openxmlformats.org/officeDocument/2006/math">
+                    <m:oMathParaPr>
+                      <m:jc m:val="centerGroup"/>
+                    </m:oMathParaPr>
+                    <m:oMath xmlns:m="http://schemas.openxmlformats.org/officeDocument/2006/math">
+                      <m:r>
+                        <a:rPr lang="en-US" altLang="ja-JP" sz="2400" b="1" i="1" smtClean="0">
+                          <a:latin typeface="Cambria Math" panose="02040503050406030204" pitchFamily="18" charset="0"/>
+                        </a:rPr>
+                        <m:t>𝑹</m:t>
+                      </m:r>
+                      <m:r>
+                        <a:rPr lang="en-US" altLang="ja-JP" sz="2400" b="1" i="1" smtClean="0">
+                          <a:latin typeface="Cambria Math" panose="02040503050406030204" pitchFamily="18" charset="0"/>
+                        </a:rPr>
+                        <m:t>=</m:t>
+                      </m:r>
+                      <m:d>
+                        <m:dPr>
+                          <m:begChr m:val="["/>
+                          <m:endChr m:val="]"/>
+                          <m:ctrlPr>
+                            <a:rPr lang="en-US" altLang="ja-JP" sz="2400" b="1" i="1" smtClean="0">
+                              <a:latin typeface="Cambria Math" panose="02040503050406030204" pitchFamily="18" charset="0"/>
+                            </a:rPr>
+                          </m:ctrlPr>
+                        </m:dPr>
+                        <m:e>
+                          <m:eqArr>
+                            <m:eqArrPr>
+                              <m:ctrlPr>
+                                <a:rPr lang="en-US" altLang="ja-JP" sz="2400" b="0" i="1">
+                                  <a:latin typeface="Cambria Math" panose="02040503050406030204" pitchFamily="18" charset="0"/>
+                                </a:rPr>
+                              </m:ctrlPr>
+                            </m:eqArrPr>
+                            <m:e>
+                              <m:r>
+                                <a:rPr lang="en-US" altLang="ja-JP" sz="2400" b="0" i="1" smtClean="0">
+                                  <a:latin typeface="Cambria Math" panose="02040503050406030204" pitchFamily="18" charset="0"/>
+                                </a:rPr>
+                                <m:t>0.1</m:t>
+                              </m:r>
+                              <m:r>
+                                <a:rPr lang="en-US" altLang="ja-JP" sz="2400" b="0" i="1" smtClean="0">
+                                  <a:latin typeface="Cambria Math" panose="02040503050406030204" pitchFamily="18" charset="0"/>
+                                </a:rPr>
+                                <m:t>&amp; </m:t>
+                              </m:r>
+                              <m:r>
+                                <a:rPr lang="en-US" altLang="ja-JP" sz="2400" b="0" i="1" smtClean="0">
+                                  <a:latin typeface="Cambria Math" panose="02040503050406030204" pitchFamily="18" charset="0"/>
+                                </a:rPr>
+                                <m:t>  </m:t>
+                              </m:r>
+                              <m:r>
+                                <a:rPr lang="en-US" altLang="ja-JP" sz="2400" b="0" i="1" smtClean="0">
+                                  <a:latin typeface="Cambria Math" panose="02040503050406030204" pitchFamily="18" charset="0"/>
+                                </a:rPr>
+                                <m:t>0 &amp; 0</m:t>
+                              </m:r>
+                            </m:e>
+                            <m:e>
+                              <m:r>
+                                <a:rPr lang="en-US" altLang="ja-JP" sz="2400" b="0" i="1" smtClean="0">
+                                  <a:latin typeface="Cambria Math" panose="02040503050406030204" pitchFamily="18" charset="0"/>
+                                </a:rPr>
+                                <m:t>0 </m:t>
+                              </m:r>
+                              <m:r>
+                                <a:rPr lang="en-US" altLang="ja-JP" sz="2400" b="0" i="1" smtClean="0">
+                                  <a:latin typeface="Cambria Math" panose="02040503050406030204" pitchFamily="18" charset="0"/>
+                                </a:rPr>
+                                <m:t> </m:t>
+                              </m:r>
+                              <m:r>
+                                <a:rPr lang="en-US" altLang="ja-JP" sz="2400" b="0" i="1" smtClean="0">
+                                  <a:latin typeface="Cambria Math" panose="02040503050406030204" pitchFamily="18" charset="0"/>
+                                </a:rPr>
+                                <m:t>&amp; </m:t>
+                              </m:r>
+                              <m:r>
+                                <a:rPr lang="en-US" altLang="ja-JP" sz="2400" b="0" i="1" smtClean="0">
+                                  <a:latin typeface="Cambria Math" panose="02040503050406030204" pitchFamily="18" charset="0"/>
+                                </a:rPr>
+                                <m:t>0.1</m:t>
+                              </m:r>
+                              <m:r>
+                                <a:rPr lang="en-US" altLang="ja-JP" sz="2400" b="0" i="1" smtClean="0">
+                                  <a:latin typeface="Cambria Math" panose="02040503050406030204" pitchFamily="18" charset="0"/>
+                                </a:rPr>
+                                <m:t>&amp; 0</m:t>
+                              </m:r>
+                            </m:e>
+                            <m:e>
+                              <m:r>
+                                <a:rPr lang="en-US" altLang="ja-JP" sz="2400" b="0" i="1" smtClean="0">
+                                  <a:latin typeface="Cambria Math" panose="02040503050406030204" pitchFamily="18" charset="0"/>
+                                </a:rPr>
+                                <m:t>0 </m:t>
+                              </m:r>
+                              <m:r>
+                                <a:rPr lang="en-US" altLang="ja-JP" sz="2400" b="0" i="1" smtClean="0">
+                                  <a:latin typeface="Cambria Math" panose="02040503050406030204" pitchFamily="18" charset="0"/>
+                                </a:rPr>
+                                <m:t> </m:t>
+                              </m:r>
+                              <m:r>
+                                <a:rPr lang="en-US" altLang="ja-JP" sz="2400" b="0" i="1" smtClean="0">
+                                  <a:latin typeface="Cambria Math" panose="02040503050406030204" pitchFamily="18" charset="0"/>
+                                </a:rPr>
+                                <m:t>&amp; </m:t>
+                              </m:r>
+                              <m:r>
+                                <a:rPr lang="en-US" altLang="ja-JP" sz="2400" b="0" i="1" smtClean="0">
+                                  <a:latin typeface="Cambria Math" panose="02040503050406030204" pitchFamily="18" charset="0"/>
+                                </a:rPr>
+                                <m:t>  </m:t>
+                              </m:r>
+                              <m:r>
+                                <a:rPr lang="en-US" altLang="ja-JP" sz="2400" b="0" i="1" smtClean="0">
+                                  <a:latin typeface="Cambria Math" panose="02040503050406030204" pitchFamily="18" charset="0"/>
+                                </a:rPr>
+                                <m:t>0 &amp; </m:t>
+                              </m:r>
+                              <m:r>
+                                <a:rPr lang="en-US" altLang="ja-JP" sz="2400" b="0" i="1" smtClean="0">
+                                  <a:latin typeface="Cambria Math" panose="02040503050406030204" pitchFamily="18" charset="0"/>
+                                </a:rPr>
+                                <m:t> 0.1</m:t>
+                              </m:r>
+                            </m:e>
+                          </m:eqArr>
+                        </m:e>
+                      </m:d>
+                    </m:oMath>
+                  </m:oMathPara>
+                </a14:m>
+                <a:endParaRPr kumimoji="1" lang="ja-JP" altLang="en-US" sz="2400" b="1" dirty="0"/>
+              </a:p>
+            </p:txBody>
+          </p:sp>
+        </mc:Choice>
+        <mc:Fallback>
+          <p:sp>
+            <p:nvSpPr>
+              <p:cNvPr id="20" name="テキスト ボックス 19"/>
+              <p:cNvSpPr txBox="1">
+                <a:spLocks noRot="1" noChangeAspect="1" noMove="1" noResize="1" noEditPoints="1" noAdjustHandles="1" noChangeArrowheads="1" noChangeShapeType="1" noTextEdit="1"/>
+              </p:cNvSpPr>
+              <p:nvPr/>
+            </p:nvSpPr>
+            <p:spPr>
+              <a:xfrm>
+                <a:off x="4517338" y="3450291"/>
+                <a:ext cx="2691506" cy="1068947"/>
+              </a:xfrm>
+              <a:prstGeom prst="rect">
+                <a:avLst/>
+              </a:prstGeom>
+              <a:blipFill rotWithShape="0">
+                <a:blip r:embed="rId5"/>
+                <a:stretch>
+                  <a:fillRect/>
+                </a:stretch>
+              </a:blipFill>
+            </p:spPr>
+            <p:txBody>
+              <a:bodyPr/>
+              <a:lstStyle/>
+              <a:p>
+                <a:r>
+                  <a:rPr lang="ja-JP" altLang="en-US">
+                    <a:noFill/>
+                  </a:rPr>
+                  <a:t> </a:t>
+                </a:r>
+              </a:p>
+            </p:txBody>
+          </p:sp>
+        </mc:Fallback>
+      </mc:AlternateContent>
+      <mc:AlternateContent xmlns:mc="http://schemas.openxmlformats.org/markup-compatibility/2006">
+        <mc:Choice xmlns:a14="http://schemas.microsoft.com/office/drawing/2010/main" Requires="a14">
+          <p:sp>
+            <p:nvSpPr>
+              <p:cNvPr id="21" name="テキスト ボックス 20"/>
+              <p:cNvSpPr txBox="1"/>
+              <p:nvPr/>
+            </p:nvSpPr>
+            <p:spPr>
+              <a:xfrm>
+                <a:off x="3846304" y="1670163"/>
+                <a:ext cx="3716851" cy="1452962"/>
+              </a:xfrm>
+              <a:prstGeom prst="rect">
+                <a:avLst/>
+              </a:prstGeom>
+              <a:noFill/>
+            </p:spPr>
+            <p:txBody>
+              <a:bodyPr wrap="none" rtlCol="0">
+                <a:spAutoFit/>
+              </a:bodyPr>
+              <a:lstStyle/>
+              <a:p>
+                <a:pPr/>
+                <a14:m>
+                  <m:oMathPara xmlns:m="http://schemas.openxmlformats.org/officeDocument/2006/math">
+                    <m:oMathParaPr>
+                      <m:jc m:val="centerGroup"/>
+                    </m:oMathParaPr>
+                    <m:oMath xmlns:m="http://schemas.openxmlformats.org/officeDocument/2006/math">
+                      <m:r>
+                        <a:rPr lang="en-US" altLang="ja-JP" sz="2400" b="1" i="1" smtClean="0">
+                          <a:latin typeface="Cambria Math" panose="02040503050406030204" pitchFamily="18" charset="0"/>
+                        </a:rPr>
+                        <m:t>𝑷</m:t>
+                      </m:r>
+                      <m:r>
+                        <a:rPr lang="en-US" altLang="ja-JP" sz="2400" b="1" i="1" smtClean="0">
+                          <a:latin typeface="Cambria Math" panose="02040503050406030204" pitchFamily="18" charset="0"/>
+                        </a:rPr>
+                        <m:t>=</m:t>
+                      </m:r>
+                      <m:d>
+                        <m:dPr>
+                          <m:begChr m:val="["/>
+                          <m:endChr m:val="]"/>
+                          <m:ctrlPr>
+                            <a:rPr lang="en-US" altLang="ja-JP" sz="2400" b="1" i="1" smtClean="0">
+                              <a:latin typeface="Cambria Math" panose="02040503050406030204" pitchFamily="18" charset="0"/>
+                            </a:rPr>
+                          </m:ctrlPr>
+                        </m:dPr>
+                        <m:e>
+                          <m:eqArr>
+                            <m:eqArrPr>
+                              <m:ctrlPr>
+                                <a:rPr lang="en-US" altLang="ja-JP" sz="2400" b="1" i="1">
+                                  <a:latin typeface="Cambria Math" panose="02040503050406030204" pitchFamily="18" charset="0"/>
+                                </a:rPr>
+                              </m:ctrlPr>
+                            </m:eqArrPr>
+                            <m:e>
+                              <m:r>
+                                <a:rPr lang="en-US" altLang="ja-JP" sz="2400" b="0" i="1" smtClean="0">
+                                  <a:latin typeface="Cambria Math" panose="02040503050406030204" pitchFamily="18" charset="0"/>
+                                </a:rPr>
+                                <m:t>0.01</m:t>
+                              </m:r>
+                              <m:r>
+                                <a:rPr lang="en-US" altLang="ja-JP" sz="2400" b="0" i="1" smtClean="0">
+                                  <a:latin typeface="Cambria Math" panose="02040503050406030204" pitchFamily="18" charset="0"/>
+                                </a:rPr>
+                                <m:t>&amp; </m:t>
+                              </m:r>
+                              <m:r>
+                                <a:rPr lang="en-US" altLang="ja-JP" sz="2400" b="0" i="1" smtClean="0">
+                                  <a:latin typeface="Cambria Math" panose="02040503050406030204" pitchFamily="18" charset="0"/>
+                                </a:rPr>
+                                <m:t>   </m:t>
+                              </m:r>
+                              <m:r>
+                                <a:rPr lang="en-US" altLang="ja-JP" sz="2400" b="0" i="1" smtClean="0">
+                                  <a:latin typeface="Cambria Math" panose="02040503050406030204" pitchFamily="18" charset="0"/>
+                                </a:rPr>
+                                <m:t>0 &amp; 0</m:t>
+                              </m:r>
+                              <m:r>
+                                <a:rPr lang="en-US" altLang="ja-JP" sz="2400" b="0" i="1" smtClean="0">
+                                  <a:latin typeface="Cambria Math" panose="02040503050406030204" pitchFamily="18" charset="0"/>
+                                </a:rPr>
+                                <m:t>  </m:t>
+                              </m:r>
+                              <m:r>
+                                <a:rPr lang="en-US" altLang="ja-JP" sz="2400" b="0" i="1" smtClean="0">
+                                  <a:latin typeface="Cambria Math" panose="02040503050406030204" pitchFamily="18" charset="0"/>
+                                </a:rPr>
+                                <m:t> &amp; </m:t>
+                              </m:r>
+                              <m:r>
+                                <a:rPr lang="en-US" altLang="ja-JP" sz="2400" b="0" i="1" smtClean="0">
+                                  <a:latin typeface="Cambria Math" panose="02040503050406030204" pitchFamily="18" charset="0"/>
+                                </a:rPr>
+                                <m:t>   </m:t>
+                              </m:r>
+                              <m:r>
+                                <a:rPr lang="en-US" altLang="ja-JP" sz="2400" b="0" i="1" smtClean="0">
+                                  <a:latin typeface="Cambria Math" panose="02040503050406030204" pitchFamily="18" charset="0"/>
+                                </a:rPr>
+                                <m:t>0 </m:t>
+                              </m:r>
+                            </m:e>
+                            <m:e>
+                              <m:r>
+                                <a:rPr lang="en-US" altLang="ja-JP" sz="2400" b="0" i="1" smtClean="0">
+                                  <a:latin typeface="Cambria Math" panose="02040503050406030204" pitchFamily="18" charset="0"/>
+                                </a:rPr>
+                                <m:t>0</m:t>
+                              </m:r>
+                              <m:r>
+                                <a:rPr lang="en-US" altLang="ja-JP" sz="2400" b="0" i="1" smtClean="0">
+                                  <a:latin typeface="Cambria Math" panose="02040503050406030204" pitchFamily="18" charset="0"/>
+                                </a:rPr>
+                                <m:t>  </m:t>
+                              </m:r>
+                              <m:r>
+                                <a:rPr lang="en-US" altLang="ja-JP" sz="2400" b="0" i="1" smtClean="0">
+                                  <a:latin typeface="Cambria Math" panose="02040503050406030204" pitchFamily="18" charset="0"/>
+                                </a:rPr>
+                                <m:t> &amp; </m:t>
+                              </m:r>
+                              <m:r>
+                                <a:rPr lang="en-US" altLang="ja-JP" sz="2400" b="0" i="1" smtClean="0">
+                                  <a:latin typeface="Cambria Math" panose="02040503050406030204" pitchFamily="18" charset="0"/>
+                                </a:rPr>
+                                <m:t>0.01&amp; </m:t>
+                              </m:r>
+                              <m:r>
+                                <a:rPr lang="en-US" altLang="ja-JP" sz="2400" b="0" i="1" smtClean="0">
+                                  <a:latin typeface="Cambria Math" panose="02040503050406030204" pitchFamily="18" charset="0"/>
+                                </a:rPr>
+                                <m:t>0</m:t>
+                              </m:r>
+                              <m:r>
+                                <a:rPr lang="en-US" altLang="ja-JP" sz="2400" b="0" i="1" smtClean="0">
+                                  <a:latin typeface="Cambria Math" panose="02040503050406030204" pitchFamily="18" charset="0"/>
+                                </a:rPr>
+                                <m:t>  </m:t>
+                              </m:r>
+                              <m:r>
+                                <a:rPr lang="en-US" altLang="ja-JP" sz="2400" b="0" i="1" smtClean="0">
+                                  <a:latin typeface="Cambria Math" panose="02040503050406030204" pitchFamily="18" charset="0"/>
+                                </a:rPr>
+                                <m:t> &amp; </m:t>
+                              </m:r>
+                              <m:r>
+                                <a:rPr lang="en-US" altLang="ja-JP" sz="2400" b="0" i="1" smtClean="0">
+                                  <a:latin typeface="Cambria Math" panose="02040503050406030204" pitchFamily="18" charset="0"/>
+                                </a:rPr>
+                                <m:t>   </m:t>
+                              </m:r>
+                              <m:r>
+                                <a:rPr lang="en-US" altLang="ja-JP" sz="2400" b="0" i="1" smtClean="0">
+                                  <a:latin typeface="Cambria Math" panose="02040503050406030204" pitchFamily="18" charset="0"/>
+                                </a:rPr>
+                                <m:t>0 </m:t>
+                              </m:r>
+                            </m:e>
+                            <m:e>
+                              <m:r>
+                                <a:rPr lang="en-US" altLang="ja-JP" sz="2400" b="0" i="1" smtClean="0">
+                                  <a:latin typeface="Cambria Math" panose="02040503050406030204" pitchFamily="18" charset="0"/>
+                                </a:rPr>
+                                <m:t>0</m:t>
+                              </m:r>
+                              <m:r>
+                                <a:rPr lang="en-US" altLang="ja-JP" sz="2400" b="0" i="1" smtClean="0">
+                                  <a:latin typeface="Cambria Math" panose="02040503050406030204" pitchFamily="18" charset="0"/>
+                                </a:rPr>
+                                <m:t>  </m:t>
+                              </m:r>
+                              <m:r>
+                                <a:rPr lang="en-US" altLang="ja-JP" sz="2400" b="0" i="1" smtClean="0">
+                                  <a:latin typeface="Cambria Math" panose="02040503050406030204" pitchFamily="18" charset="0"/>
+                                </a:rPr>
+                                <m:t> &amp; </m:t>
+                              </m:r>
+                              <m:r>
+                                <a:rPr lang="en-US" altLang="ja-JP" sz="2400" b="0" i="1" smtClean="0">
+                                  <a:latin typeface="Cambria Math" panose="02040503050406030204" pitchFamily="18" charset="0"/>
+                                </a:rPr>
+                                <m:t>   </m:t>
+                              </m:r>
+                              <m:r>
+                                <a:rPr lang="en-US" altLang="ja-JP" sz="2400" b="0" i="1" smtClean="0">
+                                  <a:latin typeface="Cambria Math" panose="02040503050406030204" pitchFamily="18" charset="0"/>
+                                </a:rPr>
+                                <m:t>0 &amp; </m:t>
+                              </m:r>
+                              <m:r>
+                                <a:rPr lang="en-US" altLang="ja-JP" sz="2400" b="0" i="1" smtClean="0">
+                                  <a:latin typeface="Cambria Math" panose="02040503050406030204" pitchFamily="18" charset="0"/>
+                                </a:rPr>
+                                <m:t>0.01</m:t>
+                              </m:r>
+                              <m:r>
+                                <a:rPr lang="en-US" altLang="ja-JP" sz="2400" b="0" i="1" smtClean="0">
+                                  <a:latin typeface="Cambria Math" panose="02040503050406030204" pitchFamily="18" charset="0"/>
+                                </a:rPr>
+                                <m:t>&amp; </m:t>
+                              </m:r>
+                              <m:r>
+                                <a:rPr lang="en-US" altLang="ja-JP" sz="2400" b="0" i="1" smtClean="0">
+                                  <a:latin typeface="Cambria Math" panose="02040503050406030204" pitchFamily="18" charset="0"/>
+                                </a:rPr>
+                                <m:t>   </m:t>
+                              </m:r>
+                              <m:r>
+                                <a:rPr lang="en-US" altLang="ja-JP" sz="2400" b="0" i="1" smtClean="0">
+                                  <a:latin typeface="Cambria Math" panose="02040503050406030204" pitchFamily="18" charset="0"/>
+                                </a:rPr>
+                                <m:t>0 </m:t>
+                              </m:r>
+                            </m:e>
+                            <m:e>
+                              <m:r>
+                                <a:rPr lang="en-US" altLang="ja-JP" sz="2400" b="0" i="1" smtClean="0">
+                                  <a:latin typeface="Cambria Math" panose="02040503050406030204" pitchFamily="18" charset="0"/>
+                                </a:rPr>
+                                <m:t>0</m:t>
+                              </m:r>
+                              <m:r>
+                                <a:rPr lang="en-US" altLang="ja-JP" sz="2400" b="0" i="1" smtClean="0">
+                                  <a:latin typeface="Cambria Math" panose="02040503050406030204" pitchFamily="18" charset="0"/>
+                                </a:rPr>
+                                <m:t>  </m:t>
+                              </m:r>
+                              <m:r>
+                                <a:rPr lang="en-US" altLang="ja-JP" sz="2400" b="0" i="1" smtClean="0">
+                                  <a:latin typeface="Cambria Math" panose="02040503050406030204" pitchFamily="18" charset="0"/>
+                                </a:rPr>
+                                <m:t> &amp; </m:t>
+                              </m:r>
+                              <m:r>
+                                <a:rPr lang="en-US" altLang="ja-JP" sz="2400" b="0" i="1" smtClean="0">
+                                  <a:latin typeface="Cambria Math" panose="02040503050406030204" pitchFamily="18" charset="0"/>
+                                </a:rPr>
+                                <m:t>   </m:t>
+                              </m:r>
+                              <m:r>
+                                <a:rPr lang="en-US" altLang="ja-JP" sz="2400" b="0" i="1" smtClean="0">
+                                  <a:latin typeface="Cambria Math" panose="02040503050406030204" pitchFamily="18" charset="0"/>
+                                </a:rPr>
+                                <m:t>0 &amp; 0</m:t>
+                              </m:r>
+                              <m:r>
+                                <a:rPr lang="en-US" altLang="ja-JP" sz="2400" b="0" i="1" smtClean="0">
+                                  <a:latin typeface="Cambria Math" panose="02040503050406030204" pitchFamily="18" charset="0"/>
+                                </a:rPr>
+                                <m:t>  </m:t>
+                              </m:r>
+                              <m:r>
+                                <a:rPr lang="en-US" altLang="ja-JP" sz="2400" b="0" i="1" smtClean="0">
+                                  <a:latin typeface="Cambria Math" panose="02040503050406030204" pitchFamily="18" charset="0"/>
+                                </a:rPr>
+                                <m:t> &amp; </m:t>
+                              </m:r>
+                              <m:r>
+                                <a:rPr lang="en-US" altLang="ja-JP" sz="2400" b="0" i="1" smtClean="0">
+                                  <a:latin typeface="Cambria Math" panose="02040503050406030204" pitchFamily="18" charset="0"/>
+                                </a:rPr>
+                                <m:t>0.01</m:t>
+                              </m:r>
+                            </m:e>
+                          </m:eqArr>
+                        </m:e>
+                      </m:d>
+                    </m:oMath>
+                  </m:oMathPara>
+                </a14:m>
+                <a:endParaRPr kumimoji="1" lang="ja-JP" altLang="en-US" sz="2400" b="1" dirty="0"/>
+              </a:p>
+            </p:txBody>
+          </p:sp>
+        </mc:Choice>
+        <mc:Fallback>
+          <p:sp>
+            <p:nvSpPr>
+              <p:cNvPr id="21" name="テキスト ボックス 20"/>
+              <p:cNvSpPr txBox="1">
+                <a:spLocks noRot="1" noChangeAspect="1" noMove="1" noResize="1" noEditPoints="1" noAdjustHandles="1" noChangeArrowheads="1" noChangeShapeType="1" noTextEdit="1"/>
+              </p:cNvSpPr>
+              <p:nvPr/>
+            </p:nvSpPr>
+            <p:spPr>
+              <a:xfrm>
+                <a:off x="3846304" y="1670163"/>
+                <a:ext cx="3716851" cy="1452962"/>
+              </a:xfrm>
+              <a:prstGeom prst="rect">
+                <a:avLst/>
+              </a:prstGeom>
+              <a:blipFill rotWithShape="0">
+                <a:blip r:embed="rId6"/>
+                <a:stretch>
+                  <a:fillRect/>
+                </a:stretch>
+              </a:blipFill>
+            </p:spPr>
+            <p:txBody>
+              <a:bodyPr/>
+              <a:lstStyle/>
+              <a:p>
+                <a:r>
+                  <a:rPr lang="ja-JP" altLang="en-US">
+                    <a:noFill/>
+                  </a:rPr>
+                  <a:t> </a:t>
+                </a:r>
+              </a:p>
+            </p:txBody>
+          </p:sp>
+        </mc:Fallback>
+      </mc:AlternateContent>
+    </p:spTree>
+    <p:extLst>
+      <p:ext uri="{BB962C8B-B14F-4D97-AF65-F5344CB8AC3E}">
+        <p14:creationId xmlns:p14="http://schemas.microsoft.com/office/powerpoint/2010/main" val="3279160796"/>
       </p:ext>
     </p:extLst>
   </p:cSld>

</xml_diff>

<commit_message>
add Eigen and define matrix for EKF
</commit_message>
<xml_diff>
--- a/images/images_for_readme.pptx
+++ b/images/images_for_readme.pptx
@@ -2836,21 +2836,7 @@
                 <a:latin typeface="+mj-ea"/>
                 <a:ea typeface="+mj-ea"/>
               </a:rPr>
-              <a:t>カルマンフィルタ</a:t>
-            </a:r>
-            <a:r>
-              <a:rPr lang="ja-JP" altLang="en-US" dirty="0" smtClean="0">
-                <a:latin typeface="+mj-ea"/>
-                <a:ea typeface="+mj-ea"/>
-              </a:rPr>
-              <a:t>を適用してクオータニオン</a:t>
-            </a:r>
-            <a:r>
-              <a:rPr lang="ja-JP" altLang="en-US" dirty="0" smtClean="0">
-                <a:latin typeface="+mj-ea"/>
-                <a:ea typeface="+mj-ea"/>
-              </a:rPr>
-              <a:t>を計算する</a:t>
+              <a:t>カルマンフィルタを適用してクオータニオンを計算する</a:t>
             </a:r>
             <a:r>
               <a:rPr lang="en-US" altLang="ja-JP" dirty="0" smtClean="0">
@@ -6036,8 +6022,8 @@
           </a:p>
         </p:txBody>
       </p:sp>
-      <mc:AlternateContent xmlns:mc="http://schemas.openxmlformats.org/markup-compatibility/2006">
-        <mc:Choice xmlns:a14="http://schemas.microsoft.com/office/drawing/2010/main" Requires="a14">
+      <mc:AlternateContent xmlns:mc="http://schemas.openxmlformats.org/markup-compatibility/2006" xmlns:a14="http://schemas.microsoft.com/office/drawing/2010/main">
+        <mc:Choice Requires="a14">
           <p:sp>
             <p:nvSpPr>
               <p:cNvPr id="10" name="テキスト ボックス 9"/>
@@ -6204,7 +6190,7 @@
             </p:txBody>
           </p:sp>
         </mc:Choice>
-        <mc:Fallback>
+        <mc:Fallback xmlns="">
           <p:sp>
             <p:nvSpPr>
               <p:cNvPr id="10" name="テキスト ボックス 9"/>
@@ -6253,8 +6239,8 @@
             </p:nvSpPr>
             <p:spPr>
               <a:xfrm>
-                <a:off x="829431" y="3370336"/>
-                <a:ext cx="6765057" cy="1266180"/>
+                <a:off x="820964" y="3370336"/>
+                <a:ext cx="6917278" cy="1266180"/>
               </a:xfrm>
               <a:prstGeom prst="rect">
                 <a:avLst/>
@@ -6283,12 +6269,31 @@
                           </m:ctrlPr>
                         </m:sSubPr>
                         <m:e>
-                          <m:r>
-                            <a:rPr lang="en-US" altLang="ja-JP" sz="2400" b="1" i="1" smtClean="0">
-                              <a:latin typeface="Cambria Math" panose="02040503050406030204" pitchFamily="18" charset="0"/>
-                            </a:rPr>
-                            <m:t>𝑪</m:t>
-                          </m:r>
+                          <m:sSup>
+                            <m:sSupPr>
+                              <m:ctrlPr>
+                                <a:rPr lang="en-US" altLang="ja-JP" sz="2400" b="1" i="1" smtClean="0">
+                                  <a:latin typeface="Cambria Math" panose="02040503050406030204" pitchFamily="18" charset="0"/>
+                                </a:rPr>
+                              </m:ctrlPr>
+                            </m:sSupPr>
+                            <m:e>
+                              <m:r>
+                                <a:rPr lang="en-US" altLang="ja-JP" sz="2400" b="1" i="1" smtClean="0">
+                                  <a:latin typeface="Cambria Math" panose="02040503050406030204" pitchFamily="18" charset="0"/>
+                                </a:rPr>
+                                <m:t>𝑪</m:t>
+                              </m:r>
+                            </m:e>
+                            <m:sup>
+                              <m:r>
+                                <a:rPr lang="en-US" altLang="ja-JP" sz="2400" b="0" i="1" smtClean="0">
+                                  <a:latin typeface="Cambria Math" panose="02040503050406030204" pitchFamily="18" charset="0"/>
+                                </a:rPr>
+                                <m:t>𝑇</m:t>
+                              </m:r>
+                            </m:sup>
+                          </m:sSup>
                         </m:e>
                         <m:sub>
                           <m:r>
@@ -6906,8 +6911,8 @@
             </p:nvSpPr>
             <p:spPr>
               <a:xfrm>
-                <a:off x="829431" y="3370336"/>
-                <a:ext cx="6765057" cy="1266180"/>
+                <a:off x="820964" y="3370336"/>
+                <a:ext cx="6917278" cy="1266180"/>
               </a:xfrm>
               <a:prstGeom prst="rect">
                 <a:avLst/>
@@ -7089,7 +7094,7 @@
         <p:spPr bwMode="auto">
           <a:xfrm>
             <a:off x="539552" y="1340768"/>
-            <a:ext cx="7344816" cy="3600400"/>
+            <a:ext cx="7344816" cy="4176464"/>
           </a:xfrm>
           <a:prstGeom prst="roundRect">
             <a:avLst>
@@ -7229,7 +7234,7 @@
         </p:nvSpPr>
         <p:spPr>
           <a:xfrm>
-            <a:off x="933378" y="3063637"/>
+            <a:off x="933378" y="3732525"/>
             <a:ext cx="1839093" cy="369332"/>
           </a:xfrm>
           <a:prstGeom prst="rect">
@@ -7457,8 +7462,8 @@
           </p:sp>
         </mc:Fallback>
       </mc:AlternateContent>
-      <mc:AlternateContent xmlns:mc="http://schemas.openxmlformats.org/markup-compatibility/2006" xmlns:a14="http://schemas.microsoft.com/office/drawing/2010/main">
-        <mc:Choice Requires="a14">
+      <mc:AlternateContent xmlns:mc="http://schemas.openxmlformats.org/markup-compatibility/2006">
+        <mc:Choice xmlns:a14="http://schemas.microsoft.com/office/drawing/2010/main" Requires="a14">
           <p:sp>
             <p:nvSpPr>
               <p:cNvPr id="13" name="テキスト ボックス 12"/>
@@ -7467,7 +7472,7 @@
             </p:nvSpPr>
             <p:spPr>
               <a:xfrm>
-                <a:off x="2991460" y="2416637"/>
+                <a:off x="2991460" y="3085525"/>
                 <a:ext cx="3844001" cy="461665"/>
               </a:xfrm>
               <a:prstGeom prst="rect">
@@ -7670,7 +7675,7 @@
             </p:txBody>
           </p:sp>
         </mc:Choice>
-        <mc:Fallback xmlns="">
+        <mc:Fallback>
           <p:sp>
             <p:nvSpPr>
               <p:cNvPr id="13" name="テキスト ボックス 12"/>
@@ -7681,7 +7686,7 @@
             </p:nvSpPr>
             <p:spPr>
               <a:xfrm>
-                <a:off x="2991460" y="2416637"/>
+                <a:off x="2991460" y="3085525"/>
                 <a:ext cx="3844001" cy="461665"/>
               </a:xfrm>
               <a:prstGeom prst="rect">
@@ -7709,8 +7714,8 @@
           </p:sp>
         </mc:Fallback>
       </mc:AlternateContent>
-      <mc:AlternateContent xmlns:mc="http://schemas.openxmlformats.org/markup-compatibility/2006" xmlns:a14="http://schemas.microsoft.com/office/drawing/2010/main">
-        <mc:Choice Requires="a14">
+      <mc:AlternateContent xmlns:mc="http://schemas.openxmlformats.org/markup-compatibility/2006">
+        <mc:Choice xmlns:a14="http://schemas.microsoft.com/office/drawing/2010/main" Requires="a14">
           <p:sp>
             <p:nvSpPr>
               <p:cNvPr id="14" name="テキスト ボックス 13"/>
@@ -7719,7 +7724,7 @@
             </p:nvSpPr>
             <p:spPr>
               <a:xfrm>
-                <a:off x="2991460" y="2988087"/>
+                <a:off x="2991460" y="3656975"/>
                 <a:ext cx="4314643" cy="461665"/>
               </a:xfrm>
               <a:prstGeom prst="rect">
@@ -8003,7 +8008,7 @@
             </p:txBody>
           </p:sp>
         </mc:Choice>
-        <mc:Fallback xmlns="">
+        <mc:Fallback>
           <p:sp>
             <p:nvSpPr>
               <p:cNvPr id="14" name="テキスト ボックス 13"/>
@@ -8014,7 +8019,7 @@
             </p:nvSpPr>
             <p:spPr>
               <a:xfrm>
-                <a:off x="2991460" y="2988087"/>
+                <a:off x="2991460" y="3656975"/>
                 <a:ext cx="4314643" cy="461665"/>
               </a:xfrm>
               <a:prstGeom prst="rect">
@@ -8042,8 +8047,8 @@
           </p:sp>
         </mc:Fallback>
       </mc:AlternateContent>
-      <mc:AlternateContent xmlns:mc="http://schemas.openxmlformats.org/markup-compatibility/2006" xmlns:a14="http://schemas.microsoft.com/office/drawing/2010/main">
-        <mc:Choice Requires="a14">
+      <mc:AlternateContent xmlns:mc="http://schemas.openxmlformats.org/markup-compatibility/2006">
+        <mc:Choice xmlns:a14="http://schemas.microsoft.com/office/drawing/2010/main" Requires="a14">
           <p:sp>
             <p:nvSpPr>
               <p:cNvPr id="15" name="テキスト ボックス 14"/>
@@ -8052,7 +8057,7 @@
             </p:nvSpPr>
             <p:spPr>
               <a:xfrm>
-                <a:off x="3007815" y="3559537"/>
+                <a:off x="3007815" y="4228425"/>
                 <a:ext cx="4044632" cy="461665"/>
               </a:xfrm>
               <a:prstGeom prst="rect">
@@ -8328,7 +8333,7 @@
             </p:txBody>
           </p:sp>
         </mc:Choice>
-        <mc:Fallback xmlns="">
+        <mc:Fallback>
           <p:sp>
             <p:nvSpPr>
               <p:cNvPr id="15" name="テキスト ボックス 14"/>
@@ -8339,7 +8344,7 @@
             </p:nvSpPr>
             <p:spPr>
               <a:xfrm>
-                <a:off x="3007815" y="3559537"/>
+                <a:off x="3007815" y="4228425"/>
                 <a:ext cx="4044632" cy="461665"/>
               </a:xfrm>
               <a:prstGeom prst="rect">
@@ -8348,7 +8353,7 @@
               <a:blipFill rotWithShape="0">
                 <a:blip r:embed="rId5"/>
                 <a:stretch>
-                  <a:fillRect t="-7895" r="-10241" b="-10526"/>
+                  <a:fillRect t="-8000" r="-10241" b="-12000"/>
                 </a:stretch>
               </a:blipFill>
             </p:spPr>
@@ -8367,8 +8372,8 @@
           </p:sp>
         </mc:Fallback>
       </mc:AlternateContent>
-      <mc:AlternateContent xmlns:mc="http://schemas.openxmlformats.org/markup-compatibility/2006" xmlns:a14="http://schemas.microsoft.com/office/drawing/2010/main">
-        <mc:Choice Requires="a14">
+      <mc:AlternateContent xmlns:mc="http://schemas.openxmlformats.org/markup-compatibility/2006">
+        <mc:Choice xmlns:a14="http://schemas.microsoft.com/office/drawing/2010/main" Requires="a14">
           <p:sp>
             <p:nvSpPr>
               <p:cNvPr id="16" name="テキスト ボックス 15"/>
@@ -8377,7 +8382,7 @@
             </p:nvSpPr>
             <p:spPr>
               <a:xfrm>
-                <a:off x="3007815" y="4100518"/>
+                <a:off x="3007815" y="4769406"/>
                 <a:ext cx="3124189" cy="461665"/>
               </a:xfrm>
               <a:prstGeom prst="rect">
@@ -8575,7 +8580,7 @@
             </p:txBody>
           </p:sp>
         </mc:Choice>
-        <mc:Fallback xmlns="">
+        <mc:Fallback>
           <p:sp>
             <p:nvSpPr>
               <p:cNvPr id="16" name="テキスト ボックス 15"/>
@@ -8586,7 +8591,7 @@
             </p:nvSpPr>
             <p:spPr>
               <a:xfrm>
-                <a:off x="3007815" y="4100518"/>
+                <a:off x="3007815" y="4769406"/>
                 <a:ext cx="3124189" cy="461665"/>
               </a:xfrm>
               <a:prstGeom prst="rect">
@@ -8595,7 +8600,7 @@
               <a:blipFill rotWithShape="0">
                 <a:blip r:embed="rId6"/>
                 <a:stretch>
-                  <a:fillRect b="-12000"/>
+                  <a:fillRect b="-10526"/>
                 </a:stretch>
               </a:blipFill>
             </p:spPr>
@@ -8692,6 +8697,690 @@
                 <a:blip r:embed="rId7"/>
                 <a:stretch>
                   <a:fillRect/>
+                </a:stretch>
+              </a:blipFill>
+            </p:spPr>
+            <p:txBody>
+              <a:bodyPr/>
+              <a:lstStyle/>
+              <a:p>
+                <a:r>
+                  <a:rPr lang="ja-JP" altLang="en-US">
+                    <a:noFill/>
+                  </a:rPr>
+                  <a:t> </a:t>
+                </a:r>
+              </a:p>
+            </p:txBody>
+          </p:sp>
+        </mc:Fallback>
+      </mc:AlternateContent>
+      <mc:AlternateContent xmlns:mc="http://schemas.openxmlformats.org/markup-compatibility/2006">
+        <mc:Choice xmlns:a14="http://schemas.microsoft.com/office/drawing/2010/main" Requires="a14">
+          <p:sp>
+            <p:nvSpPr>
+              <p:cNvPr id="3" name="正方形/長方形 2"/>
+              <p:cNvSpPr/>
+              <p:nvPr/>
+            </p:nvSpPr>
+            <p:spPr>
+              <a:xfrm>
+                <a:off x="3008363" y="2398347"/>
+                <a:ext cx="1655068" cy="629852"/>
+              </a:xfrm>
+              <a:prstGeom prst="rect">
+                <a:avLst/>
+              </a:prstGeom>
+            </p:spPr>
+            <p:txBody>
+              <a:bodyPr wrap="none">
+                <a:spAutoFit/>
+              </a:bodyPr>
+              <a:lstStyle/>
+              <a:p>
+                <a14:m>
+                  <m:oMathPara xmlns:m="http://schemas.openxmlformats.org/officeDocument/2006/math">
+                    <m:oMathParaPr>
+                      <m:jc m:val="centerGroup"/>
+                    </m:oMathParaPr>
+                    <m:oMath xmlns:m="http://schemas.openxmlformats.org/officeDocument/2006/math">
+                      <m:sSub>
+                        <m:sSubPr>
+                          <m:ctrlPr>
+                            <a:rPr lang="en-US" altLang="ja-JP" i="1" smtClean="0">
+                              <a:latin typeface="Cambria Math" panose="02040503050406030204" pitchFamily="18" charset="0"/>
+                            </a:rPr>
+                          </m:ctrlPr>
+                        </m:sSubPr>
+                        <m:e>
+                          <m:r>
+                            <a:rPr lang="en-US" altLang="ja-JP" b="1" i="1">
+                              <a:latin typeface="Cambria Math" panose="02040503050406030204" pitchFamily="18" charset="0"/>
+                            </a:rPr>
+                            <m:t>𝑨</m:t>
+                          </m:r>
+                        </m:e>
+                        <m:sub>
+                          <m:r>
+                            <a:rPr lang="en-US" altLang="ja-JP" i="1">
+                              <a:latin typeface="Cambria Math" panose="02040503050406030204" pitchFamily="18" charset="0"/>
+                            </a:rPr>
+                            <m:t>𝑡</m:t>
+                          </m:r>
+                          <m:r>
+                            <a:rPr lang="en-US" altLang="ja-JP" i="1">
+                              <a:latin typeface="Cambria Math" panose="02040503050406030204" pitchFamily="18" charset="0"/>
+                            </a:rPr>
+                            <m:t>−1</m:t>
+                          </m:r>
+                        </m:sub>
+                      </m:sSub>
+                      <m:r>
+                        <a:rPr lang="en-US" altLang="ja-JP" b="0" i="1" smtClean="0">
+                          <a:latin typeface="Cambria Math" panose="02040503050406030204" pitchFamily="18" charset="0"/>
+                        </a:rPr>
+                        <m:t>=</m:t>
+                      </m:r>
+                      <m:f>
+                        <m:fPr>
+                          <m:ctrlPr>
+                            <a:rPr lang="en-US" altLang="ja-JP" b="0" i="1" smtClean="0">
+                              <a:latin typeface="Cambria Math" panose="02040503050406030204" pitchFamily="18" charset="0"/>
+                            </a:rPr>
+                          </m:ctrlPr>
+                        </m:fPr>
+                        <m:num>
+                          <m:r>
+                            <a:rPr lang="en-US" altLang="ja-JP" b="0" i="1" smtClean="0">
+                              <a:latin typeface="Cambria Math" panose="02040503050406030204" pitchFamily="18" charset="0"/>
+                            </a:rPr>
+                            <m:t>𝜕</m:t>
+                          </m:r>
+                          <m:r>
+                            <a:rPr lang="en-US" altLang="ja-JP" b="1" i="1" smtClean="0">
+                              <a:latin typeface="Cambria Math" panose="02040503050406030204" pitchFamily="18" charset="0"/>
+                            </a:rPr>
+                            <m:t>𝒇</m:t>
+                          </m:r>
+                          <m:d>
+                            <m:dPr>
+                              <m:ctrlPr>
+                                <a:rPr lang="en-US" altLang="ja-JP" b="0" i="1" smtClean="0">
+                                  <a:latin typeface="Cambria Math" panose="02040503050406030204" pitchFamily="18" charset="0"/>
+                                </a:rPr>
+                              </m:ctrlPr>
+                            </m:dPr>
+                            <m:e>
+                              <m:r>
+                                <a:rPr lang="en-US" altLang="ja-JP" b="1" i="1" smtClean="0">
+                                  <a:latin typeface="Cambria Math" panose="02040503050406030204" pitchFamily="18" charset="0"/>
+                                </a:rPr>
+                                <m:t>𝒙</m:t>
+                              </m:r>
+                            </m:e>
+                          </m:d>
+                        </m:num>
+                        <m:den>
+                          <m:r>
+                            <a:rPr lang="en-US" altLang="ja-JP" b="0" i="1" smtClean="0">
+                              <a:latin typeface="Cambria Math" panose="02040503050406030204" pitchFamily="18" charset="0"/>
+                            </a:rPr>
+                            <m:t>𝜕</m:t>
+                          </m:r>
+                          <m:r>
+                            <a:rPr lang="en-US" altLang="ja-JP" b="1" i="1" smtClean="0">
+                              <a:latin typeface="Cambria Math" panose="02040503050406030204" pitchFamily="18" charset="0"/>
+                            </a:rPr>
+                            <m:t>𝒙</m:t>
+                          </m:r>
+                        </m:den>
+                      </m:f>
+                    </m:oMath>
+                  </m:oMathPara>
+                </a14:m>
+                <a:endParaRPr lang="ja-JP" altLang="en-US" dirty="0"/>
+              </a:p>
+            </p:txBody>
+          </p:sp>
+        </mc:Choice>
+        <mc:Fallback>
+          <p:sp>
+            <p:nvSpPr>
+              <p:cNvPr id="3" name="正方形/長方形 2"/>
+              <p:cNvSpPr>
+                <a:spLocks noRot="1" noChangeAspect="1" noMove="1" noResize="1" noEditPoints="1" noAdjustHandles="1" noChangeArrowheads="1" noChangeShapeType="1" noTextEdit="1"/>
+              </p:cNvSpPr>
+              <p:nvPr/>
+            </p:nvSpPr>
+            <p:spPr>
+              <a:xfrm>
+                <a:off x="3008363" y="2398347"/>
+                <a:ext cx="1655068" cy="629852"/>
+              </a:xfrm>
+              <a:prstGeom prst="rect">
+                <a:avLst/>
+              </a:prstGeom>
+              <a:blipFill rotWithShape="0">
+                <a:blip r:embed="rId8"/>
+                <a:stretch>
+                  <a:fillRect/>
+                </a:stretch>
+              </a:blipFill>
+            </p:spPr>
+            <p:txBody>
+              <a:bodyPr/>
+              <a:lstStyle/>
+              <a:p>
+                <a:r>
+                  <a:rPr lang="ja-JP" altLang="en-US">
+                    <a:noFill/>
+                  </a:rPr>
+                  <a:t> </a:t>
+                </a:r>
+              </a:p>
+            </p:txBody>
+          </p:sp>
+        </mc:Fallback>
+      </mc:AlternateContent>
+      <mc:AlternateContent xmlns:mc="http://schemas.openxmlformats.org/markup-compatibility/2006">
+        <mc:Choice xmlns:a14="http://schemas.microsoft.com/office/drawing/2010/main" Requires="a14">
+          <p:sp>
+            <p:nvSpPr>
+              <p:cNvPr id="18" name="テキスト ボックス 17"/>
+              <p:cNvSpPr txBox="1"/>
+              <p:nvPr/>
+            </p:nvSpPr>
+            <p:spPr>
+              <a:xfrm>
+                <a:off x="4447666" y="2720422"/>
+                <a:ext cx="965456" cy="307777"/>
+              </a:xfrm>
+              <a:prstGeom prst="rect">
+                <a:avLst/>
+              </a:prstGeom>
+              <a:noFill/>
+            </p:spPr>
+            <p:txBody>
+              <a:bodyPr wrap="none" rtlCol="0">
+                <a:spAutoFit/>
+              </a:bodyPr>
+              <a:lstStyle/>
+              <a:p>
+                <a:pPr/>
+                <a14:m>
+                  <m:oMathPara xmlns:m="http://schemas.openxmlformats.org/officeDocument/2006/math">
+                    <m:oMathParaPr>
+                      <m:jc m:val="centerGroup"/>
+                    </m:oMathParaPr>
+                    <m:oMath xmlns:m="http://schemas.openxmlformats.org/officeDocument/2006/math">
+                      <m:sSub>
+                        <m:sSubPr>
+                          <m:ctrlPr>
+                            <a:rPr lang="en-US" altLang="ja-JP" sz="1400" i="1" smtClean="0">
+                              <a:latin typeface="Cambria Math" panose="02040503050406030204" pitchFamily="18" charset="0"/>
+                            </a:rPr>
+                          </m:ctrlPr>
+                        </m:sSubPr>
+                        <m:e>
+                          <m:r>
+                            <a:rPr lang="en-US" altLang="ja-JP" sz="1400" b="1" i="1" smtClean="0">
+                              <a:latin typeface="Cambria Math" panose="02040503050406030204" pitchFamily="18" charset="0"/>
+                            </a:rPr>
+                            <m:t>𝒙</m:t>
+                          </m:r>
+                          <m:r>
+                            <a:rPr lang="en-US" altLang="ja-JP" sz="1400" b="1" i="1" smtClean="0">
+                              <a:latin typeface="Cambria Math" panose="02040503050406030204" pitchFamily="18" charset="0"/>
+                            </a:rPr>
+                            <m:t>=</m:t>
+                          </m:r>
+                          <m:acc>
+                            <m:accPr>
+                              <m:chr m:val="̂"/>
+                              <m:ctrlPr>
+                                <a:rPr lang="en-US" altLang="ja-JP" sz="1400" b="1" i="1" smtClean="0">
+                                  <a:latin typeface="Cambria Math" panose="02040503050406030204" pitchFamily="18" charset="0"/>
+                                </a:rPr>
+                              </m:ctrlPr>
+                            </m:accPr>
+                            <m:e>
+                              <m:r>
+                                <a:rPr lang="en-US" altLang="ja-JP" sz="1400" b="1" i="1" smtClean="0">
+                                  <a:latin typeface="Cambria Math" panose="02040503050406030204" pitchFamily="18" charset="0"/>
+                                </a:rPr>
+                                <m:t>𝒙</m:t>
+                              </m:r>
+                            </m:e>
+                          </m:acc>
+                        </m:e>
+                        <m:sub>
+                          <m:r>
+                            <a:rPr lang="en-US" altLang="ja-JP" sz="1400" b="0" i="1" smtClean="0">
+                              <a:latin typeface="Cambria Math" panose="02040503050406030204" pitchFamily="18" charset="0"/>
+                            </a:rPr>
+                            <m:t>𝑡</m:t>
+                          </m:r>
+                          <m:r>
+                            <a:rPr lang="en-US" altLang="ja-JP" sz="1400" b="0" i="1" smtClean="0">
+                              <a:latin typeface="Cambria Math" panose="02040503050406030204" pitchFamily="18" charset="0"/>
+                            </a:rPr>
+                            <m:t>−1</m:t>
+                          </m:r>
+                        </m:sub>
+                      </m:sSub>
+                    </m:oMath>
+                  </m:oMathPara>
+                </a14:m>
+                <a:endParaRPr kumimoji="1" lang="ja-JP" altLang="en-US" sz="1400" dirty="0"/>
+              </a:p>
+            </p:txBody>
+          </p:sp>
+        </mc:Choice>
+        <mc:Fallback>
+          <p:sp>
+            <p:nvSpPr>
+              <p:cNvPr id="18" name="テキスト ボックス 17"/>
+              <p:cNvSpPr txBox="1">
+                <a:spLocks noRot="1" noChangeAspect="1" noMove="1" noResize="1" noEditPoints="1" noAdjustHandles="1" noChangeArrowheads="1" noChangeShapeType="1" noTextEdit="1"/>
+              </p:cNvSpPr>
+              <p:nvPr/>
+            </p:nvSpPr>
+            <p:spPr>
+              <a:xfrm>
+                <a:off x="4447666" y="2720422"/>
+                <a:ext cx="965456" cy="307777"/>
+              </a:xfrm>
+              <a:prstGeom prst="rect">
+                <a:avLst/>
+              </a:prstGeom>
+              <a:blipFill rotWithShape="0">
+                <a:blip r:embed="rId9"/>
+                <a:stretch>
+                  <a:fillRect t="-1961" r="-633"/>
+                </a:stretch>
+              </a:blipFill>
+            </p:spPr>
+            <p:txBody>
+              <a:bodyPr/>
+              <a:lstStyle/>
+              <a:p>
+                <a:r>
+                  <a:rPr lang="ja-JP" altLang="en-US">
+                    <a:noFill/>
+                  </a:rPr>
+                  <a:t> </a:t>
+                </a:r>
+              </a:p>
+            </p:txBody>
+          </p:sp>
+        </mc:Fallback>
+      </mc:AlternateContent>
+      <p:cxnSp>
+        <p:nvCxnSpPr>
+          <p:cNvPr id="10" name="直線コネクタ 9"/>
+          <p:cNvCxnSpPr/>
+          <p:nvPr/>
+        </p:nvCxnSpPr>
+        <p:spPr bwMode="auto">
+          <a:xfrm>
+            <a:off x="4538215" y="2451092"/>
+            <a:ext cx="0" cy="547781"/>
+          </a:xfrm>
+          <a:prstGeom prst="line">
+            <a:avLst/>
+          </a:prstGeom>
+          <a:solidFill>
+            <a:schemeClr val="accent1"/>
+          </a:solidFill>
+          <a:ln w="19050" cap="flat" cmpd="sng" algn="ctr">
+            <a:solidFill>
+              <a:schemeClr val="tx1"/>
+            </a:solidFill>
+            <a:prstDash val="solid"/>
+            <a:round/>
+            <a:headEnd type="none" w="med" len="med"/>
+            <a:tailEnd type="none" w="med" len="med"/>
+          </a:ln>
+          <a:effectLst/>
+        </p:spPr>
+      </p:cxnSp>
+      <mc:AlternateContent xmlns:mc="http://schemas.openxmlformats.org/markup-compatibility/2006">
+        <mc:Choice xmlns:a14="http://schemas.microsoft.com/office/drawing/2010/main" Requires="a14">
+          <p:sp>
+            <p:nvSpPr>
+              <p:cNvPr id="19" name="正方形/長方形 18"/>
+              <p:cNvSpPr/>
+              <p:nvPr/>
+            </p:nvSpPr>
+            <p:spPr>
+              <a:xfrm>
+                <a:off x="5193915" y="2398347"/>
+                <a:ext cx="1562287" cy="629852"/>
+              </a:xfrm>
+              <a:prstGeom prst="rect">
+                <a:avLst/>
+              </a:prstGeom>
+            </p:spPr>
+            <p:txBody>
+              <a:bodyPr wrap="none">
+                <a:spAutoFit/>
+              </a:bodyPr>
+              <a:lstStyle/>
+              <a:p>
+                <a14:m>
+                  <m:oMathPara xmlns:m="http://schemas.openxmlformats.org/officeDocument/2006/math">
+                    <m:oMathParaPr>
+                      <m:jc m:val="centerGroup"/>
+                    </m:oMathParaPr>
+                    <m:oMath xmlns:m="http://schemas.openxmlformats.org/officeDocument/2006/math">
+                      <m:sSub>
+                        <m:sSubPr>
+                          <m:ctrlPr>
+                            <a:rPr lang="en-US" altLang="ja-JP" i="1" smtClean="0">
+                              <a:latin typeface="Cambria Math" panose="02040503050406030204" pitchFamily="18" charset="0"/>
+                            </a:rPr>
+                          </m:ctrlPr>
+                        </m:sSubPr>
+                        <m:e>
+                          <m:sSup>
+                            <m:sSupPr>
+                              <m:ctrlPr>
+                                <a:rPr lang="en-US" altLang="ja-JP" i="1" smtClean="0">
+                                  <a:latin typeface="Cambria Math" panose="02040503050406030204" pitchFamily="18" charset="0"/>
+                                </a:rPr>
+                              </m:ctrlPr>
+                            </m:sSupPr>
+                            <m:e>
+                              <m:r>
+                                <a:rPr lang="en-US" altLang="ja-JP" b="1" i="1" smtClean="0">
+                                  <a:latin typeface="Cambria Math" panose="02040503050406030204" pitchFamily="18" charset="0"/>
+                                </a:rPr>
+                                <m:t>𝑪</m:t>
+                              </m:r>
+                            </m:e>
+                            <m:sup>
+                              <m:r>
+                                <a:rPr lang="en-US" altLang="ja-JP" b="0" i="1" smtClean="0">
+                                  <a:latin typeface="Cambria Math" panose="02040503050406030204" pitchFamily="18" charset="0"/>
+                                </a:rPr>
+                                <m:t>𝑇</m:t>
+                              </m:r>
+                            </m:sup>
+                          </m:sSup>
+                        </m:e>
+                        <m:sub>
+                          <m:r>
+                            <a:rPr lang="en-US" altLang="ja-JP" i="1">
+                              <a:latin typeface="Cambria Math" panose="02040503050406030204" pitchFamily="18" charset="0"/>
+                            </a:rPr>
+                            <m:t>𝑡</m:t>
+                          </m:r>
+                        </m:sub>
+                      </m:sSub>
+                      <m:r>
+                        <a:rPr lang="en-US" altLang="ja-JP" b="0" i="1" smtClean="0">
+                          <a:latin typeface="Cambria Math" panose="02040503050406030204" pitchFamily="18" charset="0"/>
+                        </a:rPr>
+                        <m:t>=</m:t>
+                      </m:r>
+                      <m:f>
+                        <m:fPr>
+                          <m:ctrlPr>
+                            <a:rPr lang="en-US" altLang="ja-JP" b="0" i="1" smtClean="0">
+                              <a:latin typeface="Cambria Math" panose="02040503050406030204" pitchFamily="18" charset="0"/>
+                            </a:rPr>
+                          </m:ctrlPr>
+                        </m:fPr>
+                        <m:num>
+                          <m:r>
+                            <a:rPr lang="en-US" altLang="ja-JP" b="0" i="1" smtClean="0">
+                              <a:latin typeface="Cambria Math" panose="02040503050406030204" pitchFamily="18" charset="0"/>
+                            </a:rPr>
+                            <m:t>𝜕</m:t>
+                          </m:r>
+                          <m:r>
+                            <a:rPr lang="en-US" altLang="ja-JP" b="1" i="1" smtClean="0">
+                              <a:latin typeface="Cambria Math" panose="02040503050406030204" pitchFamily="18" charset="0"/>
+                            </a:rPr>
+                            <m:t>𝒉</m:t>
+                          </m:r>
+                          <m:d>
+                            <m:dPr>
+                              <m:ctrlPr>
+                                <a:rPr lang="en-US" altLang="ja-JP" b="0" i="1" smtClean="0">
+                                  <a:latin typeface="Cambria Math" panose="02040503050406030204" pitchFamily="18" charset="0"/>
+                                </a:rPr>
+                              </m:ctrlPr>
+                            </m:dPr>
+                            <m:e>
+                              <m:r>
+                                <a:rPr lang="en-US" altLang="ja-JP" b="1" i="1" smtClean="0">
+                                  <a:latin typeface="Cambria Math" panose="02040503050406030204" pitchFamily="18" charset="0"/>
+                                </a:rPr>
+                                <m:t>𝒙</m:t>
+                              </m:r>
+                            </m:e>
+                          </m:d>
+                        </m:num>
+                        <m:den>
+                          <m:r>
+                            <a:rPr lang="en-US" altLang="ja-JP" b="0" i="1" smtClean="0">
+                              <a:latin typeface="Cambria Math" panose="02040503050406030204" pitchFamily="18" charset="0"/>
+                            </a:rPr>
+                            <m:t>𝜕</m:t>
+                          </m:r>
+                          <m:r>
+                            <a:rPr lang="en-US" altLang="ja-JP" b="1" i="1" smtClean="0">
+                              <a:latin typeface="Cambria Math" panose="02040503050406030204" pitchFamily="18" charset="0"/>
+                            </a:rPr>
+                            <m:t>𝒙</m:t>
+                          </m:r>
+                        </m:den>
+                      </m:f>
+                    </m:oMath>
+                  </m:oMathPara>
+                </a14:m>
+                <a:endParaRPr lang="ja-JP" altLang="en-US" dirty="0"/>
+              </a:p>
+            </p:txBody>
+          </p:sp>
+        </mc:Choice>
+        <mc:Fallback>
+          <p:sp>
+            <p:nvSpPr>
+              <p:cNvPr id="19" name="正方形/長方形 18"/>
+              <p:cNvSpPr>
+                <a:spLocks noRot="1" noChangeAspect="1" noMove="1" noResize="1" noEditPoints="1" noAdjustHandles="1" noChangeArrowheads="1" noChangeShapeType="1" noTextEdit="1"/>
+              </p:cNvSpPr>
+              <p:nvPr/>
+            </p:nvSpPr>
+            <p:spPr>
+              <a:xfrm>
+                <a:off x="5193915" y="2398347"/>
+                <a:ext cx="1562287" cy="629852"/>
+              </a:xfrm>
+              <a:prstGeom prst="rect">
+                <a:avLst/>
+              </a:prstGeom>
+              <a:blipFill rotWithShape="0">
+                <a:blip r:embed="rId10"/>
+                <a:stretch>
+                  <a:fillRect/>
+                </a:stretch>
+              </a:blipFill>
+            </p:spPr>
+            <p:txBody>
+              <a:bodyPr/>
+              <a:lstStyle/>
+              <a:p>
+                <a:r>
+                  <a:rPr lang="ja-JP" altLang="en-US">
+                    <a:noFill/>
+                  </a:rPr>
+                  <a:t> </a:t>
+                </a:r>
+              </a:p>
+            </p:txBody>
+          </p:sp>
+        </mc:Fallback>
+      </mc:AlternateContent>
+      <p:cxnSp>
+        <p:nvCxnSpPr>
+          <p:cNvPr id="20" name="直線コネクタ 19"/>
+          <p:cNvCxnSpPr/>
+          <p:nvPr/>
+        </p:nvCxnSpPr>
+        <p:spPr bwMode="auto">
+          <a:xfrm>
+            <a:off x="6643298" y="2447849"/>
+            <a:ext cx="0" cy="547781"/>
+          </a:xfrm>
+          <a:prstGeom prst="line">
+            <a:avLst/>
+          </a:prstGeom>
+          <a:solidFill>
+            <a:schemeClr val="accent1"/>
+          </a:solidFill>
+          <a:ln w="19050" cap="flat" cmpd="sng" algn="ctr">
+            <a:solidFill>
+              <a:schemeClr val="tx1"/>
+            </a:solidFill>
+            <a:prstDash val="solid"/>
+            <a:round/>
+            <a:headEnd type="none" w="med" len="med"/>
+            <a:tailEnd type="none" w="med" len="med"/>
+          </a:ln>
+          <a:effectLst/>
+        </p:spPr>
+      </p:cxnSp>
+      <mc:AlternateContent xmlns:mc="http://schemas.openxmlformats.org/markup-compatibility/2006">
+        <mc:Choice xmlns:a14="http://schemas.microsoft.com/office/drawing/2010/main" Requires="a14">
+          <p:sp>
+            <p:nvSpPr>
+              <p:cNvPr id="21" name="テキスト ボックス 20"/>
+              <p:cNvSpPr txBox="1"/>
+              <p:nvPr/>
+            </p:nvSpPr>
+            <p:spPr>
+              <a:xfrm>
+                <a:off x="6550161" y="2720422"/>
+                <a:ext cx="894989" cy="307777"/>
+              </a:xfrm>
+              <a:prstGeom prst="rect">
+                <a:avLst/>
+              </a:prstGeom>
+              <a:noFill/>
+            </p:spPr>
+            <p:txBody>
+              <a:bodyPr wrap="none" rtlCol="0">
+                <a:spAutoFit/>
+              </a:bodyPr>
+              <a:lstStyle/>
+              <a:p>
+                <a:pPr/>
+                <a14:m>
+                  <m:oMathPara xmlns:m="http://schemas.openxmlformats.org/officeDocument/2006/math">
+                    <m:oMathParaPr>
+                      <m:jc m:val="centerGroup"/>
+                    </m:oMathParaPr>
+                    <m:oMath xmlns:m="http://schemas.openxmlformats.org/officeDocument/2006/math">
+                      <m:r>
+                        <a:rPr lang="en-US" altLang="ja-JP" sz="1400" b="1" i="1" smtClean="0">
+                          <a:latin typeface="Cambria Math" panose="02040503050406030204" pitchFamily="18" charset="0"/>
+                        </a:rPr>
+                        <m:t>𝒙</m:t>
+                      </m:r>
+                      <m:r>
+                        <a:rPr lang="en-US" altLang="ja-JP" sz="1400" b="0" i="1" smtClean="0">
+                          <a:latin typeface="Cambria Math" panose="02040503050406030204" pitchFamily="18" charset="0"/>
+                        </a:rPr>
+                        <m:t>=</m:t>
+                      </m:r>
+                      <m:sSub>
+                        <m:sSubPr>
+                          <m:ctrlPr>
+                            <a:rPr lang="en-US" altLang="ja-JP" sz="1400" i="1">
+                              <a:latin typeface="Cambria Math" panose="02040503050406030204" pitchFamily="18" charset="0"/>
+                            </a:rPr>
+                          </m:ctrlPr>
+                        </m:sSubPr>
+                        <m:e>
+                          <m:acc>
+                            <m:accPr>
+                              <m:chr m:val="̂"/>
+                              <m:ctrlPr>
+                                <a:rPr lang="en-US" altLang="ja-JP" sz="1400" b="1" i="1">
+                                  <a:latin typeface="Cambria Math" panose="02040503050406030204" pitchFamily="18" charset="0"/>
+                                </a:rPr>
+                              </m:ctrlPr>
+                            </m:accPr>
+                            <m:e>
+                              <m:sSup>
+                                <m:sSupPr>
+                                  <m:ctrlPr>
+                                    <a:rPr lang="en-US" altLang="ja-JP" sz="1400" b="1" i="1">
+                                      <a:latin typeface="Cambria Math" panose="02040503050406030204" pitchFamily="18" charset="0"/>
+                                    </a:rPr>
+                                  </m:ctrlPr>
+                                </m:sSupPr>
+                                <m:e>
+                                  <m:r>
+                                    <a:rPr lang="en-US" altLang="ja-JP" sz="1400" b="1" i="1">
+                                      <a:latin typeface="Cambria Math" panose="02040503050406030204" pitchFamily="18" charset="0"/>
+                                    </a:rPr>
+                                    <m:t>𝒙</m:t>
+                                  </m:r>
+                                </m:e>
+                                <m:sup>
+                                  <m:r>
+                                    <a:rPr lang="en-US" altLang="ja-JP" sz="1400" b="1" i="1">
+                                      <a:latin typeface="Cambria Math" panose="02040503050406030204" pitchFamily="18" charset="0"/>
+                                    </a:rPr>
+                                    <m:t>−</m:t>
+                                  </m:r>
+                                </m:sup>
+                              </m:sSup>
+                            </m:e>
+                          </m:acc>
+                        </m:e>
+                        <m:sub>
+                          <m:r>
+                            <a:rPr lang="en-US" altLang="ja-JP" sz="1400" i="1">
+                              <a:latin typeface="Cambria Math" panose="02040503050406030204" pitchFamily="18" charset="0"/>
+                            </a:rPr>
+                            <m:t>𝑡</m:t>
+                          </m:r>
+                        </m:sub>
+                      </m:sSub>
+                    </m:oMath>
+                  </m:oMathPara>
+                </a14:m>
+                <a:endParaRPr kumimoji="1" lang="ja-JP" altLang="en-US" sz="1400" dirty="0"/>
+              </a:p>
+            </p:txBody>
+          </p:sp>
+        </mc:Choice>
+        <mc:Fallback>
+          <p:sp>
+            <p:nvSpPr>
+              <p:cNvPr id="21" name="テキスト ボックス 20"/>
+              <p:cNvSpPr txBox="1">
+                <a:spLocks noRot="1" noChangeAspect="1" noMove="1" noResize="1" noEditPoints="1" noAdjustHandles="1" noChangeArrowheads="1" noChangeShapeType="1" noTextEdit="1"/>
+              </p:cNvSpPr>
+              <p:nvPr/>
+            </p:nvSpPr>
+            <p:spPr>
+              <a:xfrm>
+                <a:off x="6550161" y="2720422"/>
+                <a:ext cx="894989" cy="307777"/>
+              </a:xfrm>
+              <a:prstGeom prst="rect">
+                <a:avLst/>
+              </a:prstGeom>
+              <a:blipFill rotWithShape="0">
+                <a:blip r:embed="rId11"/>
+                <a:stretch>
+                  <a:fillRect t="-5882" r="-41096"/>
                 </a:stretch>
               </a:blipFill>
             </p:spPr>
@@ -8878,7 +9567,7 @@
             </p:nvSpPr>
             <p:spPr>
               <a:xfrm>
-                <a:off x="683568" y="1670163"/>
+                <a:off x="1475656" y="1679907"/>
                 <a:ext cx="1737078" cy="1452962"/>
               </a:xfrm>
               <a:prstGeom prst="rect">
@@ -9014,7 +9703,7 @@
             </p:nvSpPr>
             <p:spPr>
               <a:xfrm>
-                <a:off x="683568" y="1670163"/>
+                <a:off x="1475656" y="1679907"/>
                 <a:ext cx="1737078" cy="1452962"/>
               </a:xfrm>
               <a:prstGeom prst="rect">
@@ -9046,187 +9735,13 @@
         <mc:Choice Requires="a14">
           <p:sp>
             <p:nvSpPr>
-              <p:cNvPr id="18" name="正方形/長方形 17"/>
-              <p:cNvSpPr/>
-              <p:nvPr/>
-            </p:nvSpPr>
-            <p:spPr>
-              <a:xfrm>
-                <a:off x="2253602" y="1666715"/>
-                <a:ext cx="1737078" cy="1452962"/>
-              </a:xfrm>
-              <a:prstGeom prst="rect">
-                <a:avLst/>
-              </a:prstGeom>
-            </p:spPr>
-            <p:txBody>
-              <a:bodyPr wrap="none">
-                <a:spAutoFit/>
-              </a:bodyPr>
-              <a:lstStyle/>
-              <a:p>
-                <a:pPr/>
-                <a14:m>
-                  <m:oMathPara xmlns:m="http://schemas.openxmlformats.org/officeDocument/2006/math">
-                    <m:oMathParaPr>
-                      <m:jc m:val="centerGroup"/>
-                    </m:oMathParaPr>
-                    <m:oMath xmlns:m="http://schemas.openxmlformats.org/officeDocument/2006/math">
-                      <m:sSub>
-                        <m:sSubPr>
-                          <m:ctrlPr>
-                            <a:rPr lang="en-US" altLang="ja-JP" sz="2400" i="1" smtClean="0">
-                              <a:latin typeface="Cambria Math" panose="02040503050406030204" pitchFamily="18" charset="0"/>
-                            </a:rPr>
-                          </m:ctrlPr>
-                        </m:sSubPr>
-                        <m:e>
-                          <m:acc>
-                            <m:accPr>
-                              <m:chr m:val="̂"/>
-                              <m:ctrlPr>
-                                <a:rPr lang="en-US" altLang="ja-JP" sz="2400" b="1" i="1">
-                                  <a:latin typeface="Cambria Math" panose="02040503050406030204" pitchFamily="18" charset="0"/>
-                                </a:rPr>
-                              </m:ctrlPr>
-                            </m:accPr>
-                            <m:e>
-                              <m:r>
-                                <a:rPr lang="en-US" altLang="ja-JP" sz="2400" b="1" i="1">
-                                  <a:latin typeface="Cambria Math" panose="02040503050406030204" pitchFamily="18" charset="0"/>
-                                </a:rPr>
-                                <m:t>𝒙</m:t>
-                              </m:r>
-                            </m:e>
-                          </m:acc>
-                        </m:e>
-                        <m:sub>
-                          <m:r>
-                            <a:rPr lang="en-US" altLang="ja-JP" sz="2400" b="0" i="1" smtClean="0">
-                              <a:latin typeface="Cambria Math" panose="02040503050406030204" pitchFamily="18" charset="0"/>
-                            </a:rPr>
-                            <m:t>0</m:t>
-                          </m:r>
-                        </m:sub>
-                      </m:sSub>
-                      <m:r>
-                        <a:rPr lang="en-US" altLang="ja-JP" sz="2400" b="0" i="1" smtClean="0">
-                          <a:latin typeface="Cambria Math" panose="02040503050406030204" pitchFamily="18" charset="0"/>
-                        </a:rPr>
-                        <m:t>=</m:t>
-                      </m:r>
-                      <m:d>
-                        <m:dPr>
-                          <m:begChr m:val="["/>
-                          <m:endChr m:val="]"/>
-                          <m:ctrlPr>
-                            <a:rPr lang="en-US" altLang="ja-JP" sz="2400" b="0" i="1" smtClean="0">
-                              <a:latin typeface="Cambria Math" panose="02040503050406030204" pitchFamily="18" charset="0"/>
-                            </a:rPr>
-                          </m:ctrlPr>
-                        </m:dPr>
-                        <m:e>
-                          <m:eqArr>
-                            <m:eqArrPr>
-                              <m:ctrlPr>
-                                <a:rPr lang="en-US" altLang="ja-JP" sz="2400" b="0" i="1" smtClean="0">
-                                  <a:latin typeface="Cambria Math" panose="02040503050406030204" pitchFamily="18" charset="0"/>
-                                </a:rPr>
-                              </m:ctrlPr>
-                            </m:eqArrPr>
-                            <m:e>
-                              <m:r>
-                                <a:rPr lang="en-US" altLang="ja-JP" sz="2400" b="0" i="1" smtClean="0">
-                                  <a:latin typeface="Cambria Math" panose="02040503050406030204" pitchFamily="18" charset="0"/>
-                                </a:rPr>
-                                <m:t>0</m:t>
-                              </m:r>
-                            </m:e>
-                            <m:e>
-                              <m:r>
-                                <a:rPr lang="en-US" altLang="ja-JP" sz="2400" b="0" i="1" smtClean="0">
-                                  <a:latin typeface="Cambria Math" panose="02040503050406030204" pitchFamily="18" charset="0"/>
-                                </a:rPr>
-                                <m:t>0</m:t>
-                              </m:r>
-                            </m:e>
-                            <m:e>
-                              <m:r>
-                                <a:rPr lang="en-US" altLang="ja-JP" sz="2400" b="0" i="1" smtClean="0">
-                                  <a:latin typeface="Cambria Math" panose="02040503050406030204" pitchFamily="18" charset="0"/>
-                                </a:rPr>
-                                <m:t>0</m:t>
-                              </m:r>
-                            </m:e>
-                            <m:e>
-                              <m:r>
-                                <a:rPr lang="en-US" altLang="ja-JP" sz="2400" b="0" i="1" smtClean="0">
-                                  <a:latin typeface="Cambria Math" panose="02040503050406030204" pitchFamily="18" charset="0"/>
-                                </a:rPr>
-                                <m:t>1.0</m:t>
-                              </m:r>
-                            </m:e>
-                          </m:eqArr>
-                        </m:e>
-                      </m:d>
-                    </m:oMath>
-                  </m:oMathPara>
-                </a14:m>
-                <a:endParaRPr lang="ja-JP" altLang="en-US" sz="2400" dirty="0"/>
-              </a:p>
-            </p:txBody>
-          </p:sp>
-        </mc:Choice>
-        <mc:Fallback xmlns="">
-          <p:sp>
-            <p:nvSpPr>
-              <p:cNvPr id="18" name="正方形/長方形 17"/>
-              <p:cNvSpPr>
-                <a:spLocks noRot="1" noChangeAspect="1" noMove="1" noResize="1" noEditPoints="1" noAdjustHandles="1" noChangeArrowheads="1" noChangeShapeType="1" noTextEdit="1"/>
-              </p:cNvSpPr>
-              <p:nvPr/>
-            </p:nvSpPr>
-            <p:spPr>
-              <a:xfrm>
-                <a:off x="2253602" y="1666715"/>
-                <a:ext cx="1737078" cy="1452962"/>
-              </a:xfrm>
-              <a:prstGeom prst="rect">
-                <a:avLst/>
-              </a:prstGeom>
-              <a:blipFill rotWithShape="0">
-                <a:blip r:embed="rId3"/>
-                <a:stretch>
-                  <a:fillRect/>
-                </a:stretch>
-              </a:blipFill>
-            </p:spPr>
-            <p:txBody>
-              <a:bodyPr/>
-              <a:lstStyle/>
-              <a:p>
-                <a:r>
-                  <a:rPr lang="ja-JP" altLang="en-US">
-                    <a:noFill/>
-                  </a:rPr>
-                  <a:t> </a:t>
-                </a:r>
-              </a:p>
-            </p:txBody>
-          </p:sp>
-        </mc:Fallback>
-      </mc:AlternateContent>
-      <mc:AlternateContent xmlns:mc="http://schemas.openxmlformats.org/markup-compatibility/2006" xmlns:a14="http://schemas.microsoft.com/office/drawing/2010/main">
-        <mc:Choice Requires="a14">
-          <p:sp>
-            <p:nvSpPr>
               <p:cNvPr id="19" name="テキスト ボックス 18"/>
               <p:cNvSpPr txBox="1"/>
               <p:nvPr/>
             </p:nvSpPr>
             <p:spPr>
               <a:xfrm>
-                <a:off x="675899" y="3226930"/>
+                <a:off x="827584" y="3196532"/>
                 <a:ext cx="3865930" cy="1452962"/>
               </a:xfrm>
               <a:prstGeom prst="rect">
@@ -9332,14 +9847,14 @@
             </p:nvSpPr>
             <p:spPr>
               <a:xfrm>
-                <a:off x="675899" y="3226930"/>
+                <a:off x="827584" y="3196532"/>
                 <a:ext cx="3865930" cy="1452962"/>
               </a:xfrm>
               <a:prstGeom prst="rect">
                 <a:avLst/>
               </a:prstGeom>
               <a:blipFill rotWithShape="0">
-                <a:blip r:embed="rId4"/>
+                <a:blip r:embed="rId3"/>
                 <a:stretch>
                   <a:fillRect/>
                 </a:stretch>
@@ -9370,7 +9885,7 @@
             </p:nvSpPr>
             <p:spPr>
               <a:xfrm>
-                <a:off x="4517338" y="3450291"/>
+                <a:off x="4572000" y="3388539"/>
                 <a:ext cx="2691506" cy="1068947"/>
               </a:xfrm>
               <a:prstGeom prst="rect">
@@ -9468,14 +9983,14 @@
             </p:nvSpPr>
             <p:spPr>
               <a:xfrm>
-                <a:off x="4517338" y="3450291"/>
+                <a:off x="4572000" y="3388539"/>
                 <a:ext cx="2691506" cy="1068947"/>
               </a:xfrm>
               <a:prstGeom prst="rect">
                 <a:avLst/>
               </a:prstGeom>
               <a:blipFill rotWithShape="0">
-                <a:blip r:embed="rId5"/>
+                <a:blip r:embed="rId4"/>
                 <a:stretch>
                   <a:fillRect/>
                 </a:stretch>
@@ -9506,7 +10021,7 @@
             </p:nvSpPr>
             <p:spPr>
               <a:xfrm>
-                <a:off x="3846304" y="1670163"/>
+                <a:off x="3248331" y="1662227"/>
                 <a:ext cx="3716851" cy="1452962"/>
               </a:xfrm>
               <a:prstGeom prst="rect">
@@ -9612,14 +10127,14 @@
             </p:nvSpPr>
             <p:spPr>
               <a:xfrm>
-                <a:off x="3846304" y="1670163"/>
+                <a:off x="3248331" y="1662227"/>
                 <a:ext cx="3716851" cy="1452962"/>
               </a:xfrm>
               <a:prstGeom prst="rect">
                 <a:avLst/>
               </a:prstGeom>
               <a:blipFill rotWithShape="0">
-                <a:blip r:embed="rId6"/>
+                <a:blip r:embed="rId5"/>
                 <a:stretch>
                   <a:fillRect/>
                 </a:stretch>
@@ -10324,8 +10839,8 @@
           </a:p>
         </p:txBody>
       </p:sp>
-      <mc:AlternateContent xmlns:mc="http://schemas.openxmlformats.org/markup-compatibility/2006">
-        <mc:Choice xmlns:a14="http://schemas.microsoft.com/office/drawing/2010/main" Requires="a14">
+      <mc:AlternateContent xmlns:mc="http://schemas.openxmlformats.org/markup-compatibility/2006" xmlns:a14="http://schemas.microsoft.com/office/drawing/2010/main">
+        <mc:Choice Requires="a14">
           <p:sp>
             <p:nvSpPr>
               <p:cNvPr id="5" name="テキスト ボックス 4"/>
@@ -10381,7 +10896,7 @@
             </p:txBody>
           </p:sp>
         </mc:Choice>
-        <mc:Fallback>
+        <mc:Fallback xmlns="">
           <p:sp>
             <p:nvSpPr>
               <p:cNvPr id="5" name="テキスト ボックス 4"/>
@@ -10531,8 +11046,8 @@
           </a:p>
         </p:txBody>
       </p:sp>
-      <mc:AlternateContent xmlns:mc="http://schemas.openxmlformats.org/markup-compatibility/2006">
-        <mc:Choice xmlns:a14="http://schemas.microsoft.com/office/drawing/2010/main" Requires="a14">
+      <mc:AlternateContent xmlns:mc="http://schemas.openxmlformats.org/markup-compatibility/2006" xmlns:a14="http://schemas.microsoft.com/office/drawing/2010/main">
+        <mc:Choice Requires="a14">
           <p:sp>
             <p:nvSpPr>
               <p:cNvPr id="18" name="テキスト ボックス 17"/>
@@ -10588,7 +11103,7 @@
             </p:txBody>
           </p:sp>
         </mc:Choice>
-        <mc:Fallback>
+        <mc:Fallback xmlns="">
           <p:sp>
             <p:nvSpPr>
               <p:cNvPr id="18" name="テキスト ボックス 17"/>
@@ -10714,8 +11229,8 @@
           <a:effectLst/>
         </p:spPr>
       </p:cxnSp>
-      <mc:AlternateContent xmlns:mc="http://schemas.openxmlformats.org/markup-compatibility/2006">
-        <mc:Choice xmlns:a14="http://schemas.microsoft.com/office/drawing/2010/main" Requires="a14">
+      <mc:AlternateContent xmlns:mc="http://schemas.openxmlformats.org/markup-compatibility/2006" xmlns:a14="http://schemas.microsoft.com/office/drawing/2010/main">
+        <mc:Choice Requires="a14">
           <p:sp>
             <p:nvSpPr>
               <p:cNvPr id="29" name="テキスト ボックス 28"/>
@@ -10778,7 +11293,7 @@
             </p:txBody>
           </p:sp>
         </mc:Choice>
-        <mc:Fallback>
+        <mc:Fallback xmlns="">
           <p:sp>
             <p:nvSpPr>
               <p:cNvPr id="29" name="テキスト ボックス 28"/>
@@ -10817,8 +11332,8 @@
           </p:sp>
         </mc:Fallback>
       </mc:AlternateContent>
-      <mc:AlternateContent xmlns:mc="http://schemas.openxmlformats.org/markup-compatibility/2006">
-        <mc:Choice xmlns:a14="http://schemas.microsoft.com/office/drawing/2010/main" Requires="a14">
+      <mc:AlternateContent xmlns:mc="http://schemas.openxmlformats.org/markup-compatibility/2006" xmlns:a14="http://schemas.microsoft.com/office/drawing/2010/main">
+        <mc:Choice Requires="a14">
           <p:sp>
             <p:nvSpPr>
               <p:cNvPr id="30" name="テキスト ボックス 29"/>
@@ -10881,7 +11396,7 @@
             </p:txBody>
           </p:sp>
         </mc:Choice>
-        <mc:Fallback>
+        <mc:Fallback xmlns="">
           <p:sp>
             <p:nvSpPr>
               <p:cNvPr id="30" name="テキスト ボックス 29"/>
@@ -10920,8 +11435,8 @@
           </p:sp>
         </mc:Fallback>
       </mc:AlternateContent>
-      <mc:AlternateContent xmlns:mc="http://schemas.openxmlformats.org/markup-compatibility/2006">
-        <mc:Choice xmlns:a14="http://schemas.microsoft.com/office/drawing/2010/main" Requires="a14">
+      <mc:AlternateContent xmlns:mc="http://schemas.openxmlformats.org/markup-compatibility/2006" xmlns:a14="http://schemas.microsoft.com/office/drawing/2010/main">
+        <mc:Choice Requires="a14">
           <p:sp>
             <p:nvSpPr>
               <p:cNvPr id="31" name="テキスト ボックス 30"/>
@@ -10984,7 +11499,7 @@
             </p:txBody>
           </p:sp>
         </mc:Choice>
-        <mc:Fallback>
+        <mc:Fallback xmlns="">
           <p:sp>
             <p:nvSpPr>
               <p:cNvPr id="31" name="テキスト ボックス 30"/>
@@ -11110,8 +11625,8 @@
           <a:effectLst/>
         </p:spPr>
       </p:cxnSp>
-      <mc:AlternateContent xmlns:mc="http://schemas.openxmlformats.org/markup-compatibility/2006">
-        <mc:Choice xmlns:a14="http://schemas.microsoft.com/office/drawing/2010/main" Requires="a14">
+      <mc:AlternateContent xmlns:mc="http://schemas.openxmlformats.org/markup-compatibility/2006" xmlns:a14="http://schemas.microsoft.com/office/drawing/2010/main">
+        <mc:Choice Requires="a14">
           <p:sp>
             <p:nvSpPr>
               <p:cNvPr id="35" name="テキスト ボックス 34"/>
@@ -11174,7 +11689,7 @@
             </p:txBody>
           </p:sp>
         </mc:Choice>
-        <mc:Fallback>
+        <mc:Fallback xmlns="">
           <p:sp>
             <p:nvSpPr>
               <p:cNvPr id="35" name="テキスト ボックス 34"/>
@@ -11213,8 +11728,8 @@
           </p:sp>
         </mc:Fallback>
       </mc:AlternateContent>
-      <mc:AlternateContent xmlns:mc="http://schemas.openxmlformats.org/markup-compatibility/2006">
-        <mc:Choice xmlns:a14="http://schemas.microsoft.com/office/drawing/2010/main" Requires="a14">
+      <mc:AlternateContent xmlns:mc="http://schemas.openxmlformats.org/markup-compatibility/2006" xmlns:a14="http://schemas.microsoft.com/office/drawing/2010/main">
+        <mc:Choice Requires="a14">
           <p:sp>
             <p:nvSpPr>
               <p:cNvPr id="36" name="テキスト ボックス 35"/>
@@ -11277,7 +11792,7 @@
             </p:txBody>
           </p:sp>
         </mc:Choice>
-        <mc:Fallback>
+        <mc:Fallback xmlns="">
           <p:sp>
             <p:nvSpPr>
               <p:cNvPr id="36" name="テキスト ボックス 35"/>
@@ -11316,8 +11831,8 @@
           </p:sp>
         </mc:Fallback>
       </mc:AlternateContent>
-      <mc:AlternateContent xmlns:mc="http://schemas.openxmlformats.org/markup-compatibility/2006">
-        <mc:Choice xmlns:a14="http://schemas.microsoft.com/office/drawing/2010/main" Requires="a14">
+      <mc:AlternateContent xmlns:mc="http://schemas.openxmlformats.org/markup-compatibility/2006" xmlns:a14="http://schemas.microsoft.com/office/drawing/2010/main">
+        <mc:Choice Requires="a14">
           <p:sp>
             <p:nvSpPr>
               <p:cNvPr id="37" name="テキスト ボックス 36"/>
@@ -11380,7 +11895,7 @@
             </p:txBody>
           </p:sp>
         </mc:Choice>
-        <mc:Fallback>
+        <mc:Fallback xmlns="">
           <p:sp>
             <p:nvSpPr>
               <p:cNvPr id="37" name="テキスト ボックス 36"/>
@@ -11514,8 +12029,8 @@
           </a:p>
         </p:txBody>
       </p:sp>
-      <mc:AlternateContent xmlns:mc="http://schemas.openxmlformats.org/markup-compatibility/2006">
-        <mc:Choice xmlns:a14="http://schemas.microsoft.com/office/drawing/2010/main" Requires="a14">
+      <mc:AlternateContent xmlns:mc="http://schemas.openxmlformats.org/markup-compatibility/2006" xmlns:a14="http://schemas.microsoft.com/office/drawing/2010/main">
+        <mc:Choice Requires="a14">
           <p:sp>
             <p:nvSpPr>
               <p:cNvPr id="8" name="テキスト ボックス 7"/>
@@ -11538,6 +12053,7 @@
               </a:bodyPr>
               <a:lstStyle/>
               <a:p>
+                <a:pPr/>
                 <a14:m>
                   <m:oMathPara xmlns:m="http://schemas.openxmlformats.org/officeDocument/2006/math">
                     <m:oMathParaPr>
@@ -11558,7 +12074,7 @@
             </p:txBody>
           </p:sp>
         </mc:Choice>
-        <mc:Fallback>
+        <mc:Fallback xmlns="">
           <p:sp>
             <p:nvSpPr>
               <p:cNvPr id="8" name="テキスト ボックス 7"/>
@@ -11754,8 +12270,8 @@
           </a:p>
         </p:txBody>
       </p:sp>
-      <mc:AlternateContent xmlns:mc="http://schemas.openxmlformats.org/markup-compatibility/2006">
-        <mc:Choice xmlns:a14="http://schemas.microsoft.com/office/drawing/2010/main" Requires="a14">
+      <mc:AlternateContent xmlns:mc="http://schemas.openxmlformats.org/markup-compatibility/2006" xmlns:a14="http://schemas.microsoft.com/office/drawing/2010/main">
+        <mc:Choice Requires="a14">
           <p:sp>
             <p:nvSpPr>
               <p:cNvPr id="30" name="テキスト ボックス 29"/>
@@ -12409,7 +12925,7 @@
             </p:txBody>
           </p:sp>
         </mc:Choice>
-        <mc:Fallback>
+        <mc:Fallback xmlns="">
           <p:sp>
             <p:nvSpPr>
               <p:cNvPr id="30" name="テキスト ボックス 29"/>
@@ -12448,8 +12964,8 @@
           </p:sp>
         </mc:Fallback>
       </mc:AlternateContent>
-      <mc:AlternateContent xmlns:mc="http://schemas.openxmlformats.org/markup-compatibility/2006">
-        <mc:Choice xmlns:a14="http://schemas.microsoft.com/office/drawing/2010/main" Requires="a14">
+      <mc:AlternateContent xmlns:mc="http://schemas.openxmlformats.org/markup-compatibility/2006" xmlns:a14="http://schemas.microsoft.com/office/drawing/2010/main">
+        <mc:Choice Requires="a14">
           <p:sp>
             <p:nvSpPr>
               <p:cNvPr id="3" name="テキスト ボックス 2"/>
@@ -12545,7 +13061,7 @@
             </p:txBody>
           </p:sp>
         </mc:Choice>
-        <mc:Fallback>
+        <mc:Fallback xmlns="">
           <p:sp>
             <p:nvSpPr>
               <p:cNvPr id="3" name="テキスト ボックス 2"/>
@@ -12584,8 +13100,8 @@
           </p:sp>
         </mc:Fallback>
       </mc:AlternateContent>
-      <mc:AlternateContent xmlns:mc="http://schemas.openxmlformats.org/markup-compatibility/2006">
-        <mc:Choice xmlns:a14="http://schemas.microsoft.com/office/drawing/2010/main" Requires="a14">
+      <mc:AlternateContent xmlns:mc="http://schemas.openxmlformats.org/markup-compatibility/2006" xmlns:a14="http://schemas.microsoft.com/office/drawing/2010/main">
+        <mc:Choice Requires="a14">
           <p:sp>
             <p:nvSpPr>
               <p:cNvPr id="6" name="正方形/長方形 5"/>
@@ -12678,7 +13194,7 @@
             </p:txBody>
           </p:sp>
         </mc:Choice>
-        <mc:Fallback>
+        <mc:Fallback xmlns="">
           <p:sp>
             <p:nvSpPr>
               <p:cNvPr id="6" name="正方形/長方形 5"/>
@@ -12946,8 +13462,8 @@
           </a:p>
         </p:txBody>
       </p:sp>
-      <mc:AlternateContent xmlns:mc="http://schemas.openxmlformats.org/markup-compatibility/2006">
-        <mc:Choice xmlns:a14="http://schemas.microsoft.com/office/drawing/2010/main" Requires="a14">
+      <mc:AlternateContent xmlns:mc="http://schemas.openxmlformats.org/markup-compatibility/2006" xmlns:a14="http://schemas.microsoft.com/office/drawing/2010/main">
+        <mc:Choice Requires="a14">
           <p:sp>
             <p:nvSpPr>
               <p:cNvPr id="30" name="テキスト ボックス 29"/>
@@ -13180,7 +13696,7 @@
             </p:txBody>
           </p:sp>
         </mc:Choice>
-        <mc:Fallback>
+        <mc:Fallback xmlns="">
           <p:sp>
             <p:nvSpPr>
               <p:cNvPr id="30" name="テキスト ボックス 29"/>
@@ -17487,8 +18003,8 @@
           </p:sp>
         </mc:Fallback>
       </mc:AlternateContent>
-      <mc:AlternateContent xmlns:mc="http://schemas.openxmlformats.org/markup-compatibility/2006">
-        <mc:Choice xmlns:a14="http://schemas.microsoft.com/office/drawing/2010/main" Requires="a14">
+      <mc:AlternateContent xmlns:mc="http://schemas.openxmlformats.org/markup-compatibility/2006" xmlns:a14="http://schemas.microsoft.com/office/drawing/2010/main">
+        <mc:Choice Requires="a14">
           <p:sp>
             <p:nvSpPr>
               <p:cNvPr id="33" name="テキスト ボックス 32"/>
@@ -17615,7 +18131,7 @@
             </p:txBody>
           </p:sp>
         </mc:Choice>
-        <mc:Fallback>
+        <mc:Fallback xmlns="">
           <p:sp>
             <p:nvSpPr>
               <p:cNvPr id="33" name="テキスト ボックス 32"/>
@@ -19922,8 +20438,8 @@
           </a:p>
         </p:txBody>
       </p:sp>
-      <mc:AlternateContent xmlns:mc="http://schemas.openxmlformats.org/markup-compatibility/2006">
-        <mc:Choice xmlns:a14="http://schemas.microsoft.com/office/drawing/2010/main" Requires="a14">
+      <mc:AlternateContent xmlns:mc="http://schemas.openxmlformats.org/markup-compatibility/2006" xmlns:a14="http://schemas.microsoft.com/office/drawing/2010/main">
+        <mc:Choice Requires="a14">
           <p:sp>
             <p:nvSpPr>
               <p:cNvPr id="7" name="テキスト ボックス 6"/>
@@ -20022,13 +20538,7 @@
                   <a:rPr lang="en-US" altLang="ja-JP" sz="1600" dirty="0" smtClean="0">
                     <a:latin typeface="+mn-ea"/>
                   </a:rPr>
-                  <a:t> and </a:t>
-                </a:r>
-                <a:r>
-                  <a:rPr lang="en-US" altLang="ja-JP" sz="1600" dirty="0" smtClean="0">
-                    <a:latin typeface="+mn-ea"/>
-                  </a:rPr>
-                  <a:t> </a:t>
+                  <a:t> and  </a:t>
                 </a:r>
                 <a14:m>
                   <m:oMath xmlns:m="http://schemas.openxmlformats.org/officeDocument/2006/math">
@@ -20068,7 +20578,7 @@
             </p:txBody>
           </p:sp>
         </mc:Choice>
-        <mc:Fallback>
+        <mc:Fallback xmlns="">
           <p:sp>
             <p:nvSpPr>
               <p:cNvPr id="7" name="テキスト ボックス 6"/>
@@ -20404,8 +20914,8 @@
           </p:sp>
         </mc:Fallback>
       </mc:AlternateContent>
-      <mc:AlternateContent xmlns:mc="http://schemas.openxmlformats.org/markup-compatibility/2006">
-        <mc:Choice xmlns:a14="http://schemas.microsoft.com/office/drawing/2010/main" Requires="a14">
+      <mc:AlternateContent xmlns:mc="http://schemas.openxmlformats.org/markup-compatibility/2006" xmlns:a14="http://schemas.microsoft.com/office/drawing/2010/main">
+        <mc:Choice Requires="a14">
           <p:sp>
             <p:nvSpPr>
               <p:cNvPr id="28" name="テキスト ボックス 27"/>
@@ -20768,7 +21278,7 @@
             </p:txBody>
           </p:sp>
         </mc:Choice>
-        <mc:Fallback>
+        <mc:Fallback xmlns="">
           <p:sp>
             <p:nvSpPr>
               <p:cNvPr id="28" name="テキスト ボックス 27"/>
@@ -20807,8 +21317,8 @@
           </p:sp>
         </mc:Fallback>
       </mc:AlternateContent>
-      <mc:AlternateContent xmlns:mc="http://schemas.openxmlformats.org/markup-compatibility/2006">
-        <mc:Choice xmlns:a14="http://schemas.microsoft.com/office/drawing/2010/main" Requires="a14">
+      <mc:AlternateContent xmlns:mc="http://schemas.openxmlformats.org/markup-compatibility/2006" xmlns:a14="http://schemas.microsoft.com/office/drawing/2010/main">
+        <mc:Choice Requires="a14">
           <p:sp>
             <p:nvSpPr>
               <p:cNvPr id="29" name="テキスト ボックス 28"/>
@@ -21279,7 +21789,7 @@
             </p:txBody>
           </p:sp>
         </mc:Choice>
-        <mc:Fallback>
+        <mc:Fallback xmlns="">
           <p:sp>
             <p:nvSpPr>
               <p:cNvPr id="29" name="テキスト ボックス 28"/>
@@ -23059,8 +23569,8 @@
           </p:sp>
         </mc:Fallback>
       </mc:AlternateContent>
-      <mc:AlternateContent xmlns:mc="http://schemas.openxmlformats.org/markup-compatibility/2006">
-        <mc:Choice xmlns:a14="http://schemas.microsoft.com/office/drawing/2010/main" Requires="a14">
+      <mc:AlternateContent xmlns:mc="http://schemas.openxmlformats.org/markup-compatibility/2006" xmlns:a14="http://schemas.microsoft.com/office/drawing/2010/main">
+        <mc:Choice Requires="a14">
           <p:sp>
             <p:nvSpPr>
               <p:cNvPr id="41" name="テキスト ボックス 40"/>
@@ -23111,13 +23621,7 @@
                             <a:rPr lang="en-US" altLang="ja-JP" sz="2400" b="0" i="1" smtClean="0">
                               <a:latin typeface="Cambria Math" panose="02040503050406030204" pitchFamily="18" charset="0"/>
                             </a:rPr>
-                            <m:t>𝑑</m:t>
-                          </m:r>
-                          <m:r>
-                            <a:rPr lang="en-US" altLang="ja-JP" sz="2400" b="0" i="1" smtClean="0">
-                              <a:latin typeface="Cambria Math" panose="02040503050406030204" pitchFamily="18" charset="0"/>
-                            </a:rPr>
-                            <m:t>𝑡</m:t>
+                            <m:t>𝑑𝑡</m:t>
                           </m:r>
                         </m:den>
                       </m:f>
@@ -23729,7 +24233,7 @@
             </p:txBody>
           </p:sp>
         </mc:Choice>
-        <mc:Fallback>
+        <mc:Fallback xmlns="">
           <p:sp>
             <p:nvSpPr>
               <p:cNvPr id="41" name="テキスト ボックス 40"/>
@@ -25581,8 +26085,8 @@
           </a:p>
         </p:txBody>
       </p:sp>
-      <mc:AlternateContent xmlns:mc="http://schemas.openxmlformats.org/markup-compatibility/2006">
-        <mc:Choice xmlns:a14="http://schemas.microsoft.com/office/drawing/2010/main" Requires="a14">
+      <mc:AlternateContent xmlns:mc="http://schemas.openxmlformats.org/markup-compatibility/2006" xmlns:a14="http://schemas.microsoft.com/office/drawing/2010/main">
+        <mc:Choice Requires="a14">
           <p:sp>
             <p:nvSpPr>
               <p:cNvPr id="27" name="テキスト ボックス 26"/>
@@ -26009,7 +26513,7 @@
             </p:txBody>
           </p:sp>
         </mc:Choice>
-        <mc:Fallback>
+        <mc:Fallback xmlns="">
           <p:sp>
             <p:nvSpPr>
               <p:cNvPr id="27" name="テキスト ボックス 26"/>
@@ -26048,8 +26552,8 @@
           </p:sp>
         </mc:Fallback>
       </mc:AlternateContent>
-      <mc:AlternateContent xmlns:mc="http://schemas.openxmlformats.org/markup-compatibility/2006">
-        <mc:Choice xmlns:a14="http://schemas.microsoft.com/office/drawing/2010/main" Requires="a14">
+      <mc:AlternateContent xmlns:mc="http://schemas.openxmlformats.org/markup-compatibility/2006" xmlns:a14="http://schemas.microsoft.com/office/drawing/2010/main">
+        <mc:Choice Requires="a14">
           <p:sp>
             <p:nvSpPr>
               <p:cNvPr id="59" name="テキスト ボックス 58"/>
@@ -26326,7 +26830,7 @@
             </p:txBody>
           </p:sp>
         </mc:Choice>
-        <mc:Fallback>
+        <mc:Fallback xmlns="">
           <p:sp>
             <p:nvSpPr>
               <p:cNvPr id="59" name="テキスト ボックス 58"/>
@@ -26365,8 +26869,8 @@
           </p:sp>
         </mc:Fallback>
       </mc:AlternateContent>
-      <mc:AlternateContent xmlns:mc="http://schemas.openxmlformats.org/markup-compatibility/2006">
-        <mc:Choice xmlns:a14="http://schemas.microsoft.com/office/drawing/2010/main" Requires="a14">
+      <mc:AlternateContent xmlns:mc="http://schemas.openxmlformats.org/markup-compatibility/2006" xmlns:a14="http://schemas.microsoft.com/office/drawing/2010/main">
+        <mc:Choice Requires="a14">
           <p:sp>
             <p:nvSpPr>
               <p:cNvPr id="66" name="テキスト ボックス 65"/>
@@ -26569,7 +27073,7 @@
             </p:txBody>
           </p:sp>
         </mc:Choice>
-        <mc:Fallback>
+        <mc:Fallback xmlns="">
           <p:sp>
             <p:nvSpPr>
               <p:cNvPr id="66" name="テキスト ボックス 65"/>

</xml_diff>